<commit_message>
Corrected errors in tables on slides
</commit_message>
<xml_diff>
--- a/slides/4_DistanceAndSimilarityMeasures_Part1.pptx
+++ b/slides/4_DistanceAndSimilarityMeasures_Part1.pptx
@@ -16949,7 +16949,7 @@
           <p:nvPr>
             <p:extLst>
               <p:ext uri="{D42A27DB-BD31-4B8C-83A1-F6EECF244321}">
-                <p14:modId xmlns:p14="http://schemas.microsoft.com/office/powerpoint/2010/main" val="2657871498"/>
+                <p14:modId xmlns:p14="http://schemas.microsoft.com/office/powerpoint/2010/main" val="3571526124"/>
               </p:ext>
             </p:extLst>
           </p:nvPr>
@@ -17111,12 +17111,20 @@
                     <a:lstStyle/>
                     <a:p>
                       <a:r>
+                        <a:rPr lang="en-US" sz="2400" b="1">
+                          <a:solidFill>
+                            <a:schemeClr val="tx1"/>
+                          </a:solidFill>
+                        </a:rPr>
+                        <a:t>Squared </a:t>
+                      </a:r>
+                      <a:r>
                         <a:rPr lang="en-US" sz="2400" b="1" dirty="0">
                           <a:solidFill>
                             <a:schemeClr val="tx1"/>
                           </a:solidFill>
                         </a:rPr>
-                        <a:t>Squared distance</a:t>
+                        <a:t>distance</a:t>
                       </a:r>
                     </a:p>
                   </a:txBody>

</xml_diff>

<commit_message>
Updates and corrections to slides, added summary
</commit_message>
<xml_diff>
--- a/slides/4_DistanceAndSimilarityMeasures_Part1.pptx
+++ b/slides/4_DistanceAndSimilarityMeasures_Part1.pptx
@@ -5,7 +5,7 @@
     <p:sldMasterId id="2147483648" r:id="rId1"/>
   </p:sldMasterIdLst>
   <p:notesMasterIdLst>
-    <p:notesMasterId r:id="rId28"/>
+    <p:notesMasterId r:id="rId29"/>
   </p:notesMasterIdLst>
   <p:sldIdLst>
     <p:sldId id="719" r:id="rId2"/>
@@ -34,6 +34,7 @@
     <p:sldId id="675" r:id="rId25"/>
     <p:sldId id="682" r:id="rId26"/>
     <p:sldId id="683" r:id="rId27"/>
+    <p:sldId id="720" r:id="rId28"/>
   </p:sldIdLst>
   <p:sldSz cx="12192000" cy="6858000"/>
   <p:notesSz cx="6858000" cy="9144000"/>
@@ -222,7 +223,7 @@
           <a:p>
             <a:fld id="{8DD534D1-5B48-49E9-A024-C5EAE54CADD0}" type="datetimeFigureOut">
               <a:rPr lang="en-US" smtClean="0"/>
-              <a:t>6/29/2022</a:t>
+              <a:t>2/11/2023</a:t>
             </a:fld>
             <a:endParaRPr lang="en-US"/>
           </a:p>
@@ -2019,6 +2020,91 @@
 </p:notes>
 </file>
 
+<file path=ppt/notesSlides/notesSlide26.xml><?xml version="1.0" encoding="utf-8"?>
+<p:notes xmlns:a="http://schemas.openxmlformats.org/drawingml/2006/main" xmlns:r="http://schemas.openxmlformats.org/officeDocument/2006/relationships" xmlns:p="http://schemas.openxmlformats.org/presentationml/2006/main">
+  <p:cSld>
+    <p:spTree>
+      <p:nvGrpSpPr>
+        <p:cNvPr id="1" name=""/>
+        <p:cNvGrpSpPr/>
+        <p:nvPr/>
+      </p:nvGrpSpPr>
+      <p:grpSpPr>
+        <a:xfrm>
+          <a:off x="0" y="0"/>
+          <a:ext cx="0" cy="0"/>
+          <a:chOff x="0" y="0"/>
+          <a:chExt cx="0" cy="0"/>
+        </a:xfrm>
+      </p:grpSpPr>
+      <p:sp>
+        <p:nvSpPr>
+          <p:cNvPr id="2" name="Slide Image Placeholder 1"/>
+          <p:cNvSpPr>
+            <a:spLocks noGrp="1" noRot="1" noChangeAspect="1"/>
+          </p:cNvSpPr>
+          <p:nvPr>
+            <p:ph type="sldImg"/>
+          </p:nvPr>
+        </p:nvSpPr>
+        <p:spPr/>
+      </p:sp>
+      <p:sp>
+        <p:nvSpPr>
+          <p:cNvPr id="3" name="Notes Placeholder 2"/>
+          <p:cNvSpPr>
+            <a:spLocks noGrp="1"/>
+          </p:cNvSpPr>
+          <p:nvPr>
+            <p:ph type="body" idx="1"/>
+          </p:nvPr>
+        </p:nvSpPr>
+        <p:spPr/>
+        <p:txBody>
+          <a:bodyPr/>
+          <a:lstStyle/>
+          <a:p>
+            <a:endParaRPr lang="en-US" dirty="0"/>
+          </a:p>
+        </p:txBody>
+      </p:sp>
+      <p:sp>
+        <p:nvSpPr>
+          <p:cNvPr id="4" name="Slide Number Placeholder 3"/>
+          <p:cNvSpPr>
+            <a:spLocks noGrp="1"/>
+          </p:cNvSpPr>
+          <p:nvPr>
+            <p:ph type="sldNum" sz="quarter" idx="10"/>
+          </p:nvPr>
+        </p:nvSpPr>
+        <p:spPr/>
+        <p:txBody>
+          <a:bodyPr/>
+          <a:lstStyle/>
+          <a:p>
+            <a:fld id="{4CFD207A-07DF-40AD-A916-9872E089CE7A}" type="slidenum">
+              <a:rPr lang="en-US" smtClean="0"/>
+              <a:pPr/>
+              <a:t>27</a:t>
+            </a:fld>
+            <a:endParaRPr lang="en-US"/>
+          </a:p>
+        </p:txBody>
+      </p:sp>
+    </p:spTree>
+    <p:extLst>
+      <p:ext uri="{BB962C8B-B14F-4D97-AF65-F5344CB8AC3E}">
+        <p14:creationId xmlns:p14="http://schemas.microsoft.com/office/powerpoint/2010/main" val="1415537555"/>
+      </p:ext>
+    </p:extLst>
+  </p:cSld>
+  <p:clrMapOvr>
+    <a:masterClrMapping/>
+  </p:clrMapOvr>
+</p:notes>
+</file>
+
 <file path=ppt/notesSlides/notesSlide3.xml><?xml version="1.0" encoding="utf-8"?>
 <p:notes xmlns:a="http://schemas.openxmlformats.org/drawingml/2006/main" xmlns:r="http://schemas.openxmlformats.org/officeDocument/2006/relationships" xmlns:p="http://schemas.openxmlformats.org/presentationml/2006/main">
   <p:cSld>
@@ -2761,7 +2847,7 @@
           <a:p>
             <a:fld id="{9DC183D5-83EE-4A48-BB2E-1FC30CD8E44A}" type="datetimeFigureOut">
               <a:rPr lang="en-US" smtClean="0"/>
-              <a:t>6/29/2022</a:t>
+              <a:t>2/11/2023</a:t>
             </a:fld>
             <a:endParaRPr lang="en-US"/>
           </a:p>
@@ -2959,7 +3045,7 @@
           <a:p>
             <a:fld id="{9DC183D5-83EE-4A48-BB2E-1FC30CD8E44A}" type="datetimeFigureOut">
               <a:rPr lang="en-US" smtClean="0"/>
-              <a:t>6/29/2022</a:t>
+              <a:t>2/11/2023</a:t>
             </a:fld>
             <a:endParaRPr lang="en-US"/>
           </a:p>
@@ -3167,7 +3253,7 @@
           <a:p>
             <a:fld id="{9DC183D5-83EE-4A48-BB2E-1FC30CD8E44A}" type="datetimeFigureOut">
               <a:rPr lang="en-US" smtClean="0"/>
-              <a:t>6/29/2022</a:t>
+              <a:t>2/11/2023</a:t>
             </a:fld>
             <a:endParaRPr lang="en-US"/>
           </a:p>
@@ -3537,7 +3623,7 @@
           <a:p>
             <a:fld id="{9DC183D5-83EE-4A48-BB2E-1FC30CD8E44A}" type="datetimeFigureOut">
               <a:rPr lang="en-US" smtClean="0"/>
-              <a:t>6/29/2022</a:t>
+              <a:t>2/11/2023</a:t>
             </a:fld>
             <a:endParaRPr lang="en-US"/>
           </a:p>
@@ -3812,7 +3898,7 @@
           <a:p>
             <a:fld id="{9DC183D5-83EE-4A48-BB2E-1FC30CD8E44A}" type="datetimeFigureOut">
               <a:rPr lang="en-US" smtClean="0"/>
-              <a:t>6/29/2022</a:t>
+              <a:t>2/11/2023</a:t>
             </a:fld>
             <a:endParaRPr lang="en-US"/>
           </a:p>
@@ -4077,7 +4163,7 @@
           <a:p>
             <a:fld id="{9DC183D5-83EE-4A48-BB2E-1FC30CD8E44A}" type="datetimeFigureOut">
               <a:rPr lang="en-US" smtClean="0"/>
-              <a:t>6/29/2022</a:t>
+              <a:t>2/11/2023</a:t>
             </a:fld>
             <a:endParaRPr lang="en-US"/>
           </a:p>
@@ -4489,7 +4575,7 @@
           <a:p>
             <a:fld id="{9DC183D5-83EE-4A48-BB2E-1FC30CD8E44A}" type="datetimeFigureOut">
               <a:rPr lang="en-US" smtClean="0"/>
-              <a:t>6/29/2022</a:t>
+              <a:t>2/11/2023</a:t>
             </a:fld>
             <a:endParaRPr lang="en-US"/>
           </a:p>
@@ -4630,7 +4716,7 @@
           <a:p>
             <a:fld id="{9DC183D5-83EE-4A48-BB2E-1FC30CD8E44A}" type="datetimeFigureOut">
               <a:rPr lang="en-US" smtClean="0"/>
-              <a:t>6/29/2022</a:t>
+              <a:t>2/11/2023</a:t>
             </a:fld>
             <a:endParaRPr lang="en-US"/>
           </a:p>
@@ -4743,7 +4829,7 @@
           <a:p>
             <a:fld id="{9DC183D5-83EE-4A48-BB2E-1FC30CD8E44A}" type="datetimeFigureOut">
               <a:rPr lang="en-US" smtClean="0"/>
-              <a:t>6/29/2022</a:t>
+              <a:t>2/11/2023</a:t>
             </a:fld>
             <a:endParaRPr lang="en-US"/>
           </a:p>
@@ -5054,7 +5140,7 @@
           <a:p>
             <a:fld id="{9DC183D5-83EE-4A48-BB2E-1FC30CD8E44A}" type="datetimeFigureOut">
               <a:rPr lang="en-US" smtClean="0"/>
-              <a:t>6/29/2022</a:t>
+              <a:t>2/11/2023</a:t>
             </a:fld>
             <a:endParaRPr lang="en-US"/>
           </a:p>
@@ -5342,7 +5428,7 @@
           <a:p>
             <a:fld id="{9DC183D5-83EE-4A48-BB2E-1FC30CD8E44A}" type="datetimeFigureOut">
               <a:rPr lang="en-US" smtClean="0"/>
-              <a:t>6/29/2022</a:t>
+              <a:t>2/11/2023</a:t>
             </a:fld>
             <a:endParaRPr lang="en-US"/>
           </a:p>
@@ -5583,7 +5669,7 @@
           <a:p>
             <a:fld id="{9DC183D5-83EE-4A48-BB2E-1FC30CD8E44A}" type="datetimeFigureOut">
               <a:rPr lang="en-US" smtClean="0"/>
-              <a:t>6/29/2022</a:t>
+              <a:t>2/11/2023</a:t>
             </a:fld>
             <a:endParaRPr lang="en-US"/>
           </a:p>
@@ -6185,7 +6271,7 @@
             <a:pPr algn="ctr"/>
             <a:r>
               <a:rPr lang="en-US" sz="1100" dirty="0"/>
-              <a:t>Copyright 2021, 2022, Stephen F Elston. All rights reserved</a:t>
+              <a:t>Copyright 2021, 2022, 2023, Stephen F Elston. All rights reserved</a:t>
             </a:r>
             <a:r>
               <a:rPr lang="en-US" dirty="0"/>
@@ -6253,8 +6339,8 @@
           </a:p>
         </p:txBody>
       </p:sp>
-      <mc:AlternateContent xmlns:mc="http://schemas.openxmlformats.org/markup-compatibility/2006" xmlns:a14="http://schemas.microsoft.com/office/drawing/2010/main">
-        <mc:Choice Requires="a14">
+      <mc:AlternateContent xmlns:mc="http://schemas.openxmlformats.org/markup-compatibility/2006">
+        <mc:Choice xmlns:a14="http://schemas.microsoft.com/office/drawing/2010/main" Requires="a14">
           <p:sp>
             <p:nvSpPr>
               <p:cNvPr id="3" name="Content Placeholder 2"/>
@@ -6273,7 +6359,7 @@
             </p:spPr>
             <p:txBody>
               <a:bodyPr>
-                <a:normAutofit/>
+                <a:normAutofit fontScale="85000" lnSpcReduction="10000"/>
               </a:bodyPr>
               <a:lstStyle/>
               <a:p>
@@ -6342,146 +6428,197 @@
                         <a:rPr lang="en-US" b="0" i="1" smtClean="0">
                           <a:latin typeface="Cambria Math" panose="02040503050406030204" pitchFamily="18" charset="0"/>
                         </a:rPr>
-                        <m:t>= </m:t>
+                        <m:t>=</m:t>
                       </m:r>
-                      <m:nary>
-                        <m:naryPr>
-                          <m:chr m:val="∑"/>
+                      <m:sSup>
+                        <m:sSupPr>
                           <m:ctrlPr>
                             <a:rPr lang="en-US" b="0" i="1" smtClean="0">
                               <a:latin typeface="Cambria Math" panose="02040503050406030204" pitchFamily="18" charset="0"/>
                             </a:rPr>
                           </m:ctrlPr>
-                        </m:naryPr>
-                        <m:sub>
-                          <m:r>
-                            <m:rPr>
-                              <m:brk m:alnAt="23"/>
-                            </m:rPr>
-                            <a:rPr lang="en-US" b="0" i="1" smtClean="0">
-                              <a:latin typeface="Cambria Math" panose="02040503050406030204" pitchFamily="18" charset="0"/>
-                            </a:rPr>
-                            <m:t>𝑖</m:t>
-                          </m:r>
-                          <m:r>
-                            <a:rPr lang="en-US" b="0" i="1" smtClean="0">
-                              <a:latin typeface="Cambria Math" panose="02040503050406030204" pitchFamily="18" charset="0"/>
-                            </a:rPr>
-                            <m:t>=1</m:t>
-                          </m:r>
-                        </m:sub>
-                        <m:sup>
-                          <m:r>
-                            <a:rPr lang="en-US" b="0" i="1" smtClean="0">
-                              <a:latin typeface="Cambria Math" panose="02040503050406030204" pitchFamily="18" charset="0"/>
-                            </a:rPr>
-                            <m:t>𝑝</m:t>
-                          </m:r>
-                        </m:sup>
+                        </m:sSupPr>
                         <m:e>
-                          <m:r>
-                            <a:rPr lang="en-US" b="0" i="1" smtClean="0">
-                              <a:latin typeface="Cambria Math" panose="02040503050406030204" pitchFamily="18" charset="0"/>
-                            </a:rPr>
-                            <m:t> (</m:t>
-                          </m:r>
-                          <m:sSubSup>
-                            <m:sSubSupPr>
+                          <m:d>
+                            <m:dPr>
+                              <m:begChr m:val="["/>
+                              <m:endChr m:val="]"/>
                               <m:ctrlPr>
                                 <a:rPr lang="en-US" b="0" i="1" smtClean="0">
                                   <a:latin typeface="Cambria Math" panose="02040503050406030204" pitchFamily="18" charset="0"/>
                                 </a:rPr>
                               </m:ctrlPr>
-                            </m:sSubSupPr>
+                            </m:dPr>
                             <m:e>
-                              <m:r>
-                                <a:rPr lang="en-US" b="0" i="1" smtClean="0">
-                                  <a:latin typeface="Cambria Math" panose="02040503050406030204" pitchFamily="18" charset="0"/>
-                                </a:rPr>
-                                <m:t>𝑥</m:t>
-                              </m:r>
+                              <m:nary>
+                                <m:naryPr>
+                                  <m:chr m:val="∑"/>
+                                  <m:ctrlPr>
+                                    <a:rPr lang="en-US" i="1">
+                                      <a:latin typeface="Cambria Math" panose="02040503050406030204" pitchFamily="18" charset="0"/>
+                                    </a:rPr>
+                                  </m:ctrlPr>
+                                </m:naryPr>
+                                <m:sub>
+                                  <m:r>
+                                    <m:rPr>
+                                      <m:brk m:alnAt="23"/>
+                                    </m:rPr>
+                                    <a:rPr lang="en-US" i="1">
+                                      <a:latin typeface="Cambria Math" panose="02040503050406030204" pitchFamily="18" charset="0"/>
+                                    </a:rPr>
+                                    <m:t>𝑖</m:t>
+                                  </m:r>
+                                  <m:r>
+                                    <a:rPr lang="en-US" i="1">
+                                      <a:latin typeface="Cambria Math" panose="02040503050406030204" pitchFamily="18" charset="0"/>
+                                    </a:rPr>
+                                    <m:t>=1</m:t>
+                                  </m:r>
+                                </m:sub>
+                                <m:sup>
+                                  <m:r>
+                                    <a:rPr lang="en-US" i="1">
+                                      <a:latin typeface="Cambria Math" panose="02040503050406030204" pitchFamily="18" charset="0"/>
+                                    </a:rPr>
+                                    <m:t>𝑝</m:t>
+                                  </m:r>
+                                </m:sup>
+                                <m:e>
+                                  <m:r>
+                                    <a:rPr lang="en-US" i="1">
+                                      <a:latin typeface="Cambria Math" panose="02040503050406030204" pitchFamily="18" charset="0"/>
+                                    </a:rPr>
+                                    <m:t> (</m:t>
+                                  </m:r>
+                                  <m:sSubSup>
+                                    <m:sSubSupPr>
+                                      <m:ctrlPr>
+                                        <a:rPr lang="en-US" i="1">
+                                          <a:latin typeface="Cambria Math" panose="02040503050406030204" pitchFamily="18" charset="0"/>
+                                        </a:rPr>
+                                      </m:ctrlPr>
+                                    </m:sSubSupPr>
+                                    <m:e>
+                                      <m:r>
+                                        <a:rPr lang="en-US" i="1">
+                                          <a:latin typeface="Cambria Math" panose="02040503050406030204" pitchFamily="18" charset="0"/>
+                                        </a:rPr>
+                                        <m:t>𝑥</m:t>
+                                      </m:r>
+                                    </m:e>
+                                    <m:sub>
+                                      <m:r>
+                                        <a:rPr lang="en-US" i="1">
+                                          <a:latin typeface="Cambria Math" panose="02040503050406030204" pitchFamily="18" charset="0"/>
+                                        </a:rPr>
+                                        <m:t>𝑖</m:t>
+                                      </m:r>
+                                    </m:sub>
+                                    <m:sup>
+                                      <m:r>
+                                        <a:rPr lang="en-US" i="1">
+                                          <a:latin typeface="Cambria Math" panose="02040503050406030204" pitchFamily="18" charset="0"/>
+                                        </a:rPr>
+                                        <m:t> </m:t>
+                                      </m:r>
+                                    </m:sup>
+                                  </m:sSubSup>
+                                  <m:r>
+                                    <a:rPr lang="en-US" i="1">
+                                      <a:latin typeface="Cambria Math" panose="02040503050406030204" pitchFamily="18" charset="0"/>
+                                    </a:rPr>
+                                    <m:t>−</m:t>
+                                  </m:r>
+                                  <m:sSub>
+                                    <m:sSubPr>
+                                      <m:ctrlPr>
+                                        <a:rPr lang="en-US" i="1">
+                                          <a:latin typeface="Cambria Math" panose="02040503050406030204" pitchFamily="18" charset="0"/>
+                                        </a:rPr>
+                                      </m:ctrlPr>
+                                    </m:sSubPr>
+                                    <m:e>
+                                      <m:r>
+                                        <a:rPr lang="en-US" i="1">
+                                          <a:latin typeface="Cambria Math" panose="02040503050406030204" pitchFamily="18" charset="0"/>
+                                        </a:rPr>
+                                        <m:t>𝑥</m:t>
+                                      </m:r>
+                                      <m:r>
+                                        <a:rPr lang="en-US" i="1">
+                                          <a:latin typeface="Cambria Math" panose="02040503050406030204" pitchFamily="18" charset="0"/>
+                                        </a:rPr>
+                                        <m:t>′</m:t>
+                                      </m:r>
+                                    </m:e>
+                                    <m:sub>
+                                      <m:r>
+                                        <a:rPr lang="en-US" i="1">
+                                          <a:latin typeface="Cambria Math" panose="02040503050406030204" pitchFamily="18" charset="0"/>
+                                        </a:rPr>
+                                        <m:t>𝑖</m:t>
+                                      </m:r>
+                                    </m:sub>
+                                  </m:sSub>
+                                  <m:sSup>
+                                    <m:sSupPr>
+                                      <m:ctrlPr>
+                                        <a:rPr lang="en-US" i="1">
+                                          <a:latin typeface="Cambria Math" panose="02040503050406030204" pitchFamily="18" charset="0"/>
+                                        </a:rPr>
+                                      </m:ctrlPr>
+                                    </m:sSupPr>
+                                    <m:e>
+                                      <m:r>
+                                        <a:rPr lang="en-US" i="1">
+                                          <a:latin typeface="Cambria Math" panose="02040503050406030204" pitchFamily="18" charset="0"/>
+                                        </a:rPr>
+                                        <m:t>)</m:t>
+                                      </m:r>
+                                    </m:e>
+                                    <m:sup>
+                                      <m:r>
+                                        <a:rPr lang="en-US" i="1">
+                                          <a:latin typeface="Cambria Math" panose="02040503050406030204" pitchFamily="18" charset="0"/>
+                                        </a:rPr>
+                                        <m:t>2</m:t>
+                                      </m:r>
+                                    </m:sup>
+                                  </m:sSup>
+                                </m:e>
+                              </m:nary>
                             </m:e>
-                            <m:sub>
-                              <m:r>
-                                <a:rPr lang="en-US" b="0" i="1" smtClean="0">
-                                  <a:latin typeface="Cambria Math" panose="02040503050406030204" pitchFamily="18" charset="0"/>
-                                </a:rPr>
-                                <m:t>𝑖</m:t>
-                              </m:r>
-                            </m:sub>
-                            <m:sup>
-                              <m:r>
-                                <a:rPr lang="en-US" b="0" i="1" smtClean="0">
-                                  <a:latin typeface="Cambria Math" panose="02040503050406030204" pitchFamily="18" charset="0"/>
-                                </a:rPr>
-                                <m:t> </m:t>
-                              </m:r>
-                            </m:sup>
-                          </m:sSubSup>
-                          <m:r>
-                            <a:rPr lang="en-US" b="0" i="1" smtClean="0">
-                              <a:latin typeface="Cambria Math" panose="02040503050406030204" pitchFamily="18" charset="0"/>
-                            </a:rPr>
-                            <m:t>−</m:t>
-                          </m:r>
-                          <m:sSub>
-                            <m:sSubPr>
+                          </m:d>
+                        </m:e>
+                        <m:sup>
+                          <m:f>
+                            <m:fPr>
                               <m:ctrlPr>
                                 <a:rPr lang="en-US" b="0" i="1" smtClean="0">
                                   <a:latin typeface="Cambria Math" panose="02040503050406030204" pitchFamily="18" charset="0"/>
                                 </a:rPr>
                               </m:ctrlPr>
-                            </m:sSubPr>
-                            <m:e>
+                            </m:fPr>
+                            <m:num>
                               <m:r>
                                 <a:rPr lang="en-US" b="0" i="1" smtClean="0">
                                   <a:latin typeface="Cambria Math" panose="02040503050406030204" pitchFamily="18" charset="0"/>
                                 </a:rPr>
-                                <m:t>𝑥</m:t>
+                                <m:t>1</m:t>
                               </m:r>
-                              <m:r>
-                                <a:rPr lang="en-US" b="0" i="1" smtClean="0">
-                                  <a:latin typeface="Cambria Math" panose="02040503050406030204" pitchFamily="18" charset="0"/>
-                                </a:rPr>
-                                <m:t>′</m:t>
-                              </m:r>
-                            </m:e>
-                            <m:sub>
-                              <m:r>
-                                <a:rPr lang="en-US" b="0" i="1" smtClean="0">
-                                  <a:latin typeface="Cambria Math" panose="02040503050406030204" pitchFamily="18" charset="0"/>
-                                </a:rPr>
-                                <m:t>𝑖</m:t>
-                              </m:r>
-                            </m:sub>
-                          </m:sSub>
-                          <m:sSup>
-                            <m:sSupPr>
-                              <m:ctrlPr>
-                                <a:rPr lang="en-US" b="0" i="1" smtClean="0">
-                                  <a:latin typeface="Cambria Math" panose="02040503050406030204" pitchFamily="18" charset="0"/>
-                                </a:rPr>
-                              </m:ctrlPr>
-                            </m:sSupPr>
-                            <m:e>
-                              <m:r>
-                                <a:rPr lang="en-US" b="0" i="1" smtClean="0">
-                                  <a:latin typeface="Cambria Math" panose="02040503050406030204" pitchFamily="18" charset="0"/>
-                                </a:rPr>
-                                <m:t>)</m:t>
-                              </m:r>
-                            </m:e>
-                            <m:sup>
+                            </m:num>
+                            <m:den>
                               <m:r>
                                 <a:rPr lang="en-US" b="0" i="1" smtClean="0">
                                   <a:latin typeface="Cambria Math" panose="02040503050406030204" pitchFamily="18" charset="0"/>
                                 </a:rPr>
                                 <m:t>2</m:t>
                               </m:r>
-                            </m:sup>
-                          </m:sSup>
-                        </m:e>
-                      </m:nary>
+                            </m:den>
+                          </m:f>
+                        </m:sup>
+                      </m:sSup>
                     </m:oMath>
                   </m:oMathPara>
                 </a14:m>
@@ -6497,7 +6634,7 @@
             </p:txBody>
           </p:sp>
         </mc:Choice>
-        <mc:Fallback xmlns="">
+        <mc:Fallback>
           <p:sp>
             <p:nvSpPr>
               <p:cNvPr id="3" name="Content Placeholder 2"/>
@@ -6516,7 +6653,7 @@
               <a:blipFill>
                 <a:blip r:embed="rId3"/>
                 <a:stretch>
-                  <a:fillRect l="-1111" t="-6320"/>
+                  <a:fillRect l="-847" t="-7063"/>
                 </a:stretch>
               </a:blipFill>
             </p:spPr>
@@ -12891,7 +13028,7 @@
               <a:rPr lang="en-US" sz="2800" dirty="0">
                 <a:latin typeface="+mn-lt"/>
               </a:rPr>
-              <a:t>Then normalize</a:t>
+              <a:t>Optionally, normalize</a:t>
             </a:r>
           </a:p>
           <a:p>
@@ -16503,6 +16640,14 @@
               <a:rPr lang="en-US" dirty="0">
                 <a:latin typeface="+mn-lt"/>
               </a:rPr>
+              <a:t>Matching partners in a dating app</a:t>
+            </a:r>
+          </a:p>
+          <a:p>
+            <a:r>
+              <a:rPr lang="en-US" dirty="0">
+                <a:latin typeface="+mn-lt"/>
+              </a:rPr>
               <a:t> Etc. </a:t>
             </a:r>
           </a:p>
@@ -16760,6 +16905,55 @@
                                           <p:spTgt spid="3">
                                             <p:txEl>
                                               <p:pRg st="5" end="5"/>
+                                            </p:txEl>
+                                          </p:spTgt>
+                                        </p:tgtEl>
+                                        <p:attrNameLst>
+                                          <p:attrName>style.visibility</p:attrName>
+                                        </p:attrNameLst>
+                                      </p:cBhvr>
+                                      <p:to>
+                                        <p:strVal val="visible"/>
+                                      </p:to>
+                                    </p:set>
+                                  </p:childTnLst>
+                                </p:cTn>
+                              </p:par>
+                            </p:childTnLst>
+                          </p:cTn>
+                        </p:par>
+                      </p:childTnLst>
+                    </p:cTn>
+                  </p:par>
+                  <p:par>
+                    <p:cTn id="23" fill="hold">
+                      <p:stCondLst>
+                        <p:cond delay="indefinite"/>
+                      </p:stCondLst>
+                      <p:childTnLst>
+                        <p:par>
+                          <p:cTn id="24" fill="hold">
+                            <p:stCondLst>
+                              <p:cond delay="0"/>
+                            </p:stCondLst>
+                            <p:childTnLst>
+                              <p:par>
+                                <p:cTn id="25" presetID="1" presetClass="entr" presetSubtype="0" fill="hold" nodeType="clickEffect">
+                                  <p:stCondLst>
+                                    <p:cond delay="0"/>
+                                  </p:stCondLst>
+                                  <p:childTnLst>
+                                    <p:set>
+                                      <p:cBhvr>
+                                        <p:cTn id="26" dur="1" fill="hold">
+                                          <p:stCondLst>
+                                            <p:cond delay="0"/>
+                                          </p:stCondLst>
+                                        </p:cTn>
+                                        <p:tgtEl>
+                                          <p:spTgt spid="3">
+                                            <p:txEl>
+                                              <p:pRg st="6" end="6"/>
                                             </p:txEl>
                                           </p:spTgt>
                                         </p:tgtEl>
@@ -17596,7 +17790,7 @@
               <a:rPr lang="en-US" dirty="0">
                 <a:latin typeface="+mn-lt"/>
               </a:rPr>
-              <a:t>The closer points in a space are (smaller distance) the more similar they are</a:t>
+              <a:t>The closer points are in a space (smaller distance) the more similar they are</a:t>
             </a:r>
           </a:p>
           <a:p>
@@ -18255,8 +18449,8 @@
           </a:p>
         </p:txBody>
       </p:sp>
-      <mc:AlternateContent xmlns:mc="http://schemas.openxmlformats.org/markup-compatibility/2006" xmlns:a14="http://schemas.microsoft.com/office/drawing/2010/main">
-        <mc:Choice Requires="a14">
+      <mc:AlternateContent xmlns:mc="http://schemas.openxmlformats.org/markup-compatibility/2006">
+        <mc:Choice xmlns:a14="http://schemas.microsoft.com/office/drawing/2010/main" Requires="a14">
           <p:sp>
             <p:nvSpPr>
               <p:cNvPr id="3" name="Content Placeholder 2"/>
@@ -18844,6 +19038,15 @@
                 </a:r>
               </a:p>
               <a:p>
+                <a:pPr lvl="1"/>
+                <a:r>
+                  <a:rPr lang="en-US" dirty="0">
+                    <a:latin typeface="+mn-lt"/>
+                  </a:rPr>
+                  <a:t>Often better choice for data mining </a:t>
+                </a:r>
+              </a:p>
+              <a:p>
                 <a:pPr marL="0" indent="0">
                   <a:buNone/>
                 </a:pPr>
@@ -18854,7 +19057,7 @@
             </p:txBody>
           </p:sp>
         </mc:Choice>
-        <mc:Fallback xmlns="">
+        <mc:Fallback>
           <p:sp>
             <p:nvSpPr>
               <p:cNvPr id="3" name="Content Placeholder 2"/>
@@ -19068,6 +19271,55 @@
                                           <p:spTgt spid="3">
                                             <p:txEl>
                                               <p:pRg st="4" end="4"/>
+                                            </p:txEl>
+                                          </p:spTgt>
+                                        </p:tgtEl>
+                                        <p:attrNameLst>
+                                          <p:attrName>style.visibility</p:attrName>
+                                        </p:attrNameLst>
+                                      </p:cBhvr>
+                                      <p:to>
+                                        <p:strVal val="visible"/>
+                                      </p:to>
+                                    </p:set>
+                                  </p:childTnLst>
+                                </p:cTn>
+                              </p:par>
+                            </p:childTnLst>
+                          </p:cTn>
+                        </p:par>
+                      </p:childTnLst>
+                    </p:cTn>
+                  </p:par>
+                  <p:par>
+                    <p:cTn id="17" fill="hold">
+                      <p:stCondLst>
+                        <p:cond delay="indefinite"/>
+                      </p:stCondLst>
+                      <p:childTnLst>
+                        <p:par>
+                          <p:cTn id="18" fill="hold">
+                            <p:stCondLst>
+                              <p:cond delay="0"/>
+                            </p:stCondLst>
+                            <p:childTnLst>
+                              <p:par>
+                                <p:cTn id="19" presetID="1" presetClass="entr" presetSubtype="0" fill="hold" nodeType="clickEffect">
+                                  <p:stCondLst>
+                                    <p:cond delay="0"/>
+                                  </p:stCondLst>
+                                  <p:childTnLst>
+                                    <p:set>
+                                      <p:cBhvr>
+                                        <p:cTn id="20" dur="1" fill="hold">
+                                          <p:stCondLst>
+                                            <p:cond delay="0"/>
+                                          </p:stCondLst>
+                                        </p:cTn>
+                                        <p:tgtEl>
+                                          <p:spTgt spid="3">
+                                            <p:txEl>
+                                              <p:pRg st="5" end="5"/>
                                             </p:txEl>
                                           </p:spTgt>
                                         </p:tgtEl>
@@ -22808,8 +23060,8 @@
           </a:p>
         </p:txBody>
       </p:sp>
-      <mc:AlternateContent xmlns:mc="http://schemas.openxmlformats.org/markup-compatibility/2006" xmlns:a14="http://schemas.microsoft.com/office/drawing/2010/main">
-        <mc:Choice Requires="a14">
+      <mc:AlternateContent xmlns:mc="http://schemas.openxmlformats.org/markup-compatibility/2006">
+        <mc:Choice xmlns:a14="http://schemas.microsoft.com/office/drawing/2010/main" Requires="a14">
           <p:graphicFrame>
             <p:nvGraphicFramePr>
               <p:cNvPr id="5" name="Table 5">
@@ -22825,14 +23077,14 @@
               <p:nvPr>
                 <p:extLst>
                   <p:ext uri="{D42A27DB-BD31-4B8C-83A1-F6EECF244321}">
-                    <p14:modId xmlns:p14="http://schemas.microsoft.com/office/powerpoint/2010/main" val="3131377956"/>
+                    <p14:modId xmlns:p14="http://schemas.microsoft.com/office/powerpoint/2010/main" val="946736701"/>
                   </p:ext>
                 </p:extLst>
               </p:nvPr>
             </p:nvGraphicFramePr>
             <p:xfrm>
               <a:off x="825468" y="3675331"/>
-              <a:ext cx="10618258" cy="2531174"/>
+              <a:ext cx="10618258" cy="2903284"/>
             </p:xfrm>
             <a:graphic>
               <a:graphicData uri="http://schemas.openxmlformats.org/drawingml/2006/table">
@@ -23036,10 +23288,10 @@
                                     </a:solidFill>
                                     <a:latin typeface="Cambria Math" panose="02040503050406030204" pitchFamily="18" charset="0"/>
                                   </a:rPr>
-                                  <m:t>=1 − </m:t>
+                                  <m:t>=</m:t>
                                 </m:r>
-                                <m:sSub>
-                                  <m:sSubPr>
+                                <m:f>
+                                  <m:fPr>
                                     <m:ctrlPr>
                                       <a:rPr lang="en-US" sz="2800" b="0" i="1" smtClean="0">
                                         <a:solidFill>
@@ -23048,7 +23300,41 @@
                                         <a:latin typeface="Cambria Math" panose="02040503050406030204" pitchFamily="18" charset="0"/>
                                       </a:rPr>
                                     </m:ctrlPr>
-                                  </m:sSubPr>
+                                  </m:fPr>
+                                  <m:num>
+                                    <m:r>
+                                      <a:rPr lang="en-US" sz="2800" b="0" i="1" smtClean="0">
+                                        <a:solidFill>
+                                          <a:schemeClr val="tx1"/>
+                                        </a:solidFill>
+                                        <a:latin typeface="Cambria Math" panose="02040503050406030204" pitchFamily="18" charset="0"/>
+                                      </a:rPr>
+                                      <m:t>1</m:t>
+                                    </m:r>
+                                  </m:num>
+                                  <m:den>
+                                    <m:r>
+                                      <a:rPr lang="en-US" sz="2800" b="0" i="1" smtClean="0">
+                                        <a:solidFill>
+                                          <a:schemeClr val="tx1"/>
+                                        </a:solidFill>
+                                        <a:latin typeface="Cambria Math" panose="02040503050406030204" pitchFamily="18" charset="0"/>
+                                      </a:rPr>
+                                      <m:t>2</m:t>
+                                    </m:r>
+                                  </m:den>
+                                </m:f>
+                                <m:d>
+                                  <m:dPr>
+                                    <m:ctrlPr>
+                                      <a:rPr lang="en-US" sz="2800" b="0" i="1" smtClean="0">
+                                        <a:solidFill>
+                                          <a:schemeClr val="tx1"/>
+                                        </a:solidFill>
+                                        <a:latin typeface="Cambria Math" panose="02040503050406030204" pitchFamily="18" charset="0"/>
+                                      </a:rPr>
+                                    </m:ctrlPr>
+                                  </m:dPr>
                                   <m:e>
                                     <m:r>
                                       <a:rPr lang="en-US" sz="2800" b="0" i="1" smtClean="0">
@@ -23057,91 +23343,110 @@
                                         </a:solidFill>
                                         <a:latin typeface="Cambria Math" panose="02040503050406030204" pitchFamily="18" charset="0"/>
                                       </a:rPr>
-                                      <m:t>𝑠</m:t>
+                                      <m:t>1 − </m:t>
                                     </m:r>
+                                    <m:sSub>
+                                      <m:sSubPr>
+                                        <m:ctrlPr>
+                                          <a:rPr lang="en-US" sz="2800" b="0" i="1" smtClean="0">
+                                            <a:solidFill>
+                                              <a:schemeClr val="tx1"/>
+                                            </a:solidFill>
+                                            <a:latin typeface="Cambria Math" panose="02040503050406030204" pitchFamily="18" charset="0"/>
+                                          </a:rPr>
+                                        </m:ctrlPr>
+                                      </m:sSubPr>
+                                      <m:e>
+                                        <m:r>
+                                          <a:rPr lang="en-US" sz="2800" b="0" i="1" smtClean="0">
+                                            <a:solidFill>
+                                              <a:schemeClr val="tx1"/>
+                                            </a:solidFill>
+                                            <a:latin typeface="Cambria Math" panose="02040503050406030204" pitchFamily="18" charset="0"/>
+                                          </a:rPr>
+                                          <m:t>𝑠</m:t>
+                                        </m:r>
+                                      </m:e>
+                                      <m:sub>
+                                        <m:r>
+                                          <a:rPr lang="en-US" sz="2800" b="0" i="1" smtClean="0">
+                                            <a:solidFill>
+                                              <a:schemeClr val="tx1"/>
+                                            </a:solidFill>
+                                            <a:latin typeface="Cambria Math" panose="02040503050406030204" pitchFamily="18" charset="0"/>
+                                          </a:rPr>
+                                          <m:t>𝑃</m:t>
+                                        </m:r>
+                                      </m:sub>
+                                    </m:sSub>
+                                    <m:d>
+                                      <m:dPr>
+                                        <m:ctrlPr>
+                                          <a:rPr lang="en-US" sz="2800" b="0" i="1" smtClean="0">
+                                            <a:solidFill>
+                                              <a:schemeClr val="tx1"/>
+                                            </a:solidFill>
+                                            <a:latin typeface="Cambria Math" panose="02040503050406030204" pitchFamily="18" charset="0"/>
+                                          </a:rPr>
+                                        </m:ctrlPr>
+                                      </m:dPr>
+                                      <m:e>
+                                        <m:r>
+                                          <a:rPr lang="en-US" sz="2800" b="0" i="1" smtClean="0">
+                                            <a:solidFill>
+                                              <a:schemeClr val="tx1"/>
+                                            </a:solidFill>
+                                            <a:latin typeface="Cambria Math" panose="02040503050406030204" pitchFamily="18" charset="0"/>
+                                          </a:rPr>
+                                          <m:t>𝑥</m:t>
+                                        </m:r>
+                                        <m:r>
+                                          <a:rPr lang="en-US" sz="2800" b="0" i="1" smtClean="0">
+                                            <a:solidFill>
+                                              <a:schemeClr val="tx1"/>
+                                            </a:solidFill>
+                                            <a:latin typeface="Cambria Math" panose="02040503050406030204" pitchFamily="18" charset="0"/>
+                                          </a:rPr>
+                                          <m:t>,</m:t>
+                                        </m:r>
+                                        <m:sSup>
+                                          <m:sSupPr>
+                                            <m:ctrlPr>
+                                              <a:rPr lang="en-US" sz="2800" b="0" i="1" smtClean="0">
+                                                <a:solidFill>
+                                                  <a:schemeClr val="tx1"/>
+                                                </a:solidFill>
+                                                <a:latin typeface="Cambria Math" panose="02040503050406030204" pitchFamily="18" charset="0"/>
+                                              </a:rPr>
+                                            </m:ctrlPr>
+                                          </m:sSupPr>
+                                          <m:e>
+                                            <m:r>
+                                              <a:rPr lang="en-US" sz="2800" b="0" i="1" smtClean="0">
+                                                <a:solidFill>
+                                                  <a:schemeClr val="tx1"/>
+                                                </a:solidFill>
+                                                <a:latin typeface="Cambria Math" panose="02040503050406030204" pitchFamily="18" charset="0"/>
+                                              </a:rPr>
+                                              <m:t>𝑥</m:t>
+                                            </m:r>
+                                          </m:e>
+                                          <m:sup>
+                                            <m:r>
+                                              <a:rPr lang="en-US" sz="2800" b="0" i="1" smtClean="0">
+                                                <a:solidFill>
+                                                  <a:schemeClr val="tx1"/>
+                                                </a:solidFill>
+                                                <a:latin typeface="Cambria Math" panose="02040503050406030204" pitchFamily="18" charset="0"/>
+                                              </a:rPr>
+                                              <m:t>′</m:t>
+                                            </m:r>
+                                          </m:sup>
+                                        </m:sSup>
+                                      </m:e>
+                                    </m:d>
                                   </m:e>
-                                  <m:sub>
-                                    <m:r>
-                                      <a:rPr lang="en-US" sz="2800" b="0" i="1" smtClean="0">
-                                        <a:solidFill>
-                                          <a:schemeClr val="tx1"/>
-                                        </a:solidFill>
-                                        <a:latin typeface="Cambria Math" panose="02040503050406030204" pitchFamily="18" charset="0"/>
-                                      </a:rPr>
-                                      <m:t>𝑃</m:t>
-                                    </m:r>
-                                  </m:sub>
-                                </m:sSub>
-                                <m:r>
-                                  <a:rPr lang="en-US" sz="2800" b="0" i="1" smtClean="0">
-                                    <a:solidFill>
-                                      <a:schemeClr val="tx1"/>
-                                    </a:solidFill>
-                                    <a:latin typeface="Cambria Math" panose="02040503050406030204" pitchFamily="18" charset="0"/>
-                                  </a:rPr>
-                                  <m:t>(</m:t>
-                                </m:r>
-                                <m:r>
-                                  <a:rPr lang="en-US" sz="2800" b="0" i="1" smtClean="0">
-                                    <a:solidFill>
-                                      <a:schemeClr val="tx1"/>
-                                    </a:solidFill>
-                                    <a:latin typeface="Cambria Math" panose="02040503050406030204" pitchFamily="18" charset="0"/>
-                                  </a:rPr>
-                                  <m:t>𝑥</m:t>
-                                </m:r>
-                                <m:r>
-                                  <a:rPr lang="en-US" sz="2800" b="0" i="1" smtClean="0">
-                                    <a:solidFill>
-                                      <a:schemeClr val="tx1"/>
-                                    </a:solidFill>
-                                    <a:latin typeface="Cambria Math" panose="02040503050406030204" pitchFamily="18" charset="0"/>
-                                  </a:rPr>
-                                  <m:t>,</m:t>
-                                </m:r>
-                                <m:sSup>
-                                  <m:sSupPr>
-                                    <m:ctrlPr>
-                                      <a:rPr lang="en-US" sz="2800" b="0" i="1" smtClean="0">
-                                        <a:solidFill>
-                                          <a:schemeClr val="tx1"/>
-                                        </a:solidFill>
-                                        <a:latin typeface="Cambria Math" panose="02040503050406030204" pitchFamily="18" charset="0"/>
-                                      </a:rPr>
-                                    </m:ctrlPr>
-                                  </m:sSupPr>
-                                  <m:e>
-                                    <m:r>
-                                      <a:rPr lang="en-US" sz="2800" b="0" i="1" smtClean="0">
-                                        <a:solidFill>
-                                          <a:schemeClr val="tx1"/>
-                                        </a:solidFill>
-                                        <a:latin typeface="Cambria Math" panose="02040503050406030204" pitchFamily="18" charset="0"/>
-                                      </a:rPr>
-                                      <m:t>𝑥</m:t>
-                                    </m:r>
-                                  </m:e>
-                                  <m:sup>
-                                    <m:r>
-                                      <a:rPr lang="en-US" sz="2800" b="0" i="1" smtClean="0">
-                                        <a:solidFill>
-                                          <a:schemeClr val="tx1"/>
-                                        </a:solidFill>
-                                        <a:latin typeface="Cambria Math" panose="02040503050406030204" pitchFamily="18" charset="0"/>
-                                      </a:rPr>
-                                      <m:t>′</m:t>
-                                    </m:r>
-                                  </m:sup>
-                                </m:sSup>
-                                <m:r>
-                                  <a:rPr lang="en-US" sz="2800" b="0" i="1" smtClean="0">
-                                    <a:solidFill>
-                                      <a:schemeClr val="tx1"/>
-                                    </a:solidFill>
-                                    <a:latin typeface="Cambria Math" panose="02040503050406030204" pitchFamily="18" charset="0"/>
-                                  </a:rPr>
-                                  <m:t>)</m:t>
-                                </m:r>
+                                </m:d>
                               </m:oMath>
                             </m:oMathPara>
                           </a14:m>
@@ -23731,7 +24036,7 @@
             </a:graphic>
           </p:graphicFrame>
         </mc:Choice>
-        <mc:Fallback xmlns="">
+        <mc:Fallback>
           <p:graphicFrame>
             <p:nvGraphicFramePr>
               <p:cNvPr id="5" name="Table 5">
@@ -23747,14 +24052,14 @@
               <p:nvPr>
                 <p:extLst>
                   <p:ext uri="{D42A27DB-BD31-4B8C-83A1-F6EECF244321}">
-                    <p14:modId xmlns:p14="http://schemas.microsoft.com/office/powerpoint/2010/main" val="3131377956"/>
+                    <p14:modId xmlns:p14="http://schemas.microsoft.com/office/powerpoint/2010/main" val="946736701"/>
                   </p:ext>
                 </p:extLst>
               </p:nvPr>
             </p:nvGraphicFramePr>
             <p:xfrm>
               <a:off x="825468" y="3675331"/>
-              <a:ext cx="10618258" cy="2531174"/>
+              <a:ext cx="10618258" cy="2903284"/>
             </p:xfrm>
             <a:graphic>
               <a:graphicData uri="http://schemas.openxmlformats.org/drawingml/2006/table">
@@ -23821,7 +24126,7 @@
                       </a:ext>
                     </a:extLst>
                   </a:tr>
-                  <a:tr h="518160">
+                  <a:tr h="890270">
                     <a:tc>
                       <a:txBody>
                         <a:bodyPr/>
@@ -23851,7 +24156,7 @@
                         <a:blipFill>
                           <a:blip r:embed="rId3"/>
                           <a:stretch>
-                            <a:fillRect l="-65937" t="-109302" r="-381" b="-288372"/>
+                            <a:fillRect l="-65937" t="-63946" r="-381" b="-168707"/>
                           </a:stretch>
                         </a:blipFill>
                       </a:tcPr>
@@ -23892,7 +24197,7 @@
                         <a:blipFill>
                           <a:blip r:embed="rId3"/>
                           <a:stretch>
-                            <a:fillRect l="-65937" t="-200000" r="-381" b="-175556"/>
+                            <a:fillRect l="-65937" t="-267778" r="-381" b="-175556"/>
                           </a:stretch>
                         </a:blipFill>
                       </a:tcPr>
@@ -23933,7 +24238,7 @@
                         <a:blipFill>
                           <a:blip r:embed="rId3"/>
                           <a:stretch>
-                            <a:fillRect l="-65937" t="-173077" r="-381" b="-1282"/>
+                            <a:fillRect l="-65937" t="-212179" r="-381" b="-1282"/>
                           </a:stretch>
                         </a:blipFill>
                       </a:tcPr>
@@ -25027,6 +25332,578 @@
 </p:sld>
 </file>
 
+<file path=ppt/slides/slide27.xml><?xml version="1.0" encoding="utf-8"?>
+<p:sld xmlns:a="http://schemas.openxmlformats.org/drawingml/2006/main" xmlns:r="http://schemas.openxmlformats.org/officeDocument/2006/relationships" xmlns:p="http://schemas.openxmlformats.org/presentationml/2006/main">
+  <p:cSld>
+    <p:spTree>
+      <p:nvGrpSpPr>
+        <p:cNvPr id="1" name=""/>
+        <p:cNvGrpSpPr/>
+        <p:nvPr/>
+      </p:nvGrpSpPr>
+      <p:grpSpPr>
+        <a:xfrm>
+          <a:off x="0" y="0"/>
+          <a:ext cx="0" cy="0"/>
+          <a:chOff x="0" y="0"/>
+          <a:chExt cx="0" cy="0"/>
+        </a:xfrm>
+      </p:grpSpPr>
+      <p:sp>
+        <p:nvSpPr>
+          <p:cNvPr id="2" name="Title 1"/>
+          <p:cNvSpPr>
+            <a:spLocks noGrp="1"/>
+          </p:cNvSpPr>
+          <p:nvPr>
+            <p:ph type="title"/>
+          </p:nvPr>
+        </p:nvSpPr>
+        <p:spPr>
+          <a:xfrm>
+            <a:off x="584200" y="221992"/>
+            <a:ext cx="10515600" cy="530954"/>
+          </a:xfrm>
+        </p:spPr>
+        <p:txBody>
+          <a:bodyPr>
+            <a:normAutofit fontScale="90000"/>
+          </a:bodyPr>
+          <a:lstStyle/>
+          <a:p>
+            <a:r>
+              <a:rPr lang="en-US" dirty="0"/>
+              <a:t>Summary</a:t>
+            </a:r>
+          </a:p>
+        </p:txBody>
+      </p:sp>
+      <p:sp>
+        <p:nvSpPr>
+          <p:cNvPr id="3" name="Content Placeholder 2"/>
+          <p:cNvSpPr>
+            <a:spLocks noGrp="1"/>
+          </p:cNvSpPr>
+          <p:nvPr>
+            <p:ph sz="quarter" idx="10"/>
+          </p:nvPr>
+        </p:nvSpPr>
+        <p:spPr>
+          <a:xfrm>
+            <a:off x="333375" y="896079"/>
+            <a:ext cx="11525250" cy="5290388"/>
+          </a:xfrm>
+        </p:spPr>
+        <p:txBody>
+          <a:bodyPr>
+            <a:normAutofit/>
+          </a:bodyPr>
+          <a:lstStyle/>
+          <a:p>
+            <a:pPr marL="0" indent="0">
+              <a:buNone/>
+            </a:pPr>
+            <a:r>
+              <a:rPr lang="en-US" dirty="0">
+                <a:latin typeface="+mn-lt"/>
+              </a:rPr>
+              <a:t>Key points for this lesson</a:t>
+            </a:r>
+          </a:p>
+          <a:p>
+            <a:r>
+              <a:rPr lang="en-US" b="1" dirty="0">
+                <a:latin typeface="+mn-lt"/>
+              </a:rPr>
+              <a:t>Distance metrics </a:t>
+            </a:r>
+            <a:r>
+              <a:rPr lang="en-US" dirty="0">
+                <a:latin typeface="+mn-lt"/>
+              </a:rPr>
+              <a:t>and </a:t>
+            </a:r>
+            <a:r>
+              <a:rPr lang="en-US" b="1" dirty="0">
+                <a:latin typeface="+mn-lt"/>
+              </a:rPr>
+              <a:t>similarity metrics</a:t>
+            </a:r>
+            <a:r>
+              <a:rPr lang="en-US" dirty="0">
+                <a:latin typeface="+mn-lt"/>
+              </a:rPr>
+              <a:t> are foundational for unsupervised learning</a:t>
+            </a:r>
+          </a:p>
+          <a:p>
+            <a:r>
+              <a:rPr lang="en-US" dirty="0">
+                <a:latin typeface="+mn-lt"/>
+              </a:rPr>
+              <a:t>Distance and similarity metrics map 2 multivariate (vector) values to </a:t>
+            </a:r>
+            <a:r>
+              <a:rPr lang="en-US">
+                <a:latin typeface="+mn-lt"/>
+              </a:rPr>
+              <a:t>a scalar  </a:t>
+            </a:r>
+            <a:endParaRPr lang="en-US" dirty="0">
+              <a:latin typeface="+mn-lt"/>
+            </a:endParaRPr>
+          </a:p>
+          <a:p>
+            <a:r>
+              <a:rPr lang="en-US" dirty="0">
+                <a:latin typeface="+mn-lt"/>
+              </a:rPr>
+              <a:t>Distance metric must conform to the </a:t>
+            </a:r>
+            <a:r>
+              <a:rPr lang="en-US" b="1" dirty="0">
+                <a:latin typeface="+mn-lt"/>
+              </a:rPr>
+              <a:t>4 axioms</a:t>
+            </a:r>
+            <a:r>
+              <a:rPr lang="en-US" dirty="0">
+                <a:latin typeface="+mn-lt"/>
+              </a:rPr>
+              <a:t>!  </a:t>
+            </a:r>
+          </a:p>
+          <a:p>
+            <a:r>
+              <a:rPr lang="en-US" dirty="0">
+                <a:latin typeface="+mn-lt"/>
+              </a:rPr>
+              <a:t>Different distance and similarity metrics find different relationships in data</a:t>
+            </a:r>
+          </a:p>
+          <a:p>
+            <a:pPr lvl="1"/>
+            <a:r>
+              <a:rPr lang="en-US" dirty="0">
+                <a:latin typeface="+mn-lt"/>
+              </a:rPr>
+              <a:t>There is no one best metric!</a:t>
+            </a:r>
+          </a:p>
+          <a:p>
+            <a:pPr lvl="1"/>
+            <a:r>
+              <a:rPr lang="en-US" dirty="0">
+                <a:latin typeface="+mn-lt"/>
+              </a:rPr>
+              <a:t>In practice, try several </a:t>
+            </a:r>
+          </a:p>
+          <a:p>
+            <a:r>
+              <a:rPr lang="en-US" dirty="0">
+                <a:latin typeface="+mn-lt"/>
+              </a:rPr>
+              <a:t>Can transform from similarity to distance </a:t>
+            </a:r>
+          </a:p>
+          <a:p>
+            <a:endParaRPr lang="en-US" sz="2800" dirty="0">
+              <a:latin typeface="+mn-lt"/>
+            </a:endParaRPr>
+          </a:p>
+          <a:p>
+            <a:pPr lvl="1"/>
+            <a:endParaRPr lang="en-US" dirty="0"/>
+          </a:p>
+        </p:txBody>
+      </p:sp>
+    </p:spTree>
+    <p:extLst>
+      <p:ext uri="{BB962C8B-B14F-4D97-AF65-F5344CB8AC3E}">
+        <p14:creationId xmlns:p14="http://schemas.microsoft.com/office/powerpoint/2010/main" val="1814252472"/>
+      </p:ext>
+    </p:extLst>
+  </p:cSld>
+  <p:clrMapOvr>
+    <a:masterClrMapping/>
+  </p:clrMapOvr>
+  <p:timing>
+    <p:tnLst>
+      <p:par>
+        <p:cTn id="1" dur="indefinite" restart="never" nodeType="tmRoot">
+          <p:childTnLst>
+            <p:seq concurrent="1" nextAc="seek">
+              <p:cTn id="2" dur="indefinite" nodeType="mainSeq">
+                <p:childTnLst>
+                  <p:par>
+                    <p:cTn id="3" fill="hold">
+                      <p:stCondLst>
+                        <p:cond delay="indefinite"/>
+                      </p:stCondLst>
+                      <p:childTnLst>
+                        <p:par>
+                          <p:cTn id="4" fill="hold">
+                            <p:stCondLst>
+                              <p:cond delay="0"/>
+                            </p:stCondLst>
+                            <p:childTnLst>
+                              <p:par>
+                                <p:cTn id="5" presetID="1" presetClass="entr" presetSubtype="0" fill="hold" nodeType="clickEffect">
+                                  <p:stCondLst>
+                                    <p:cond delay="0"/>
+                                  </p:stCondLst>
+                                  <p:childTnLst>
+                                    <p:set>
+                                      <p:cBhvr>
+                                        <p:cTn id="6" dur="1" fill="hold">
+                                          <p:stCondLst>
+                                            <p:cond delay="0"/>
+                                          </p:stCondLst>
+                                        </p:cTn>
+                                        <p:tgtEl>
+                                          <p:spTgt spid="3">
+                                            <p:txEl>
+                                              <p:pRg st="1" end="1"/>
+                                            </p:txEl>
+                                          </p:spTgt>
+                                        </p:tgtEl>
+                                        <p:attrNameLst>
+                                          <p:attrName>style.visibility</p:attrName>
+                                        </p:attrNameLst>
+                                      </p:cBhvr>
+                                      <p:to>
+                                        <p:strVal val="visible"/>
+                                      </p:to>
+                                    </p:set>
+                                  </p:childTnLst>
+                                </p:cTn>
+                              </p:par>
+                            </p:childTnLst>
+                          </p:cTn>
+                        </p:par>
+                      </p:childTnLst>
+                    </p:cTn>
+                  </p:par>
+                  <p:par>
+                    <p:cTn id="7" fill="hold">
+                      <p:stCondLst>
+                        <p:cond delay="indefinite"/>
+                      </p:stCondLst>
+                      <p:childTnLst>
+                        <p:par>
+                          <p:cTn id="8" fill="hold">
+                            <p:stCondLst>
+                              <p:cond delay="0"/>
+                            </p:stCondLst>
+                            <p:childTnLst>
+                              <p:par>
+                                <p:cTn id="9" presetID="1" presetClass="entr" presetSubtype="0" fill="hold" nodeType="clickEffect">
+                                  <p:stCondLst>
+                                    <p:cond delay="0"/>
+                                  </p:stCondLst>
+                                  <p:childTnLst>
+                                    <p:set>
+                                      <p:cBhvr>
+                                        <p:cTn id="10" dur="1" fill="hold">
+                                          <p:stCondLst>
+                                            <p:cond delay="0"/>
+                                          </p:stCondLst>
+                                        </p:cTn>
+                                        <p:tgtEl>
+                                          <p:spTgt spid="3">
+                                            <p:txEl>
+                                              <p:pRg st="2" end="2"/>
+                                            </p:txEl>
+                                          </p:spTgt>
+                                        </p:tgtEl>
+                                        <p:attrNameLst>
+                                          <p:attrName>style.visibility</p:attrName>
+                                        </p:attrNameLst>
+                                      </p:cBhvr>
+                                      <p:to>
+                                        <p:strVal val="visible"/>
+                                      </p:to>
+                                    </p:set>
+                                  </p:childTnLst>
+                                </p:cTn>
+                              </p:par>
+                            </p:childTnLst>
+                          </p:cTn>
+                        </p:par>
+                      </p:childTnLst>
+                    </p:cTn>
+                  </p:par>
+                  <p:par>
+                    <p:cTn id="11" fill="hold">
+                      <p:stCondLst>
+                        <p:cond delay="indefinite"/>
+                      </p:stCondLst>
+                      <p:childTnLst>
+                        <p:par>
+                          <p:cTn id="12" fill="hold">
+                            <p:stCondLst>
+                              <p:cond delay="0"/>
+                            </p:stCondLst>
+                            <p:childTnLst>
+                              <p:par>
+                                <p:cTn id="13" presetID="1" presetClass="entr" presetSubtype="0" fill="hold" nodeType="clickEffect">
+                                  <p:stCondLst>
+                                    <p:cond delay="0"/>
+                                  </p:stCondLst>
+                                  <p:childTnLst>
+                                    <p:set>
+                                      <p:cBhvr>
+                                        <p:cTn id="14" dur="1" fill="hold">
+                                          <p:stCondLst>
+                                            <p:cond delay="0"/>
+                                          </p:stCondLst>
+                                        </p:cTn>
+                                        <p:tgtEl>
+                                          <p:spTgt spid="3">
+                                            <p:txEl>
+                                              <p:pRg st="3" end="3"/>
+                                            </p:txEl>
+                                          </p:spTgt>
+                                        </p:tgtEl>
+                                        <p:attrNameLst>
+                                          <p:attrName>style.visibility</p:attrName>
+                                        </p:attrNameLst>
+                                      </p:cBhvr>
+                                      <p:to>
+                                        <p:strVal val="visible"/>
+                                      </p:to>
+                                    </p:set>
+                                  </p:childTnLst>
+                                </p:cTn>
+                              </p:par>
+                            </p:childTnLst>
+                          </p:cTn>
+                        </p:par>
+                      </p:childTnLst>
+                    </p:cTn>
+                  </p:par>
+                  <p:par>
+                    <p:cTn id="15" fill="hold">
+                      <p:stCondLst>
+                        <p:cond delay="indefinite"/>
+                      </p:stCondLst>
+                      <p:childTnLst>
+                        <p:par>
+                          <p:cTn id="16" fill="hold">
+                            <p:stCondLst>
+                              <p:cond delay="0"/>
+                            </p:stCondLst>
+                            <p:childTnLst>
+                              <p:par>
+                                <p:cTn id="17" presetID="1" presetClass="entr" presetSubtype="0" fill="hold" nodeType="clickEffect">
+                                  <p:stCondLst>
+                                    <p:cond delay="0"/>
+                                  </p:stCondLst>
+                                  <p:childTnLst>
+                                    <p:set>
+                                      <p:cBhvr>
+                                        <p:cTn id="18" dur="1" fill="hold">
+                                          <p:stCondLst>
+                                            <p:cond delay="0"/>
+                                          </p:stCondLst>
+                                        </p:cTn>
+                                        <p:tgtEl>
+                                          <p:spTgt spid="3">
+                                            <p:txEl>
+                                              <p:pRg st="4" end="4"/>
+                                            </p:txEl>
+                                          </p:spTgt>
+                                        </p:tgtEl>
+                                        <p:attrNameLst>
+                                          <p:attrName>style.visibility</p:attrName>
+                                        </p:attrNameLst>
+                                      </p:cBhvr>
+                                      <p:to>
+                                        <p:strVal val="visible"/>
+                                      </p:to>
+                                    </p:set>
+                                  </p:childTnLst>
+                                </p:cTn>
+                              </p:par>
+                            </p:childTnLst>
+                          </p:cTn>
+                        </p:par>
+                      </p:childTnLst>
+                    </p:cTn>
+                  </p:par>
+                  <p:par>
+                    <p:cTn id="19" fill="hold">
+                      <p:stCondLst>
+                        <p:cond delay="indefinite"/>
+                      </p:stCondLst>
+                      <p:childTnLst>
+                        <p:par>
+                          <p:cTn id="20" fill="hold">
+                            <p:stCondLst>
+                              <p:cond delay="0"/>
+                            </p:stCondLst>
+                            <p:childTnLst>
+                              <p:par>
+                                <p:cTn id="21" presetID="1" presetClass="entr" presetSubtype="0" fill="hold" nodeType="clickEffect">
+                                  <p:stCondLst>
+                                    <p:cond delay="0"/>
+                                  </p:stCondLst>
+                                  <p:childTnLst>
+                                    <p:set>
+                                      <p:cBhvr>
+                                        <p:cTn id="22" dur="1" fill="hold">
+                                          <p:stCondLst>
+                                            <p:cond delay="0"/>
+                                          </p:stCondLst>
+                                        </p:cTn>
+                                        <p:tgtEl>
+                                          <p:spTgt spid="3">
+                                            <p:txEl>
+                                              <p:pRg st="5" end="5"/>
+                                            </p:txEl>
+                                          </p:spTgt>
+                                        </p:tgtEl>
+                                        <p:attrNameLst>
+                                          <p:attrName>style.visibility</p:attrName>
+                                        </p:attrNameLst>
+                                      </p:cBhvr>
+                                      <p:to>
+                                        <p:strVal val="visible"/>
+                                      </p:to>
+                                    </p:set>
+                                  </p:childTnLst>
+                                </p:cTn>
+                              </p:par>
+                            </p:childTnLst>
+                          </p:cTn>
+                        </p:par>
+                      </p:childTnLst>
+                    </p:cTn>
+                  </p:par>
+                  <p:par>
+                    <p:cTn id="23" fill="hold">
+                      <p:stCondLst>
+                        <p:cond delay="indefinite"/>
+                      </p:stCondLst>
+                      <p:childTnLst>
+                        <p:par>
+                          <p:cTn id="24" fill="hold">
+                            <p:stCondLst>
+                              <p:cond delay="0"/>
+                            </p:stCondLst>
+                            <p:childTnLst>
+                              <p:par>
+                                <p:cTn id="25" presetID="1" presetClass="entr" presetSubtype="0" fill="hold" nodeType="clickEffect">
+                                  <p:stCondLst>
+                                    <p:cond delay="0"/>
+                                  </p:stCondLst>
+                                  <p:childTnLst>
+                                    <p:set>
+                                      <p:cBhvr>
+                                        <p:cTn id="26" dur="1" fill="hold">
+                                          <p:stCondLst>
+                                            <p:cond delay="0"/>
+                                          </p:stCondLst>
+                                        </p:cTn>
+                                        <p:tgtEl>
+                                          <p:spTgt spid="3">
+                                            <p:txEl>
+                                              <p:pRg st="6" end="6"/>
+                                            </p:txEl>
+                                          </p:spTgt>
+                                        </p:tgtEl>
+                                        <p:attrNameLst>
+                                          <p:attrName>style.visibility</p:attrName>
+                                        </p:attrNameLst>
+                                      </p:cBhvr>
+                                      <p:to>
+                                        <p:strVal val="visible"/>
+                                      </p:to>
+                                    </p:set>
+                                  </p:childTnLst>
+                                </p:cTn>
+                              </p:par>
+                            </p:childTnLst>
+                          </p:cTn>
+                        </p:par>
+                      </p:childTnLst>
+                    </p:cTn>
+                  </p:par>
+                  <p:par>
+                    <p:cTn id="27" fill="hold">
+                      <p:stCondLst>
+                        <p:cond delay="indefinite"/>
+                      </p:stCondLst>
+                      <p:childTnLst>
+                        <p:par>
+                          <p:cTn id="28" fill="hold">
+                            <p:stCondLst>
+                              <p:cond delay="0"/>
+                            </p:stCondLst>
+                            <p:childTnLst>
+                              <p:par>
+                                <p:cTn id="29" presetID="1" presetClass="entr" presetSubtype="0" fill="hold" nodeType="clickEffect">
+                                  <p:stCondLst>
+                                    <p:cond delay="0"/>
+                                  </p:stCondLst>
+                                  <p:childTnLst>
+                                    <p:set>
+                                      <p:cBhvr>
+                                        <p:cTn id="30" dur="1" fill="hold">
+                                          <p:stCondLst>
+                                            <p:cond delay="0"/>
+                                          </p:stCondLst>
+                                        </p:cTn>
+                                        <p:tgtEl>
+                                          <p:spTgt spid="3">
+                                            <p:txEl>
+                                              <p:pRg st="7" end="7"/>
+                                            </p:txEl>
+                                          </p:spTgt>
+                                        </p:tgtEl>
+                                        <p:attrNameLst>
+                                          <p:attrName>style.visibility</p:attrName>
+                                        </p:attrNameLst>
+                                      </p:cBhvr>
+                                      <p:to>
+                                        <p:strVal val="visible"/>
+                                      </p:to>
+                                    </p:set>
+                                  </p:childTnLst>
+                                </p:cTn>
+                              </p:par>
+                            </p:childTnLst>
+                          </p:cTn>
+                        </p:par>
+                      </p:childTnLst>
+                    </p:cTn>
+                  </p:par>
+                </p:childTnLst>
+              </p:cTn>
+              <p:prevCondLst>
+                <p:cond evt="onPrev" delay="0">
+                  <p:tgtEl>
+                    <p:sldTgt/>
+                  </p:tgtEl>
+                </p:cond>
+              </p:prevCondLst>
+              <p:nextCondLst>
+                <p:cond evt="onNext" delay="0">
+                  <p:tgtEl>
+                    <p:sldTgt/>
+                  </p:tgtEl>
+                </p:cond>
+              </p:nextCondLst>
+            </p:seq>
+          </p:childTnLst>
+        </p:cTn>
+      </p:par>
+    </p:tnLst>
+  </p:timing>
+</p:sld>
+</file>
+
 <file path=ppt/slides/slide3.xml><?xml version="1.0" encoding="utf-8"?>
 <p:sld xmlns:a="http://schemas.openxmlformats.org/drawingml/2006/main" xmlns:r="http://schemas.openxmlformats.org/officeDocument/2006/relationships" xmlns:p="http://schemas.openxmlformats.org/presentationml/2006/main">
   <p:cSld>
@@ -25736,7 +26613,19 @@
               <a:rPr lang="en-US" sz="2800" dirty="0">
                 <a:latin typeface="+mn-lt"/>
               </a:rPr>
-              <a:t>Distance measures are therefore multivariate </a:t>
+              <a:t>Distance measures are therefore </a:t>
+            </a:r>
+            <a:r>
+              <a:rPr lang="en-US" sz="2800" b="1" dirty="0">
+                <a:latin typeface="+mn-lt"/>
+              </a:rPr>
+              <a:t>multivariate</a:t>
+            </a:r>
+            <a:r>
+              <a:rPr lang="en-US" sz="2800" dirty="0">
+                <a:latin typeface="+mn-lt"/>
+              </a:rPr>
+              <a:t> </a:t>
             </a:r>
           </a:p>
           <a:p>
@@ -25745,7 +26634,25 @@
               <a:rPr lang="en-US" sz="2800" dirty="0">
                 <a:latin typeface="+mn-lt"/>
               </a:rPr>
-              <a:t>Maps two vector values to a real scalar value    </a:t>
+              <a:t>Maps </a:t>
+            </a:r>
+            <a:r>
+              <a:rPr lang="en-US" sz="2800" b="1" dirty="0">
+                <a:latin typeface="+mn-lt"/>
+              </a:rPr>
+              <a:t>two vector values </a:t>
+            </a:r>
+            <a:r>
+              <a:rPr lang="en-US" sz="2800" dirty="0">
+                <a:latin typeface="+mn-lt"/>
+              </a:rPr>
+              <a:t>to a </a:t>
+            </a:r>
+            <a:r>
+              <a:rPr lang="en-US" sz="2800" b="1" dirty="0">
+                <a:latin typeface="+mn-lt"/>
+              </a:rPr>
+              <a:t>real scalar value    </a:t>
             </a:r>
           </a:p>
           <a:p>
@@ -25780,11 +26687,13 @@
               <a:rPr lang="en-US" sz="2800" dirty="0">
                 <a:latin typeface="+mn-lt"/>
               </a:rPr>
-              <a:t>Coded difference, for unordered categorical variables</a:t>
+              <a:t>Binary distance (no match, match), for unordered categorical variables</a:t>
             </a:r>
           </a:p>
           <a:p>
-            <a:pPr lvl="1"/>
+            <a:pPr marL="457200" lvl="1" indent="0">
+              <a:buNone/>
+            </a:pPr>
             <a:endParaRPr lang="en-US" dirty="0"/>
           </a:p>
         </p:txBody>
@@ -26221,8 +27130,8 @@
           </a:p>
         </p:txBody>
       </p:sp>
-      <mc:AlternateContent xmlns:mc="http://schemas.openxmlformats.org/markup-compatibility/2006" xmlns:a14="http://schemas.microsoft.com/office/drawing/2010/main">
-        <mc:Choice Requires="a14">
+      <mc:AlternateContent xmlns:mc="http://schemas.openxmlformats.org/markup-compatibility/2006">
+        <mc:Choice xmlns:a14="http://schemas.microsoft.com/office/drawing/2010/main" Requires="a14">
           <p:sp>
             <p:nvSpPr>
               <p:cNvPr id="3" name="Content Placeholder 2"/>
@@ -26835,21 +27744,7 @@
                           <a:latin typeface="Cambria Math" panose="02040503050406030204" pitchFamily="18" charset="0"/>
                           <a:ea typeface="Cambria Math" panose="02040503050406030204" pitchFamily="18" charset="0"/>
                         </a:rPr>
-                        <m:t> </m:t>
-                      </m:r>
-                      <m:r>
-                        <a:rPr lang="en-US" sz="2800" b="0" i="1" smtClean="0">
-                          <a:latin typeface="Cambria Math" panose="02040503050406030204" pitchFamily="18" charset="0"/>
-                          <a:ea typeface="Cambria Math" panose="02040503050406030204" pitchFamily="18" charset="0"/>
-                        </a:rPr>
-                        <m:t>𝑓𝑜𝑟</m:t>
-                      </m:r>
-                      <m:r>
-                        <a:rPr lang="en-US" sz="2800" b="0" i="1" smtClean="0">
-                          <a:latin typeface="Cambria Math" panose="02040503050406030204" pitchFamily="18" charset="0"/>
-                          <a:ea typeface="Cambria Math" panose="02040503050406030204" pitchFamily="18" charset="0"/>
-                        </a:rPr>
-                        <m:t> ∀ </m:t>
+                        <m:t>  ∀ </m:t>
                       </m:r>
                       <m:r>
                         <a:rPr lang="en-US" sz="2800" b="0" i="1" smtClean="0">
@@ -26920,7 +27815,7 @@
             </p:txBody>
           </p:sp>
         </mc:Choice>
-        <mc:Fallback xmlns="">
+        <mc:Fallback>
           <p:sp>
             <p:nvSpPr>
               <p:cNvPr id="3" name="Content Placeholder 2"/>

</xml_diff>

<commit_message>
Corrections and additions to slides
</commit_message>
<xml_diff>
--- a/slides/4_DistanceAndSimilarityMeasures_Part1.pptx
+++ b/slides/4_DistanceAndSimilarityMeasures_Part1.pptx
@@ -5,7 +5,7 @@
     <p:sldMasterId id="2147483648" r:id="rId1"/>
   </p:sldMasterIdLst>
   <p:notesMasterIdLst>
-    <p:notesMasterId r:id="rId29"/>
+    <p:notesMasterId r:id="rId30"/>
   </p:notesMasterIdLst>
   <p:sldIdLst>
     <p:sldId id="719" r:id="rId2"/>
@@ -17,24 +17,25 @@
     <p:sldId id="612" r:id="rId8"/>
     <p:sldId id="607" r:id="rId9"/>
     <p:sldId id="681" r:id="rId10"/>
-    <p:sldId id="673" r:id="rId11"/>
-    <p:sldId id="674" r:id="rId12"/>
-    <p:sldId id="680" r:id="rId13"/>
-    <p:sldId id="610" r:id="rId14"/>
-    <p:sldId id="611" r:id="rId15"/>
-    <p:sldId id="609" r:id="rId16"/>
-    <p:sldId id="613" r:id="rId17"/>
-    <p:sldId id="616" r:id="rId18"/>
-    <p:sldId id="615" r:id="rId19"/>
-    <p:sldId id="617" r:id="rId20"/>
-    <p:sldId id="618" r:id="rId21"/>
-    <p:sldId id="641" r:id="rId22"/>
-    <p:sldId id="679" r:id="rId23"/>
-    <p:sldId id="685" r:id="rId24"/>
-    <p:sldId id="675" r:id="rId25"/>
-    <p:sldId id="682" r:id="rId26"/>
-    <p:sldId id="683" r:id="rId27"/>
-    <p:sldId id="720" r:id="rId28"/>
+    <p:sldId id="721" r:id="rId11"/>
+    <p:sldId id="673" r:id="rId12"/>
+    <p:sldId id="674" r:id="rId13"/>
+    <p:sldId id="680" r:id="rId14"/>
+    <p:sldId id="610" r:id="rId15"/>
+    <p:sldId id="611" r:id="rId16"/>
+    <p:sldId id="609" r:id="rId17"/>
+    <p:sldId id="613" r:id="rId18"/>
+    <p:sldId id="616" r:id="rId19"/>
+    <p:sldId id="615" r:id="rId20"/>
+    <p:sldId id="617" r:id="rId21"/>
+    <p:sldId id="618" r:id="rId22"/>
+    <p:sldId id="641" r:id="rId23"/>
+    <p:sldId id="679" r:id="rId24"/>
+    <p:sldId id="685" r:id="rId25"/>
+    <p:sldId id="675" r:id="rId26"/>
+    <p:sldId id="682" r:id="rId27"/>
+    <p:sldId id="683" r:id="rId28"/>
+    <p:sldId id="720" r:id="rId29"/>
   </p:sldIdLst>
   <p:sldSz cx="12192000" cy="6858000"/>
   <p:notesSz cx="6858000" cy="9144000"/>
@@ -223,7 +224,7 @@
           <a:p>
             <a:fld id="{8DD534D1-5B48-49E9-A024-C5EAE54CADD0}" type="datetimeFigureOut">
               <a:rPr lang="en-US" smtClean="0"/>
-              <a:t>2/11/2023</a:t>
+              <a:t>2/12/2023</a:t>
             </a:fld>
             <a:endParaRPr lang="en-US"/>
           </a:p>
@@ -650,7 +651,7 @@
     </p:spTree>
     <p:extLst>
       <p:ext uri="{BB962C8B-B14F-4D97-AF65-F5344CB8AC3E}">
-        <p14:creationId xmlns:p14="http://schemas.microsoft.com/office/powerpoint/2010/main" val="1942439870"/>
+        <p14:creationId xmlns:p14="http://schemas.microsoft.com/office/powerpoint/2010/main" val="3206964653"/>
       </p:ext>
     </p:extLst>
   </p:cSld>
@@ -735,7 +736,7 @@
     </p:spTree>
     <p:extLst>
       <p:ext uri="{BB962C8B-B14F-4D97-AF65-F5344CB8AC3E}">
-        <p14:creationId xmlns:p14="http://schemas.microsoft.com/office/powerpoint/2010/main" val="269515439"/>
+        <p14:creationId xmlns:p14="http://schemas.microsoft.com/office/powerpoint/2010/main" val="1942439870"/>
       </p:ext>
     </p:extLst>
   </p:cSld>
@@ -820,7 +821,7 @@
     </p:spTree>
     <p:extLst>
       <p:ext uri="{BB962C8B-B14F-4D97-AF65-F5344CB8AC3E}">
-        <p14:creationId xmlns:p14="http://schemas.microsoft.com/office/powerpoint/2010/main" val="489536907"/>
+        <p14:creationId xmlns:p14="http://schemas.microsoft.com/office/powerpoint/2010/main" val="269515439"/>
       </p:ext>
     </p:extLst>
   </p:cSld>
@@ -905,7 +906,7 @@
     </p:spTree>
     <p:extLst>
       <p:ext uri="{BB962C8B-B14F-4D97-AF65-F5344CB8AC3E}">
-        <p14:creationId xmlns:p14="http://schemas.microsoft.com/office/powerpoint/2010/main" val="243420119"/>
+        <p14:creationId xmlns:p14="http://schemas.microsoft.com/office/powerpoint/2010/main" val="489536907"/>
       </p:ext>
     </p:extLst>
   </p:cSld>
@@ -990,7 +991,7 @@
     </p:spTree>
     <p:extLst>
       <p:ext uri="{BB962C8B-B14F-4D97-AF65-F5344CB8AC3E}">
-        <p14:creationId xmlns:p14="http://schemas.microsoft.com/office/powerpoint/2010/main" val="3682425662"/>
+        <p14:creationId xmlns:p14="http://schemas.microsoft.com/office/powerpoint/2010/main" val="243420119"/>
       </p:ext>
     </p:extLst>
   </p:cSld>
@@ -1075,7 +1076,7 @@
     </p:spTree>
     <p:extLst>
       <p:ext uri="{BB962C8B-B14F-4D97-AF65-F5344CB8AC3E}">
-        <p14:creationId xmlns:p14="http://schemas.microsoft.com/office/powerpoint/2010/main" val="1090722005"/>
+        <p14:creationId xmlns:p14="http://schemas.microsoft.com/office/powerpoint/2010/main" val="3682425662"/>
       </p:ext>
     </p:extLst>
   </p:cSld>
@@ -1160,7 +1161,7 @@
     </p:spTree>
     <p:extLst>
       <p:ext uri="{BB962C8B-B14F-4D97-AF65-F5344CB8AC3E}">
-        <p14:creationId xmlns:p14="http://schemas.microsoft.com/office/powerpoint/2010/main" val="2875515759"/>
+        <p14:creationId xmlns:p14="http://schemas.microsoft.com/office/powerpoint/2010/main" val="1090722005"/>
       </p:ext>
     </p:extLst>
   </p:cSld>
@@ -1245,7 +1246,7 @@
     </p:spTree>
     <p:extLst>
       <p:ext uri="{BB962C8B-B14F-4D97-AF65-F5344CB8AC3E}">
-        <p14:creationId xmlns:p14="http://schemas.microsoft.com/office/powerpoint/2010/main" val="4065866648"/>
+        <p14:creationId xmlns:p14="http://schemas.microsoft.com/office/powerpoint/2010/main" val="2875515759"/>
       </p:ext>
     </p:extLst>
   </p:cSld>
@@ -1330,7 +1331,7 @@
     </p:spTree>
     <p:extLst>
       <p:ext uri="{BB962C8B-B14F-4D97-AF65-F5344CB8AC3E}">
-        <p14:creationId xmlns:p14="http://schemas.microsoft.com/office/powerpoint/2010/main" val="3575019063"/>
+        <p14:creationId xmlns:p14="http://schemas.microsoft.com/office/powerpoint/2010/main" val="4065866648"/>
       </p:ext>
     </p:extLst>
   </p:cSld>
@@ -1415,7 +1416,7 @@
     </p:spTree>
     <p:extLst>
       <p:ext uri="{BB962C8B-B14F-4D97-AF65-F5344CB8AC3E}">
-        <p14:creationId xmlns:p14="http://schemas.microsoft.com/office/powerpoint/2010/main" val="2305027239"/>
+        <p14:creationId xmlns:p14="http://schemas.microsoft.com/office/powerpoint/2010/main" val="3575019063"/>
       </p:ext>
     </p:extLst>
   </p:cSld>
@@ -1585,7 +1586,7 @@
     </p:spTree>
     <p:extLst>
       <p:ext uri="{BB962C8B-B14F-4D97-AF65-F5344CB8AC3E}">
-        <p14:creationId xmlns:p14="http://schemas.microsoft.com/office/powerpoint/2010/main" val="2995025684"/>
+        <p14:creationId xmlns:p14="http://schemas.microsoft.com/office/powerpoint/2010/main" val="2305027239"/>
       </p:ext>
     </p:extLst>
   </p:cSld>
@@ -1670,7 +1671,7 @@
     </p:spTree>
     <p:extLst>
       <p:ext uri="{BB962C8B-B14F-4D97-AF65-F5344CB8AC3E}">
-        <p14:creationId xmlns:p14="http://schemas.microsoft.com/office/powerpoint/2010/main" val="2400999226"/>
+        <p14:creationId xmlns:p14="http://schemas.microsoft.com/office/powerpoint/2010/main" val="2995025684"/>
       </p:ext>
     </p:extLst>
   </p:cSld>
@@ -1755,7 +1756,7 @@
     </p:spTree>
     <p:extLst>
       <p:ext uri="{BB962C8B-B14F-4D97-AF65-F5344CB8AC3E}">
-        <p14:creationId xmlns:p14="http://schemas.microsoft.com/office/powerpoint/2010/main" val="744865965"/>
+        <p14:creationId xmlns:p14="http://schemas.microsoft.com/office/powerpoint/2010/main" val="2400999226"/>
       </p:ext>
     </p:extLst>
   </p:cSld>
@@ -1840,7 +1841,7 @@
     </p:spTree>
     <p:extLst>
       <p:ext uri="{BB962C8B-B14F-4D97-AF65-F5344CB8AC3E}">
-        <p14:creationId xmlns:p14="http://schemas.microsoft.com/office/powerpoint/2010/main" val="2268458518"/>
+        <p14:creationId xmlns:p14="http://schemas.microsoft.com/office/powerpoint/2010/main" val="744865965"/>
       </p:ext>
     </p:extLst>
   </p:cSld>
@@ -1925,7 +1926,7 @@
     </p:spTree>
     <p:extLst>
       <p:ext uri="{BB962C8B-B14F-4D97-AF65-F5344CB8AC3E}">
-        <p14:creationId xmlns:p14="http://schemas.microsoft.com/office/powerpoint/2010/main" val="1937406605"/>
+        <p14:creationId xmlns:p14="http://schemas.microsoft.com/office/powerpoint/2010/main" val="2268458518"/>
       </p:ext>
     </p:extLst>
   </p:cSld>
@@ -2010,7 +2011,7 @@
     </p:spTree>
     <p:extLst>
       <p:ext uri="{BB962C8B-B14F-4D97-AF65-F5344CB8AC3E}">
-        <p14:creationId xmlns:p14="http://schemas.microsoft.com/office/powerpoint/2010/main" val="1817750170"/>
+        <p14:creationId xmlns:p14="http://schemas.microsoft.com/office/powerpoint/2010/main" val="1937406605"/>
       </p:ext>
     </p:extLst>
   </p:cSld>
@@ -2087,6 +2088,91 @@
               <a:rPr lang="en-US" smtClean="0"/>
               <a:pPr/>
               <a:t>27</a:t>
+            </a:fld>
+            <a:endParaRPr lang="en-US"/>
+          </a:p>
+        </p:txBody>
+      </p:sp>
+    </p:spTree>
+    <p:extLst>
+      <p:ext uri="{BB962C8B-B14F-4D97-AF65-F5344CB8AC3E}">
+        <p14:creationId xmlns:p14="http://schemas.microsoft.com/office/powerpoint/2010/main" val="1817750170"/>
+      </p:ext>
+    </p:extLst>
+  </p:cSld>
+  <p:clrMapOvr>
+    <a:masterClrMapping/>
+  </p:clrMapOvr>
+</p:notes>
+</file>
+
+<file path=ppt/notesSlides/notesSlide27.xml><?xml version="1.0" encoding="utf-8"?>
+<p:notes xmlns:a="http://schemas.openxmlformats.org/drawingml/2006/main" xmlns:r="http://schemas.openxmlformats.org/officeDocument/2006/relationships" xmlns:p="http://schemas.openxmlformats.org/presentationml/2006/main">
+  <p:cSld>
+    <p:spTree>
+      <p:nvGrpSpPr>
+        <p:cNvPr id="1" name=""/>
+        <p:cNvGrpSpPr/>
+        <p:nvPr/>
+      </p:nvGrpSpPr>
+      <p:grpSpPr>
+        <a:xfrm>
+          <a:off x="0" y="0"/>
+          <a:ext cx="0" cy="0"/>
+          <a:chOff x="0" y="0"/>
+          <a:chExt cx="0" cy="0"/>
+        </a:xfrm>
+      </p:grpSpPr>
+      <p:sp>
+        <p:nvSpPr>
+          <p:cNvPr id="2" name="Slide Image Placeholder 1"/>
+          <p:cNvSpPr>
+            <a:spLocks noGrp="1" noRot="1" noChangeAspect="1"/>
+          </p:cNvSpPr>
+          <p:nvPr>
+            <p:ph type="sldImg"/>
+          </p:nvPr>
+        </p:nvSpPr>
+        <p:spPr/>
+      </p:sp>
+      <p:sp>
+        <p:nvSpPr>
+          <p:cNvPr id="3" name="Notes Placeholder 2"/>
+          <p:cNvSpPr>
+            <a:spLocks noGrp="1"/>
+          </p:cNvSpPr>
+          <p:nvPr>
+            <p:ph type="body" idx="1"/>
+          </p:nvPr>
+        </p:nvSpPr>
+        <p:spPr/>
+        <p:txBody>
+          <a:bodyPr/>
+          <a:lstStyle/>
+          <a:p>
+            <a:endParaRPr lang="en-US" dirty="0"/>
+          </a:p>
+        </p:txBody>
+      </p:sp>
+      <p:sp>
+        <p:nvSpPr>
+          <p:cNvPr id="4" name="Slide Number Placeholder 3"/>
+          <p:cNvSpPr>
+            <a:spLocks noGrp="1"/>
+          </p:cNvSpPr>
+          <p:nvPr>
+            <p:ph type="sldNum" sz="quarter" idx="10"/>
+          </p:nvPr>
+        </p:nvSpPr>
+        <p:spPr/>
+        <p:txBody>
+          <a:bodyPr/>
+          <a:lstStyle/>
+          <a:p>
+            <a:fld id="{4CFD207A-07DF-40AD-A916-9872E089CE7A}" type="slidenum">
+              <a:rPr lang="en-US" smtClean="0"/>
+              <a:pPr/>
+              <a:t>28</a:t>
             </a:fld>
             <a:endParaRPr lang="en-US"/>
           </a:p>
@@ -2690,7 +2776,7 @@
     </p:spTree>
     <p:extLst>
       <p:ext uri="{BB962C8B-B14F-4D97-AF65-F5344CB8AC3E}">
-        <p14:creationId xmlns:p14="http://schemas.microsoft.com/office/powerpoint/2010/main" val="3206964653"/>
+        <p14:creationId xmlns:p14="http://schemas.microsoft.com/office/powerpoint/2010/main" val="3875999212"/>
       </p:ext>
     </p:extLst>
   </p:cSld>
@@ -2847,7 +2933,7 @@
           <a:p>
             <a:fld id="{9DC183D5-83EE-4A48-BB2E-1FC30CD8E44A}" type="datetimeFigureOut">
               <a:rPr lang="en-US" smtClean="0"/>
-              <a:t>2/11/2023</a:t>
+              <a:t>2/12/2023</a:t>
             </a:fld>
             <a:endParaRPr lang="en-US"/>
           </a:p>
@@ -3045,7 +3131,7 @@
           <a:p>
             <a:fld id="{9DC183D5-83EE-4A48-BB2E-1FC30CD8E44A}" type="datetimeFigureOut">
               <a:rPr lang="en-US" smtClean="0"/>
-              <a:t>2/11/2023</a:t>
+              <a:t>2/12/2023</a:t>
             </a:fld>
             <a:endParaRPr lang="en-US"/>
           </a:p>
@@ -3253,7 +3339,7 @@
           <a:p>
             <a:fld id="{9DC183D5-83EE-4A48-BB2E-1FC30CD8E44A}" type="datetimeFigureOut">
               <a:rPr lang="en-US" smtClean="0"/>
-              <a:t>2/11/2023</a:t>
+              <a:t>2/12/2023</a:t>
             </a:fld>
             <a:endParaRPr lang="en-US"/>
           </a:p>
@@ -3623,7 +3709,7 @@
           <a:p>
             <a:fld id="{9DC183D5-83EE-4A48-BB2E-1FC30CD8E44A}" type="datetimeFigureOut">
               <a:rPr lang="en-US" smtClean="0"/>
-              <a:t>2/11/2023</a:t>
+              <a:t>2/12/2023</a:t>
             </a:fld>
             <a:endParaRPr lang="en-US"/>
           </a:p>
@@ -3898,7 +3984,7 @@
           <a:p>
             <a:fld id="{9DC183D5-83EE-4A48-BB2E-1FC30CD8E44A}" type="datetimeFigureOut">
               <a:rPr lang="en-US" smtClean="0"/>
-              <a:t>2/11/2023</a:t>
+              <a:t>2/12/2023</a:t>
             </a:fld>
             <a:endParaRPr lang="en-US"/>
           </a:p>
@@ -4163,7 +4249,7 @@
           <a:p>
             <a:fld id="{9DC183D5-83EE-4A48-BB2E-1FC30CD8E44A}" type="datetimeFigureOut">
               <a:rPr lang="en-US" smtClean="0"/>
-              <a:t>2/11/2023</a:t>
+              <a:t>2/12/2023</a:t>
             </a:fld>
             <a:endParaRPr lang="en-US"/>
           </a:p>
@@ -4575,7 +4661,7 @@
           <a:p>
             <a:fld id="{9DC183D5-83EE-4A48-BB2E-1FC30CD8E44A}" type="datetimeFigureOut">
               <a:rPr lang="en-US" smtClean="0"/>
-              <a:t>2/11/2023</a:t>
+              <a:t>2/12/2023</a:t>
             </a:fld>
             <a:endParaRPr lang="en-US"/>
           </a:p>
@@ -4716,7 +4802,7 @@
           <a:p>
             <a:fld id="{9DC183D5-83EE-4A48-BB2E-1FC30CD8E44A}" type="datetimeFigureOut">
               <a:rPr lang="en-US" smtClean="0"/>
-              <a:t>2/11/2023</a:t>
+              <a:t>2/12/2023</a:t>
             </a:fld>
             <a:endParaRPr lang="en-US"/>
           </a:p>
@@ -4829,7 +4915,7 @@
           <a:p>
             <a:fld id="{9DC183D5-83EE-4A48-BB2E-1FC30CD8E44A}" type="datetimeFigureOut">
               <a:rPr lang="en-US" smtClean="0"/>
-              <a:t>2/11/2023</a:t>
+              <a:t>2/12/2023</a:t>
             </a:fld>
             <a:endParaRPr lang="en-US"/>
           </a:p>
@@ -5140,7 +5226,7 @@
           <a:p>
             <a:fld id="{9DC183D5-83EE-4A48-BB2E-1FC30CD8E44A}" type="datetimeFigureOut">
               <a:rPr lang="en-US" smtClean="0"/>
-              <a:t>2/11/2023</a:t>
+              <a:t>2/12/2023</a:t>
             </a:fld>
             <a:endParaRPr lang="en-US"/>
           </a:p>
@@ -5428,7 +5514,7 @@
           <a:p>
             <a:fld id="{9DC183D5-83EE-4A48-BB2E-1FC30CD8E44A}" type="datetimeFigureOut">
               <a:rPr lang="en-US" smtClean="0"/>
-              <a:t>2/11/2023</a:t>
+              <a:t>2/12/2023</a:t>
             </a:fld>
             <a:endParaRPr lang="en-US"/>
           </a:p>
@@ -5669,7 +5755,7 @@
           <a:p>
             <a:fld id="{9DC183D5-83EE-4A48-BB2E-1FC30CD8E44A}" type="datetimeFigureOut">
               <a:rPr lang="en-US" smtClean="0"/>
-              <a:t>2/11/2023</a:t>
+              <a:t>2/12/2023</a:t>
             </a:fld>
             <a:endParaRPr lang="en-US"/>
           </a:p>
@@ -6354,6 +6440,498 @@
             <p:spPr>
               <a:xfrm>
                 <a:off x="333375" y="896079"/>
+                <a:ext cx="11525250" cy="5698998"/>
+              </a:xfrm>
+            </p:spPr>
+            <p:txBody>
+              <a:bodyPr>
+                <a:normAutofit/>
+              </a:bodyPr>
+              <a:lstStyle/>
+              <a:p>
+                <a:r>
+                  <a:rPr lang="en-US" dirty="0">
+                    <a:latin typeface="+mn-lt"/>
+                  </a:rPr>
+                  <a:t>Different metrics for numeric dissimilarity can be computed for numeric variables in p dimensions</a:t>
+                </a:r>
+              </a:p>
+              <a:p>
+                <a:r>
+                  <a:rPr lang="en-US" b="1" dirty="0" err="1">
+                    <a:latin typeface="+mn-lt"/>
+                  </a:rPr>
+                  <a:t>Mahalanobis</a:t>
+                </a:r>
+                <a:r>
+                  <a:rPr lang="en-US" b="1" dirty="0">
+                    <a:latin typeface="+mn-lt"/>
+                  </a:rPr>
+                  <a:t> Distance </a:t>
+                </a:r>
+                <a:r>
+                  <a:rPr lang="en-US" dirty="0">
+                    <a:latin typeface="+mn-lt"/>
+                  </a:rPr>
+                  <a:t>between two points (vectors) </a:t>
+                </a:r>
+                <a:endParaRPr lang="en-US" dirty="0"/>
+              </a:p>
+              <a:p>
+                <a:pPr marL="0" indent="0">
+                  <a:buNone/>
+                </a:pPr>
+                <a:r>
+                  <a:rPr lang="en-US" dirty="0"/>
+                  <a:t>				</a:t>
+                </a:r>
+                <a14:m>
+                  <m:oMath xmlns:m="http://schemas.openxmlformats.org/officeDocument/2006/math">
+                    <m:r>
+                      <a:rPr lang="en-US">
+                        <a:latin typeface="Cambria Math" panose="02040503050406030204" pitchFamily="18" charset="0"/>
+                      </a:rPr>
+                      <m:t> </m:t>
+                    </m:r>
+                    <m:r>
+                      <a:rPr lang="en-US" i="1">
+                        <a:latin typeface="Cambria Math" panose="02040503050406030204" pitchFamily="18" charset="0"/>
+                      </a:rPr>
+                      <m:t>𝑑</m:t>
+                    </m:r>
+                    <m:r>
+                      <a:rPr lang="en-US" i="1">
+                        <a:latin typeface="Cambria Math" panose="02040503050406030204" pitchFamily="18" charset="0"/>
+                      </a:rPr>
+                      <m:t>(</m:t>
+                    </m:r>
+                    <m:r>
+                      <a:rPr lang="en-US" i="1">
+                        <a:latin typeface="Cambria Math" panose="02040503050406030204" pitchFamily="18" charset="0"/>
+                      </a:rPr>
+                      <m:t>𝑥</m:t>
+                    </m:r>
+                    <m:r>
+                      <a:rPr lang="en-US" i="1">
+                        <a:latin typeface="Cambria Math" panose="02040503050406030204" pitchFamily="18" charset="0"/>
+                      </a:rPr>
+                      <m:t>,</m:t>
+                    </m:r>
+                    <m:r>
+                      <a:rPr lang="en-US" b="0" i="1" smtClean="0">
+                        <a:latin typeface="Cambria Math" panose="02040503050406030204" pitchFamily="18" charset="0"/>
+                      </a:rPr>
+                      <m:t>𝑥</m:t>
+                    </m:r>
+                    <m:r>
+                      <a:rPr lang="en-US" b="0" i="1" smtClean="0">
+                        <a:latin typeface="Cambria Math" panose="02040503050406030204" pitchFamily="18" charset="0"/>
+                      </a:rPr>
+                      <m:t>′)= </m:t>
+                    </m:r>
+                    <m:rad>
+                      <m:radPr>
+                        <m:degHide m:val="on"/>
+                        <m:ctrlPr>
+                          <a:rPr lang="en-US" i="1">
+                            <a:latin typeface="Cambria Math" panose="02040503050406030204" pitchFamily="18" charset="0"/>
+                          </a:rPr>
+                        </m:ctrlPr>
+                      </m:radPr>
+                      <m:deg/>
+                      <m:e>
+                        <m:sSup>
+                          <m:sSupPr>
+                            <m:ctrlPr>
+                              <a:rPr lang="en-US" i="1">
+                                <a:latin typeface="Cambria Math" panose="02040503050406030204" pitchFamily="18" charset="0"/>
+                              </a:rPr>
+                            </m:ctrlPr>
+                          </m:sSupPr>
+                          <m:e>
+                            <m:d>
+                              <m:dPr>
+                                <m:ctrlPr>
+                                  <a:rPr lang="en-US" i="1" smtClean="0">
+                                    <a:latin typeface="Cambria Math" panose="02040503050406030204" pitchFamily="18" charset="0"/>
+                                  </a:rPr>
+                                </m:ctrlPr>
+                              </m:dPr>
+                              <m:e>
+                                <m:r>
+                                  <a:rPr lang="en-US" i="1">
+                                    <a:latin typeface="Cambria Math" panose="02040503050406030204" pitchFamily="18" charset="0"/>
+                                  </a:rPr>
+                                  <m:t>𝑥</m:t>
+                                </m:r>
+                                <m:r>
+                                  <a:rPr lang="en-US" i="1">
+                                    <a:latin typeface="Cambria Math" panose="02040503050406030204" pitchFamily="18" charset="0"/>
+                                  </a:rPr>
+                                  <m:t>−</m:t>
+                                </m:r>
+                                <m:r>
+                                  <a:rPr lang="en-US" b="0" i="1" smtClean="0">
+                                    <a:latin typeface="Cambria Math" panose="02040503050406030204" pitchFamily="18" charset="0"/>
+                                  </a:rPr>
+                                  <m:t>𝑥</m:t>
+                                </m:r>
+                                <m:r>
+                                  <a:rPr lang="en-US" b="0" i="1" smtClean="0">
+                                    <a:latin typeface="Cambria Math" panose="02040503050406030204" pitchFamily="18" charset="0"/>
+                                  </a:rPr>
+                                  <m:t>′</m:t>
+                                </m:r>
+                              </m:e>
+                            </m:d>
+                          </m:e>
+                          <m:sup>
+                            <m:r>
+                              <a:rPr lang="en-US" i="1">
+                                <a:latin typeface="Cambria Math" panose="02040503050406030204" pitchFamily="18" charset="0"/>
+                              </a:rPr>
+                              <m:t>𝑇</m:t>
+                            </m:r>
+                          </m:sup>
+                        </m:sSup>
+                        <m:sSup>
+                          <m:sSupPr>
+                            <m:ctrlPr>
+                              <a:rPr lang="en-US" i="1">
+                                <a:latin typeface="Cambria Math" panose="02040503050406030204" pitchFamily="18" charset="0"/>
+                              </a:rPr>
+                            </m:ctrlPr>
+                          </m:sSupPr>
+                          <m:e>
+                            <m:r>
+                              <a:rPr lang="en-US" i="1">
+                                <a:latin typeface="Cambria Math" panose="02040503050406030204" pitchFamily="18" charset="0"/>
+                              </a:rPr>
+                              <m:t>𝑆</m:t>
+                            </m:r>
+                          </m:e>
+                          <m:sup>
+                            <m:r>
+                              <a:rPr lang="en-US" i="1">
+                                <a:latin typeface="Cambria Math" panose="02040503050406030204" pitchFamily="18" charset="0"/>
+                              </a:rPr>
+                              <m:t>−1</m:t>
+                            </m:r>
+                          </m:sup>
+                        </m:sSup>
+                        <m:d>
+                          <m:dPr>
+                            <m:ctrlPr>
+                              <a:rPr lang="en-US" i="1">
+                                <a:latin typeface="Cambria Math" panose="02040503050406030204" pitchFamily="18" charset="0"/>
+                              </a:rPr>
+                            </m:ctrlPr>
+                          </m:dPr>
+                          <m:e>
+                            <m:r>
+                              <a:rPr lang="en-US" i="1">
+                                <a:latin typeface="Cambria Math" panose="02040503050406030204" pitchFamily="18" charset="0"/>
+                              </a:rPr>
+                              <m:t>𝑥</m:t>
+                            </m:r>
+                            <m:r>
+                              <a:rPr lang="en-US" i="1">
+                                <a:latin typeface="Cambria Math" panose="02040503050406030204" pitchFamily="18" charset="0"/>
+                              </a:rPr>
+                              <m:t>−</m:t>
+                            </m:r>
+                            <m:r>
+                              <a:rPr lang="en-US" b="0" i="1" smtClean="0">
+                                <a:latin typeface="Cambria Math" panose="02040503050406030204" pitchFamily="18" charset="0"/>
+                              </a:rPr>
+                              <m:t>𝑥</m:t>
+                            </m:r>
+                            <m:r>
+                              <a:rPr lang="en-US" b="0" i="1" smtClean="0">
+                                <a:latin typeface="Cambria Math" panose="02040503050406030204" pitchFamily="18" charset="0"/>
+                              </a:rPr>
+                              <m:t>′</m:t>
+                            </m:r>
+                          </m:e>
+                        </m:d>
+                      </m:e>
+                    </m:rad>
+                  </m:oMath>
+                </a14:m>
+                <a:endParaRPr lang="en-US" dirty="0"/>
+              </a:p>
+              <a:p>
+                <a:pPr marL="0" indent="0">
+                  <a:buNone/>
+                </a:pPr>
+                <a:r>
+                  <a:rPr lang="en-US" dirty="0">
+                    <a:latin typeface="+mn-lt"/>
+                  </a:rPr>
+                  <a:t>Where, </a:t>
+                </a:r>
+                <a14:m>
+                  <m:oMath xmlns:m="http://schemas.openxmlformats.org/officeDocument/2006/math">
+                    <m:sSup>
+                      <m:sSupPr>
+                        <m:ctrlPr>
+                          <a:rPr lang="en-US" i="1">
+                            <a:latin typeface="Cambria Math" panose="02040503050406030204" pitchFamily="18" charset="0"/>
+                          </a:rPr>
+                        </m:ctrlPr>
+                      </m:sSupPr>
+                      <m:e>
+                        <m:r>
+                          <a:rPr lang="en-US" i="1">
+                            <a:latin typeface="Cambria Math" panose="02040503050406030204" pitchFamily="18" charset="0"/>
+                          </a:rPr>
+                          <m:t>𝑆</m:t>
+                        </m:r>
+                      </m:e>
+                      <m:sup>
+                        <m:r>
+                          <a:rPr lang="en-US" b="0" i="1" smtClean="0">
+                            <a:latin typeface="Cambria Math" panose="02040503050406030204" pitchFamily="18" charset="0"/>
+                          </a:rPr>
+                          <m:t> </m:t>
+                        </m:r>
+                      </m:sup>
+                    </m:sSup>
+                    <m:r>
+                      <a:rPr lang="en-US" b="0" i="1" smtClean="0">
+                        <a:latin typeface="Cambria Math" panose="02040503050406030204" pitchFamily="18" charset="0"/>
+                      </a:rPr>
+                      <m:t>=</m:t>
+                    </m:r>
+                    <m:r>
+                      <a:rPr lang="en-US" b="0" i="1" smtClean="0">
+                        <a:latin typeface="Cambria Math" panose="02040503050406030204" pitchFamily="18" charset="0"/>
+                      </a:rPr>
+                      <m:t>𝑥</m:t>
+                    </m:r>
+                    <m:r>
+                      <a:rPr lang="en-US" b="0" i="1" smtClean="0">
+                        <a:latin typeface="Cambria Math" panose="02040503050406030204" pitchFamily="18" charset="0"/>
+                        <a:ea typeface="Cambria Math" panose="02040503050406030204" pitchFamily="18" charset="0"/>
+                      </a:rPr>
+                      <m:t>∙</m:t>
+                    </m:r>
+                    <m:sSup>
+                      <m:sSupPr>
+                        <m:ctrlPr>
+                          <a:rPr lang="en-US" b="0" i="1" smtClean="0">
+                            <a:latin typeface="Cambria Math" panose="02040503050406030204" pitchFamily="18" charset="0"/>
+                          </a:rPr>
+                        </m:ctrlPr>
+                      </m:sSupPr>
+                      <m:e>
+                        <m:r>
+                          <a:rPr lang="en-US" b="0" i="1" smtClean="0">
+                            <a:latin typeface="Cambria Math" panose="02040503050406030204" pitchFamily="18" charset="0"/>
+                          </a:rPr>
+                          <m:t>𝑥</m:t>
+                        </m:r>
+                        <m:r>
+                          <a:rPr lang="en-US" b="0" i="1" smtClean="0">
+                            <a:latin typeface="Cambria Math" panose="02040503050406030204" pitchFamily="18" charset="0"/>
+                          </a:rPr>
+                          <m:t>′</m:t>
+                        </m:r>
+                      </m:e>
+                      <m:sup>
+                        <m:r>
+                          <a:rPr lang="en-US" b="0" i="1" smtClean="0">
+                            <a:latin typeface="Cambria Math" panose="02040503050406030204" pitchFamily="18" charset="0"/>
+                          </a:rPr>
+                          <m:t>𝑇</m:t>
+                        </m:r>
+                      </m:sup>
+                    </m:sSup>
+                  </m:oMath>
+                </a14:m>
+                <a:r>
+                  <a:rPr lang="en-US" dirty="0">
+                    <a:latin typeface="+mn-lt"/>
+                  </a:rPr>
+                  <a:t> is the empirical covariance estimate </a:t>
+                </a:r>
+              </a:p>
+              <a:p>
+                <a:r>
+                  <a:rPr lang="en-US" dirty="0">
+                    <a:latin typeface="+mn-lt"/>
+                  </a:rPr>
+                  <a:t>How can we interpret the </a:t>
+                </a:r>
+                <a:r>
+                  <a:rPr lang="en-US" dirty="0" err="1">
+                    <a:latin typeface="+mn-lt"/>
+                  </a:rPr>
+                  <a:t>Mahalanobis</a:t>
+                </a:r>
+                <a:r>
+                  <a:rPr lang="en-US" dirty="0">
+                    <a:latin typeface="+mn-lt"/>
+                  </a:rPr>
+                  <a:t> distance?   </a:t>
+                </a:r>
+              </a:p>
+              <a:p>
+                <a:r>
+                  <a:rPr lang="en-US" dirty="0">
+                    <a:latin typeface="+mn-lt"/>
+                  </a:rPr>
+                  <a:t>The </a:t>
+                </a:r>
+                <a:r>
+                  <a:rPr lang="en-US" dirty="0" err="1">
+                    <a:latin typeface="+mn-lt"/>
+                  </a:rPr>
+                  <a:t>Mahalanobis</a:t>
+                </a:r>
+                <a:r>
+                  <a:rPr lang="en-US" dirty="0">
+                    <a:latin typeface="+mn-lt"/>
+                  </a:rPr>
+                  <a:t> distance is the distance between points in a distribution (point cloud) with covariance </a:t>
+                </a:r>
+                <a14:m>
+                  <m:oMath xmlns:m="http://schemas.openxmlformats.org/officeDocument/2006/math">
+                    <m:r>
+                      <a:rPr lang="en-US" i="1">
+                        <a:latin typeface="Cambria Math" panose="02040503050406030204" pitchFamily="18" charset="0"/>
+                      </a:rPr>
+                      <m:t>𝑆</m:t>
+                    </m:r>
+                  </m:oMath>
+                </a14:m>
+                <a:r>
+                  <a:rPr lang="en-US" dirty="0">
+                    <a:latin typeface="+mn-lt"/>
+                  </a:rPr>
+                  <a:t> </a:t>
+                </a:r>
+              </a:p>
+              <a:p>
+                <a:endParaRPr lang="en-US" dirty="0">
+                  <a:latin typeface="+mn-lt"/>
+                </a:endParaRPr>
+              </a:p>
+            </p:txBody>
+          </p:sp>
+        </mc:Choice>
+        <mc:Fallback>
+          <p:sp>
+            <p:nvSpPr>
+              <p:cNvPr id="3" name="Content Placeholder 2"/>
+              <p:cNvSpPr>
+                <a:spLocks noGrp="1" noRot="1" noChangeAspect="1" noMove="1" noResize="1" noEditPoints="1" noAdjustHandles="1" noChangeArrowheads="1" noChangeShapeType="1" noTextEdit="1"/>
+              </p:cNvSpPr>
+              <p:nvPr>
+                <p:ph sz="quarter" idx="10"/>
+              </p:nvPr>
+            </p:nvSpPr>
+            <p:spPr>
+              <a:xfrm>
+                <a:off x="333375" y="896079"/>
+                <a:ext cx="11525250" cy="5698998"/>
+              </a:xfrm>
+              <a:blipFill>
+                <a:blip r:embed="rId3"/>
+                <a:stretch>
+                  <a:fillRect l="-1111" t="-1818"/>
+                </a:stretch>
+              </a:blipFill>
+            </p:spPr>
+            <p:txBody>
+              <a:bodyPr/>
+              <a:lstStyle/>
+              <a:p>
+                <a:r>
+                  <a:rPr lang="en-US">
+                    <a:noFill/>
+                  </a:rPr>
+                  <a:t> </a:t>
+                </a:r>
+              </a:p>
+            </p:txBody>
+          </p:sp>
+        </mc:Fallback>
+      </mc:AlternateContent>
+    </p:spTree>
+    <p:extLst>
+      <p:ext uri="{BB962C8B-B14F-4D97-AF65-F5344CB8AC3E}">
+        <p14:creationId xmlns:p14="http://schemas.microsoft.com/office/powerpoint/2010/main" val="4220097327"/>
+      </p:ext>
+    </p:extLst>
+  </p:cSld>
+  <p:clrMapOvr>
+    <a:masterClrMapping/>
+  </p:clrMapOvr>
+</p:sld>
+</file>
+
+<file path=ppt/slides/slide11.xml><?xml version="1.0" encoding="utf-8"?>
+<p:sld xmlns:a="http://schemas.openxmlformats.org/drawingml/2006/main" xmlns:r="http://schemas.openxmlformats.org/officeDocument/2006/relationships" xmlns:p="http://schemas.openxmlformats.org/presentationml/2006/main">
+  <p:cSld>
+    <p:spTree>
+      <p:nvGrpSpPr>
+        <p:cNvPr id="1" name=""/>
+        <p:cNvGrpSpPr/>
+        <p:nvPr/>
+      </p:nvGrpSpPr>
+      <p:grpSpPr>
+        <a:xfrm>
+          <a:off x="0" y="0"/>
+          <a:ext cx="0" cy="0"/>
+          <a:chOff x="0" y="0"/>
+          <a:chExt cx="0" cy="0"/>
+        </a:xfrm>
+      </p:grpSpPr>
+      <p:sp>
+        <p:nvSpPr>
+          <p:cNvPr id="2" name="Title 1"/>
+          <p:cNvSpPr>
+            <a:spLocks noGrp="1"/>
+          </p:cNvSpPr>
+          <p:nvPr>
+            <p:ph type="title"/>
+          </p:nvPr>
+        </p:nvSpPr>
+        <p:spPr>
+          <a:xfrm>
+            <a:off x="584200" y="221992"/>
+            <a:ext cx="10515600" cy="530954"/>
+          </a:xfrm>
+        </p:spPr>
+        <p:txBody>
+          <a:bodyPr>
+            <a:normAutofit fontScale="90000"/>
+          </a:bodyPr>
+          <a:lstStyle/>
+          <a:p>
+            <a:r>
+              <a:rPr lang="en-US" dirty="0"/>
+              <a:t>Measuring distance or dissimilarity</a:t>
+            </a:r>
+          </a:p>
+        </p:txBody>
+      </p:sp>
+      <mc:AlternateContent xmlns:mc="http://schemas.openxmlformats.org/markup-compatibility/2006" xmlns:a14="http://schemas.microsoft.com/office/drawing/2010/main">
+        <mc:Choice Requires="a14">
+          <p:sp>
+            <p:nvSpPr>
+              <p:cNvPr id="3" name="Content Placeholder 2"/>
+              <p:cNvSpPr>
+                <a:spLocks noGrp="1"/>
+              </p:cNvSpPr>
+              <p:nvPr>
+                <p:ph sz="quarter" idx="10"/>
+              </p:nvPr>
+            </p:nvSpPr>
+            <p:spPr>
+              <a:xfrm>
+                <a:off x="333375" y="896079"/>
                 <a:ext cx="11525250" cy="1639303"/>
               </a:xfrm>
             </p:spPr>
@@ -6634,7 +7212,7 @@
             </p:txBody>
           </p:sp>
         </mc:Choice>
-        <mc:Fallback>
+        <mc:Fallback xmlns="">
           <p:sp>
             <p:nvSpPr>
               <p:cNvPr id="3" name="Content Placeholder 2"/>
@@ -8175,7 +8753,7 @@
 </p:sld>
 </file>
 
-<file path=ppt/slides/slide11.xml><?xml version="1.0" encoding="utf-8"?>
+<file path=ppt/slides/slide12.xml><?xml version="1.0" encoding="utf-8"?>
 <p:sld xmlns:a="http://schemas.openxmlformats.org/drawingml/2006/main" xmlns:r="http://schemas.openxmlformats.org/officeDocument/2006/relationships" xmlns:p="http://schemas.openxmlformats.org/presentationml/2006/main">
   <p:cSld>
     <p:spTree>
@@ -9715,7 +10293,7 @@
 </p:sld>
 </file>
 
-<file path=ppt/slides/slide12.xml><?xml version="1.0" encoding="utf-8"?>
+<file path=ppt/slides/slide13.xml><?xml version="1.0" encoding="utf-8"?>
 <p:sld xmlns:a="http://schemas.openxmlformats.org/drawingml/2006/main" xmlns:r="http://schemas.openxmlformats.org/officeDocument/2006/relationships" xmlns:p="http://schemas.openxmlformats.org/presentationml/2006/main">
   <p:cSld>
     <p:spTree>
@@ -10596,7 +11174,7 @@
 </p:sld>
 </file>
 
-<file path=ppt/slides/slide13.xml><?xml version="1.0" encoding="utf-8"?>
+<file path=ppt/slides/slide14.xml><?xml version="1.0" encoding="utf-8"?>
 <p:sld xmlns:a="http://schemas.openxmlformats.org/drawingml/2006/main" xmlns:r="http://schemas.openxmlformats.org/officeDocument/2006/relationships" xmlns:p="http://schemas.openxmlformats.org/presentationml/2006/main">
   <p:cSld>
     <p:spTree>
@@ -11316,7 +11894,7 @@
 </p:sld>
 </file>
 
-<file path=ppt/slides/slide14.xml><?xml version="1.0" encoding="utf-8"?>
+<file path=ppt/slides/slide15.xml><?xml version="1.0" encoding="utf-8"?>
 <p:sld xmlns:a="http://schemas.openxmlformats.org/drawingml/2006/main" xmlns:r="http://schemas.openxmlformats.org/officeDocument/2006/relationships" xmlns:p="http://schemas.openxmlformats.org/presentationml/2006/main">
   <p:cSld>
     <p:spTree>
@@ -12037,7 +12615,7 @@
 </p:sld>
 </file>
 
-<file path=ppt/slides/slide15.xml><?xml version="1.0" encoding="utf-8"?>
+<file path=ppt/slides/slide16.xml><?xml version="1.0" encoding="utf-8"?>
 <p:sld xmlns:a="http://schemas.openxmlformats.org/drawingml/2006/main" xmlns:r="http://schemas.openxmlformats.org/officeDocument/2006/relationships" xmlns:p="http://schemas.openxmlformats.org/presentationml/2006/main">
   <p:cSld>
     <p:spTree>
@@ -12927,7 +13505,7 @@
 </p:sld>
 </file>
 
-<file path=ppt/slides/slide16.xml><?xml version="1.0" encoding="utf-8"?>
+<file path=ppt/slides/slide17.xml><?xml version="1.0" encoding="utf-8"?>
 <p:sld xmlns:a="http://schemas.openxmlformats.org/drawingml/2006/main" xmlns:r="http://schemas.openxmlformats.org/officeDocument/2006/relationships" xmlns:p="http://schemas.openxmlformats.org/presentationml/2006/main">
   <p:cSld>
     <p:spTree>
@@ -13569,7 +14147,7 @@
 </p:sld>
 </file>
 
-<file path=ppt/slides/slide17.xml><?xml version="1.0" encoding="utf-8"?>
+<file path=ppt/slides/slide18.xml><?xml version="1.0" encoding="utf-8"?>
 <p:sld xmlns:a="http://schemas.openxmlformats.org/drawingml/2006/main" xmlns:r="http://schemas.openxmlformats.org/officeDocument/2006/relationships" xmlns:p="http://schemas.openxmlformats.org/presentationml/2006/main">
   <p:cSld>
     <p:spTree>
@@ -14095,7 +14673,7 @@
 </p:sld>
 </file>
 
-<file path=ppt/slides/slide18.xml><?xml version="1.0" encoding="utf-8"?>
+<file path=ppt/slides/slide19.xml><?xml version="1.0" encoding="utf-8"?>
 <p:sld xmlns:a="http://schemas.openxmlformats.org/drawingml/2006/main" xmlns:r="http://schemas.openxmlformats.org/officeDocument/2006/relationships" xmlns:p="http://schemas.openxmlformats.org/presentationml/2006/main">
   <p:cSld>
     <p:spTree>
@@ -15294,7 +15872,481 @@
 </p:sld>
 </file>
 
-<file path=ppt/slides/slide19.xml><?xml version="1.0" encoding="utf-8"?>
+<file path=ppt/slides/slide2.xml><?xml version="1.0" encoding="utf-8"?>
+<p:sld xmlns:a="http://schemas.openxmlformats.org/drawingml/2006/main" xmlns:r="http://schemas.openxmlformats.org/officeDocument/2006/relationships" xmlns:p="http://schemas.openxmlformats.org/presentationml/2006/main">
+  <p:cSld>
+    <p:spTree>
+      <p:nvGrpSpPr>
+        <p:cNvPr id="1" name=""/>
+        <p:cNvGrpSpPr/>
+        <p:nvPr/>
+      </p:nvGrpSpPr>
+      <p:grpSpPr>
+        <a:xfrm>
+          <a:off x="0" y="0"/>
+          <a:ext cx="0" cy="0"/>
+          <a:chOff x="0" y="0"/>
+          <a:chExt cx="0" cy="0"/>
+        </a:xfrm>
+      </p:grpSpPr>
+      <p:sp>
+        <p:nvSpPr>
+          <p:cNvPr id="2" name="Title 1"/>
+          <p:cNvSpPr>
+            <a:spLocks noGrp="1"/>
+          </p:cNvSpPr>
+          <p:nvPr>
+            <p:ph type="title"/>
+          </p:nvPr>
+        </p:nvSpPr>
+        <p:spPr>
+          <a:xfrm>
+            <a:off x="584200" y="221992"/>
+            <a:ext cx="10515600" cy="530954"/>
+          </a:xfrm>
+        </p:spPr>
+        <p:txBody>
+          <a:bodyPr>
+            <a:normAutofit fontScale="90000"/>
+          </a:bodyPr>
+          <a:lstStyle/>
+          <a:p>
+            <a:r>
+              <a:rPr lang="en-US" dirty="0"/>
+              <a:t>Measuring similarity and dissimilarity</a:t>
+            </a:r>
+          </a:p>
+        </p:txBody>
+      </p:sp>
+      <p:sp>
+        <p:nvSpPr>
+          <p:cNvPr id="3" name="Content Placeholder 2"/>
+          <p:cNvSpPr>
+            <a:spLocks noGrp="1"/>
+          </p:cNvSpPr>
+          <p:nvPr>
+            <p:ph sz="quarter" idx="10"/>
+          </p:nvPr>
+        </p:nvSpPr>
+        <p:spPr>
+          <a:xfrm>
+            <a:off x="333375" y="896079"/>
+            <a:ext cx="11525250" cy="5290388"/>
+          </a:xfrm>
+        </p:spPr>
+        <p:txBody>
+          <a:bodyPr>
+            <a:normAutofit/>
+          </a:bodyPr>
+          <a:lstStyle/>
+          <a:p>
+            <a:pPr marL="0" indent="0">
+              <a:buNone/>
+            </a:pPr>
+            <a:r>
+              <a:rPr lang="en-US" dirty="0">
+                <a:latin typeface="+mn-lt"/>
+              </a:rPr>
+              <a:t>Many data mining algorithms search for the most similar or dissimilar cases</a:t>
+            </a:r>
+          </a:p>
+          <a:p>
+            <a:r>
+              <a:rPr lang="en-US" dirty="0">
+                <a:latin typeface="+mn-lt"/>
+              </a:rPr>
+              <a:t>Searching for documents with similar content</a:t>
+            </a:r>
+          </a:p>
+          <a:p>
+            <a:r>
+              <a:rPr lang="en-US" dirty="0">
+                <a:latin typeface="+mn-lt"/>
+              </a:rPr>
+              <a:t>Finding customers with similar purchasing habits </a:t>
+            </a:r>
+          </a:p>
+          <a:p>
+            <a:r>
+              <a:rPr lang="en-US" dirty="0">
+                <a:latin typeface="+mn-lt"/>
+              </a:rPr>
+              <a:t>Discover similar mRNA sequences </a:t>
+            </a:r>
+          </a:p>
+          <a:p>
+            <a:r>
+              <a:rPr lang="en-US" dirty="0">
+                <a:latin typeface="+mn-lt"/>
+              </a:rPr>
+              <a:t>Similarity between two sensor streams</a:t>
+            </a:r>
+          </a:p>
+          <a:p>
+            <a:r>
+              <a:rPr lang="en-US" dirty="0">
+                <a:latin typeface="+mn-lt"/>
+              </a:rPr>
+              <a:t>Matching partners in a dating app</a:t>
+            </a:r>
+          </a:p>
+          <a:p>
+            <a:r>
+              <a:rPr lang="en-US" dirty="0">
+                <a:latin typeface="+mn-lt"/>
+              </a:rPr>
+              <a:t> Etc. </a:t>
+            </a:r>
+          </a:p>
+          <a:p>
+            <a:endParaRPr lang="en-US" sz="2800" dirty="0">
+              <a:latin typeface="+mn-lt"/>
+            </a:endParaRPr>
+          </a:p>
+          <a:p>
+            <a:pPr lvl="1"/>
+            <a:endParaRPr lang="en-US" dirty="0"/>
+          </a:p>
+        </p:txBody>
+      </p:sp>
+    </p:spTree>
+    <p:extLst>
+      <p:ext uri="{BB962C8B-B14F-4D97-AF65-F5344CB8AC3E}">
+        <p14:creationId xmlns:p14="http://schemas.microsoft.com/office/powerpoint/2010/main" val="92654233"/>
+      </p:ext>
+    </p:extLst>
+  </p:cSld>
+  <p:clrMapOvr>
+    <a:masterClrMapping/>
+  </p:clrMapOvr>
+  <p:timing>
+    <p:tnLst>
+      <p:par>
+        <p:cTn id="1" dur="indefinite" restart="never" nodeType="tmRoot">
+          <p:childTnLst>
+            <p:seq concurrent="1" nextAc="seek">
+              <p:cTn id="2" dur="indefinite" nodeType="mainSeq">
+                <p:childTnLst>
+                  <p:par>
+                    <p:cTn id="3" fill="hold">
+                      <p:stCondLst>
+                        <p:cond delay="indefinite"/>
+                      </p:stCondLst>
+                      <p:childTnLst>
+                        <p:par>
+                          <p:cTn id="4" fill="hold">
+                            <p:stCondLst>
+                              <p:cond delay="0"/>
+                            </p:stCondLst>
+                            <p:childTnLst>
+                              <p:par>
+                                <p:cTn id="5" presetID="1" presetClass="entr" presetSubtype="0" fill="hold" nodeType="clickEffect">
+                                  <p:stCondLst>
+                                    <p:cond delay="0"/>
+                                  </p:stCondLst>
+                                  <p:childTnLst>
+                                    <p:set>
+                                      <p:cBhvr>
+                                        <p:cTn id="6" dur="1" fill="hold">
+                                          <p:stCondLst>
+                                            <p:cond delay="0"/>
+                                          </p:stCondLst>
+                                        </p:cTn>
+                                        <p:tgtEl>
+                                          <p:spTgt spid="3">
+                                            <p:txEl>
+                                              <p:pRg st="1" end="1"/>
+                                            </p:txEl>
+                                          </p:spTgt>
+                                        </p:tgtEl>
+                                        <p:attrNameLst>
+                                          <p:attrName>style.visibility</p:attrName>
+                                        </p:attrNameLst>
+                                      </p:cBhvr>
+                                      <p:to>
+                                        <p:strVal val="visible"/>
+                                      </p:to>
+                                    </p:set>
+                                  </p:childTnLst>
+                                </p:cTn>
+                              </p:par>
+                            </p:childTnLst>
+                          </p:cTn>
+                        </p:par>
+                      </p:childTnLst>
+                    </p:cTn>
+                  </p:par>
+                  <p:par>
+                    <p:cTn id="7" fill="hold">
+                      <p:stCondLst>
+                        <p:cond delay="indefinite"/>
+                      </p:stCondLst>
+                      <p:childTnLst>
+                        <p:par>
+                          <p:cTn id="8" fill="hold">
+                            <p:stCondLst>
+                              <p:cond delay="0"/>
+                            </p:stCondLst>
+                            <p:childTnLst>
+                              <p:par>
+                                <p:cTn id="9" presetID="1" presetClass="entr" presetSubtype="0" fill="hold" nodeType="clickEffect">
+                                  <p:stCondLst>
+                                    <p:cond delay="0"/>
+                                  </p:stCondLst>
+                                  <p:childTnLst>
+                                    <p:set>
+                                      <p:cBhvr>
+                                        <p:cTn id="10" dur="1" fill="hold">
+                                          <p:stCondLst>
+                                            <p:cond delay="0"/>
+                                          </p:stCondLst>
+                                        </p:cTn>
+                                        <p:tgtEl>
+                                          <p:spTgt spid="3">
+                                            <p:txEl>
+                                              <p:pRg st="2" end="2"/>
+                                            </p:txEl>
+                                          </p:spTgt>
+                                        </p:tgtEl>
+                                        <p:attrNameLst>
+                                          <p:attrName>style.visibility</p:attrName>
+                                        </p:attrNameLst>
+                                      </p:cBhvr>
+                                      <p:to>
+                                        <p:strVal val="visible"/>
+                                      </p:to>
+                                    </p:set>
+                                  </p:childTnLst>
+                                </p:cTn>
+                              </p:par>
+                            </p:childTnLst>
+                          </p:cTn>
+                        </p:par>
+                      </p:childTnLst>
+                    </p:cTn>
+                  </p:par>
+                  <p:par>
+                    <p:cTn id="11" fill="hold">
+                      <p:stCondLst>
+                        <p:cond delay="indefinite"/>
+                      </p:stCondLst>
+                      <p:childTnLst>
+                        <p:par>
+                          <p:cTn id="12" fill="hold">
+                            <p:stCondLst>
+                              <p:cond delay="0"/>
+                            </p:stCondLst>
+                            <p:childTnLst>
+                              <p:par>
+                                <p:cTn id="13" presetID="1" presetClass="entr" presetSubtype="0" fill="hold" nodeType="clickEffect">
+                                  <p:stCondLst>
+                                    <p:cond delay="0"/>
+                                  </p:stCondLst>
+                                  <p:childTnLst>
+                                    <p:set>
+                                      <p:cBhvr>
+                                        <p:cTn id="14" dur="1" fill="hold">
+                                          <p:stCondLst>
+                                            <p:cond delay="0"/>
+                                          </p:stCondLst>
+                                        </p:cTn>
+                                        <p:tgtEl>
+                                          <p:spTgt spid="3">
+                                            <p:txEl>
+                                              <p:pRg st="3" end="3"/>
+                                            </p:txEl>
+                                          </p:spTgt>
+                                        </p:tgtEl>
+                                        <p:attrNameLst>
+                                          <p:attrName>style.visibility</p:attrName>
+                                        </p:attrNameLst>
+                                      </p:cBhvr>
+                                      <p:to>
+                                        <p:strVal val="visible"/>
+                                      </p:to>
+                                    </p:set>
+                                  </p:childTnLst>
+                                </p:cTn>
+                              </p:par>
+                            </p:childTnLst>
+                          </p:cTn>
+                        </p:par>
+                      </p:childTnLst>
+                    </p:cTn>
+                  </p:par>
+                  <p:par>
+                    <p:cTn id="15" fill="hold">
+                      <p:stCondLst>
+                        <p:cond delay="indefinite"/>
+                      </p:stCondLst>
+                      <p:childTnLst>
+                        <p:par>
+                          <p:cTn id="16" fill="hold">
+                            <p:stCondLst>
+                              <p:cond delay="0"/>
+                            </p:stCondLst>
+                            <p:childTnLst>
+                              <p:par>
+                                <p:cTn id="17" presetID="1" presetClass="entr" presetSubtype="0" fill="hold" nodeType="clickEffect">
+                                  <p:stCondLst>
+                                    <p:cond delay="0"/>
+                                  </p:stCondLst>
+                                  <p:childTnLst>
+                                    <p:set>
+                                      <p:cBhvr>
+                                        <p:cTn id="18" dur="1" fill="hold">
+                                          <p:stCondLst>
+                                            <p:cond delay="0"/>
+                                          </p:stCondLst>
+                                        </p:cTn>
+                                        <p:tgtEl>
+                                          <p:spTgt spid="3">
+                                            <p:txEl>
+                                              <p:pRg st="4" end="4"/>
+                                            </p:txEl>
+                                          </p:spTgt>
+                                        </p:tgtEl>
+                                        <p:attrNameLst>
+                                          <p:attrName>style.visibility</p:attrName>
+                                        </p:attrNameLst>
+                                      </p:cBhvr>
+                                      <p:to>
+                                        <p:strVal val="visible"/>
+                                      </p:to>
+                                    </p:set>
+                                  </p:childTnLst>
+                                </p:cTn>
+                              </p:par>
+                            </p:childTnLst>
+                          </p:cTn>
+                        </p:par>
+                      </p:childTnLst>
+                    </p:cTn>
+                  </p:par>
+                  <p:par>
+                    <p:cTn id="19" fill="hold">
+                      <p:stCondLst>
+                        <p:cond delay="indefinite"/>
+                      </p:stCondLst>
+                      <p:childTnLst>
+                        <p:par>
+                          <p:cTn id="20" fill="hold">
+                            <p:stCondLst>
+                              <p:cond delay="0"/>
+                            </p:stCondLst>
+                            <p:childTnLst>
+                              <p:par>
+                                <p:cTn id="21" presetID="1" presetClass="entr" presetSubtype="0" fill="hold" nodeType="clickEffect">
+                                  <p:stCondLst>
+                                    <p:cond delay="0"/>
+                                  </p:stCondLst>
+                                  <p:childTnLst>
+                                    <p:set>
+                                      <p:cBhvr>
+                                        <p:cTn id="22" dur="1" fill="hold">
+                                          <p:stCondLst>
+                                            <p:cond delay="0"/>
+                                          </p:stCondLst>
+                                        </p:cTn>
+                                        <p:tgtEl>
+                                          <p:spTgt spid="3">
+                                            <p:txEl>
+                                              <p:pRg st="5" end="5"/>
+                                            </p:txEl>
+                                          </p:spTgt>
+                                        </p:tgtEl>
+                                        <p:attrNameLst>
+                                          <p:attrName>style.visibility</p:attrName>
+                                        </p:attrNameLst>
+                                      </p:cBhvr>
+                                      <p:to>
+                                        <p:strVal val="visible"/>
+                                      </p:to>
+                                    </p:set>
+                                  </p:childTnLst>
+                                </p:cTn>
+                              </p:par>
+                            </p:childTnLst>
+                          </p:cTn>
+                        </p:par>
+                      </p:childTnLst>
+                    </p:cTn>
+                  </p:par>
+                  <p:par>
+                    <p:cTn id="23" fill="hold">
+                      <p:stCondLst>
+                        <p:cond delay="indefinite"/>
+                      </p:stCondLst>
+                      <p:childTnLst>
+                        <p:par>
+                          <p:cTn id="24" fill="hold">
+                            <p:stCondLst>
+                              <p:cond delay="0"/>
+                            </p:stCondLst>
+                            <p:childTnLst>
+                              <p:par>
+                                <p:cTn id="25" presetID="1" presetClass="entr" presetSubtype="0" fill="hold" nodeType="clickEffect">
+                                  <p:stCondLst>
+                                    <p:cond delay="0"/>
+                                  </p:stCondLst>
+                                  <p:childTnLst>
+                                    <p:set>
+                                      <p:cBhvr>
+                                        <p:cTn id="26" dur="1" fill="hold">
+                                          <p:stCondLst>
+                                            <p:cond delay="0"/>
+                                          </p:stCondLst>
+                                        </p:cTn>
+                                        <p:tgtEl>
+                                          <p:spTgt spid="3">
+                                            <p:txEl>
+                                              <p:pRg st="6" end="6"/>
+                                            </p:txEl>
+                                          </p:spTgt>
+                                        </p:tgtEl>
+                                        <p:attrNameLst>
+                                          <p:attrName>style.visibility</p:attrName>
+                                        </p:attrNameLst>
+                                      </p:cBhvr>
+                                      <p:to>
+                                        <p:strVal val="visible"/>
+                                      </p:to>
+                                    </p:set>
+                                  </p:childTnLst>
+                                </p:cTn>
+                              </p:par>
+                            </p:childTnLst>
+                          </p:cTn>
+                        </p:par>
+                      </p:childTnLst>
+                    </p:cTn>
+                  </p:par>
+                </p:childTnLst>
+              </p:cTn>
+              <p:prevCondLst>
+                <p:cond evt="onPrev" delay="0">
+                  <p:tgtEl>
+                    <p:sldTgt/>
+                  </p:tgtEl>
+                </p:cond>
+              </p:prevCondLst>
+              <p:nextCondLst>
+                <p:cond evt="onNext" delay="0">
+                  <p:tgtEl>
+                    <p:sldTgt/>
+                  </p:tgtEl>
+                </p:cond>
+              </p:nextCondLst>
+            </p:seq>
+          </p:childTnLst>
+        </p:cTn>
+      </p:par>
+    </p:tnLst>
+  </p:timing>
+</p:sld>
+</file>
+
+<file path=ppt/slides/slide20.xml><?xml version="1.0" encoding="utf-8"?>
 <p:sld xmlns:a="http://schemas.openxmlformats.org/drawingml/2006/main" xmlns:r="http://schemas.openxmlformats.org/officeDocument/2006/relationships" xmlns:p="http://schemas.openxmlformats.org/presentationml/2006/main">
   <p:cSld>
     <p:spTree>
@@ -16525,481 +17577,7 @@
 </p:sld>
 </file>
 
-<file path=ppt/slides/slide2.xml><?xml version="1.0" encoding="utf-8"?>
-<p:sld xmlns:a="http://schemas.openxmlformats.org/drawingml/2006/main" xmlns:r="http://schemas.openxmlformats.org/officeDocument/2006/relationships" xmlns:p="http://schemas.openxmlformats.org/presentationml/2006/main">
-  <p:cSld>
-    <p:spTree>
-      <p:nvGrpSpPr>
-        <p:cNvPr id="1" name=""/>
-        <p:cNvGrpSpPr/>
-        <p:nvPr/>
-      </p:nvGrpSpPr>
-      <p:grpSpPr>
-        <a:xfrm>
-          <a:off x="0" y="0"/>
-          <a:ext cx="0" cy="0"/>
-          <a:chOff x="0" y="0"/>
-          <a:chExt cx="0" cy="0"/>
-        </a:xfrm>
-      </p:grpSpPr>
-      <p:sp>
-        <p:nvSpPr>
-          <p:cNvPr id="2" name="Title 1"/>
-          <p:cNvSpPr>
-            <a:spLocks noGrp="1"/>
-          </p:cNvSpPr>
-          <p:nvPr>
-            <p:ph type="title"/>
-          </p:nvPr>
-        </p:nvSpPr>
-        <p:spPr>
-          <a:xfrm>
-            <a:off x="584200" y="221992"/>
-            <a:ext cx="10515600" cy="530954"/>
-          </a:xfrm>
-        </p:spPr>
-        <p:txBody>
-          <a:bodyPr>
-            <a:normAutofit fontScale="90000"/>
-          </a:bodyPr>
-          <a:lstStyle/>
-          <a:p>
-            <a:r>
-              <a:rPr lang="en-US" dirty="0"/>
-              <a:t>Measuring similarity and dissimilarity</a:t>
-            </a:r>
-          </a:p>
-        </p:txBody>
-      </p:sp>
-      <p:sp>
-        <p:nvSpPr>
-          <p:cNvPr id="3" name="Content Placeholder 2"/>
-          <p:cNvSpPr>
-            <a:spLocks noGrp="1"/>
-          </p:cNvSpPr>
-          <p:nvPr>
-            <p:ph sz="quarter" idx="10"/>
-          </p:nvPr>
-        </p:nvSpPr>
-        <p:spPr>
-          <a:xfrm>
-            <a:off x="333375" y="896079"/>
-            <a:ext cx="11525250" cy="5290388"/>
-          </a:xfrm>
-        </p:spPr>
-        <p:txBody>
-          <a:bodyPr>
-            <a:normAutofit/>
-          </a:bodyPr>
-          <a:lstStyle/>
-          <a:p>
-            <a:pPr marL="0" indent="0">
-              <a:buNone/>
-            </a:pPr>
-            <a:r>
-              <a:rPr lang="en-US" dirty="0">
-                <a:latin typeface="+mn-lt"/>
-              </a:rPr>
-              <a:t>Many data mining algorithms search for the most similar or dissimilar cases</a:t>
-            </a:r>
-          </a:p>
-          <a:p>
-            <a:r>
-              <a:rPr lang="en-US" dirty="0">
-                <a:latin typeface="+mn-lt"/>
-              </a:rPr>
-              <a:t>Searching for documents with similar content</a:t>
-            </a:r>
-          </a:p>
-          <a:p>
-            <a:r>
-              <a:rPr lang="en-US" dirty="0">
-                <a:latin typeface="+mn-lt"/>
-              </a:rPr>
-              <a:t>Finding customers with similar purchasing habits </a:t>
-            </a:r>
-          </a:p>
-          <a:p>
-            <a:r>
-              <a:rPr lang="en-US" dirty="0">
-                <a:latin typeface="+mn-lt"/>
-              </a:rPr>
-              <a:t>Discover similar mRNA sequences </a:t>
-            </a:r>
-          </a:p>
-          <a:p>
-            <a:r>
-              <a:rPr lang="en-US" dirty="0">
-                <a:latin typeface="+mn-lt"/>
-              </a:rPr>
-              <a:t>Similarity between two sensor streams</a:t>
-            </a:r>
-          </a:p>
-          <a:p>
-            <a:r>
-              <a:rPr lang="en-US" dirty="0">
-                <a:latin typeface="+mn-lt"/>
-              </a:rPr>
-              <a:t>Matching partners in a dating app</a:t>
-            </a:r>
-          </a:p>
-          <a:p>
-            <a:r>
-              <a:rPr lang="en-US" dirty="0">
-                <a:latin typeface="+mn-lt"/>
-              </a:rPr>
-              <a:t> Etc. </a:t>
-            </a:r>
-          </a:p>
-          <a:p>
-            <a:endParaRPr lang="en-US" sz="2800" dirty="0">
-              <a:latin typeface="+mn-lt"/>
-            </a:endParaRPr>
-          </a:p>
-          <a:p>
-            <a:pPr lvl="1"/>
-            <a:endParaRPr lang="en-US" dirty="0"/>
-          </a:p>
-        </p:txBody>
-      </p:sp>
-    </p:spTree>
-    <p:extLst>
-      <p:ext uri="{BB962C8B-B14F-4D97-AF65-F5344CB8AC3E}">
-        <p14:creationId xmlns:p14="http://schemas.microsoft.com/office/powerpoint/2010/main" val="92654233"/>
-      </p:ext>
-    </p:extLst>
-  </p:cSld>
-  <p:clrMapOvr>
-    <a:masterClrMapping/>
-  </p:clrMapOvr>
-  <p:timing>
-    <p:tnLst>
-      <p:par>
-        <p:cTn id="1" dur="indefinite" restart="never" nodeType="tmRoot">
-          <p:childTnLst>
-            <p:seq concurrent="1" nextAc="seek">
-              <p:cTn id="2" dur="indefinite" nodeType="mainSeq">
-                <p:childTnLst>
-                  <p:par>
-                    <p:cTn id="3" fill="hold">
-                      <p:stCondLst>
-                        <p:cond delay="indefinite"/>
-                      </p:stCondLst>
-                      <p:childTnLst>
-                        <p:par>
-                          <p:cTn id="4" fill="hold">
-                            <p:stCondLst>
-                              <p:cond delay="0"/>
-                            </p:stCondLst>
-                            <p:childTnLst>
-                              <p:par>
-                                <p:cTn id="5" presetID="1" presetClass="entr" presetSubtype="0" fill="hold" nodeType="clickEffect">
-                                  <p:stCondLst>
-                                    <p:cond delay="0"/>
-                                  </p:stCondLst>
-                                  <p:childTnLst>
-                                    <p:set>
-                                      <p:cBhvr>
-                                        <p:cTn id="6" dur="1" fill="hold">
-                                          <p:stCondLst>
-                                            <p:cond delay="0"/>
-                                          </p:stCondLst>
-                                        </p:cTn>
-                                        <p:tgtEl>
-                                          <p:spTgt spid="3">
-                                            <p:txEl>
-                                              <p:pRg st="1" end="1"/>
-                                            </p:txEl>
-                                          </p:spTgt>
-                                        </p:tgtEl>
-                                        <p:attrNameLst>
-                                          <p:attrName>style.visibility</p:attrName>
-                                        </p:attrNameLst>
-                                      </p:cBhvr>
-                                      <p:to>
-                                        <p:strVal val="visible"/>
-                                      </p:to>
-                                    </p:set>
-                                  </p:childTnLst>
-                                </p:cTn>
-                              </p:par>
-                            </p:childTnLst>
-                          </p:cTn>
-                        </p:par>
-                      </p:childTnLst>
-                    </p:cTn>
-                  </p:par>
-                  <p:par>
-                    <p:cTn id="7" fill="hold">
-                      <p:stCondLst>
-                        <p:cond delay="indefinite"/>
-                      </p:stCondLst>
-                      <p:childTnLst>
-                        <p:par>
-                          <p:cTn id="8" fill="hold">
-                            <p:stCondLst>
-                              <p:cond delay="0"/>
-                            </p:stCondLst>
-                            <p:childTnLst>
-                              <p:par>
-                                <p:cTn id="9" presetID="1" presetClass="entr" presetSubtype="0" fill="hold" nodeType="clickEffect">
-                                  <p:stCondLst>
-                                    <p:cond delay="0"/>
-                                  </p:stCondLst>
-                                  <p:childTnLst>
-                                    <p:set>
-                                      <p:cBhvr>
-                                        <p:cTn id="10" dur="1" fill="hold">
-                                          <p:stCondLst>
-                                            <p:cond delay="0"/>
-                                          </p:stCondLst>
-                                        </p:cTn>
-                                        <p:tgtEl>
-                                          <p:spTgt spid="3">
-                                            <p:txEl>
-                                              <p:pRg st="2" end="2"/>
-                                            </p:txEl>
-                                          </p:spTgt>
-                                        </p:tgtEl>
-                                        <p:attrNameLst>
-                                          <p:attrName>style.visibility</p:attrName>
-                                        </p:attrNameLst>
-                                      </p:cBhvr>
-                                      <p:to>
-                                        <p:strVal val="visible"/>
-                                      </p:to>
-                                    </p:set>
-                                  </p:childTnLst>
-                                </p:cTn>
-                              </p:par>
-                            </p:childTnLst>
-                          </p:cTn>
-                        </p:par>
-                      </p:childTnLst>
-                    </p:cTn>
-                  </p:par>
-                  <p:par>
-                    <p:cTn id="11" fill="hold">
-                      <p:stCondLst>
-                        <p:cond delay="indefinite"/>
-                      </p:stCondLst>
-                      <p:childTnLst>
-                        <p:par>
-                          <p:cTn id="12" fill="hold">
-                            <p:stCondLst>
-                              <p:cond delay="0"/>
-                            </p:stCondLst>
-                            <p:childTnLst>
-                              <p:par>
-                                <p:cTn id="13" presetID="1" presetClass="entr" presetSubtype="0" fill="hold" nodeType="clickEffect">
-                                  <p:stCondLst>
-                                    <p:cond delay="0"/>
-                                  </p:stCondLst>
-                                  <p:childTnLst>
-                                    <p:set>
-                                      <p:cBhvr>
-                                        <p:cTn id="14" dur="1" fill="hold">
-                                          <p:stCondLst>
-                                            <p:cond delay="0"/>
-                                          </p:stCondLst>
-                                        </p:cTn>
-                                        <p:tgtEl>
-                                          <p:spTgt spid="3">
-                                            <p:txEl>
-                                              <p:pRg st="3" end="3"/>
-                                            </p:txEl>
-                                          </p:spTgt>
-                                        </p:tgtEl>
-                                        <p:attrNameLst>
-                                          <p:attrName>style.visibility</p:attrName>
-                                        </p:attrNameLst>
-                                      </p:cBhvr>
-                                      <p:to>
-                                        <p:strVal val="visible"/>
-                                      </p:to>
-                                    </p:set>
-                                  </p:childTnLst>
-                                </p:cTn>
-                              </p:par>
-                            </p:childTnLst>
-                          </p:cTn>
-                        </p:par>
-                      </p:childTnLst>
-                    </p:cTn>
-                  </p:par>
-                  <p:par>
-                    <p:cTn id="15" fill="hold">
-                      <p:stCondLst>
-                        <p:cond delay="indefinite"/>
-                      </p:stCondLst>
-                      <p:childTnLst>
-                        <p:par>
-                          <p:cTn id="16" fill="hold">
-                            <p:stCondLst>
-                              <p:cond delay="0"/>
-                            </p:stCondLst>
-                            <p:childTnLst>
-                              <p:par>
-                                <p:cTn id="17" presetID="1" presetClass="entr" presetSubtype="0" fill="hold" nodeType="clickEffect">
-                                  <p:stCondLst>
-                                    <p:cond delay="0"/>
-                                  </p:stCondLst>
-                                  <p:childTnLst>
-                                    <p:set>
-                                      <p:cBhvr>
-                                        <p:cTn id="18" dur="1" fill="hold">
-                                          <p:stCondLst>
-                                            <p:cond delay="0"/>
-                                          </p:stCondLst>
-                                        </p:cTn>
-                                        <p:tgtEl>
-                                          <p:spTgt spid="3">
-                                            <p:txEl>
-                                              <p:pRg st="4" end="4"/>
-                                            </p:txEl>
-                                          </p:spTgt>
-                                        </p:tgtEl>
-                                        <p:attrNameLst>
-                                          <p:attrName>style.visibility</p:attrName>
-                                        </p:attrNameLst>
-                                      </p:cBhvr>
-                                      <p:to>
-                                        <p:strVal val="visible"/>
-                                      </p:to>
-                                    </p:set>
-                                  </p:childTnLst>
-                                </p:cTn>
-                              </p:par>
-                            </p:childTnLst>
-                          </p:cTn>
-                        </p:par>
-                      </p:childTnLst>
-                    </p:cTn>
-                  </p:par>
-                  <p:par>
-                    <p:cTn id="19" fill="hold">
-                      <p:stCondLst>
-                        <p:cond delay="indefinite"/>
-                      </p:stCondLst>
-                      <p:childTnLst>
-                        <p:par>
-                          <p:cTn id="20" fill="hold">
-                            <p:stCondLst>
-                              <p:cond delay="0"/>
-                            </p:stCondLst>
-                            <p:childTnLst>
-                              <p:par>
-                                <p:cTn id="21" presetID="1" presetClass="entr" presetSubtype="0" fill="hold" nodeType="clickEffect">
-                                  <p:stCondLst>
-                                    <p:cond delay="0"/>
-                                  </p:stCondLst>
-                                  <p:childTnLst>
-                                    <p:set>
-                                      <p:cBhvr>
-                                        <p:cTn id="22" dur="1" fill="hold">
-                                          <p:stCondLst>
-                                            <p:cond delay="0"/>
-                                          </p:stCondLst>
-                                        </p:cTn>
-                                        <p:tgtEl>
-                                          <p:spTgt spid="3">
-                                            <p:txEl>
-                                              <p:pRg st="5" end="5"/>
-                                            </p:txEl>
-                                          </p:spTgt>
-                                        </p:tgtEl>
-                                        <p:attrNameLst>
-                                          <p:attrName>style.visibility</p:attrName>
-                                        </p:attrNameLst>
-                                      </p:cBhvr>
-                                      <p:to>
-                                        <p:strVal val="visible"/>
-                                      </p:to>
-                                    </p:set>
-                                  </p:childTnLst>
-                                </p:cTn>
-                              </p:par>
-                            </p:childTnLst>
-                          </p:cTn>
-                        </p:par>
-                      </p:childTnLst>
-                    </p:cTn>
-                  </p:par>
-                  <p:par>
-                    <p:cTn id="23" fill="hold">
-                      <p:stCondLst>
-                        <p:cond delay="indefinite"/>
-                      </p:stCondLst>
-                      <p:childTnLst>
-                        <p:par>
-                          <p:cTn id="24" fill="hold">
-                            <p:stCondLst>
-                              <p:cond delay="0"/>
-                            </p:stCondLst>
-                            <p:childTnLst>
-                              <p:par>
-                                <p:cTn id="25" presetID="1" presetClass="entr" presetSubtype="0" fill="hold" nodeType="clickEffect">
-                                  <p:stCondLst>
-                                    <p:cond delay="0"/>
-                                  </p:stCondLst>
-                                  <p:childTnLst>
-                                    <p:set>
-                                      <p:cBhvr>
-                                        <p:cTn id="26" dur="1" fill="hold">
-                                          <p:stCondLst>
-                                            <p:cond delay="0"/>
-                                          </p:stCondLst>
-                                        </p:cTn>
-                                        <p:tgtEl>
-                                          <p:spTgt spid="3">
-                                            <p:txEl>
-                                              <p:pRg st="6" end="6"/>
-                                            </p:txEl>
-                                          </p:spTgt>
-                                        </p:tgtEl>
-                                        <p:attrNameLst>
-                                          <p:attrName>style.visibility</p:attrName>
-                                        </p:attrNameLst>
-                                      </p:cBhvr>
-                                      <p:to>
-                                        <p:strVal val="visible"/>
-                                      </p:to>
-                                    </p:set>
-                                  </p:childTnLst>
-                                </p:cTn>
-                              </p:par>
-                            </p:childTnLst>
-                          </p:cTn>
-                        </p:par>
-                      </p:childTnLst>
-                    </p:cTn>
-                  </p:par>
-                </p:childTnLst>
-              </p:cTn>
-              <p:prevCondLst>
-                <p:cond evt="onPrev" delay="0">
-                  <p:tgtEl>
-                    <p:sldTgt/>
-                  </p:tgtEl>
-                </p:cond>
-              </p:prevCondLst>
-              <p:nextCondLst>
-                <p:cond evt="onNext" delay="0">
-                  <p:tgtEl>
-                    <p:sldTgt/>
-                  </p:tgtEl>
-                </p:cond>
-              </p:nextCondLst>
-            </p:seq>
-          </p:childTnLst>
-        </p:cTn>
-      </p:par>
-    </p:tnLst>
-  </p:timing>
-</p:sld>
-</file>
-
-<file path=ppt/slides/slide20.xml><?xml version="1.0" encoding="utf-8"?>
+<file path=ppt/slides/slide21.xml><?xml version="1.0" encoding="utf-8"?>
 <p:sld xmlns:a="http://schemas.openxmlformats.org/drawingml/2006/main" xmlns:r="http://schemas.openxmlformats.org/officeDocument/2006/relationships" xmlns:p="http://schemas.openxmlformats.org/presentationml/2006/main">
   <p:cSld>
     <p:spTree>
@@ -17685,7 +18263,7 @@
 </p:sld>
 </file>
 
-<file path=ppt/slides/slide21.xml><?xml version="1.0" encoding="utf-8"?>
+<file path=ppt/slides/slide22.xml><?xml version="1.0" encoding="utf-8"?>
 <p:sld xmlns:a="http://schemas.openxmlformats.org/drawingml/2006/main" xmlns:r="http://schemas.openxmlformats.org/officeDocument/2006/relationships" xmlns:p="http://schemas.openxmlformats.org/presentationml/2006/main">
   <p:cSld>
     <p:spTree>
@@ -18403,7 +18981,7 @@
 </p:sld>
 </file>
 
-<file path=ppt/slides/slide22.xml><?xml version="1.0" encoding="utf-8"?>
+<file path=ppt/slides/slide23.xml><?xml version="1.0" encoding="utf-8"?>
 <p:sld xmlns:a="http://schemas.openxmlformats.org/drawingml/2006/main" xmlns:r="http://schemas.openxmlformats.org/officeDocument/2006/relationships" xmlns:p="http://schemas.openxmlformats.org/presentationml/2006/main">
   <p:cSld>
     <p:spTree>
@@ -18449,8 +19027,8 @@
           </a:p>
         </p:txBody>
       </p:sp>
-      <mc:AlternateContent xmlns:mc="http://schemas.openxmlformats.org/markup-compatibility/2006">
-        <mc:Choice xmlns:a14="http://schemas.microsoft.com/office/drawing/2010/main" Requires="a14">
+      <mc:AlternateContent xmlns:mc="http://schemas.openxmlformats.org/markup-compatibility/2006" xmlns:a14="http://schemas.microsoft.com/office/drawing/2010/main">
+        <mc:Choice Requires="a14">
           <p:sp>
             <p:nvSpPr>
               <p:cNvPr id="3" name="Content Placeholder 2"/>
@@ -19057,7 +19635,7 @@
             </p:txBody>
           </p:sp>
         </mc:Choice>
-        <mc:Fallback>
+        <mc:Fallback xmlns="">
           <p:sp>
             <p:nvSpPr>
               <p:cNvPr id="3" name="Content Placeholder 2"/>
@@ -19365,7 +19943,7 @@
 </p:sld>
 </file>
 
-<file path=ppt/slides/slide23.xml><?xml version="1.0" encoding="utf-8"?>
+<file path=ppt/slides/slide24.xml><?xml version="1.0" encoding="utf-8"?>
 <p:sld xmlns:a="http://schemas.openxmlformats.org/drawingml/2006/main" xmlns:r="http://schemas.openxmlformats.org/officeDocument/2006/relationships" xmlns:p="http://schemas.openxmlformats.org/presentationml/2006/main">
   <p:cSld>
     <p:spTree>
@@ -20719,7 +21297,7 @@
 </p:sld>
 </file>
 
-<file path=ppt/slides/slide24.xml><?xml version="1.0" encoding="utf-8"?>
+<file path=ppt/slides/slide25.xml><?xml version="1.0" encoding="utf-8"?>
 <p:sld xmlns:a="http://schemas.openxmlformats.org/drawingml/2006/main" xmlns:r="http://schemas.openxmlformats.org/officeDocument/2006/relationships" xmlns:p="http://schemas.openxmlformats.org/presentationml/2006/main">
   <p:cSld>
     <p:spTree>
@@ -22948,7 +23526,7 @@
 </p:sld>
 </file>
 
-<file path=ppt/slides/slide25.xml><?xml version="1.0" encoding="utf-8"?>
+<file path=ppt/slides/slide26.xml><?xml version="1.0" encoding="utf-8"?>
 <p:sld xmlns:a="http://schemas.openxmlformats.org/drawingml/2006/main" xmlns:r="http://schemas.openxmlformats.org/officeDocument/2006/relationships" xmlns:p="http://schemas.openxmlformats.org/presentationml/2006/main">
   <p:cSld>
     <p:spTree>
@@ -23060,8 +23638,8 @@
           </a:p>
         </p:txBody>
       </p:sp>
-      <mc:AlternateContent xmlns:mc="http://schemas.openxmlformats.org/markup-compatibility/2006">
-        <mc:Choice xmlns:a14="http://schemas.microsoft.com/office/drawing/2010/main" Requires="a14">
+      <mc:AlternateContent xmlns:mc="http://schemas.openxmlformats.org/markup-compatibility/2006" xmlns:a14="http://schemas.microsoft.com/office/drawing/2010/main">
+        <mc:Choice Requires="a14">
           <p:graphicFrame>
             <p:nvGraphicFramePr>
               <p:cNvPr id="5" name="Table 5">
@@ -24036,7 +24614,7 @@
             </a:graphic>
           </p:graphicFrame>
         </mc:Choice>
-        <mc:Fallback>
+        <mc:Fallback xmlns="">
           <p:graphicFrame>
             <p:nvGraphicFramePr>
               <p:cNvPr id="5" name="Table 5">
@@ -24472,7 +25050,7 @@
 </p:sld>
 </file>
 
-<file path=ppt/slides/slide26.xml><?xml version="1.0" encoding="utf-8"?>
+<file path=ppt/slides/slide27.xml><?xml version="1.0" encoding="utf-8"?>
 <p:sld xmlns:a="http://schemas.openxmlformats.org/drawingml/2006/main" xmlns:r="http://schemas.openxmlformats.org/officeDocument/2006/relationships" xmlns:p="http://schemas.openxmlformats.org/presentationml/2006/main">
   <p:cSld>
     <p:spTree>
@@ -25332,7 +25910,7 @@
 </p:sld>
 </file>
 
-<file path=ppt/slides/slide27.xml><?xml version="1.0" encoding="utf-8"?>
+<file path=ppt/slides/slide28.xml><?xml version="1.0" encoding="utf-8"?>
 <p:sld xmlns:a="http://schemas.openxmlformats.org/drawingml/2006/main" xmlns:r="http://schemas.openxmlformats.org/officeDocument/2006/relationships" xmlns:p="http://schemas.openxmlformats.org/presentationml/2006/main">
   <p:cSld>
     <p:spTree>
@@ -27130,8 +27708,8 @@
           </a:p>
         </p:txBody>
       </p:sp>
-      <mc:AlternateContent xmlns:mc="http://schemas.openxmlformats.org/markup-compatibility/2006">
-        <mc:Choice xmlns:a14="http://schemas.microsoft.com/office/drawing/2010/main" Requires="a14">
+      <mc:AlternateContent xmlns:mc="http://schemas.openxmlformats.org/markup-compatibility/2006" xmlns:a14="http://schemas.microsoft.com/office/drawing/2010/main">
+        <mc:Choice Requires="a14">
           <p:sp>
             <p:nvSpPr>
               <p:cNvPr id="3" name="Content Placeholder 2"/>
@@ -27815,7 +28393,7 @@
             </p:txBody>
           </p:sp>
         </mc:Choice>
-        <mc:Fallback>
+        <mc:Fallback xmlns="">
           <p:sp>
             <p:nvSpPr>
               <p:cNvPr id="3" name="Content Placeholder 2"/>
@@ -31875,8 +32453,8 @@
           </a:p>
         </p:txBody>
       </p:sp>
-      <mc:AlternateContent xmlns:mc="http://schemas.openxmlformats.org/markup-compatibility/2006" xmlns:a14="http://schemas.microsoft.com/office/drawing/2010/main">
-        <mc:Choice Requires="a14">
+      <mc:AlternateContent xmlns:mc="http://schemas.openxmlformats.org/markup-compatibility/2006">
+        <mc:Choice xmlns:a14="http://schemas.microsoft.com/office/drawing/2010/main" Requires="a14">
           <p:sp>
             <p:nvSpPr>
               <p:cNvPr id="3" name="Content Placeholder 2"/>
@@ -32153,7 +32731,7 @@
                           <a:rPr lang="en-US" b="0" i="1" smtClean="0">
                             <a:latin typeface="Cambria Math" panose="02040503050406030204" pitchFamily="18" charset="0"/>
                           </a:rPr>
-                          <m:t>−1</m:t>
+                          <m:t> </m:t>
                         </m:r>
                       </m:sup>
                     </m:sSup>
@@ -32394,10 +32972,10 @@
                       </m:e>
                       <m:sup>
                         <m:r>
-                          <a:rPr lang="en-US" i="1">
+                          <a:rPr lang="en-US" b="0" i="1" smtClean="0">
                             <a:latin typeface="Cambria Math" panose="02040503050406030204" pitchFamily="18" charset="0"/>
                           </a:rPr>
-                          <m:t>−1</m:t>
+                          <m:t> </m:t>
                         </m:r>
                       </m:sup>
                     </m:sSup>
@@ -32503,7 +33081,7 @@
             </p:txBody>
           </p:sp>
         </mc:Choice>
-        <mc:Fallback xmlns="">
+        <mc:Fallback>
           <p:sp>
             <p:nvSpPr>
               <p:cNvPr id="3" name="Content Placeholder 2"/>
@@ -32551,307 +33129,6 @@
   <p:clrMapOvr>
     <a:masterClrMapping/>
   </p:clrMapOvr>
-  <p:timing>
-    <p:tnLst>
-      <p:par>
-        <p:cTn id="1" dur="indefinite" restart="never" nodeType="tmRoot">
-          <p:childTnLst>
-            <p:seq concurrent="1" nextAc="seek">
-              <p:cTn id="2" dur="indefinite" nodeType="mainSeq">
-                <p:childTnLst>
-                  <p:par>
-                    <p:cTn id="3" fill="hold">
-                      <p:stCondLst>
-                        <p:cond delay="indefinite"/>
-                      </p:stCondLst>
-                      <p:childTnLst>
-                        <p:par>
-                          <p:cTn id="4" fill="hold">
-                            <p:stCondLst>
-                              <p:cond delay="0"/>
-                            </p:stCondLst>
-                            <p:childTnLst>
-                              <p:par>
-                                <p:cTn id="5" presetID="1" presetClass="entr" presetSubtype="0" fill="hold" nodeType="clickEffect">
-                                  <p:stCondLst>
-                                    <p:cond delay="0"/>
-                                  </p:stCondLst>
-                                  <p:childTnLst>
-                                    <p:set>
-                                      <p:cBhvr>
-                                        <p:cTn id="6" dur="1" fill="hold">
-                                          <p:stCondLst>
-                                            <p:cond delay="0"/>
-                                          </p:stCondLst>
-                                        </p:cTn>
-                                        <p:tgtEl>
-                                          <p:spTgt spid="3">
-                                            <p:txEl>
-                                              <p:pRg st="1" end="1"/>
-                                            </p:txEl>
-                                          </p:spTgt>
-                                        </p:tgtEl>
-                                        <p:attrNameLst>
-                                          <p:attrName>style.visibility</p:attrName>
-                                        </p:attrNameLst>
-                                      </p:cBhvr>
-                                      <p:to>
-                                        <p:strVal val="visible"/>
-                                      </p:to>
-                                    </p:set>
-                                  </p:childTnLst>
-                                </p:cTn>
-                              </p:par>
-                              <p:par>
-                                <p:cTn id="7" presetID="1" presetClass="entr" presetSubtype="0" fill="hold" nodeType="withEffect">
-                                  <p:stCondLst>
-                                    <p:cond delay="0"/>
-                                  </p:stCondLst>
-                                  <p:childTnLst>
-                                    <p:set>
-                                      <p:cBhvr>
-                                        <p:cTn id="8" dur="1" fill="hold">
-                                          <p:stCondLst>
-                                            <p:cond delay="0"/>
-                                          </p:stCondLst>
-                                        </p:cTn>
-                                        <p:tgtEl>
-                                          <p:spTgt spid="3">
-                                            <p:txEl>
-                                              <p:pRg st="2" end="2"/>
-                                            </p:txEl>
-                                          </p:spTgt>
-                                        </p:tgtEl>
-                                        <p:attrNameLst>
-                                          <p:attrName>style.visibility</p:attrName>
-                                        </p:attrNameLst>
-                                      </p:cBhvr>
-                                      <p:to>
-                                        <p:strVal val="visible"/>
-                                      </p:to>
-                                    </p:set>
-                                  </p:childTnLst>
-                                </p:cTn>
-                              </p:par>
-                              <p:par>
-                                <p:cTn id="9" presetID="1" presetClass="entr" presetSubtype="0" fill="hold" nodeType="withEffect">
-                                  <p:stCondLst>
-                                    <p:cond delay="0"/>
-                                  </p:stCondLst>
-                                  <p:childTnLst>
-                                    <p:set>
-                                      <p:cBhvr>
-                                        <p:cTn id="10" dur="1" fill="hold">
-                                          <p:stCondLst>
-                                            <p:cond delay="0"/>
-                                          </p:stCondLst>
-                                        </p:cTn>
-                                        <p:tgtEl>
-                                          <p:spTgt spid="3">
-                                            <p:txEl>
-                                              <p:pRg st="3" end="3"/>
-                                            </p:txEl>
-                                          </p:spTgt>
-                                        </p:tgtEl>
-                                        <p:attrNameLst>
-                                          <p:attrName>style.visibility</p:attrName>
-                                        </p:attrNameLst>
-                                      </p:cBhvr>
-                                      <p:to>
-                                        <p:strVal val="visible"/>
-                                      </p:to>
-                                    </p:set>
-                                  </p:childTnLst>
-                                </p:cTn>
-                              </p:par>
-                            </p:childTnLst>
-                          </p:cTn>
-                        </p:par>
-                      </p:childTnLst>
-                    </p:cTn>
-                  </p:par>
-                  <p:par>
-                    <p:cTn id="11" fill="hold">
-                      <p:stCondLst>
-                        <p:cond delay="indefinite"/>
-                      </p:stCondLst>
-                      <p:childTnLst>
-                        <p:par>
-                          <p:cTn id="12" fill="hold">
-                            <p:stCondLst>
-                              <p:cond delay="0"/>
-                            </p:stCondLst>
-                            <p:childTnLst>
-                              <p:par>
-                                <p:cTn id="13" presetID="1" presetClass="entr" presetSubtype="0" fill="hold" nodeType="clickEffect">
-                                  <p:stCondLst>
-                                    <p:cond delay="0"/>
-                                  </p:stCondLst>
-                                  <p:childTnLst>
-                                    <p:set>
-                                      <p:cBhvr>
-                                        <p:cTn id="14" dur="1" fill="hold">
-                                          <p:stCondLst>
-                                            <p:cond delay="0"/>
-                                          </p:stCondLst>
-                                        </p:cTn>
-                                        <p:tgtEl>
-                                          <p:spTgt spid="3">
-                                            <p:txEl>
-                                              <p:pRg st="4" end="4"/>
-                                            </p:txEl>
-                                          </p:spTgt>
-                                        </p:tgtEl>
-                                        <p:attrNameLst>
-                                          <p:attrName>style.visibility</p:attrName>
-                                        </p:attrNameLst>
-                                      </p:cBhvr>
-                                      <p:to>
-                                        <p:strVal val="visible"/>
-                                      </p:to>
-                                    </p:set>
-                                  </p:childTnLst>
-                                </p:cTn>
-                              </p:par>
-                              <p:par>
-                                <p:cTn id="15" presetID="1" presetClass="entr" presetSubtype="0" fill="hold" nodeType="withEffect">
-                                  <p:stCondLst>
-                                    <p:cond delay="0"/>
-                                  </p:stCondLst>
-                                  <p:childTnLst>
-                                    <p:set>
-                                      <p:cBhvr>
-                                        <p:cTn id="16" dur="1" fill="hold">
-                                          <p:stCondLst>
-                                            <p:cond delay="0"/>
-                                          </p:stCondLst>
-                                        </p:cTn>
-                                        <p:tgtEl>
-                                          <p:spTgt spid="3">
-                                            <p:txEl>
-                                              <p:pRg st="5" end="5"/>
-                                            </p:txEl>
-                                          </p:spTgt>
-                                        </p:tgtEl>
-                                        <p:attrNameLst>
-                                          <p:attrName>style.visibility</p:attrName>
-                                        </p:attrNameLst>
-                                      </p:cBhvr>
-                                      <p:to>
-                                        <p:strVal val="visible"/>
-                                      </p:to>
-                                    </p:set>
-                                  </p:childTnLst>
-                                </p:cTn>
-                              </p:par>
-                              <p:par>
-                                <p:cTn id="17" presetID="1" presetClass="entr" presetSubtype="0" fill="hold" nodeType="withEffect">
-                                  <p:stCondLst>
-                                    <p:cond delay="0"/>
-                                  </p:stCondLst>
-                                  <p:childTnLst>
-                                    <p:set>
-                                      <p:cBhvr>
-                                        <p:cTn id="18" dur="1" fill="hold">
-                                          <p:stCondLst>
-                                            <p:cond delay="0"/>
-                                          </p:stCondLst>
-                                        </p:cTn>
-                                        <p:tgtEl>
-                                          <p:spTgt spid="3">
-                                            <p:txEl>
-                                              <p:pRg st="6" end="6"/>
-                                            </p:txEl>
-                                          </p:spTgt>
-                                        </p:tgtEl>
-                                        <p:attrNameLst>
-                                          <p:attrName>style.visibility</p:attrName>
-                                        </p:attrNameLst>
-                                      </p:cBhvr>
-                                      <p:to>
-                                        <p:strVal val="visible"/>
-                                      </p:to>
-                                    </p:set>
-                                  </p:childTnLst>
-                                </p:cTn>
-                              </p:par>
-                            </p:childTnLst>
-                          </p:cTn>
-                        </p:par>
-                      </p:childTnLst>
-                    </p:cTn>
-                  </p:par>
-                  <p:par>
-                    <p:cTn id="19" fill="hold">
-                      <p:stCondLst>
-                        <p:cond delay="indefinite"/>
-                      </p:stCondLst>
-                      <p:childTnLst>
-                        <p:par>
-                          <p:cTn id="20" fill="hold">
-                            <p:stCondLst>
-                              <p:cond delay="0"/>
-                            </p:stCondLst>
-                            <p:childTnLst>
-                              <p:par>
-                                <p:cTn id="21" presetID="1" presetClass="entr" presetSubtype="0" fill="hold" nodeType="clickEffect">
-                                  <p:stCondLst>
-                                    <p:cond delay="0"/>
-                                  </p:stCondLst>
-                                  <p:childTnLst>
-                                    <p:set>
-                                      <p:cBhvr>
-                                        <p:cTn id="22" dur="1" fill="hold">
-                                          <p:stCondLst>
-                                            <p:cond delay="0"/>
-                                          </p:stCondLst>
-                                        </p:cTn>
-                                        <p:tgtEl>
-                                          <p:spTgt spid="3">
-                                            <p:txEl>
-                                              <p:pRg st="7" end="7"/>
-                                            </p:txEl>
-                                          </p:spTgt>
-                                        </p:tgtEl>
-                                        <p:attrNameLst>
-                                          <p:attrName>style.visibility</p:attrName>
-                                        </p:attrNameLst>
-                                      </p:cBhvr>
-                                      <p:to>
-                                        <p:strVal val="visible"/>
-                                      </p:to>
-                                    </p:set>
-                                  </p:childTnLst>
-                                </p:cTn>
-                              </p:par>
-                            </p:childTnLst>
-                          </p:cTn>
-                        </p:par>
-                      </p:childTnLst>
-                    </p:cTn>
-                  </p:par>
-                </p:childTnLst>
-              </p:cTn>
-              <p:prevCondLst>
-                <p:cond evt="onPrev" delay="0">
-                  <p:tgtEl>
-                    <p:sldTgt/>
-                  </p:tgtEl>
-                </p:cond>
-              </p:prevCondLst>
-              <p:nextCondLst>
-                <p:cond evt="onNext" delay="0">
-                  <p:tgtEl>
-                    <p:sldTgt/>
-                  </p:tgtEl>
-                </p:cond>
-              </p:nextCondLst>
-            </p:seq>
-          </p:childTnLst>
-        </p:cTn>
-      </p:par>
-    </p:tnLst>
-  </p:timing>
 </p:sld>
 </file>
 

</xml_diff>

<commit_message>
Typo correction in slides
</commit_message>
<xml_diff>
--- a/slides/4_DistanceAndSimilarityMeasures_Part1.pptx
+++ b/slides/4_DistanceAndSimilarityMeasures_Part1.pptx
@@ -5,7 +5,7 @@
     <p:sldMasterId id="2147483648" r:id="rId1"/>
   </p:sldMasterIdLst>
   <p:notesMasterIdLst>
-    <p:notesMasterId r:id="rId37"/>
+    <p:notesMasterId r:id="rId38"/>
   </p:notesMasterIdLst>
   <p:sldIdLst>
     <p:sldId id="719" r:id="rId2"/>
@@ -22,27 +22,28 @@
     <p:sldId id="673" r:id="rId13"/>
     <p:sldId id="674" r:id="rId14"/>
     <p:sldId id="680" r:id="rId15"/>
-    <p:sldId id="610" r:id="rId16"/>
-    <p:sldId id="611" r:id="rId17"/>
-    <p:sldId id="609" r:id="rId18"/>
-    <p:sldId id="613" r:id="rId19"/>
-    <p:sldId id="616" r:id="rId20"/>
-    <p:sldId id="615" r:id="rId21"/>
-    <p:sldId id="617" r:id="rId22"/>
-    <p:sldId id="618" r:id="rId23"/>
-    <p:sldId id="641" r:id="rId24"/>
-    <p:sldId id="679" r:id="rId25"/>
-    <p:sldId id="685" r:id="rId26"/>
-    <p:sldId id="724" r:id="rId27"/>
-    <p:sldId id="723" r:id="rId28"/>
-    <p:sldId id="682" r:id="rId29"/>
-    <p:sldId id="683" r:id="rId30"/>
-    <p:sldId id="725" r:id="rId31"/>
-    <p:sldId id="726" r:id="rId32"/>
-    <p:sldId id="727" r:id="rId33"/>
-    <p:sldId id="728" r:id="rId34"/>
-    <p:sldId id="729" r:id="rId35"/>
-    <p:sldId id="720" r:id="rId36"/>
+    <p:sldId id="730" r:id="rId16"/>
+    <p:sldId id="610" r:id="rId17"/>
+    <p:sldId id="611" r:id="rId18"/>
+    <p:sldId id="609" r:id="rId19"/>
+    <p:sldId id="613" r:id="rId20"/>
+    <p:sldId id="616" r:id="rId21"/>
+    <p:sldId id="615" r:id="rId22"/>
+    <p:sldId id="617" r:id="rId23"/>
+    <p:sldId id="618" r:id="rId24"/>
+    <p:sldId id="641" r:id="rId25"/>
+    <p:sldId id="679" r:id="rId26"/>
+    <p:sldId id="685" r:id="rId27"/>
+    <p:sldId id="724" r:id="rId28"/>
+    <p:sldId id="723" r:id="rId29"/>
+    <p:sldId id="682" r:id="rId30"/>
+    <p:sldId id="683" r:id="rId31"/>
+    <p:sldId id="725" r:id="rId32"/>
+    <p:sldId id="726" r:id="rId33"/>
+    <p:sldId id="727" r:id="rId34"/>
+    <p:sldId id="728" r:id="rId35"/>
+    <p:sldId id="729" r:id="rId36"/>
+    <p:sldId id="720" r:id="rId37"/>
   </p:sldIdLst>
   <p:sldSz cx="12192000" cy="6858000"/>
   <p:notesSz cx="6858000" cy="9144000"/>
@@ -231,7 +232,7 @@
           <a:p>
             <a:fld id="{8DD534D1-5B48-49E9-A024-C5EAE54CADD0}" type="datetimeFigureOut">
               <a:rPr lang="en-US" smtClean="0"/>
-              <a:t>6/29/2023</a:t>
+              <a:t>2/11/2024</a:t>
             </a:fld>
             <a:endParaRPr lang="en-US"/>
           </a:p>
@@ -928,7 +929,13 @@
   <p:cSld>
     <p:spTree>
       <p:nvGrpSpPr>
-        <p:cNvPr id="1" name=""/>
+        <p:cNvPr id="1" name="">
+          <a:extLst>
+            <a:ext uri="{FF2B5EF4-FFF2-40B4-BE49-F238E27FC236}">
+              <a16:creationId xmlns:a16="http://schemas.microsoft.com/office/drawing/2014/main" id="{8CFDD6AC-BBD5-0301-5EC0-682DF15FF24A}"/>
+            </a:ext>
+          </a:extLst>
+        </p:cNvPr>
         <p:cNvGrpSpPr/>
         <p:nvPr/>
       </p:nvGrpSpPr>
@@ -942,7 +949,13 @@
       </p:grpSpPr>
       <p:sp>
         <p:nvSpPr>
-          <p:cNvPr id="2" name="Slide Image Placeholder 1"/>
+          <p:cNvPr id="2" name="Slide Image Placeholder 1">
+            <a:extLst>
+              <a:ext uri="{FF2B5EF4-FFF2-40B4-BE49-F238E27FC236}">
+                <a16:creationId xmlns:a16="http://schemas.microsoft.com/office/drawing/2014/main" id="{C7C36AFC-AEBA-94F9-213E-59AA2F4FC68B}"/>
+              </a:ext>
+            </a:extLst>
+          </p:cNvPr>
           <p:cNvSpPr>
             <a:spLocks noGrp="1" noRot="1" noChangeAspect="1"/>
           </p:cNvSpPr>
@@ -954,7 +967,13 @@
       </p:sp>
       <p:sp>
         <p:nvSpPr>
-          <p:cNvPr id="3" name="Notes Placeholder 2"/>
+          <p:cNvPr id="3" name="Notes Placeholder 2">
+            <a:extLst>
+              <a:ext uri="{FF2B5EF4-FFF2-40B4-BE49-F238E27FC236}">
+                <a16:creationId xmlns:a16="http://schemas.microsoft.com/office/drawing/2014/main" id="{AA8174B8-2DA8-0FF6-67B4-878A73B0E1CA}"/>
+              </a:ext>
+            </a:extLst>
+          </p:cNvPr>
           <p:cNvSpPr>
             <a:spLocks noGrp="1"/>
           </p:cNvSpPr>
@@ -973,7 +992,13 @@
       </p:sp>
       <p:sp>
         <p:nvSpPr>
-          <p:cNvPr id="4" name="Slide Number Placeholder 3"/>
+          <p:cNvPr id="4" name="Slide Number Placeholder 3">
+            <a:extLst>
+              <a:ext uri="{FF2B5EF4-FFF2-40B4-BE49-F238E27FC236}">
+                <a16:creationId xmlns:a16="http://schemas.microsoft.com/office/drawing/2014/main" id="{D777531D-0D14-78C7-3AD8-1F582CCA33BF}"/>
+              </a:ext>
+            </a:extLst>
+          </p:cNvPr>
           <p:cNvSpPr>
             <a:spLocks noGrp="1"/>
           </p:cNvSpPr>
@@ -998,7 +1023,7 @@
     </p:spTree>
     <p:extLst>
       <p:ext uri="{BB962C8B-B14F-4D97-AF65-F5344CB8AC3E}">
-        <p14:creationId xmlns:p14="http://schemas.microsoft.com/office/powerpoint/2010/main" val="489536907"/>
+        <p14:creationId xmlns:p14="http://schemas.microsoft.com/office/powerpoint/2010/main" val="4134444643"/>
       </p:ext>
     </p:extLst>
   </p:cSld>
@@ -1083,7 +1108,7 @@
     </p:spTree>
     <p:extLst>
       <p:ext uri="{BB962C8B-B14F-4D97-AF65-F5344CB8AC3E}">
-        <p14:creationId xmlns:p14="http://schemas.microsoft.com/office/powerpoint/2010/main" val="243420119"/>
+        <p14:creationId xmlns:p14="http://schemas.microsoft.com/office/powerpoint/2010/main" val="489536907"/>
       </p:ext>
     </p:extLst>
   </p:cSld>
@@ -1168,7 +1193,7 @@
     </p:spTree>
     <p:extLst>
       <p:ext uri="{BB962C8B-B14F-4D97-AF65-F5344CB8AC3E}">
-        <p14:creationId xmlns:p14="http://schemas.microsoft.com/office/powerpoint/2010/main" val="3682425662"/>
+        <p14:creationId xmlns:p14="http://schemas.microsoft.com/office/powerpoint/2010/main" val="243420119"/>
       </p:ext>
     </p:extLst>
   </p:cSld>
@@ -1253,7 +1278,7 @@
     </p:spTree>
     <p:extLst>
       <p:ext uri="{BB962C8B-B14F-4D97-AF65-F5344CB8AC3E}">
-        <p14:creationId xmlns:p14="http://schemas.microsoft.com/office/powerpoint/2010/main" val="1090722005"/>
+        <p14:creationId xmlns:p14="http://schemas.microsoft.com/office/powerpoint/2010/main" val="3682425662"/>
       </p:ext>
     </p:extLst>
   </p:cSld>
@@ -1338,7 +1363,7 @@
     </p:spTree>
     <p:extLst>
       <p:ext uri="{BB962C8B-B14F-4D97-AF65-F5344CB8AC3E}">
-        <p14:creationId xmlns:p14="http://schemas.microsoft.com/office/powerpoint/2010/main" val="2875515759"/>
+        <p14:creationId xmlns:p14="http://schemas.microsoft.com/office/powerpoint/2010/main" val="1090722005"/>
       </p:ext>
     </p:extLst>
   </p:cSld>
@@ -1423,7 +1448,7 @@
     </p:spTree>
     <p:extLst>
       <p:ext uri="{BB962C8B-B14F-4D97-AF65-F5344CB8AC3E}">
-        <p14:creationId xmlns:p14="http://schemas.microsoft.com/office/powerpoint/2010/main" val="4065866648"/>
+        <p14:creationId xmlns:p14="http://schemas.microsoft.com/office/powerpoint/2010/main" val="2875515759"/>
       </p:ext>
     </p:extLst>
   </p:cSld>
@@ -1593,7 +1618,7 @@
     </p:spTree>
     <p:extLst>
       <p:ext uri="{BB962C8B-B14F-4D97-AF65-F5344CB8AC3E}">
-        <p14:creationId xmlns:p14="http://schemas.microsoft.com/office/powerpoint/2010/main" val="3575019063"/>
+        <p14:creationId xmlns:p14="http://schemas.microsoft.com/office/powerpoint/2010/main" val="4065866648"/>
       </p:ext>
     </p:extLst>
   </p:cSld>
@@ -1678,7 +1703,7 @@
     </p:spTree>
     <p:extLst>
       <p:ext uri="{BB962C8B-B14F-4D97-AF65-F5344CB8AC3E}">
-        <p14:creationId xmlns:p14="http://schemas.microsoft.com/office/powerpoint/2010/main" val="2305027239"/>
+        <p14:creationId xmlns:p14="http://schemas.microsoft.com/office/powerpoint/2010/main" val="3575019063"/>
       </p:ext>
     </p:extLst>
   </p:cSld>
@@ -1763,7 +1788,7 @@
     </p:spTree>
     <p:extLst>
       <p:ext uri="{BB962C8B-B14F-4D97-AF65-F5344CB8AC3E}">
-        <p14:creationId xmlns:p14="http://schemas.microsoft.com/office/powerpoint/2010/main" val="2995025684"/>
+        <p14:creationId xmlns:p14="http://schemas.microsoft.com/office/powerpoint/2010/main" val="2305027239"/>
       </p:ext>
     </p:extLst>
   </p:cSld>
@@ -1848,7 +1873,7 @@
     </p:spTree>
     <p:extLst>
       <p:ext uri="{BB962C8B-B14F-4D97-AF65-F5344CB8AC3E}">
-        <p14:creationId xmlns:p14="http://schemas.microsoft.com/office/powerpoint/2010/main" val="2400999226"/>
+        <p14:creationId xmlns:p14="http://schemas.microsoft.com/office/powerpoint/2010/main" val="2995025684"/>
       </p:ext>
     </p:extLst>
   </p:cSld>
@@ -1933,7 +1958,7 @@
     </p:spTree>
     <p:extLst>
       <p:ext uri="{BB962C8B-B14F-4D97-AF65-F5344CB8AC3E}">
-        <p14:creationId xmlns:p14="http://schemas.microsoft.com/office/powerpoint/2010/main" val="744865965"/>
+        <p14:creationId xmlns:p14="http://schemas.microsoft.com/office/powerpoint/2010/main" val="2400999226"/>
       </p:ext>
     </p:extLst>
   </p:cSld>
@@ -2018,7 +2043,7 @@
     </p:spTree>
     <p:extLst>
       <p:ext uri="{BB962C8B-B14F-4D97-AF65-F5344CB8AC3E}">
-        <p14:creationId xmlns:p14="http://schemas.microsoft.com/office/powerpoint/2010/main" val="2560398139"/>
+        <p14:creationId xmlns:p14="http://schemas.microsoft.com/office/powerpoint/2010/main" val="744865965"/>
       </p:ext>
     </p:extLst>
   </p:cSld>
@@ -2103,7 +2128,7 @@
     </p:spTree>
     <p:extLst>
       <p:ext uri="{BB962C8B-B14F-4D97-AF65-F5344CB8AC3E}">
-        <p14:creationId xmlns:p14="http://schemas.microsoft.com/office/powerpoint/2010/main" val="555763951"/>
+        <p14:creationId xmlns:p14="http://schemas.microsoft.com/office/powerpoint/2010/main" val="2560398139"/>
       </p:ext>
     </p:extLst>
   </p:cSld>
@@ -2188,7 +2213,7 @@
     </p:spTree>
     <p:extLst>
       <p:ext uri="{BB962C8B-B14F-4D97-AF65-F5344CB8AC3E}">
-        <p14:creationId xmlns:p14="http://schemas.microsoft.com/office/powerpoint/2010/main" val="1937406605"/>
+        <p14:creationId xmlns:p14="http://schemas.microsoft.com/office/powerpoint/2010/main" val="555763951"/>
       </p:ext>
     </p:extLst>
   </p:cSld>
@@ -2273,7 +2298,7 @@
     </p:spTree>
     <p:extLst>
       <p:ext uri="{BB962C8B-B14F-4D97-AF65-F5344CB8AC3E}">
-        <p14:creationId xmlns:p14="http://schemas.microsoft.com/office/powerpoint/2010/main" val="1817750170"/>
+        <p14:creationId xmlns:p14="http://schemas.microsoft.com/office/powerpoint/2010/main" val="1937406605"/>
       </p:ext>
     </p:extLst>
   </p:cSld>
@@ -2358,7 +2383,7 @@
     </p:spTree>
     <p:extLst>
       <p:ext uri="{BB962C8B-B14F-4D97-AF65-F5344CB8AC3E}">
-        <p14:creationId xmlns:p14="http://schemas.microsoft.com/office/powerpoint/2010/main" val="4019156545"/>
+        <p14:creationId xmlns:p14="http://schemas.microsoft.com/office/powerpoint/2010/main" val="1817750170"/>
       </p:ext>
     </p:extLst>
   </p:cSld>
@@ -2528,7 +2553,7 @@
     </p:spTree>
     <p:extLst>
       <p:ext uri="{BB962C8B-B14F-4D97-AF65-F5344CB8AC3E}">
-        <p14:creationId xmlns:p14="http://schemas.microsoft.com/office/powerpoint/2010/main" val="3731718061"/>
+        <p14:creationId xmlns:p14="http://schemas.microsoft.com/office/powerpoint/2010/main" val="4019156545"/>
       </p:ext>
     </p:extLst>
   </p:cSld>
@@ -2613,7 +2638,7 @@
     </p:spTree>
     <p:extLst>
       <p:ext uri="{BB962C8B-B14F-4D97-AF65-F5344CB8AC3E}">
-        <p14:creationId xmlns:p14="http://schemas.microsoft.com/office/powerpoint/2010/main" val="1781883727"/>
+        <p14:creationId xmlns:p14="http://schemas.microsoft.com/office/powerpoint/2010/main" val="3731718061"/>
       </p:ext>
     </p:extLst>
   </p:cSld>
@@ -2698,7 +2723,7 @@
     </p:spTree>
     <p:extLst>
       <p:ext uri="{BB962C8B-B14F-4D97-AF65-F5344CB8AC3E}">
-        <p14:creationId xmlns:p14="http://schemas.microsoft.com/office/powerpoint/2010/main" val="3631150544"/>
+        <p14:creationId xmlns:p14="http://schemas.microsoft.com/office/powerpoint/2010/main" val="1781883727"/>
       </p:ext>
     </p:extLst>
   </p:cSld>
@@ -2783,7 +2808,7 @@
     </p:spTree>
     <p:extLst>
       <p:ext uri="{BB962C8B-B14F-4D97-AF65-F5344CB8AC3E}">
-        <p14:creationId xmlns:p14="http://schemas.microsoft.com/office/powerpoint/2010/main" val="139523512"/>
+        <p14:creationId xmlns:p14="http://schemas.microsoft.com/office/powerpoint/2010/main" val="3631150544"/>
       </p:ext>
     </p:extLst>
   </p:cSld>
@@ -2860,6 +2885,91 @@
               <a:rPr lang="en-US" smtClean="0"/>
               <a:pPr/>
               <a:t>35</a:t>
+            </a:fld>
+            <a:endParaRPr lang="en-US"/>
+          </a:p>
+        </p:txBody>
+      </p:sp>
+    </p:spTree>
+    <p:extLst>
+      <p:ext uri="{BB962C8B-B14F-4D97-AF65-F5344CB8AC3E}">
+        <p14:creationId xmlns:p14="http://schemas.microsoft.com/office/powerpoint/2010/main" val="139523512"/>
+      </p:ext>
+    </p:extLst>
+  </p:cSld>
+  <p:clrMapOvr>
+    <a:masterClrMapping/>
+  </p:clrMapOvr>
+</p:notes>
+</file>
+
+<file path=ppt/notesSlides/notesSlide35.xml><?xml version="1.0" encoding="utf-8"?>
+<p:notes xmlns:a="http://schemas.openxmlformats.org/drawingml/2006/main" xmlns:r="http://schemas.openxmlformats.org/officeDocument/2006/relationships" xmlns:p="http://schemas.openxmlformats.org/presentationml/2006/main">
+  <p:cSld>
+    <p:spTree>
+      <p:nvGrpSpPr>
+        <p:cNvPr id="1" name=""/>
+        <p:cNvGrpSpPr/>
+        <p:nvPr/>
+      </p:nvGrpSpPr>
+      <p:grpSpPr>
+        <a:xfrm>
+          <a:off x="0" y="0"/>
+          <a:ext cx="0" cy="0"/>
+          <a:chOff x="0" y="0"/>
+          <a:chExt cx="0" cy="0"/>
+        </a:xfrm>
+      </p:grpSpPr>
+      <p:sp>
+        <p:nvSpPr>
+          <p:cNvPr id="2" name="Slide Image Placeholder 1"/>
+          <p:cNvSpPr>
+            <a:spLocks noGrp="1" noRot="1" noChangeAspect="1"/>
+          </p:cNvSpPr>
+          <p:nvPr>
+            <p:ph type="sldImg"/>
+          </p:nvPr>
+        </p:nvSpPr>
+        <p:spPr/>
+      </p:sp>
+      <p:sp>
+        <p:nvSpPr>
+          <p:cNvPr id="3" name="Notes Placeholder 2"/>
+          <p:cNvSpPr>
+            <a:spLocks noGrp="1"/>
+          </p:cNvSpPr>
+          <p:nvPr>
+            <p:ph type="body" idx="1"/>
+          </p:nvPr>
+        </p:nvSpPr>
+        <p:spPr/>
+        <p:txBody>
+          <a:bodyPr/>
+          <a:lstStyle/>
+          <a:p>
+            <a:endParaRPr lang="en-US" dirty="0"/>
+          </a:p>
+        </p:txBody>
+      </p:sp>
+      <p:sp>
+        <p:nvSpPr>
+          <p:cNvPr id="4" name="Slide Number Placeholder 3"/>
+          <p:cNvSpPr>
+            <a:spLocks noGrp="1"/>
+          </p:cNvSpPr>
+          <p:nvPr>
+            <p:ph type="sldNum" sz="quarter" idx="10"/>
+          </p:nvPr>
+        </p:nvSpPr>
+        <p:spPr/>
+        <p:txBody>
+          <a:bodyPr/>
+          <a:lstStyle/>
+          <a:p>
+            <a:fld id="{4CFD207A-07DF-40AD-A916-9872E089CE7A}" type="slidenum">
+              <a:rPr lang="en-US" smtClean="0"/>
+              <a:pPr/>
+              <a:t>36</a:t>
             </a:fld>
             <a:endParaRPr lang="en-US"/>
           </a:p>
@@ -3535,7 +3645,7 @@
           <a:p>
             <a:fld id="{9DC183D5-83EE-4A48-BB2E-1FC30CD8E44A}" type="datetimeFigureOut">
               <a:rPr lang="en-US" smtClean="0"/>
-              <a:t>6/29/2023</a:t>
+              <a:t>2/11/2024</a:t>
             </a:fld>
             <a:endParaRPr lang="en-US"/>
           </a:p>
@@ -3733,7 +3843,7 @@
           <a:p>
             <a:fld id="{9DC183D5-83EE-4A48-BB2E-1FC30CD8E44A}" type="datetimeFigureOut">
               <a:rPr lang="en-US" smtClean="0"/>
-              <a:t>6/29/2023</a:t>
+              <a:t>2/11/2024</a:t>
             </a:fld>
             <a:endParaRPr lang="en-US"/>
           </a:p>
@@ -3941,7 +4051,7 @@
           <a:p>
             <a:fld id="{9DC183D5-83EE-4A48-BB2E-1FC30CD8E44A}" type="datetimeFigureOut">
               <a:rPr lang="en-US" smtClean="0"/>
-              <a:t>6/29/2023</a:t>
+              <a:t>2/11/2024</a:t>
             </a:fld>
             <a:endParaRPr lang="en-US"/>
           </a:p>
@@ -4311,7 +4421,7 @@
           <a:p>
             <a:fld id="{9DC183D5-83EE-4A48-BB2E-1FC30CD8E44A}" type="datetimeFigureOut">
               <a:rPr lang="en-US" smtClean="0"/>
-              <a:t>6/29/2023</a:t>
+              <a:t>2/11/2024</a:t>
             </a:fld>
             <a:endParaRPr lang="en-US"/>
           </a:p>
@@ -4586,7 +4696,7 @@
           <a:p>
             <a:fld id="{9DC183D5-83EE-4A48-BB2E-1FC30CD8E44A}" type="datetimeFigureOut">
               <a:rPr lang="en-US" smtClean="0"/>
-              <a:t>6/29/2023</a:t>
+              <a:t>2/11/2024</a:t>
             </a:fld>
             <a:endParaRPr lang="en-US"/>
           </a:p>
@@ -4851,7 +4961,7 @@
           <a:p>
             <a:fld id="{9DC183D5-83EE-4A48-BB2E-1FC30CD8E44A}" type="datetimeFigureOut">
               <a:rPr lang="en-US" smtClean="0"/>
-              <a:t>6/29/2023</a:t>
+              <a:t>2/11/2024</a:t>
             </a:fld>
             <a:endParaRPr lang="en-US"/>
           </a:p>
@@ -5263,7 +5373,7 @@
           <a:p>
             <a:fld id="{9DC183D5-83EE-4A48-BB2E-1FC30CD8E44A}" type="datetimeFigureOut">
               <a:rPr lang="en-US" smtClean="0"/>
-              <a:t>6/29/2023</a:t>
+              <a:t>2/11/2024</a:t>
             </a:fld>
             <a:endParaRPr lang="en-US"/>
           </a:p>
@@ -5404,7 +5514,7 @@
           <a:p>
             <a:fld id="{9DC183D5-83EE-4A48-BB2E-1FC30CD8E44A}" type="datetimeFigureOut">
               <a:rPr lang="en-US" smtClean="0"/>
-              <a:t>6/29/2023</a:t>
+              <a:t>2/11/2024</a:t>
             </a:fld>
             <a:endParaRPr lang="en-US"/>
           </a:p>
@@ -5517,7 +5627,7 @@
           <a:p>
             <a:fld id="{9DC183D5-83EE-4A48-BB2E-1FC30CD8E44A}" type="datetimeFigureOut">
               <a:rPr lang="en-US" smtClean="0"/>
-              <a:t>6/29/2023</a:t>
+              <a:t>2/11/2024</a:t>
             </a:fld>
             <a:endParaRPr lang="en-US"/>
           </a:p>
@@ -5828,7 +5938,7 @@
           <a:p>
             <a:fld id="{9DC183D5-83EE-4A48-BB2E-1FC30CD8E44A}" type="datetimeFigureOut">
               <a:rPr lang="en-US" smtClean="0"/>
-              <a:t>6/29/2023</a:t>
+              <a:t>2/11/2024</a:t>
             </a:fld>
             <a:endParaRPr lang="en-US"/>
           </a:p>
@@ -6116,7 +6226,7 @@
           <a:p>
             <a:fld id="{9DC183D5-83EE-4A48-BB2E-1FC30CD8E44A}" type="datetimeFigureOut">
               <a:rPr lang="en-US" smtClean="0"/>
-              <a:t>6/29/2023</a:t>
+              <a:t>2/11/2024</a:t>
             </a:fld>
             <a:endParaRPr lang="en-US"/>
           </a:p>
@@ -6357,7 +6467,7 @@
           <a:p>
             <a:fld id="{9DC183D5-83EE-4A48-BB2E-1FC30CD8E44A}" type="datetimeFigureOut">
               <a:rPr lang="en-US" smtClean="0"/>
-              <a:t>6/29/2023</a:t>
+              <a:t>2/11/2024</a:t>
             </a:fld>
             <a:endParaRPr lang="en-US"/>
           </a:p>
@@ -7065,12 +7175,14 @@
                 <a:r>
                   <a:rPr lang="en-US" b="1" dirty="0" err="1">
                     <a:latin typeface="+mn-lt"/>
+                    <a:hlinkClick r:id="rId3"/>
                   </a:rPr>
                   <a:t>Mahalanobis</a:t>
                 </a:r>
                 <a:r>
                   <a:rPr lang="en-US" b="1" dirty="0">
                     <a:latin typeface="+mn-lt"/>
+                    <a:hlinkClick r:id="rId3"/>
                   </a:rPr>
                   <a:t> Distance </a:t>
                 </a:r>
@@ -7675,7 +7787,7 @@
                 <a:ext cx="11525250" cy="5698998"/>
               </a:xfrm>
               <a:blipFill>
-                <a:blip r:embed="rId3"/>
+                <a:blip r:embed="rId4"/>
                 <a:stretch>
                   <a:fillRect l="-1111" t="-1818"/>
                 </a:stretch>
@@ -11911,11 +12023,722 @@
           </a:p>
         </p:txBody>
       </p:sp>
+      <p:sp>
+        <p:nvSpPr>
+          <p:cNvPr id="3" name="Content Placeholder 2"/>
+          <p:cNvSpPr>
+            <a:spLocks noGrp="1"/>
+          </p:cNvSpPr>
+          <p:nvPr>
+            <p:ph sz="quarter" idx="10"/>
+          </p:nvPr>
+        </p:nvSpPr>
+        <p:spPr>
+          <a:xfrm>
+            <a:off x="333375" y="896079"/>
+            <a:ext cx="11525250" cy="5698998"/>
+          </a:xfrm>
+        </p:spPr>
+        <p:txBody>
+          <a:bodyPr>
+            <a:normAutofit/>
+          </a:bodyPr>
+          <a:lstStyle/>
+          <a:p>
+            <a:pPr marL="0" indent="0">
+              <a:buNone/>
+            </a:pPr>
+            <a:r>
+              <a:rPr lang="en-US" b="1" dirty="0">
+                <a:latin typeface="+mn-lt"/>
+              </a:rPr>
+              <a:t>Edit Distance</a:t>
+            </a:r>
+            <a:r>
+              <a:rPr lang="en-US" dirty="0">
+                <a:latin typeface="+mn-lt"/>
+              </a:rPr>
+              <a:t>: the number of edit operations required to </a:t>
+            </a:r>
+          </a:p>
+          <a:p>
+            <a:r>
+              <a:rPr lang="en-US" dirty="0">
+                <a:latin typeface="+mn-lt"/>
+              </a:rPr>
+              <a:t>Example: Consider two binary vectors:   </a:t>
+            </a:r>
+            <a:r>
+              <a:rPr lang="en-US" sz="2400" dirty="0">
+                <a:latin typeface="+mn-lt"/>
+              </a:rPr>
+              <a:t> </a:t>
+            </a:r>
+          </a:p>
+          <a:p>
+            <a:pPr marL="457200" lvl="1" indent="0">
+              <a:buNone/>
+            </a:pPr>
+            <a:r>
+              <a:rPr lang="en-US" dirty="0">
+                <a:latin typeface="+mn-lt"/>
+              </a:rPr>
+              <a:t>				x = </a:t>
+            </a:r>
+            <a:r>
+              <a:rPr lang="en-US" dirty="0" err="1">
+                <a:latin typeface="+mn-lt"/>
+              </a:rPr>
+              <a:t>thisismy</a:t>
+            </a:r>
+            <a:r>
+              <a:rPr lang="en-US" dirty="0" err="1">
+                <a:solidFill>
+                  <a:srgbClr val="C00000"/>
+                </a:solidFill>
+                <a:latin typeface="+mn-lt"/>
+              </a:rPr>
+              <a:t>olddog</a:t>
+            </a:r>
+            <a:endParaRPr lang="en-US" dirty="0">
+              <a:solidFill>
+                <a:srgbClr val="C00000"/>
+              </a:solidFill>
+              <a:latin typeface="+mn-lt"/>
+            </a:endParaRPr>
+          </a:p>
+          <a:p>
+            <a:pPr marL="457200" lvl="1" indent="0">
+              <a:buNone/>
+            </a:pPr>
+            <a:r>
+              <a:rPr lang="en-US" dirty="0">
+                <a:latin typeface="+mn-lt"/>
+              </a:rPr>
+              <a:t>				x’ = </a:t>
+            </a:r>
+            <a:r>
+              <a:rPr lang="en-US" dirty="0" err="1">
+                <a:latin typeface="+mn-lt"/>
+              </a:rPr>
+              <a:t>thisismy</a:t>
+            </a:r>
+            <a:r>
+              <a:rPr lang="en-US" dirty="0" err="1">
+                <a:solidFill>
+                  <a:srgbClr val="C00000"/>
+                </a:solidFill>
+                <a:latin typeface="+mn-lt"/>
+              </a:rPr>
+              <a:t>cat</a:t>
+            </a:r>
+            <a:endParaRPr lang="en-US" dirty="0">
+              <a:solidFill>
+                <a:srgbClr val="C00000"/>
+              </a:solidFill>
+              <a:latin typeface="+mn-lt"/>
+            </a:endParaRPr>
+          </a:p>
+          <a:p>
+            <a:pPr marL="457200" lvl="1" indent="0">
+              <a:buNone/>
+            </a:pPr>
+            <a:r>
+              <a:rPr lang="en-US" dirty="0">
+                <a:latin typeface="+mn-lt"/>
+              </a:rPr>
+              <a:t>Changes required to have same characters in both strings:   </a:t>
+            </a:r>
+          </a:p>
+          <a:p>
+            <a:pPr marL="457200" lvl="1" indent="0">
+              <a:buNone/>
+            </a:pPr>
+            <a:r>
+              <a:rPr lang="en-US" dirty="0">
+                <a:latin typeface="+mn-lt"/>
+              </a:rPr>
+              <a:t>				3 – deletes, o, l, d</a:t>
+            </a:r>
+          </a:p>
+          <a:p>
+            <a:pPr marL="457200" lvl="1" indent="0">
+              <a:buNone/>
+            </a:pPr>
+            <a:r>
+              <a:rPr lang="en-US" dirty="0">
+                <a:latin typeface="+mn-lt"/>
+              </a:rPr>
+              <a:t>                                               3 – changes, c, a, t</a:t>
+            </a:r>
+          </a:p>
+          <a:p>
+            <a:r>
+              <a:rPr lang="en-US" dirty="0">
+                <a:latin typeface="+mn-lt"/>
+              </a:rPr>
+              <a:t>Many edit distance metrics can be applied:  </a:t>
+            </a:r>
+          </a:p>
+          <a:p>
+            <a:pPr lvl="1"/>
+            <a:r>
+              <a:rPr lang="en-US" dirty="0">
+                <a:latin typeface="+mn-lt"/>
+              </a:rPr>
+              <a:t>Hamming distance </a:t>
+            </a:r>
+          </a:p>
+          <a:p>
+            <a:pPr lvl="1"/>
+            <a:r>
+              <a:rPr lang="en-US" dirty="0" err="1">
+                <a:latin typeface="+mn-lt"/>
+                <a:hlinkClick r:id="rId3"/>
+              </a:rPr>
+              <a:t>Levenshtein</a:t>
+            </a:r>
+            <a:r>
+              <a:rPr lang="en-US" dirty="0">
+                <a:latin typeface="+mn-lt"/>
+                <a:hlinkClick r:id="rId3"/>
+              </a:rPr>
+              <a:t> distance</a:t>
+            </a:r>
+            <a:r>
+              <a:rPr lang="en-US" dirty="0">
+                <a:latin typeface="+mn-lt"/>
+              </a:rPr>
+              <a:t>   </a:t>
+            </a:r>
+          </a:p>
+          <a:p>
+            <a:pPr lvl="1"/>
+            <a:r>
+              <a:rPr lang="en-US" dirty="0">
+                <a:latin typeface="+mn-lt"/>
+              </a:rPr>
+              <a:t>Longest common sequence</a:t>
+            </a:r>
+          </a:p>
+          <a:p>
+            <a:pPr lvl="1"/>
+            <a:r>
+              <a:rPr lang="en-US" dirty="0">
+                <a:latin typeface="+mn-lt"/>
+              </a:rPr>
+              <a:t>…</a:t>
+            </a:r>
+          </a:p>
+        </p:txBody>
+      </p:sp>
+    </p:spTree>
+    <p:extLst>
+      <p:ext uri="{BB962C8B-B14F-4D97-AF65-F5344CB8AC3E}">
+        <p14:creationId xmlns:p14="http://schemas.microsoft.com/office/powerpoint/2010/main" val="3526936667"/>
+      </p:ext>
+    </p:extLst>
+  </p:cSld>
+  <p:clrMapOvr>
+    <a:masterClrMapping/>
+  </p:clrMapOvr>
+  <p:timing>
+    <p:tnLst>
+      <p:par>
+        <p:cTn id="1" dur="indefinite" restart="never" nodeType="tmRoot">
+          <p:childTnLst>
+            <p:seq concurrent="1" nextAc="seek">
+              <p:cTn id="2" dur="indefinite" nodeType="mainSeq">
+                <p:childTnLst>
+                  <p:par>
+                    <p:cTn id="3" fill="hold">
+                      <p:stCondLst>
+                        <p:cond delay="indefinite"/>
+                      </p:stCondLst>
+                      <p:childTnLst>
+                        <p:par>
+                          <p:cTn id="4" fill="hold">
+                            <p:stCondLst>
+                              <p:cond delay="0"/>
+                            </p:stCondLst>
+                            <p:childTnLst>
+                              <p:par>
+                                <p:cTn id="5" presetID="1" presetClass="entr" presetSubtype="0" fill="hold" nodeType="clickEffect">
+                                  <p:stCondLst>
+                                    <p:cond delay="0"/>
+                                  </p:stCondLst>
+                                  <p:childTnLst>
+                                    <p:set>
+                                      <p:cBhvr>
+                                        <p:cTn id="6" dur="1" fill="hold">
+                                          <p:stCondLst>
+                                            <p:cond delay="0"/>
+                                          </p:stCondLst>
+                                        </p:cTn>
+                                        <p:tgtEl>
+                                          <p:spTgt spid="3">
+                                            <p:txEl>
+                                              <p:pRg st="1" end="1"/>
+                                            </p:txEl>
+                                          </p:spTgt>
+                                        </p:tgtEl>
+                                        <p:attrNameLst>
+                                          <p:attrName>style.visibility</p:attrName>
+                                        </p:attrNameLst>
+                                      </p:cBhvr>
+                                      <p:to>
+                                        <p:strVal val="visible"/>
+                                      </p:to>
+                                    </p:set>
+                                  </p:childTnLst>
+                                </p:cTn>
+                              </p:par>
+                              <p:par>
+                                <p:cTn id="7" presetID="1" presetClass="entr" presetSubtype="0" fill="hold" nodeType="withEffect">
+                                  <p:stCondLst>
+                                    <p:cond delay="0"/>
+                                  </p:stCondLst>
+                                  <p:childTnLst>
+                                    <p:set>
+                                      <p:cBhvr>
+                                        <p:cTn id="8" dur="1" fill="hold">
+                                          <p:stCondLst>
+                                            <p:cond delay="0"/>
+                                          </p:stCondLst>
+                                        </p:cTn>
+                                        <p:tgtEl>
+                                          <p:spTgt spid="3">
+                                            <p:txEl>
+                                              <p:pRg st="2" end="2"/>
+                                            </p:txEl>
+                                          </p:spTgt>
+                                        </p:tgtEl>
+                                        <p:attrNameLst>
+                                          <p:attrName>style.visibility</p:attrName>
+                                        </p:attrNameLst>
+                                      </p:cBhvr>
+                                      <p:to>
+                                        <p:strVal val="visible"/>
+                                      </p:to>
+                                    </p:set>
+                                  </p:childTnLst>
+                                </p:cTn>
+                              </p:par>
+                              <p:par>
+                                <p:cTn id="9" presetID="1" presetClass="entr" presetSubtype="0" fill="hold" nodeType="withEffect">
+                                  <p:stCondLst>
+                                    <p:cond delay="0"/>
+                                  </p:stCondLst>
+                                  <p:childTnLst>
+                                    <p:set>
+                                      <p:cBhvr>
+                                        <p:cTn id="10" dur="1" fill="hold">
+                                          <p:stCondLst>
+                                            <p:cond delay="0"/>
+                                          </p:stCondLst>
+                                        </p:cTn>
+                                        <p:tgtEl>
+                                          <p:spTgt spid="3">
+                                            <p:txEl>
+                                              <p:pRg st="3" end="3"/>
+                                            </p:txEl>
+                                          </p:spTgt>
+                                        </p:tgtEl>
+                                        <p:attrNameLst>
+                                          <p:attrName>style.visibility</p:attrName>
+                                        </p:attrNameLst>
+                                      </p:cBhvr>
+                                      <p:to>
+                                        <p:strVal val="visible"/>
+                                      </p:to>
+                                    </p:set>
+                                  </p:childTnLst>
+                                </p:cTn>
+                              </p:par>
+                            </p:childTnLst>
+                          </p:cTn>
+                        </p:par>
+                      </p:childTnLst>
+                    </p:cTn>
+                  </p:par>
+                  <p:par>
+                    <p:cTn id="11" fill="hold">
+                      <p:stCondLst>
+                        <p:cond delay="indefinite"/>
+                      </p:stCondLst>
+                      <p:childTnLst>
+                        <p:par>
+                          <p:cTn id="12" fill="hold">
+                            <p:stCondLst>
+                              <p:cond delay="0"/>
+                            </p:stCondLst>
+                            <p:childTnLst>
+                              <p:par>
+                                <p:cTn id="13" presetID="1" presetClass="entr" presetSubtype="0" fill="hold" nodeType="clickEffect">
+                                  <p:stCondLst>
+                                    <p:cond delay="0"/>
+                                  </p:stCondLst>
+                                  <p:childTnLst>
+                                    <p:set>
+                                      <p:cBhvr>
+                                        <p:cTn id="14" dur="1" fill="hold">
+                                          <p:stCondLst>
+                                            <p:cond delay="0"/>
+                                          </p:stCondLst>
+                                        </p:cTn>
+                                        <p:tgtEl>
+                                          <p:spTgt spid="3">
+                                            <p:txEl>
+                                              <p:pRg st="4" end="4"/>
+                                            </p:txEl>
+                                          </p:spTgt>
+                                        </p:tgtEl>
+                                        <p:attrNameLst>
+                                          <p:attrName>style.visibility</p:attrName>
+                                        </p:attrNameLst>
+                                      </p:cBhvr>
+                                      <p:to>
+                                        <p:strVal val="visible"/>
+                                      </p:to>
+                                    </p:set>
+                                  </p:childTnLst>
+                                </p:cTn>
+                              </p:par>
+                              <p:par>
+                                <p:cTn id="15" presetID="1" presetClass="entr" presetSubtype="0" fill="hold" nodeType="withEffect">
+                                  <p:stCondLst>
+                                    <p:cond delay="0"/>
+                                  </p:stCondLst>
+                                  <p:childTnLst>
+                                    <p:set>
+                                      <p:cBhvr>
+                                        <p:cTn id="16" dur="1" fill="hold">
+                                          <p:stCondLst>
+                                            <p:cond delay="0"/>
+                                          </p:stCondLst>
+                                        </p:cTn>
+                                        <p:tgtEl>
+                                          <p:spTgt spid="3">
+                                            <p:txEl>
+                                              <p:pRg st="5" end="5"/>
+                                            </p:txEl>
+                                          </p:spTgt>
+                                        </p:tgtEl>
+                                        <p:attrNameLst>
+                                          <p:attrName>style.visibility</p:attrName>
+                                        </p:attrNameLst>
+                                      </p:cBhvr>
+                                      <p:to>
+                                        <p:strVal val="visible"/>
+                                      </p:to>
+                                    </p:set>
+                                  </p:childTnLst>
+                                </p:cTn>
+                              </p:par>
+                              <p:par>
+                                <p:cTn id="17" presetID="1" presetClass="entr" presetSubtype="0" fill="hold" nodeType="withEffect">
+                                  <p:stCondLst>
+                                    <p:cond delay="0"/>
+                                  </p:stCondLst>
+                                  <p:childTnLst>
+                                    <p:set>
+                                      <p:cBhvr>
+                                        <p:cTn id="18" dur="1" fill="hold">
+                                          <p:stCondLst>
+                                            <p:cond delay="0"/>
+                                          </p:stCondLst>
+                                        </p:cTn>
+                                        <p:tgtEl>
+                                          <p:spTgt spid="3">
+                                            <p:txEl>
+                                              <p:pRg st="6" end="6"/>
+                                            </p:txEl>
+                                          </p:spTgt>
+                                        </p:tgtEl>
+                                        <p:attrNameLst>
+                                          <p:attrName>style.visibility</p:attrName>
+                                        </p:attrNameLst>
+                                      </p:cBhvr>
+                                      <p:to>
+                                        <p:strVal val="visible"/>
+                                      </p:to>
+                                    </p:set>
+                                  </p:childTnLst>
+                                </p:cTn>
+                              </p:par>
+                            </p:childTnLst>
+                          </p:cTn>
+                        </p:par>
+                      </p:childTnLst>
+                    </p:cTn>
+                  </p:par>
+                  <p:par>
+                    <p:cTn id="19" fill="hold">
+                      <p:stCondLst>
+                        <p:cond delay="indefinite"/>
+                      </p:stCondLst>
+                      <p:childTnLst>
+                        <p:par>
+                          <p:cTn id="20" fill="hold">
+                            <p:stCondLst>
+                              <p:cond delay="0"/>
+                            </p:stCondLst>
+                            <p:childTnLst>
+                              <p:par>
+                                <p:cTn id="21" presetID="1" presetClass="entr" presetSubtype="0" fill="hold" nodeType="clickEffect">
+                                  <p:stCondLst>
+                                    <p:cond delay="0"/>
+                                  </p:stCondLst>
+                                  <p:childTnLst>
+                                    <p:set>
+                                      <p:cBhvr>
+                                        <p:cTn id="22" dur="1" fill="hold">
+                                          <p:stCondLst>
+                                            <p:cond delay="0"/>
+                                          </p:stCondLst>
+                                        </p:cTn>
+                                        <p:tgtEl>
+                                          <p:spTgt spid="3">
+                                            <p:txEl>
+                                              <p:pRg st="7" end="7"/>
+                                            </p:txEl>
+                                          </p:spTgt>
+                                        </p:tgtEl>
+                                        <p:attrNameLst>
+                                          <p:attrName>style.visibility</p:attrName>
+                                        </p:attrNameLst>
+                                      </p:cBhvr>
+                                      <p:to>
+                                        <p:strVal val="visible"/>
+                                      </p:to>
+                                    </p:set>
+                                  </p:childTnLst>
+                                </p:cTn>
+                              </p:par>
+                              <p:par>
+                                <p:cTn id="23" presetID="1" presetClass="entr" presetSubtype="0" fill="hold" nodeType="withEffect">
+                                  <p:stCondLst>
+                                    <p:cond delay="0"/>
+                                  </p:stCondLst>
+                                  <p:childTnLst>
+                                    <p:set>
+                                      <p:cBhvr>
+                                        <p:cTn id="24" dur="1" fill="hold">
+                                          <p:stCondLst>
+                                            <p:cond delay="0"/>
+                                          </p:stCondLst>
+                                        </p:cTn>
+                                        <p:tgtEl>
+                                          <p:spTgt spid="3">
+                                            <p:txEl>
+                                              <p:pRg st="8" end="8"/>
+                                            </p:txEl>
+                                          </p:spTgt>
+                                        </p:tgtEl>
+                                        <p:attrNameLst>
+                                          <p:attrName>style.visibility</p:attrName>
+                                        </p:attrNameLst>
+                                      </p:cBhvr>
+                                      <p:to>
+                                        <p:strVal val="visible"/>
+                                      </p:to>
+                                    </p:set>
+                                  </p:childTnLst>
+                                </p:cTn>
+                              </p:par>
+                              <p:par>
+                                <p:cTn id="25" presetID="1" presetClass="entr" presetSubtype="0" fill="hold" nodeType="withEffect">
+                                  <p:stCondLst>
+                                    <p:cond delay="0"/>
+                                  </p:stCondLst>
+                                  <p:childTnLst>
+                                    <p:set>
+                                      <p:cBhvr>
+                                        <p:cTn id="26" dur="1" fill="hold">
+                                          <p:stCondLst>
+                                            <p:cond delay="0"/>
+                                          </p:stCondLst>
+                                        </p:cTn>
+                                        <p:tgtEl>
+                                          <p:spTgt spid="3">
+                                            <p:txEl>
+                                              <p:pRg st="9" end="9"/>
+                                            </p:txEl>
+                                          </p:spTgt>
+                                        </p:tgtEl>
+                                        <p:attrNameLst>
+                                          <p:attrName>style.visibility</p:attrName>
+                                        </p:attrNameLst>
+                                      </p:cBhvr>
+                                      <p:to>
+                                        <p:strVal val="visible"/>
+                                      </p:to>
+                                    </p:set>
+                                  </p:childTnLst>
+                                </p:cTn>
+                              </p:par>
+                              <p:par>
+                                <p:cTn id="27" presetID="1" presetClass="entr" presetSubtype="0" fill="hold" nodeType="withEffect">
+                                  <p:stCondLst>
+                                    <p:cond delay="0"/>
+                                  </p:stCondLst>
+                                  <p:childTnLst>
+                                    <p:set>
+                                      <p:cBhvr>
+                                        <p:cTn id="28" dur="1" fill="hold">
+                                          <p:stCondLst>
+                                            <p:cond delay="0"/>
+                                          </p:stCondLst>
+                                        </p:cTn>
+                                        <p:tgtEl>
+                                          <p:spTgt spid="3">
+                                            <p:txEl>
+                                              <p:pRg st="10" end="10"/>
+                                            </p:txEl>
+                                          </p:spTgt>
+                                        </p:tgtEl>
+                                        <p:attrNameLst>
+                                          <p:attrName>style.visibility</p:attrName>
+                                        </p:attrNameLst>
+                                      </p:cBhvr>
+                                      <p:to>
+                                        <p:strVal val="visible"/>
+                                      </p:to>
+                                    </p:set>
+                                  </p:childTnLst>
+                                </p:cTn>
+                              </p:par>
+                              <p:par>
+                                <p:cTn id="29" presetID="1" presetClass="entr" presetSubtype="0" fill="hold" nodeType="withEffect">
+                                  <p:stCondLst>
+                                    <p:cond delay="0"/>
+                                  </p:stCondLst>
+                                  <p:childTnLst>
+                                    <p:set>
+                                      <p:cBhvr>
+                                        <p:cTn id="30" dur="1" fill="hold">
+                                          <p:stCondLst>
+                                            <p:cond delay="0"/>
+                                          </p:stCondLst>
+                                        </p:cTn>
+                                        <p:tgtEl>
+                                          <p:spTgt spid="3">
+                                            <p:txEl>
+                                              <p:pRg st="11" end="11"/>
+                                            </p:txEl>
+                                          </p:spTgt>
+                                        </p:tgtEl>
+                                        <p:attrNameLst>
+                                          <p:attrName>style.visibility</p:attrName>
+                                        </p:attrNameLst>
+                                      </p:cBhvr>
+                                      <p:to>
+                                        <p:strVal val="visible"/>
+                                      </p:to>
+                                    </p:set>
+                                  </p:childTnLst>
+                                </p:cTn>
+                              </p:par>
+                            </p:childTnLst>
+                          </p:cTn>
+                        </p:par>
+                      </p:childTnLst>
+                    </p:cTn>
+                  </p:par>
+                </p:childTnLst>
+              </p:cTn>
+              <p:prevCondLst>
+                <p:cond evt="onPrev" delay="0">
+                  <p:tgtEl>
+                    <p:sldTgt/>
+                  </p:tgtEl>
+                </p:cond>
+              </p:prevCondLst>
+              <p:nextCondLst>
+                <p:cond evt="onNext" delay="0">
+                  <p:tgtEl>
+                    <p:sldTgt/>
+                  </p:tgtEl>
+                </p:cond>
+              </p:nextCondLst>
+            </p:seq>
+          </p:childTnLst>
+        </p:cTn>
+      </p:par>
+    </p:tnLst>
+  </p:timing>
+</p:sld>
+</file>
+
+<file path=ppt/slides/slide15.xml><?xml version="1.0" encoding="utf-8"?>
+<p:sld xmlns:a="http://schemas.openxmlformats.org/drawingml/2006/main" xmlns:r="http://schemas.openxmlformats.org/officeDocument/2006/relationships" xmlns:p="http://schemas.openxmlformats.org/presentationml/2006/main">
+  <p:cSld>
+    <p:spTree>
+      <p:nvGrpSpPr>
+        <p:cNvPr id="1" name="">
+          <a:extLst>
+            <a:ext uri="{FF2B5EF4-FFF2-40B4-BE49-F238E27FC236}">
+              <a16:creationId xmlns:a16="http://schemas.microsoft.com/office/drawing/2014/main" id="{5D5CAA5A-3FE0-F3FB-06AC-A7661F94860C}"/>
+            </a:ext>
+          </a:extLst>
+        </p:cNvPr>
+        <p:cNvGrpSpPr/>
+        <p:nvPr/>
+      </p:nvGrpSpPr>
+      <p:grpSpPr>
+        <a:xfrm>
+          <a:off x="0" y="0"/>
+          <a:ext cx="0" cy="0"/>
+          <a:chOff x="0" y="0"/>
+          <a:chExt cx="0" cy="0"/>
+        </a:xfrm>
+      </p:grpSpPr>
+      <p:sp>
+        <p:nvSpPr>
+          <p:cNvPr id="2" name="Title 1">
+            <a:extLst>
+              <a:ext uri="{FF2B5EF4-FFF2-40B4-BE49-F238E27FC236}">
+                <a16:creationId xmlns:a16="http://schemas.microsoft.com/office/drawing/2014/main" id="{96171D76-016C-3FB5-A8FE-9FC3410DCC0B}"/>
+              </a:ext>
+            </a:extLst>
+          </p:cNvPr>
+          <p:cNvSpPr>
+            <a:spLocks noGrp="1"/>
+          </p:cNvSpPr>
+          <p:nvPr>
+            <p:ph type="title"/>
+          </p:nvPr>
+        </p:nvSpPr>
+        <p:spPr>
+          <a:xfrm>
+            <a:off x="584200" y="221992"/>
+            <a:ext cx="10515600" cy="530954"/>
+          </a:xfrm>
+        </p:spPr>
+        <p:txBody>
+          <a:bodyPr>
+            <a:normAutofit fontScale="90000"/>
+          </a:bodyPr>
+          <a:lstStyle/>
+          <a:p>
+            <a:r>
+              <a:rPr lang="en-US" dirty="0"/>
+              <a:t>Measuring distance or dissimilarity</a:t>
+            </a:r>
+          </a:p>
+        </p:txBody>
+      </p:sp>
       <mc:AlternateContent xmlns:mc="http://schemas.openxmlformats.org/markup-compatibility/2006" xmlns:a14="http://schemas.microsoft.com/office/drawing/2010/main">
         <mc:Choice Requires="a14">
           <p:sp>
             <p:nvSpPr>
-              <p:cNvPr id="3" name="Content Placeholder 2"/>
+              <p:cNvPr id="3" name="Content Placeholder 2">
+                <a:extLst>
+                  <a:ext uri="{FF2B5EF4-FFF2-40B4-BE49-F238E27FC236}">
+                    <a16:creationId xmlns:a16="http://schemas.microsoft.com/office/drawing/2014/main" id="{C327BFAB-84EF-2B31-8402-AFD79DB40099}"/>
+                  </a:ext>
+                </a:extLst>
+              </p:cNvPr>
               <p:cNvSpPr>
                 <a:spLocks noGrp="1"/>
               </p:cNvSpPr>
@@ -11941,6 +12764,7 @@
                 <a:r>
                   <a:rPr lang="en-US" b="1" dirty="0">
                     <a:latin typeface="+mn-lt"/>
+                    <a:hlinkClick r:id="rId3"/>
                   </a:rPr>
                   <a:t>Hamming Distance</a:t>
                 </a:r>
@@ -12299,7 +13123,13 @@
         <mc:Fallback xmlns="">
           <p:sp>
             <p:nvSpPr>
-              <p:cNvPr id="3" name="Content Placeholder 2"/>
+              <p:cNvPr id="3" name="Content Placeholder 2">
+                <a:extLst>
+                  <a:ext uri="{FF2B5EF4-FFF2-40B4-BE49-F238E27FC236}">
+                    <a16:creationId xmlns:a16="http://schemas.microsoft.com/office/drawing/2014/main" id="{C327BFAB-84EF-2B31-8402-AFD79DB40099}"/>
+                  </a:ext>
+                </a:extLst>
+              </p:cNvPr>
               <p:cNvSpPr>
                 <a:spLocks noGrp="1" noRot="1" noChangeAspect="1" noMove="1" noResize="1" noEditPoints="1" noAdjustHandles="1" noChangeArrowheads="1" noChangeShapeType="1" noTextEdit="1"/>
               </p:cNvSpPr>
@@ -12313,7 +13143,7 @@
                 <a:ext cx="11525250" cy="5698998"/>
               </a:xfrm>
               <a:blipFill>
-                <a:blip r:embed="rId3"/>
+                <a:blip r:embed="rId4"/>
                 <a:stretch>
                   <a:fillRect l="-1111" t="-1818"/>
                 </a:stretch>
@@ -12337,7 +13167,7 @@
     </p:spTree>
     <p:extLst>
       <p:ext uri="{BB962C8B-B14F-4D97-AF65-F5344CB8AC3E}">
-        <p14:creationId xmlns:p14="http://schemas.microsoft.com/office/powerpoint/2010/main" val="3526936667"/>
+        <p14:creationId xmlns:p14="http://schemas.microsoft.com/office/powerpoint/2010/main" val="614147095"/>
       </p:ext>
     </p:extLst>
   </p:cSld>
@@ -12746,7 +13576,7 @@
 </p:sld>
 </file>
 
-<file path=ppt/slides/slide15.xml><?xml version="1.0" encoding="utf-8"?>
+<file path=ppt/slides/slide16.xml><?xml version="1.0" encoding="utf-8"?>
 <p:sld xmlns:a="http://schemas.openxmlformats.org/drawingml/2006/main" xmlns:r="http://schemas.openxmlformats.org/officeDocument/2006/relationships" xmlns:p="http://schemas.openxmlformats.org/presentationml/2006/main">
   <p:cSld>
     <p:spTree>
@@ -13394,7 +14224,7 @@
 </p:sld>
 </file>
 
-<file path=ppt/slides/slide16.xml><?xml version="1.0" encoding="utf-8"?>
+<file path=ppt/slides/slide17.xml><?xml version="1.0" encoding="utf-8"?>
 <p:sld xmlns:a="http://schemas.openxmlformats.org/drawingml/2006/main" xmlns:r="http://schemas.openxmlformats.org/officeDocument/2006/relationships" xmlns:p="http://schemas.openxmlformats.org/presentationml/2006/main">
   <p:cSld>
     <p:spTree>
@@ -14115,7 +14945,7 @@
 </p:sld>
 </file>
 
-<file path=ppt/slides/slide17.xml><?xml version="1.0" encoding="utf-8"?>
+<file path=ppt/slides/slide18.xml><?xml version="1.0" encoding="utf-8"?>
 <p:sld xmlns:a="http://schemas.openxmlformats.org/drawingml/2006/main" xmlns:r="http://schemas.openxmlformats.org/officeDocument/2006/relationships" xmlns:p="http://schemas.openxmlformats.org/presentationml/2006/main">
   <p:cSld>
     <p:spTree>
@@ -15035,7 +15865,7 @@
 </p:sld>
 </file>
 
-<file path=ppt/slides/slide18.xml><?xml version="1.0" encoding="utf-8"?>
+<file path=ppt/slides/slide19.xml><?xml version="1.0" encoding="utf-8"?>
 <p:sld xmlns:a="http://schemas.openxmlformats.org/drawingml/2006/main" xmlns:r="http://schemas.openxmlformats.org/officeDocument/2006/relationships" xmlns:p="http://schemas.openxmlformats.org/presentationml/2006/main">
   <p:cSld>
     <p:spTree>
@@ -15581,508 +16411,6 @@
 </p:sld>
 </file>
 
-<file path=ppt/slides/slide19.xml><?xml version="1.0" encoding="utf-8"?>
-<p:sld xmlns:a="http://schemas.openxmlformats.org/drawingml/2006/main" xmlns:r="http://schemas.openxmlformats.org/officeDocument/2006/relationships" xmlns:p="http://schemas.openxmlformats.org/presentationml/2006/main">
-  <p:cSld>
-    <p:spTree>
-      <p:nvGrpSpPr>
-        <p:cNvPr id="1" name=""/>
-        <p:cNvGrpSpPr/>
-        <p:nvPr/>
-      </p:nvGrpSpPr>
-      <p:grpSpPr>
-        <a:xfrm>
-          <a:off x="0" y="0"/>
-          <a:ext cx="0" cy="0"/>
-          <a:chOff x="0" y="0"/>
-          <a:chExt cx="0" cy="0"/>
-        </a:xfrm>
-      </p:grpSpPr>
-      <p:sp>
-        <p:nvSpPr>
-          <p:cNvPr id="2" name="Title 1"/>
-          <p:cNvSpPr>
-            <a:spLocks noGrp="1"/>
-          </p:cNvSpPr>
-          <p:nvPr>
-            <p:ph type="title"/>
-          </p:nvPr>
-        </p:nvSpPr>
-        <p:spPr>
-          <a:xfrm>
-            <a:off x="584200" y="221992"/>
-            <a:ext cx="10515600" cy="530954"/>
-          </a:xfrm>
-        </p:spPr>
-        <p:txBody>
-          <a:bodyPr>
-            <a:normAutofit fontScale="90000"/>
-          </a:bodyPr>
-          <a:lstStyle/>
-          <a:p>
-            <a:r>
-              <a:rPr lang="en-US" dirty="0"/>
-              <a:t>Measuring distance or dissimilarity</a:t>
-            </a:r>
-          </a:p>
-        </p:txBody>
-      </p:sp>
-      <p:sp>
-        <p:nvSpPr>
-          <p:cNvPr id="3" name="Content Placeholder 2"/>
-          <p:cNvSpPr>
-            <a:spLocks noGrp="1"/>
-          </p:cNvSpPr>
-          <p:nvPr>
-            <p:ph sz="quarter" idx="10"/>
-          </p:nvPr>
-        </p:nvSpPr>
-        <p:spPr>
-          <a:xfrm>
-            <a:off x="333375" y="896079"/>
-            <a:ext cx="11525250" cy="5698998"/>
-          </a:xfrm>
-        </p:spPr>
-        <p:txBody>
-          <a:bodyPr>
-            <a:normAutofit lnSpcReduction="10000"/>
-          </a:bodyPr>
-          <a:lstStyle/>
-          <a:p>
-            <a:pPr marL="0" indent="0">
-              <a:buNone/>
-            </a:pPr>
-            <a:r>
-              <a:rPr lang="en-US" dirty="0">
-                <a:latin typeface="+mn-lt"/>
-              </a:rPr>
-              <a:t>Can we combine dissimilarities of different types of variables</a:t>
-            </a:r>
-          </a:p>
-          <a:p>
-            <a:r>
-              <a:rPr lang="en-US" dirty="0">
-                <a:latin typeface="+mn-lt"/>
-              </a:rPr>
-              <a:t>Yes, but with carefully!</a:t>
-            </a:r>
-          </a:p>
-          <a:p>
-            <a:r>
-              <a:rPr lang="en-US" dirty="0">
-                <a:latin typeface="+mn-lt"/>
-              </a:rPr>
-              <a:t>Scaling important, or some variable types dominate as a result of coding</a:t>
-            </a:r>
-          </a:p>
-          <a:p>
-            <a:pPr lvl="1"/>
-            <a:r>
-              <a:rPr lang="en-US" dirty="0">
-                <a:latin typeface="+mn-lt"/>
-              </a:rPr>
-              <a:t>The numeric range of values must be similar</a:t>
-            </a:r>
-          </a:p>
-          <a:p>
-            <a:pPr lvl="1"/>
-            <a:r>
-              <a:rPr lang="en-US" dirty="0">
-                <a:latin typeface="+mn-lt"/>
-              </a:rPr>
-              <a:t>e.g. We do not want ordinal variables to dominate numeric and categorical</a:t>
-            </a:r>
-          </a:p>
-          <a:p>
-            <a:r>
-              <a:rPr lang="en-US" dirty="0">
-                <a:latin typeface="+mn-lt"/>
-              </a:rPr>
-              <a:t>But, weighting is problem dependent!</a:t>
-            </a:r>
-          </a:p>
-          <a:p>
-            <a:pPr lvl="1"/>
-            <a:r>
-              <a:rPr lang="en-US" dirty="0">
-                <a:latin typeface="+mn-lt"/>
-              </a:rPr>
-              <a:t>Unfortunately, no simple procedure for correct weighting</a:t>
-            </a:r>
-          </a:p>
-          <a:p>
-            <a:pPr lvl="1"/>
-            <a:r>
-              <a:rPr lang="en-US" dirty="0">
-                <a:latin typeface="+mn-lt"/>
-              </a:rPr>
-              <a:t>Do I care more about the (ordinal) star rating or calories of the meal (numeric) when choosing a restaurant? </a:t>
-            </a:r>
-          </a:p>
-          <a:p>
-            <a:pPr lvl="1"/>
-            <a:endParaRPr lang="en-US" dirty="0">
-              <a:latin typeface="+mn-lt"/>
-            </a:endParaRPr>
-          </a:p>
-          <a:p>
-            <a:pPr marL="0" indent="0">
-              <a:buNone/>
-            </a:pPr>
-            <a:r>
-              <a:rPr lang="en-US" i="1" dirty="0">
-                <a:latin typeface="+mn-lt"/>
-              </a:rPr>
-              <a:t>Important Note: There is some controversy around methodology for combining distance metrics of different data types. Some textbooks and theoreticians say combining types should never be done. Pragmatists, claim realize we must do something, even if questionable. </a:t>
-            </a:r>
-          </a:p>
-        </p:txBody>
-      </p:sp>
-    </p:spTree>
-    <p:extLst>
-      <p:ext uri="{BB962C8B-B14F-4D97-AF65-F5344CB8AC3E}">
-        <p14:creationId xmlns:p14="http://schemas.microsoft.com/office/powerpoint/2010/main" val="2216943977"/>
-      </p:ext>
-    </p:extLst>
-  </p:cSld>
-  <p:clrMapOvr>
-    <a:masterClrMapping/>
-  </p:clrMapOvr>
-  <p:timing>
-    <p:tnLst>
-      <p:par>
-        <p:cTn id="1" dur="indefinite" restart="never" nodeType="tmRoot">
-          <p:childTnLst>
-            <p:seq concurrent="1" nextAc="seek">
-              <p:cTn id="2" dur="indefinite" nodeType="mainSeq">
-                <p:childTnLst>
-                  <p:par>
-                    <p:cTn id="3" fill="hold">
-                      <p:stCondLst>
-                        <p:cond delay="indefinite"/>
-                      </p:stCondLst>
-                      <p:childTnLst>
-                        <p:par>
-                          <p:cTn id="4" fill="hold">
-                            <p:stCondLst>
-                              <p:cond delay="0"/>
-                            </p:stCondLst>
-                            <p:childTnLst>
-                              <p:par>
-                                <p:cTn id="5" presetID="1" presetClass="entr" presetSubtype="0" fill="hold" nodeType="clickEffect">
-                                  <p:stCondLst>
-                                    <p:cond delay="0"/>
-                                  </p:stCondLst>
-                                  <p:childTnLst>
-                                    <p:set>
-                                      <p:cBhvr>
-                                        <p:cTn id="6" dur="1" fill="hold">
-                                          <p:stCondLst>
-                                            <p:cond delay="0"/>
-                                          </p:stCondLst>
-                                        </p:cTn>
-                                        <p:tgtEl>
-                                          <p:spTgt spid="3">
-                                            <p:txEl>
-                                              <p:pRg st="1" end="1"/>
-                                            </p:txEl>
-                                          </p:spTgt>
-                                        </p:tgtEl>
-                                        <p:attrNameLst>
-                                          <p:attrName>style.visibility</p:attrName>
-                                        </p:attrNameLst>
-                                      </p:cBhvr>
-                                      <p:to>
-                                        <p:strVal val="visible"/>
-                                      </p:to>
-                                    </p:set>
-                                  </p:childTnLst>
-                                </p:cTn>
-                              </p:par>
-                            </p:childTnLst>
-                          </p:cTn>
-                        </p:par>
-                      </p:childTnLst>
-                    </p:cTn>
-                  </p:par>
-                  <p:par>
-                    <p:cTn id="7" fill="hold">
-                      <p:stCondLst>
-                        <p:cond delay="indefinite"/>
-                      </p:stCondLst>
-                      <p:childTnLst>
-                        <p:par>
-                          <p:cTn id="8" fill="hold">
-                            <p:stCondLst>
-                              <p:cond delay="0"/>
-                            </p:stCondLst>
-                            <p:childTnLst>
-                              <p:par>
-                                <p:cTn id="9" presetID="1" presetClass="entr" presetSubtype="0" fill="hold" nodeType="clickEffect">
-                                  <p:stCondLst>
-                                    <p:cond delay="0"/>
-                                  </p:stCondLst>
-                                  <p:childTnLst>
-                                    <p:set>
-                                      <p:cBhvr>
-                                        <p:cTn id="10" dur="1" fill="hold">
-                                          <p:stCondLst>
-                                            <p:cond delay="0"/>
-                                          </p:stCondLst>
-                                        </p:cTn>
-                                        <p:tgtEl>
-                                          <p:spTgt spid="3">
-                                            <p:txEl>
-                                              <p:pRg st="2" end="2"/>
-                                            </p:txEl>
-                                          </p:spTgt>
-                                        </p:tgtEl>
-                                        <p:attrNameLst>
-                                          <p:attrName>style.visibility</p:attrName>
-                                        </p:attrNameLst>
-                                      </p:cBhvr>
-                                      <p:to>
-                                        <p:strVal val="visible"/>
-                                      </p:to>
-                                    </p:set>
-                                  </p:childTnLst>
-                                </p:cTn>
-                              </p:par>
-                              <p:par>
-                                <p:cTn id="11" presetID="1" presetClass="entr" presetSubtype="0" fill="hold" nodeType="withEffect">
-                                  <p:stCondLst>
-                                    <p:cond delay="0"/>
-                                  </p:stCondLst>
-                                  <p:childTnLst>
-                                    <p:set>
-                                      <p:cBhvr>
-                                        <p:cTn id="12" dur="1" fill="hold">
-                                          <p:stCondLst>
-                                            <p:cond delay="0"/>
-                                          </p:stCondLst>
-                                        </p:cTn>
-                                        <p:tgtEl>
-                                          <p:spTgt spid="3">
-                                            <p:txEl>
-                                              <p:pRg st="3" end="3"/>
-                                            </p:txEl>
-                                          </p:spTgt>
-                                        </p:tgtEl>
-                                        <p:attrNameLst>
-                                          <p:attrName>style.visibility</p:attrName>
-                                        </p:attrNameLst>
-                                      </p:cBhvr>
-                                      <p:to>
-                                        <p:strVal val="visible"/>
-                                      </p:to>
-                                    </p:set>
-                                  </p:childTnLst>
-                                </p:cTn>
-                              </p:par>
-                              <p:par>
-                                <p:cTn id="13" presetID="1" presetClass="entr" presetSubtype="0" fill="hold" nodeType="withEffect">
-                                  <p:stCondLst>
-                                    <p:cond delay="0"/>
-                                  </p:stCondLst>
-                                  <p:childTnLst>
-                                    <p:set>
-                                      <p:cBhvr>
-                                        <p:cTn id="14" dur="1" fill="hold">
-                                          <p:stCondLst>
-                                            <p:cond delay="0"/>
-                                          </p:stCondLst>
-                                        </p:cTn>
-                                        <p:tgtEl>
-                                          <p:spTgt spid="3">
-                                            <p:txEl>
-                                              <p:pRg st="4" end="4"/>
-                                            </p:txEl>
-                                          </p:spTgt>
-                                        </p:tgtEl>
-                                        <p:attrNameLst>
-                                          <p:attrName>style.visibility</p:attrName>
-                                        </p:attrNameLst>
-                                      </p:cBhvr>
-                                      <p:to>
-                                        <p:strVal val="visible"/>
-                                      </p:to>
-                                    </p:set>
-                                  </p:childTnLst>
-                                </p:cTn>
-                              </p:par>
-                            </p:childTnLst>
-                          </p:cTn>
-                        </p:par>
-                      </p:childTnLst>
-                    </p:cTn>
-                  </p:par>
-                  <p:par>
-                    <p:cTn id="15" fill="hold">
-                      <p:stCondLst>
-                        <p:cond delay="indefinite"/>
-                      </p:stCondLst>
-                      <p:childTnLst>
-                        <p:par>
-                          <p:cTn id="16" fill="hold">
-                            <p:stCondLst>
-                              <p:cond delay="0"/>
-                            </p:stCondLst>
-                            <p:childTnLst>
-                              <p:par>
-                                <p:cTn id="17" presetID="1" presetClass="entr" presetSubtype="0" fill="hold" nodeType="clickEffect">
-                                  <p:stCondLst>
-                                    <p:cond delay="0"/>
-                                  </p:stCondLst>
-                                  <p:childTnLst>
-                                    <p:set>
-                                      <p:cBhvr>
-                                        <p:cTn id="18" dur="1" fill="hold">
-                                          <p:stCondLst>
-                                            <p:cond delay="0"/>
-                                          </p:stCondLst>
-                                        </p:cTn>
-                                        <p:tgtEl>
-                                          <p:spTgt spid="3">
-                                            <p:txEl>
-                                              <p:pRg st="5" end="5"/>
-                                            </p:txEl>
-                                          </p:spTgt>
-                                        </p:tgtEl>
-                                        <p:attrNameLst>
-                                          <p:attrName>style.visibility</p:attrName>
-                                        </p:attrNameLst>
-                                      </p:cBhvr>
-                                      <p:to>
-                                        <p:strVal val="visible"/>
-                                      </p:to>
-                                    </p:set>
-                                  </p:childTnLst>
-                                </p:cTn>
-                              </p:par>
-                              <p:par>
-                                <p:cTn id="19" presetID="1" presetClass="entr" presetSubtype="0" fill="hold" nodeType="withEffect">
-                                  <p:stCondLst>
-                                    <p:cond delay="0"/>
-                                  </p:stCondLst>
-                                  <p:childTnLst>
-                                    <p:set>
-                                      <p:cBhvr>
-                                        <p:cTn id="20" dur="1" fill="hold">
-                                          <p:stCondLst>
-                                            <p:cond delay="0"/>
-                                          </p:stCondLst>
-                                        </p:cTn>
-                                        <p:tgtEl>
-                                          <p:spTgt spid="3">
-                                            <p:txEl>
-                                              <p:pRg st="6" end="6"/>
-                                            </p:txEl>
-                                          </p:spTgt>
-                                        </p:tgtEl>
-                                        <p:attrNameLst>
-                                          <p:attrName>style.visibility</p:attrName>
-                                        </p:attrNameLst>
-                                      </p:cBhvr>
-                                      <p:to>
-                                        <p:strVal val="visible"/>
-                                      </p:to>
-                                    </p:set>
-                                  </p:childTnLst>
-                                </p:cTn>
-                              </p:par>
-                              <p:par>
-                                <p:cTn id="21" presetID="1" presetClass="entr" presetSubtype="0" fill="hold" nodeType="withEffect">
-                                  <p:stCondLst>
-                                    <p:cond delay="0"/>
-                                  </p:stCondLst>
-                                  <p:childTnLst>
-                                    <p:set>
-                                      <p:cBhvr>
-                                        <p:cTn id="22" dur="1" fill="hold">
-                                          <p:stCondLst>
-                                            <p:cond delay="0"/>
-                                          </p:stCondLst>
-                                        </p:cTn>
-                                        <p:tgtEl>
-                                          <p:spTgt spid="3">
-                                            <p:txEl>
-                                              <p:pRg st="7" end="7"/>
-                                            </p:txEl>
-                                          </p:spTgt>
-                                        </p:tgtEl>
-                                        <p:attrNameLst>
-                                          <p:attrName>style.visibility</p:attrName>
-                                        </p:attrNameLst>
-                                      </p:cBhvr>
-                                      <p:to>
-                                        <p:strVal val="visible"/>
-                                      </p:to>
-                                    </p:set>
-                                  </p:childTnLst>
-                                </p:cTn>
-                              </p:par>
-                              <p:par>
-                                <p:cTn id="23" presetID="1" presetClass="entr" presetSubtype="0" fill="hold" nodeType="withEffect">
-                                  <p:stCondLst>
-                                    <p:cond delay="0"/>
-                                  </p:stCondLst>
-                                  <p:childTnLst>
-                                    <p:set>
-                                      <p:cBhvr>
-                                        <p:cTn id="24" dur="1" fill="hold">
-                                          <p:stCondLst>
-                                            <p:cond delay="0"/>
-                                          </p:stCondLst>
-                                        </p:cTn>
-                                        <p:tgtEl>
-                                          <p:spTgt spid="3">
-                                            <p:txEl>
-                                              <p:pRg st="9" end="9"/>
-                                            </p:txEl>
-                                          </p:spTgt>
-                                        </p:tgtEl>
-                                        <p:attrNameLst>
-                                          <p:attrName>style.visibility</p:attrName>
-                                        </p:attrNameLst>
-                                      </p:cBhvr>
-                                      <p:to>
-                                        <p:strVal val="visible"/>
-                                      </p:to>
-                                    </p:set>
-                                  </p:childTnLst>
-                                </p:cTn>
-                              </p:par>
-                            </p:childTnLst>
-                          </p:cTn>
-                        </p:par>
-                      </p:childTnLst>
-                    </p:cTn>
-                  </p:par>
-                </p:childTnLst>
-              </p:cTn>
-              <p:prevCondLst>
-                <p:cond evt="onPrev" delay="0">
-                  <p:tgtEl>
-                    <p:sldTgt/>
-                  </p:tgtEl>
-                </p:cond>
-              </p:prevCondLst>
-              <p:nextCondLst>
-                <p:cond evt="onNext" delay="0">
-                  <p:tgtEl>
-                    <p:sldTgt/>
-                  </p:tgtEl>
-                </p:cond>
-              </p:nextCondLst>
-            </p:seq>
-          </p:childTnLst>
-        </p:cTn>
-      </p:par>
-    </p:tnLst>
-  </p:timing>
-</p:sld>
-</file>
-
 <file path=ppt/slides/slide2.xml><?xml version="1.0" encoding="utf-8"?>
 <p:sld xmlns:a="http://schemas.openxmlformats.org/drawingml/2006/main" xmlns:r="http://schemas.openxmlformats.org/officeDocument/2006/relationships" xmlns:p="http://schemas.openxmlformats.org/presentationml/2006/main">
   <p:cSld>
@@ -16558,6 +16886,508 @@
 </file>
 
 <file path=ppt/slides/slide20.xml><?xml version="1.0" encoding="utf-8"?>
+<p:sld xmlns:a="http://schemas.openxmlformats.org/drawingml/2006/main" xmlns:r="http://schemas.openxmlformats.org/officeDocument/2006/relationships" xmlns:p="http://schemas.openxmlformats.org/presentationml/2006/main">
+  <p:cSld>
+    <p:spTree>
+      <p:nvGrpSpPr>
+        <p:cNvPr id="1" name=""/>
+        <p:cNvGrpSpPr/>
+        <p:nvPr/>
+      </p:nvGrpSpPr>
+      <p:grpSpPr>
+        <a:xfrm>
+          <a:off x="0" y="0"/>
+          <a:ext cx="0" cy="0"/>
+          <a:chOff x="0" y="0"/>
+          <a:chExt cx="0" cy="0"/>
+        </a:xfrm>
+      </p:grpSpPr>
+      <p:sp>
+        <p:nvSpPr>
+          <p:cNvPr id="2" name="Title 1"/>
+          <p:cNvSpPr>
+            <a:spLocks noGrp="1"/>
+          </p:cNvSpPr>
+          <p:nvPr>
+            <p:ph type="title"/>
+          </p:nvPr>
+        </p:nvSpPr>
+        <p:spPr>
+          <a:xfrm>
+            <a:off x="584200" y="221992"/>
+            <a:ext cx="10515600" cy="530954"/>
+          </a:xfrm>
+        </p:spPr>
+        <p:txBody>
+          <a:bodyPr>
+            <a:normAutofit fontScale="90000"/>
+          </a:bodyPr>
+          <a:lstStyle/>
+          <a:p>
+            <a:r>
+              <a:rPr lang="en-US" dirty="0"/>
+              <a:t>Measuring distance or dissimilarity</a:t>
+            </a:r>
+          </a:p>
+        </p:txBody>
+      </p:sp>
+      <p:sp>
+        <p:nvSpPr>
+          <p:cNvPr id="3" name="Content Placeholder 2"/>
+          <p:cNvSpPr>
+            <a:spLocks noGrp="1"/>
+          </p:cNvSpPr>
+          <p:nvPr>
+            <p:ph sz="quarter" idx="10"/>
+          </p:nvPr>
+        </p:nvSpPr>
+        <p:spPr>
+          <a:xfrm>
+            <a:off x="333375" y="896079"/>
+            <a:ext cx="11525250" cy="5698998"/>
+          </a:xfrm>
+        </p:spPr>
+        <p:txBody>
+          <a:bodyPr>
+            <a:normAutofit lnSpcReduction="10000"/>
+          </a:bodyPr>
+          <a:lstStyle/>
+          <a:p>
+            <a:pPr marL="0" indent="0">
+              <a:buNone/>
+            </a:pPr>
+            <a:r>
+              <a:rPr lang="en-US" dirty="0">
+                <a:latin typeface="+mn-lt"/>
+              </a:rPr>
+              <a:t>Can we combine dissimilarities of different types of variables</a:t>
+            </a:r>
+          </a:p>
+          <a:p>
+            <a:r>
+              <a:rPr lang="en-US" dirty="0">
+                <a:latin typeface="+mn-lt"/>
+              </a:rPr>
+              <a:t>Yes, but with carefully!</a:t>
+            </a:r>
+          </a:p>
+          <a:p>
+            <a:r>
+              <a:rPr lang="en-US" dirty="0">
+                <a:latin typeface="+mn-lt"/>
+              </a:rPr>
+              <a:t>Scaling important, or some variable types dominate as a result of coding</a:t>
+            </a:r>
+          </a:p>
+          <a:p>
+            <a:pPr lvl="1"/>
+            <a:r>
+              <a:rPr lang="en-US" dirty="0">
+                <a:latin typeface="+mn-lt"/>
+              </a:rPr>
+              <a:t>The numeric range of values must be similar</a:t>
+            </a:r>
+          </a:p>
+          <a:p>
+            <a:pPr lvl="1"/>
+            <a:r>
+              <a:rPr lang="en-US" dirty="0">
+                <a:latin typeface="+mn-lt"/>
+              </a:rPr>
+              <a:t>e.g. We do not want ordinal variables to dominate numeric and categorical</a:t>
+            </a:r>
+          </a:p>
+          <a:p>
+            <a:r>
+              <a:rPr lang="en-US" dirty="0">
+                <a:latin typeface="+mn-lt"/>
+              </a:rPr>
+              <a:t>But, weighting is problem dependent!</a:t>
+            </a:r>
+          </a:p>
+          <a:p>
+            <a:pPr lvl="1"/>
+            <a:r>
+              <a:rPr lang="en-US" dirty="0">
+                <a:latin typeface="+mn-lt"/>
+              </a:rPr>
+              <a:t>Unfortunately, no simple procedure for correct weighting</a:t>
+            </a:r>
+          </a:p>
+          <a:p>
+            <a:pPr lvl="1"/>
+            <a:r>
+              <a:rPr lang="en-US" dirty="0">
+                <a:latin typeface="+mn-lt"/>
+              </a:rPr>
+              <a:t>Do I care more about the (ordinal) star rating or calories of the meal (numeric) when choosing a restaurant? </a:t>
+            </a:r>
+          </a:p>
+          <a:p>
+            <a:pPr lvl="1"/>
+            <a:endParaRPr lang="en-US" dirty="0">
+              <a:latin typeface="+mn-lt"/>
+            </a:endParaRPr>
+          </a:p>
+          <a:p>
+            <a:pPr marL="0" indent="0">
+              <a:buNone/>
+            </a:pPr>
+            <a:r>
+              <a:rPr lang="en-US" sz="2400" i="1" dirty="0">
+                <a:latin typeface="+mn-lt"/>
+              </a:rPr>
+              <a:t>Important Note: There is some controversy around methodology for combining distance metrics of different data types. Some textbooks and theoreticians say combining types should never be done. Pragmatists, claim realize we must do something, even if questionable. </a:t>
+            </a:r>
+          </a:p>
+        </p:txBody>
+      </p:sp>
+    </p:spTree>
+    <p:extLst>
+      <p:ext uri="{BB962C8B-B14F-4D97-AF65-F5344CB8AC3E}">
+        <p14:creationId xmlns:p14="http://schemas.microsoft.com/office/powerpoint/2010/main" val="2216943977"/>
+      </p:ext>
+    </p:extLst>
+  </p:cSld>
+  <p:clrMapOvr>
+    <a:masterClrMapping/>
+  </p:clrMapOvr>
+  <p:timing>
+    <p:tnLst>
+      <p:par>
+        <p:cTn id="1" dur="indefinite" restart="never" nodeType="tmRoot">
+          <p:childTnLst>
+            <p:seq concurrent="1" nextAc="seek">
+              <p:cTn id="2" dur="indefinite" nodeType="mainSeq">
+                <p:childTnLst>
+                  <p:par>
+                    <p:cTn id="3" fill="hold">
+                      <p:stCondLst>
+                        <p:cond delay="indefinite"/>
+                      </p:stCondLst>
+                      <p:childTnLst>
+                        <p:par>
+                          <p:cTn id="4" fill="hold">
+                            <p:stCondLst>
+                              <p:cond delay="0"/>
+                            </p:stCondLst>
+                            <p:childTnLst>
+                              <p:par>
+                                <p:cTn id="5" presetID="1" presetClass="entr" presetSubtype="0" fill="hold" nodeType="clickEffect">
+                                  <p:stCondLst>
+                                    <p:cond delay="0"/>
+                                  </p:stCondLst>
+                                  <p:childTnLst>
+                                    <p:set>
+                                      <p:cBhvr>
+                                        <p:cTn id="6" dur="1" fill="hold">
+                                          <p:stCondLst>
+                                            <p:cond delay="0"/>
+                                          </p:stCondLst>
+                                        </p:cTn>
+                                        <p:tgtEl>
+                                          <p:spTgt spid="3">
+                                            <p:txEl>
+                                              <p:pRg st="1" end="1"/>
+                                            </p:txEl>
+                                          </p:spTgt>
+                                        </p:tgtEl>
+                                        <p:attrNameLst>
+                                          <p:attrName>style.visibility</p:attrName>
+                                        </p:attrNameLst>
+                                      </p:cBhvr>
+                                      <p:to>
+                                        <p:strVal val="visible"/>
+                                      </p:to>
+                                    </p:set>
+                                  </p:childTnLst>
+                                </p:cTn>
+                              </p:par>
+                            </p:childTnLst>
+                          </p:cTn>
+                        </p:par>
+                      </p:childTnLst>
+                    </p:cTn>
+                  </p:par>
+                  <p:par>
+                    <p:cTn id="7" fill="hold">
+                      <p:stCondLst>
+                        <p:cond delay="indefinite"/>
+                      </p:stCondLst>
+                      <p:childTnLst>
+                        <p:par>
+                          <p:cTn id="8" fill="hold">
+                            <p:stCondLst>
+                              <p:cond delay="0"/>
+                            </p:stCondLst>
+                            <p:childTnLst>
+                              <p:par>
+                                <p:cTn id="9" presetID="1" presetClass="entr" presetSubtype="0" fill="hold" nodeType="clickEffect">
+                                  <p:stCondLst>
+                                    <p:cond delay="0"/>
+                                  </p:stCondLst>
+                                  <p:childTnLst>
+                                    <p:set>
+                                      <p:cBhvr>
+                                        <p:cTn id="10" dur="1" fill="hold">
+                                          <p:stCondLst>
+                                            <p:cond delay="0"/>
+                                          </p:stCondLst>
+                                        </p:cTn>
+                                        <p:tgtEl>
+                                          <p:spTgt spid="3">
+                                            <p:txEl>
+                                              <p:pRg st="2" end="2"/>
+                                            </p:txEl>
+                                          </p:spTgt>
+                                        </p:tgtEl>
+                                        <p:attrNameLst>
+                                          <p:attrName>style.visibility</p:attrName>
+                                        </p:attrNameLst>
+                                      </p:cBhvr>
+                                      <p:to>
+                                        <p:strVal val="visible"/>
+                                      </p:to>
+                                    </p:set>
+                                  </p:childTnLst>
+                                </p:cTn>
+                              </p:par>
+                              <p:par>
+                                <p:cTn id="11" presetID="1" presetClass="entr" presetSubtype="0" fill="hold" nodeType="withEffect">
+                                  <p:stCondLst>
+                                    <p:cond delay="0"/>
+                                  </p:stCondLst>
+                                  <p:childTnLst>
+                                    <p:set>
+                                      <p:cBhvr>
+                                        <p:cTn id="12" dur="1" fill="hold">
+                                          <p:stCondLst>
+                                            <p:cond delay="0"/>
+                                          </p:stCondLst>
+                                        </p:cTn>
+                                        <p:tgtEl>
+                                          <p:spTgt spid="3">
+                                            <p:txEl>
+                                              <p:pRg st="3" end="3"/>
+                                            </p:txEl>
+                                          </p:spTgt>
+                                        </p:tgtEl>
+                                        <p:attrNameLst>
+                                          <p:attrName>style.visibility</p:attrName>
+                                        </p:attrNameLst>
+                                      </p:cBhvr>
+                                      <p:to>
+                                        <p:strVal val="visible"/>
+                                      </p:to>
+                                    </p:set>
+                                  </p:childTnLst>
+                                </p:cTn>
+                              </p:par>
+                              <p:par>
+                                <p:cTn id="13" presetID="1" presetClass="entr" presetSubtype="0" fill="hold" nodeType="withEffect">
+                                  <p:stCondLst>
+                                    <p:cond delay="0"/>
+                                  </p:stCondLst>
+                                  <p:childTnLst>
+                                    <p:set>
+                                      <p:cBhvr>
+                                        <p:cTn id="14" dur="1" fill="hold">
+                                          <p:stCondLst>
+                                            <p:cond delay="0"/>
+                                          </p:stCondLst>
+                                        </p:cTn>
+                                        <p:tgtEl>
+                                          <p:spTgt spid="3">
+                                            <p:txEl>
+                                              <p:pRg st="4" end="4"/>
+                                            </p:txEl>
+                                          </p:spTgt>
+                                        </p:tgtEl>
+                                        <p:attrNameLst>
+                                          <p:attrName>style.visibility</p:attrName>
+                                        </p:attrNameLst>
+                                      </p:cBhvr>
+                                      <p:to>
+                                        <p:strVal val="visible"/>
+                                      </p:to>
+                                    </p:set>
+                                  </p:childTnLst>
+                                </p:cTn>
+                              </p:par>
+                            </p:childTnLst>
+                          </p:cTn>
+                        </p:par>
+                      </p:childTnLst>
+                    </p:cTn>
+                  </p:par>
+                  <p:par>
+                    <p:cTn id="15" fill="hold">
+                      <p:stCondLst>
+                        <p:cond delay="indefinite"/>
+                      </p:stCondLst>
+                      <p:childTnLst>
+                        <p:par>
+                          <p:cTn id="16" fill="hold">
+                            <p:stCondLst>
+                              <p:cond delay="0"/>
+                            </p:stCondLst>
+                            <p:childTnLst>
+                              <p:par>
+                                <p:cTn id="17" presetID="1" presetClass="entr" presetSubtype="0" fill="hold" nodeType="clickEffect">
+                                  <p:stCondLst>
+                                    <p:cond delay="0"/>
+                                  </p:stCondLst>
+                                  <p:childTnLst>
+                                    <p:set>
+                                      <p:cBhvr>
+                                        <p:cTn id="18" dur="1" fill="hold">
+                                          <p:stCondLst>
+                                            <p:cond delay="0"/>
+                                          </p:stCondLst>
+                                        </p:cTn>
+                                        <p:tgtEl>
+                                          <p:spTgt spid="3">
+                                            <p:txEl>
+                                              <p:pRg st="5" end="5"/>
+                                            </p:txEl>
+                                          </p:spTgt>
+                                        </p:tgtEl>
+                                        <p:attrNameLst>
+                                          <p:attrName>style.visibility</p:attrName>
+                                        </p:attrNameLst>
+                                      </p:cBhvr>
+                                      <p:to>
+                                        <p:strVal val="visible"/>
+                                      </p:to>
+                                    </p:set>
+                                  </p:childTnLst>
+                                </p:cTn>
+                              </p:par>
+                              <p:par>
+                                <p:cTn id="19" presetID="1" presetClass="entr" presetSubtype="0" fill="hold" nodeType="withEffect">
+                                  <p:stCondLst>
+                                    <p:cond delay="0"/>
+                                  </p:stCondLst>
+                                  <p:childTnLst>
+                                    <p:set>
+                                      <p:cBhvr>
+                                        <p:cTn id="20" dur="1" fill="hold">
+                                          <p:stCondLst>
+                                            <p:cond delay="0"/>
+                                          </p:stCondLst>
+                                        </p:cTn>
+                                        <p:tgtEl>
+                                          <p:spTgt spid="3">
+                                            <p:txEl>
+                                              <p:pRg st="6" end="6"/>
+                                            </p:txEl>
+                                          </p:spTgt>
+                                        </p:tgtEl>
+                                        <p:attrNameLst>
+                                          <p:attrName>style.visibility</p:attrName>
+                                        </p:attrNameLst>
+                                      </p:cBhvr>
+                                      <p:to>
+                                        <p:strVal val="visible"/>
+                                      </p:to>
+                                    </p:set>
+                                  </p:childTnLst>
+                                </p:cTn>
+                              </p:par>
+                              <p:par>
+                                <p:cTn id="21" presetID="1" presetClass="entr" presetSubtype="0" fill="hold" nodeType="withEffect">
+                                  <p:stCondLst>
+                                    <p:cond delay="0"/>
+                                  </p:stCondLst>
+                                  <p:childTnLst>
+                                    <p:set>
+                                      <p:cBhvr>
+                                        <p:cTn id="22" dur="1" fill="hold">
+                                          <p:stCondLst>
+                                            <p:cond delay="0"/>
+                                          </p:stCondLst>
+                                        </p:cTn>
+                                        <p:tgtEl>
+                                          <p:spTgt spid="3">
+                                            <p:txEl>
+                                              <p:pRg st="7" end="7"/>
+                                            </p:txEl>
+                                          </p:spTgt>
+                                        </p:tgtEl>
+                                        <p:attrNameLst>
+                                          <p:attrName>style.visibility</p:attrName>
+                                        </p:attrNameLst>
+                                      </p:cBhvr>
+                                      <p:to>
+                                        <p:strVal val="visible"/>
+                                      </p:to>
+                                    </p:set>
+                                  </p:childTnLst>
+                                </p:cTn>
+                              </p:par>
+                              <p:par>
+                                <p:cTn id="23" presetID="1" presetClass="entr" presetSubtype="0" fill="hold" nodeType="withEffect">
+                                  <p:stCondLst>
+                                    <p:cond delay="0"/>
+                                  </p:stCondLst>
+                                  <p:childTnLst>
+                                    <p:set>
+                                      <p:cBhvr>
+                                        <p:cTn id="24" dur="1" fill="hold">
+                                          <p:stCondLst>
+                                            <p:cond delay="0"/>
+                                          </p:stCondLst>
+                                        </p:cTn>
+                                        <p:tgtEl>
+                                          <p:spTgt spid="3">
+                                            <p:txEl>
+                                              <p:pRg st="9" end="9"/>
+                                            </p:txEl>
+                                          </p:spTgt>
+                                        </p:tgtEl>
+                                        <p:attrNameLst>
+                                          <p:attrName>style.visibility</p:attrName>
+                                        </p:attrNameLst>
+                                      </p:cBhvr>
+                                      <p:to>
+                                        <p:strVal val="visible"/>
+                                      </p:to>
+                                    </p:set>
+                                  </p:childTnLst>
+                                </p:cTn>
+                              </p:par>
+                            </p:childTnLst>
+                          </p:cTn>
+                        </p:par>
+                      </p:childTnLst>
+                    </p:cTn>
+                  </p:par>
+                </p:childTnLst>
+              </p:cTn>
+              <p:prevCondLst>
+                <p:cond evt="onPrev" delay="0">
+                  <p:tgtEl>
+                    <p:sldTgt/>
+                  </p:tgtEl>
+                </p:cond>
+              </p:prevCondLst>
+              <p:nextCondLst>
+                <p:cond evt="onNext" delay="0">
+                  <p:tgtEl>
+                    <p:sldTgt/>
+                  </p:tgtEl>
+                </p:cond>
+              </p:nextCondLst>
+            </p:seq>
+          </p:childTnLst>
+        </p:cTn>
+      </p:par>
+    </p:tnLst>
+  </p:timing>
+</p:sld>
+</file>
+
+<file path=ppt/slides/slide21.xml><?xml version="1.0" encoding="utf-8"?>
 <p:sld xmlns:a="http://schemas.openxmlformats.org/drawingml/2006/main" xmlns:r="http://schemas.openxmlformats.org/officeDocument/2006/relationships" xmlns:p="http://schemas.openxmlformats.org/presentationml/2006/main">
   <p:cSld>
     <p:spTree>
@@ -17756,7 +18586,7 @@
 </p:sld>
 </file>
 
-<file path=ppt/slides/slide21.xml><?xml version="1.0" encoding="utf-8"?>
+<file path=ppt/slides/slide22.xml><?xml version="1.0" encoding="utf-8"?>
 <p:sld xmlns:a="http://schemas.openxmlformats.org/drawingml/2006/main" xmlns:r="http://schemas.openxmlformats.org/officeDocument/2006/relationships" xmlns:p="http://schemas.openxmlformats.org/presentationml/2006/main">
   <p:cSld>
     <p:spTree>
@@ -18987,7 +19817,7 @@
 </p:sld>
 </file>
 
-<file path=ppt/slides/slide22.xml><?xml version="1.0" encoding="utf-8"?>
+<file path=ppt/slides/slide23.xml><?xml version="1.0" encoding="utf-8"?>
 <p:sld xmlns:a="http://schemas.openxmlformats.org/drawingml/2006/main" xmlns:r="http://schemas.openxmlformats.org/officeDocument/2006/relationships" xmlns:p="http://schemas.openxmlformats.org/presentationml/2006/main">
   <p:cSld>
     <p:spTree>
@@ -19673,7 +20503,7 @@
 </p:sld>
 </file>
 
-<file path=ppt/slides/slide23.xml><?xml version="1.0" encoding="utf-8"?>
+<file path=ppt/slides/slide24.xml><?xml version="1.0" encoding="utf-8"?>
 <p:sld xmlns:a="http://schemas.openxmlformats.org/drawingml/2006/main" xmlns:r="http://schemas.openxmlformats.org/officeDocument/2006/relationships" xmlns:p="http://schemas.openxmlformats.org/presentationml/2006/main">
   <p:cSld>
     <p:spTree>
@@ -19786,7 +20616,7 @@
               <a:rPr lang="en-US" dirty="0">
                 <a:latin typeface="+mn-lt"/>
               </a:rPr>
-              <a:t>In many cases, similarity measures can be transform to dissimilarity </a:t>
+              <a:t>In many cases, similarity measures can be transformed to dissimilarity </a:t>
             </a:r>
             <a:endParaRPr lang="en-US" b="1" dirty="0">
               <a:latin typeface="+mn-lt"/>
@@ -20319,7 +21149,7 @@
 </p:sld>
 </file>
 
-<file path=ppt/slides/slide24.xml><?xml version="1.0" encoding="utf-8"?>
+<file path=ppt/slides/slide25.xml><?xml version="1.0" encoding="utf-8"?>
 <p:sld xmlns:a="http://schemas.openxmlformats.org/drawingml/2006/main" xmlns:r="http://schemas.openxmlformats.org/officeDocument/2006/relationships" xmlns:p="http://schemas.openxmlformats.org/presentationml/2006/main">
   <p:cSld>
     <p:spTree>
@@ -21303,7 +22133,7 @@
 </p:sld>
 </file>
 
-<file path=ppt/slides/slide25.xml><?xml version="1.0" encoding="utf-8"?>
+<file path=ppt/slides/slide26.xml><?xml version="1.0" encoding="utf-8"?>
 <p:sld xmlns:a="http://schemas.openxmlformats.org/drawingml/2006/main" xmlns:r="http://schemas.openxmlformats.org/officeDocument/2006/relationships" xmlns:p="http://schemas.openxmlformats.org/presentationml/2006/main">
   <p:cSld>
     <p:spTree>
@@ -21387,8 +22217,15 @@
                 <a:r>
                   <a:rPr lang="en-US" b="1" dirty="0">
                     <a:latin typeface="+mn-lt"/>
+                    <a:hlinkClick r:id="rId3"/>
                   </a:rPr>
-                  <a:t>Jaccard Similarity:</a:t>
+                  <a:t>Jaccard Similarity</a:t>
+                </a:r>
+                <a:r>
+                  <a:rPr lang="en-US" b="1" dirty="0">
+                    <a:latin typeface="+mn-lt"/>
+                  </a:rPr>
+                  <a:t>:</a:t>
                 </a:r>
                 <a:r>
                   <a:rPr lang="en-US" dirty="0">
@@ -21742,7 +22579,7 @@
                   <a:rPr lang="en-US" sz="2400" dirty="0">
                     <a:latin typeface="+mn-lt"/>
                   </a:rPr>
-                  <a:t>:    :  </a:t>
+                  <a:t>:      </a:t>
                 </a:r>
               </a:p>
               <a:p>
@@ -22152,7 +22989,7 @@
                 <a:ext cx="11525250" cy="5698998"/>
               </a:xfrm>
               <a:blipFill>
-                <a:blip r:embed="rId3"/>
+                <a:blip r:embed="rId4"/>
                 <a:stretch>
                   <a:fillRect l="-1111" t="-2460"/>
                 </a:stretch>
@@ -22549,7 +23386,7 @@
 </p:sld>
 </file>
 
-<file path=ppt/slides/slide26.xml><?xml version="1.0" encoding="utf-8"?>
+<file path=ppt/slides/slide27.xml><?xml version="1.0" encoding="utf-8"?>
 <p:sld xmlns:a="http://schemas.openxmlformats.org/drawingml/2006/main" xmlns:r="http://schemas.openxmlformats.org/officeDocument/2006/relationships" xmlns:p="http://schemas.openxmlformats.org/presentationml/2006/main">
   <p:cSld>
     <p:spTree>
@@ -24407,7 +25244,7 @@
 </p:sld>
 </file>
 
-<file path=ppt/slides/slide27.xml><?xml version="1.0" encoding="utf-8"?>
+<file path=ppt/slides/slide28.xml><?xml version="1.0" encoding="utf-8"?>
 <p:sld xmlns:a="http://schemas.openxmlformats.org/drawingml/2006/main" xmlns:r="http://schemas.openxmlformats.org/officeDocument/2006/relationships" xmlns:p="http://schemas.openxmlformats.org/presentationml/2006/main">
   <p:cSld>
     <p:spTree>
@@ -26318,7 +27155,7 @@
 </p:sld>
 </file>
 
-<file path=ppt/slides/slide28.xml><?xml version="1.0" encoding="utf-8"?>
+<file path=ppt/slides/slide29.xml><?xml version="1.0" encoding="utf-8"?>
 <p:sld xmlns:a="http://schemas.openxmlformats.org/drawingml/2006/main" xmlns:r="http://schemas.openxmlformats.org/officeDocument/2006/relationships" xmlns:p="http://schemas.openxmlformats.org/presentationml/2006/main">
   <p:cSld>
     <p:spTree>
@@ -27872,7 +28709,567 @@
 </p:sld>
 </file>
 
-<file path=ppt/slides/slide29.xml><?xml version="1.0" encoding="utf-8"?>
+<file path=ppt/slides/slide3.xml><?xml version="1.0" encoding="utf-8"?>
+<p:sld xmlns:a="http://schemas.openxmlformats.org/drawingml/2006/main" xmlns:r="http://schemas.openxmlformats.org/officeDocument/2006/relationships" xmlns:p="http://schemas.openxmlformats.org/presentationml/2006/main">
+  <p:cSld>
+    <p:spTree>
+      <p:nvGrpSpPr>
+        <p:cNvPr id="1" name=""/>
+        <p:cNvGrpSpPr/>
+        <p:nvPr/>
+      </p:nvGrpSpPr>
+      <p:grpSpPr>
+        <a:xfrm>
+          <a:off x="0" y="0"/>
+          <a:ext cx="0" cy="0"/>
+          <a:chOff x="0" y="0"/>
+          <a:chExt cx="0" cy="0"/>
+        </a:xfrm>
+      </p:grpSpPr>
+      <p:sp>
+        <p:nvSpPr>
+          <p:cNvPr id="2" name="Title 1"/>
+          <p:cNvSpPr>
+            <a:spLocks noGrp="1"/>
+          </p:cNvSpPr>
+          <p:nvPr>
+            <p:ph type="title"/>
+          </p:nvPr>
+        </p:nvSpPr>
+        <p:spPr>
+          <a:xfrm>
+            <a:off x="584200" y="221992"/>
+            <a:ext cx="10515600" cy="530954"/>
+          </a:xfrm>
+        </p:spPr>
+        <p:txBody>
+          <a:bodyPr>
+            <a:normAutofit fontScale="90000"/>
+          </a:bodyPr>
+          <a:lstStyle/>
+          <a:p>
+            <a:r>
+              <a:rPr lang="en-US" dirty="0"/>
+              <a:t>Measuring similarity and dissimilarity</a:t>
+            </a:r>
+          </a:p>
+        </p:txBody>
+      </p:sp>
+      <p:sp>
+        <p:nvSpPr>
+          <p:cNvPr id="3" name="Content Placeholder 2"/>
+          <p:cNvSpPr>
+            <a:spLocks noGrp="1"/>
+          </p:cNvSpPr>
+          <p:nvPr>
+            <p:ph sz="quarter" idx="10"/>
+          </p:nvPr>
+        </p:nvSpPr>
+        <p:spPr>
+          <a:xfrm>
+            <a:off x="333375" y="896079"/>
+            <a:ext cx="11525250" cy="5290388"/>
+          </a:xfrm>
+        </p:spPr>
+        <p:txBody>
+          <a:bodyPr>
+            <a:normAutofit/>
+          </a:bodyPr>
+          <a:lstStyle/>
+          <a:p>
+            <a:pPr marL="0" indent="0">
+              <a:buNone/>
+            </a:pPr>
+            <a:r>
+              <a:rPr lang="en-US" dirty="0">
+                <a:latin typeface="+mn-lt"/>
+              </a:rPr>
+              <a:t>Measuring similarity and dissimilarity is fundamental to data mining</a:t>
+            </a:r>
+          </a:p>
+          <a:p>
+            <a:r>
+              <a:rPr lang="en-US" dirty="0">
+                <a:latin typeface="+mn-lt"/>
+              </a:rPr>
+              <a:t>Distance and similarity measures are the foundation of unsupervised learning</a:t>
+            </a:r>
+          </a:p>
+          <a:p>
+            <a:r>
+              <a:rPr lang="en-US" dirty="0">
+                <a:latin typeface="+mn-lt"/>
+              </a:rPr>
+              <a:t>A wide range of metrics used in data mining</a:t>
+            </a:r>
+          </a:p>
+          <a:p>
+            <a:r>
+              <a:rPr lang="en-US" dirty="0">
+                <a:latin typeface="+mn-lt"/>
+              </a:rPr>
+              <a:t>The metrics used must fit the nature of the data and the analysis </a:t>
+            </a:r>
+          </a:p>
+          <a:p>
+            <a:pPr lvl="1"/>
+            <a:r>
+              <a:rPr lang="en-US" dirty="0">
+                <a:latin typeface="+mn-lt"/>
+              </a:rPr>
+              <a:t>Binary data</a:t>
+            </a:r>
+          </a:p>
+          <a:p>
+            <a:pPr lvl="1"/>
+            <a:r>
+              <a:rPr lang="en-US" dirty="0">
+                <a:latin typeface="+mn-lt"/>
+              </a:rPr>
+              <a:t>Text strings</a:t>
+            </a:r>
+          </a:p>
+          <a:p>
+            <a:pPr lvl="1"/>
+            <a:r>
+              <a:rPr lang="en-US" dirty="0">
+                <a:latin typeface="+mn-lt"/>
+              </a:rPr>
+              <a:t>Numeric data</a:t>
+            </a:r>
+          </a:p>
+          <a:p>
+            <a:pPr lvl="1"/>
+            <a:r>
+              <a:rPr lang="en-US" dirty="0">
+                <a:latin typeface="+mn-lt"/>
+              </a:rPr>
+              <a:t>Ordinal data; e.g. rankings and ratings </a:t>
+            </a:r>
+          </a:p>
+          <a:p>
+            <a:pPr lvl="1"/>
+            <a:r>
+              <a:rPr lang="en-US" dirty="0">
+                <a:latin typeface="+mn-lt"/>
+              </a:rPr>
+              <a:t>Unordered categorical data</a:t>
+            </a:r>
+          </a:p>
+          <a:p>
+            <a:r>
+              <a:rPr lang="en-US" b="1" dirty="0">
+                <a:latin typeface="+mn-lt"/>
+              </a:rPr>
+              <a:t>There is no one best metric!</a:t>
+            </a:r>
+          </a:p>
+          <a:p>
+            <a:endParaRPr lang="en-US" sz="2800" dirty="0">
+              <a:latin typeface="+mn-lt"/>
+            </a:endParaRPr>
+          </a:p>
+          <a:p>
+            <a:pPr lvl="1"/>
+            <a:endParaRPr lang="en-US" dirty="0"/>
+          </a:p>
+        </p:txBody>
+      </p:sp>
+    </p:spTree>
+    <p:extLst>
+      <p:ext uri="{BB962C8B-B14F-4D97-AF65-F5344CB8AC3E}">
+        <p14:creationId xmlns:p14="http://schemas.microsoft.com/office/powerpoint/2010/main" val="312349696"/>
+      </p:ext>
+    </p:extLst>
+  </p:cSld>
+  <p:clrMapOvr>
+    <a:masterClrMapping/>
+  </p:clrMapOvr>
+  <p:timing>
+    <p:tnLst>
+      <p:par>
+        <p:cTn id="1" dur="indefinite" restart="never" nodeType="tmRoot">
+          <p:childTnLst>
+            <p:seq concurrent="1" nextAc="seek">
+              <p:cTn id="2" dur="indefinite" nodeType="mainSeq">
+                <p:childTnLst>
+                  <p:par>
+                    <p:cTn id="3" fill="hold">
+                      <p:stCondLst>
+                        <p:cond delay="indefinite"/>
+                      </p:stCondLst>
+                      <p:childTnLst>
+                        <p:par>
+                          <p:cTn id="4" fill="hold">
+                            <p:stCondLst>
+                              <p:cond delay="0"/>
+                            </p:stCondLst>
+                            <p:childTnLst>
+                              <p:par>
+                                <p:cTn id="5" presetID="1" presetClass="entr" presetSubtype="0" fill="hold" nodeType="clickEffect">
+                                  <p:stCondLst>
+                                    <p:cond delay="0"/>
+                                  </p:stCondLst>
+                                  <p:childTnLst>
+                                    <p:set>
+                                      <p:cBhvr>
+                                        <p:cTn id="6" dur="1" fill="hold">
+                                          <p:stCondLst>
+                                            <p:cond delay="0"/>
+                                          </p:stCondLst>
+                                        </p:cTn>
+                                        <p:tgtEl>
+                                          <p:spTgt spid="3">
+                                            <p:txEl>
+                                              <p:pRg st="1" end="1"/>
+                                            </p:txEl>
+                                          </p:spTgt>
+                                        </p:tgtEl>
+                                        <p:attrNameLst>
+                                          <p:attrName>style.visibility</p:attrName>
+                                        </p:attrNameLst>
+                                      </p:cBhvr>
+                                      <p:to>
+                                        <p:strVal val="visible"/>
+                                      </p:to>
+                                    </p:set>
+                                  </p:childTnLst>
+                                </p:cTn>
+                              </p:par>
+                            </p:childTnLst>
+                          </p:cTn>
+                        </p:par>
+                      </p:childTnLst>
+                    </p:cTn>
+                  </p:par>
+                  <p:par>
+                    <p:cTn id="7" fill="hold">
+                      <p:stCondLst>
+                        <p:cond delay="indefinite"/>
+                      </p:stCondLst>
+                      <p:childTnLst>
+                        <p:par>
+                          <p:cTn id="8" fill="hold">
+                            <p:stCondLst>
+                              <p:cond delay="0"/>
+                            </p:stCondLst>
+                            <p:childTnLst>
+                              <p:par>
+                                <p:cTn id="9" presetID="1" presetClass="entr" presetSubtype="0" fill="hold" nodeType="clickEffect">
+                                  <p:stCondLst>
+                                    <p:cond delay="0"/>
+                                  </p:stCondLst>
+                                  <p:childTnLst>
+                                    <p:set>
+                                      <p:cBhvr>
+                                        <p:cTn id="10" dur="1" fill="hold">
+                                          <p:stCondLst>
+                                            <p:cond delay="0"/>
+                                          </p:stCondLst>
+                                        </p:cTn>
+                                        <p:tgtEl>
+                                          <p:spTgt spid="3">
+                                            <p:txEl>
+                                              <p:pRg st="2" end="2"/>
+                                            </p:txEl>
+                                          </p:spTgt>
+                                        </p:tgtEl>
+                                        <p:attrNameLst>
+                                          <p:attrName>style.visibility</p:attrName>
+                                        </p:attrNameLst>
+                                      </p:cBhvr>
+                                      <p:to>
+                                        <p:strVal val="visible"/>
+                                      </p:to>
+                                    </p:set>
+                                  </p:childTnLst>
+                                </p:cTn>
+                              </p:par>
+                            </p:childTnLst>
+                          </p:cTn>
+                        </p:par>
+                      </p:childTnLst>
+                    </p:cTn>
+                  </p:par>
+                  <p:par>
+                    <p:cTn id="11" fill="hold">
+                      <p:stCondLst>
+                        <p:cond delay="indefinite"/>
+                      </p:stCondLst>
+                      <p:childTnLst>
+                        <p:par>
+                          <p:cTn id="12" fill="hold">
+                            <p:stCondLst>
+                              <p:cond delay="0"/>
+                            </p:stCondLst>
+                            <p:childTnLst>
+                              <p:par>
+                                <p:cTn id="13" presetID="1" presetClass="entr" presetSubtype="0" fill="hold" nodeType="clickEffect">
+                                  <p:stCondLst>
+                                    <p:cond delay="0"/>
+                                  </p:stCondLst>
+                                  <p:childTnLst>
+                                    <p:set>
+                                      <p:cBhvr>
+                                        <p:cTn id="14" dur="1" fill="hold">
+                                          <p:stCondLst>
+                                            <p:cond delay="0"/>
+                                          </p:stCondLst>
+                                        </p:cTn>
+                                        <p:tgtEl>
+                                          <p:spTgt spid="3">
+                                            <p:txEl>
+                                              <p:pRg st="3" end="3"/>
+                                            </p:txEl>
+                                          </p:spTgt>
+                                        </p:tgtEl>
+                                        <p:attrNameLst>
+                                          <p:attrName>style.visibility</p:attrName>
+                                        </p:attrNameLst>
+                                      </p:cBhvr>
+                                      <p:to>
+                                        <p:strVal val="visible"/>
+                                      </p:to>
+                                    </p:set>
+                                  </p:childTnLst>
+                                </p:cTn>
+                              </p:par>
+                              <p:par>
+                                <p:cTn id="15" presetID="1" presetClass="entr" presetSubtype="0" fill="hold" nodeType="withEffect">
+                                  <p:stCondLst>
+                                    <p:cond delay="0"/>
+                                  </p:stCondLst>
+                                  <p:childTnLst>
+                                    <p:set>
+                                      <p:cBhvr>
+                                        <p:cTn id="16" dur="1" fill="hold">
+                                          <p:stCondLst>
+                                            <p:cond delay="0"/>
+                                          </p:stCondLst>
+                                        </p:cTn>
+                                        <p:tgtEl>
+                                          <p:spTgt spid="3">
+                                            <p:txEl>
+                                              <p:pRg st="4" end="4"/>
+                                            </p:txEl>
+                                          </p:spTgt>
+                                        </p:tgtEl>
+                                        <p:attrNameLst>
+                                          <p:attrName>style.visibility</p:attrName>
+                                        </p:attrNameLst>
+                                      </p:cBhvr>
+                                      <p:to>
+                                        <p:strVal val="visible"/>
+                                      </p:to>
+                                    </p:set>
+                                  </p:childTnLst>
+                                </p:cTn>
+                              </p:par>
+                              <p:par>
+                                <p:cTn id="17" presetID="1" presetClass="entr" presetSubtype="0" fill="hold" nodeType="withEffect">
+                                  <p:stCondLst>
+                                    <p:cond delay="0"/>
+                                  </p:stCondLst>
+                                  <p:childTnLst>
+                                    <p:set>
+                                      <p:cBhvr>
+                                        <p:cTn id="18" dur="1" fill="hold">
+                                          <p:stCondLst>
+                                            <p:cond delay="0"/>
+                                          </p:stCondLst>
+                                        </p:cTn>
+                                        <p:tgtEl>
+                                          <p:spTgt spid="3">
+                                            <p:txEl>
+                                              <p:pRg st="5" end="5"/>
+                                            </p:txEl>
+                                          </p:spTgt>
+                                        </p:tgtEl>
+                                        <p:attrNameLst>
+                                          <p:attrName>style.visibility</p:attrName>
+                                        </p:attrNameLst>
+                                      </p:cBhvr>
+                                      <p:to>
+                                        <p:strVal val="visible"/>
+                                      </p:to>
+                                    </p:set>
+                                  </p:childTnLst>
+                                </p:cTn>
+                              </p:par>
+                              <p:par>
+                                <p:cTn id="19" presetID="1" presetClass="entr" presetSubtype="0" fill="hold" nodeType="withEffect">
+                                  <p:stCondLst>
+                                    <p:cond delay="0"/>
+                                  </p:stCondLst>
+                                  <p:childTnLst>
+                                    <p:set>
+                                      <p:cBhvr>
+                                        <p:cTn id="20" dur="1" fill="hold">
+                                          <p:stCondLst>
+                                            <p:cond delay="0"/>
+                                          </p:stCondLst>
+                                        </p:cTn>
+                                        <p:tgtEl>
+                                          <p:spTgt spid="3">
+                                            <p:txEl>
+                                              <p:pRg st="6" end="6"/>
+                                            </p:txEl>
+                                          </p:spTgt>
+                                        </p:tgtEl>
+                                        <p:attrNameLst>
+                                          <p:attrName>style.visibility</p:attrName>
+                                        </p:attrNameLst>
+                                      </p:cBhvr>
+                                      <p:to>
+                                        <p:strVal val="visible"/>
+                                      </p:to>
+                                    </p:set>
+                                  </p:childTnLst>
+                                </p:cTn>
+                              </p:par>
+                              <p:par>
+                                <p:cTn id="21" presetID="1" presetClass="entr" presetSubtype="0" fill="hold" nodeType="withEffect">
+                                  <p:stCondLst>
+                                    <p:cond delay="0"/>
+                                  </p:stCondLst>
+                                  <p:childTnLst>
+                                    <p:set>
+                                      <p:cBhvr>
+                                        <p:cTn id="22" dur="1" fill="hold">
+                                          <p:stCondLst>
+                                            <p:cond delay="0"/>
+                                          </p:stCondLst>
+                                        </p:cTn>
+                                        <p:tgtEl>
+                                          <p:spTgt spid="3">
+                                            <p:txEl>
+                                              <p:pRg st="7" end="7"/>
+                                            </p:txEl>
+                                          </p:spTgt>
+                                        </p:tgtEl>
+                                        <p:attrNameLst>
+                                          <p:attrName>style.visibility</p:attrName>
+                                        </p:attrNameLst>
+                                      </p:cBhvr>
+                                      <p:to>
+                                        <p:strVal val="visible"/>
+                                      </p:to>
+                                    </p:set>
+                                  </p:childTnLst>
+                                </p:cTn>
+                              </p:par>
+                              <p:par>
+                                <p:cTn id="23" presetID="1" presetClass="entr" presetSubtype="0" fill="hold" nodeType="withEffect">
+                                  <p:stCondLst>
+                                    <p:cond delay="0"/>
+                                  </p:stCondLst>
+                                  <p:childTnLst>
+                                    <p:set>
+                                      <p:cBhvr>
+                                        <p:cTn id="24" dur="1" fill="hold">
+                                          <p:stCondLst>
+                                            <p:cond delay="0"/>
+                                          </p:stCondLst>
+                                        </p:cTn>
+                                        <p:tgtEl>
+                                          <p:spTgt spid="3">
+                                            <p:txEl>
+                                              <p:pRg st="8" end="8"/>
+                                            </p:txEl>
+                                          </p:spTgt>
+                                        </p:tgtEl>
+                                        <p:attrNameLst>
+                                          <p:attrName>style.visibility</p:attrName>
+                                        </p:attrNameLst>
+                                      </p:cBhvr>
+                                      <p:to>
+                                        <p:strVal val="visible"/>
+                                      </p:to>
+                                    </p:set>
+                                  </p:childTnLst>
+                                </p:cTn>
+                              </p:par>
+                            </p:childTnLst>
+                          </p:cTn>
+                        </p:par>
+                      </p:childTnLst>
+                    </p:cTn>
+                  </p:par>
+                  <p:par>
+                    <p:cTn id="25" fill="hold">
+                      <p:stCondLst>
+                        <p:cond delay="indefinite"/>
+                      </p:stCondLst>
+                      <p:childTnLst>
+                        <p:par>
+                          <p:cTn id="26" fill="hold">
+                            <p:stCondLst>
+                              <p:cond delay="0"/>
+                            </p:stCondLst>
+                            <p:childTnLst>
+                              <p:par>
+                                <p:cTn id="27" presetID="1" presetClass="entr" presetSubtype="0" fill="hold" nodeType="clickEffect">
+                                  <p:stCondLst>
+                                    <p:cond delay="0"/>
+                                  </p:stCondLst>
+                                  <p:childTnLst>
+                                    <p:set>
+                                      <p:cBhvr>
+                                        <p:cTn id="28" dur="1" fill="hold">
+                                          <p:stCondLst>
+                                            <p:cond delay="0"/>
+                                          </p:stCondLst>
+                                        </p:cTn>
+                                        <p:tgtEl>
+                                          <p:spTgt spid="3">
+                                            <p:txEl>
+                                              <p:pRg st="9" end="9"/>
+                                            </p:txEl>
+                                          </p:spTgt>
+                                        </p:tgtEl>
+                                        <p:attrNameLst>
+                                          <p:attrName>style.visibility</p:attrName>
+                                        </p:attrNameLst>
+                                      </p:cBhvr>
+                                      <p:to>
+                                        <p:strVal val="visible"/>
+                                      </p:to>
+                                    </p:set>
+                                  </p:childTnLst>
+                                </p:cTn>
+                              </p:par>
+                            </p:childTnLst>
+                          </p:cTn>
+                        </p:par>
+                      </p:childTnLst>
+                    </p:cTn>
+                  </p:par>
+                </p:childTnLst>
+              </p:cTn>
+              <p:prevCondLst>
+                <p:cond evt="onPrev" delay="0">
+                  <p:tgtEl>
+                    <p:sldTgt/>
+                  </p:tgtEl>
+                </p:cond>
+              </p:prevCondLst>
+              <p:nextCondLst>
+                <p:cond evt="onNext" delay="0">
+                  <p:tgtEl>
+                    <p:sldTgt/>
+                  </p:tgtEl>
+                </p:cond>
+              </p:nextCondLst>
+            </p:seq>
+          </p:childTnLst>
+        </p:cTn>
+      </p:par>
+    </p:tnLst>
+  </p:timing>
+</p:sld>
+</file>
+
+<file path=ppt/slides/slide30.xml><?xml version="1.0" encoding="utf-8"?>
 <p:sld xmlns:a="http://schemas.openxmlformats.org/drawingml/2006/main" xmlns:r="http://schemas.openxmlformats.org/officeDocument/2006/relationships" xmlns:p="http://schemas.openxmlformats.org/presentationml/2006/main">
   <p:cSld>
     <p:spTree>
@@ -28732,567 +30129,7 @@
 </p:sld>
 </file>
 
-<file path=ppt/slides/slide3.xml><?xml version="1.0" encoding="utf-8"?>
-<p:sld xmlns:a="http://schemas.openxmlformats.org/drawingml/2006/main" xmlns:r="http://schemas.openxmlformats.org/officeDocument/2006/relationships" xmlns:p="http://schemas.openxmlformats.org/presentationml/2006/main">
-  <p:cSld>
-    <p:spTree>
-      <p:nvGrpSpPr>
-        <p:cNvPr id="1" name=""/>
-        <p:cNvGrpSpPr/>
-        <p:nvPr/>
-      </p:nvGrpSpPr>
-      <p:grpSpPr>
-        <a:xfrm>
-          <a:off x="0" y="0"/>
-          <a:ext cx="0" cy="0"/>
-          <a:chOff x="0" y="0"/>
-          <a:chExt cx="0" cy="0"/>
-        </a:xfrm>
-      </p:grpSpPr>
-      <p:sp>
-        <p:nvSpPr>
-          <p:cNvPr id="2" name="Title 1"/>
-          <p:cNvSpPr>
-            <a:spLocks noGrp="1"/>
-          </p:cNvSpPr>
-          <p:nvPr>
-            <p:ph type="title"/>
-          </p:nvPr>
-        </p:nvSpPr>
-        <p:spPr>
-          <a:xfrm>
-            <a:off x="584200" y="221992"/>
-            <a:ext cx="10515600" cy="530954"/>
-          </a:xfrm>
-        </p:spPr>
-        <p:txBody>
-          <a:bodyPr>
-            <a:normAutofit fontScale="90000"/>
-          </a:bodyPr>
-          <a:lstStyle/>
-          <a:p>
-            <a:r>
-              <a:rPr lang="en-US" dirty="0"/>
-              <a:t>Measuring similarity and dissimilarity</a:t>
-            </a:r>
-          </a:p>
-        </p:txBody>
-      </p:sp>
-      <p:sp>
-        <p:nvSpPr>
-          <p:cNvPr id="3" name="Content Placeholder 2"/>
-          <p:cNvSpPr>
-            <a:spLocks noGrp="1"/>
-          </p:cNvSpPr>
-          <p:nvPr>
-            <p:ph sz="quarter" idx="10"/>
-          </p:nvPr>
-        </p:nvSpPr>
-        <p:spPr>
-          <a:xfrm>
-            <a:off x="333375" y="896079"/>
-            <a:ext cx="11525250" cy="5290388"/>
-          </a:xfrm>
-        </p:spPr>
-        <p:txBody>
-          <a:bodyPr>
-            <a:normAutofit/>
-          </a:bodyPr>
-          <a:lstStyle/>
-          <a:p>
-            <a:pPr marL="0" indent="0">
-              <a:buNone/>
-            </a:pPr>
-            <a:r>
-              <a:rPr lang="en-US" dirty="0">
-                <a:latin typeface="+mn-lt"/>
-              </a:rPr>
-              <a:t>Measuring similarity and dissimilarity is fundamental to data mining</a:t>
-            </a:r>
-          </a:p>
-          <a:p>
-            <a:r>
-              <a:rPr lang="en-US" dirty="0">
-                <a:latin typeface="+mn-lt"/>
-              </a:rPr>
-              <a:t>Distance and similarity measures are the foundation of unsupervised learning</a:t>
-            </a:r>
-          </a:p>
-          <a:p>
-            <a:r>
-              <a:rPr lang="en-US" dirty="0">
-                <a:latin typeface="+mn-lt"/>
-              </a:rPr>
-              <a:t>A wide range of metrics used in data mining</a:t>
-            </a:r>
-          </a:p>
-          <a:p>
-            <a:r>
-              <a:rPr lang="en-US" dirty="0">
-                <a:latin typeface="+mn-lt"/>
-              </a:rPr>
-              <a:t>The metrics used must fit the nature of the data and the analysis </a:t>
-            </a:r>
-          </a:p>
-          <a:p>
-            <a:pPr lvl="1"/>
-            <a:r>
-              <a:rPr lang="en-US" dirty="0">
-                <a:latin typeface="+mn-lt"/>
-              </a:rPr>
-              <a:t>Binary data</a:t>
-            </a:r>
-          </a:p>
-          <a:p>
-            <a:pPr lvl="1"/>
-            <a:r>
-              <a:rPr lang="en-US" dirty="0">
-                <a:latin typeface="+mn-lt"/>
-              </a:rPr>
-              <a:t>Text strings</a:t>
-            </a:r>
-          </a:p>
-          <a:p>
-            <a:pPr lvl="1"/>
-            <a:r>
-              <a:rPr lang="en-US" dirty="0">
-                <a:latin typeface="+mn-lt"/>
-              </a:rPr>
-              <a:t>Numeric data</a:t>
-            </a:r>
-          </a:p>
-          <a:p>
-            <a:pPr lvl="1"/>
-            <a:r>
-              <a:rPr lang="en-US" dirty="0">
-                <a:latin typeface="+mn-lt"/>
-              </a:rPr>
-              <a:t>Ordinal data; e.g. rankings and ratings </a:t>
-            </a:r>
-          </a:p>
-          <a:p>
-            <a:pPr lvl="1"/>
-            <a:r>
-              <a:rPr lang="en-US" dirty="0">
-                <a:latin typeface="+mn-lt"/>
-              </a:rPr>
-              <a:t>Unordered categorical data</a:t>
-            </a:r>
-          </a:p>
-          <a:p>
-            <a:r>
-              <a:rPr lang="en-US" b="1" dirty="0">
-                <a:latin typeface="+mn-lt"/>
-              </a:rPr>
-              <a:t>There is no one best metric!</a:t>
-            </a:r>
-          </a:p>
-          <a:p>
-            <a:endParaRPr lang="en-US" sz="2800" dirty="0">
-              <a:latin typeface="+mn-lt"/>
-            </a:endParaRPr>
-          </a:p>
-          <a:p>
-            <a:pPr lvl="1"/>
-            <a:endParaRPr lang="en-US" dirty="0"/>
-          </a:p>
-        </p:txBody>
-      </p:sp>
-    </p:spTree>
-    <p:extLst>
-      <p:ext uri="{BB962C8B-B14F-4D97-AF65-F5344CB8AC3E}">
-        <p14:creationId xmlns:p14="http://schemas.microsoft.com/office/powerpoint/2010/main" val="312349696"/>
-      </p:ext>
-    </p:extLst>
-  </p:cSld>
-  <p:clrMapOvr>
-    <a:masterClrMapping/>
-  </p:clrMapOvr>
-  <p:timing>
-    <p:tnLst>
-      <p:par>
-        <p:cTn id="1" dur="indefinite" restart="never" nodeType="tmRoot">
-          <p:childTnLst>
-            <p:seq concurrent="1" nextAc="seek">
-              <p:cTn id="2" dur="indefinite" nodeType="mainSeq">
-                <p:childTnLst>
-                  <p:par>
-                    <p:cTn id="3" fill="hold">
-                      <p:stCondLst>
-                        <p:cond delay="indefinite"/>
-                      </p:stCondLst>
-                      <p:childTnLst>
-                        <p:par>
-                          <p:cTn id="4" fill="hold">
-                            <p:stCondLst>
-                              <p:cond delay="0"/>
-                            </p:stCondLst>
-                            <p:childTnLst>
-                              <p:par>
-                                <p:cTn id="5" presetID="1" presetClass="entr" presetSubtype="0" fill="hold" nodeType="clickEffect">
-                                  <p:stCondLst>
-                                    <p:cond delay="0"/>
-                                  </p:stCondLst>
-                                  <p:childTnLst>
-                                    <p:set>
-                                      <p:cBhvr>
-                                        <p:cTn id="6" dur="1" fill="hold">
-                                          <p:stCondLst>
-                                            <p:cond delay="0"/>
-                                          </p:stCondLst>
-                                        </p:cTn>
-                                        <p:tgtEl>
-                                          <p:spTgt spid="3">
-                                            <p:txEl>
-                                              <p:pRg st="1" end="1"/>
-                                            </p:txEl>
-                                          </p:spTgt>
-                                        </p:tgtEl>
-                                        <p:attrNameLst>
-                                          <p:attrName>style.visibility</p:attrName>
-                                        </p:attrNameLst>
-                                      </p:cBhvr>
-                                      <p:to>
-                                        <p:strVal val="visible"/>
-                                      </p:to>
-                                    </p:set>
-                                  </p:childTnLst>
-                                </p:cTn>
-                              </p:par>
-                            </p:childTnLst>
-                          </p:cTn>
-                        </p:par>
-                      </p:childTnLst>
-                    </p:cTn>
-                  </p:par>
-                  <p:par>
-                    <p:cTn id="7" fill="hold">
-                      <p:stCondLst>
-                        <p:cond delay="indefinite"/>
-                      </p:stCondLst>
-                      <p:childTnLst>
-                        <p:par>
-                          <p:cTn id="8" fill="hold">
-                            <p:stCondLst>
-                              <p:cond delay="0"/>
-                            </p:stCondLst>
-                            <p:childTnLst>
-                              <p:par>
-                                <p:cTn id="9" presetID="1" presetClass="entr" presetSubtype="0" fill="hold" nodeType="clickEffect">
-                                  <p:stCondLst>
-                                    <p:cond delay="0"/>
-                                  </p:stCondLst>
-                                  <p:childTnLst>
-                                    <p:set>
-                                      <p:cBhvr>
-                                        <p:cTn id="10" dur="1" fill="hold">
-                                          <p:stCondLst>
-                                            <p:cond delay="0"/>
-                                          </p:stCondLst>
-                                        </p:cTn>
-                                        <p:tgtEl>
-                                          <p:spTgt spid="3">
-                                            <p:txEl>
-                                              <p:pRg st="2" end="2"/>
-                                            </p:txEl>
-                                          </p:spTgt>
-                                        </p:tgtEl>
-                                        <p:attrNameLst>
-                                          <p:attrName>style.visibility</p:attrName>
-                                        </p:attrNameLst>
-                                      </p:cBhvr>
-                                      <p:to>
-                                        <p:strVal val="visible"/>
-                                      </p:to>
-                                    </p:set>
-                                  </p:childTnLst>
-                                </p:cTn>
-                              </p:par>
-                            </p:childTnLst>
-                          </p:cTn>
-                        </p:par>
-                      </p:childTnLst>
-                    </p:cTn>
-                  </p:par>
-                  <p:par>
-                    <p:cTn id="11" fill="hold">
-                      <p:stCondLst>
-                        <p:cond delay="indefinite"/>
-                      </p:stCondLst>
-                      <p:childTnLst>
-                        <p:par>
-                          <p:cTn id="12" fill="hold">
-                            <p:stCondLst>
-                              <p:cond delay="0"/>
-                            </p:stCondLst>
-                            <p:childTnLst>
-                              <p:par>
-                                <p:cTn id="13" presetID="1" presetClass="entr" presetSubtype="0" fill="hold" nodeType="clickEffect">
-                                  <p:stCondLst>
-                                    <p:cond delay="0"/>
-                                  </p:stCondLst>
-                                  <p:childTnLst>
-                                    <p:set>
-                                      <p:cBhvr>
-                                        <p:cTn id="14" dur="1" fill="hold">
-                                          <p:stCondLst>
-                                            <p:cond delay="0"/>
-                                          </p:stCondLst>
-                                        </p:cTn>
-                                        <p:tgtEl>
-                                          <p:spTgt spid="3">
-                                            <p:txEl>
-                                              <p:pRg st="3" end="3"/>
-                                            </p:txEl>
-                                          </p:spTgt>
-                                        </p:tgtEl>
-                                        <p:attrNameLst>
-                                          <p:attrName>style.visibility</p:attrName>
-                                        </p:attrNameLst>
-                                      </p:cBhvr>
-                                      <p:to>
-                                        <p:strVal val="visible"/>
-                                      </p:to>
-                                    </p:set>
-                                  </p:childTnLst>
-                                </p:cTn>
-                              </p:par>
-                              <p:par>
-                                <p:cTn id="15" presetID="1" presetClass="entr" presetSubtype="0" fill="hold" nodeType="withEffect">
-                                  <p:stCondLst>
-                                    <p:cond delay="0"/>
-                                  </p:stCondLst>
-                                  <p:childTnLst>
-                                    <p:set>
-                                      <p:cBhvr>
-                                        <p:cTn id="16" dur="1" fill="hold">
-                                          <p:stCondLst>
-                                            <p:cond delay="0"/>
-                                          </p:stCondLst>
-                                        </p:cTn>
-                                        <p:tgtEl>
-                                          <p:spTgt spid="3">
-                                            <p:txEl>
-                                              <p:pRg st="4" end="4"/>
-                                            </p:txEl>
-                                          </p:spTgt>
-                                        </p:tgtEl>
-                                        <p:attrNameLst>
-                                          <p:attrName>style.visibility</p:attrName>
-                                        </p:attrNameLst>
-                                      </p:cBhvr>
-                                      <p:to>
-                                        <p:strVal val="visible"/>
-                                      </p:to>
-                                    </p:set>
-                                  </p:childTnLst>
-                                </p:cTn>
-                              </p:par>
-                              <p:par>
-                                <p:cTn id="17" presetID="1" presetClass="entr" presetSubtype="0" fill="hold" nodeType="withEffect">
-                                  <p:stCondLst>
-                                    <p:cond delay="0"/>
-                                  </p:stCondLst>
-                                  <p:childTnLst>
-                                    <p:set>
-                                      <p:cBhvr>
-                                        <p:cTn id="18" dur="1" fill="hold">
-                                          <p:stCondLst>
-                                            <p:cond delay="0"/>
-                                          </p:stCondLst>
-                                        </p:cTn>
-                                        <p:tgtEl>
-                                          <p:spTgt spid="3">
-                                            <p:txEl>
-                                              <p:pRg st="5" end="5"/>
-                                            </p:txEl>
-                                          </p:spTgt>
-                                        </p:tgtEl>
-                                        <p:attrNameLst>
-                                          <p:attrName>style.visibility</p:attrName>
-                                        </p:attrNameLst>
-                                      </p:cBhvr>
-                                      <p:to>
-                                        <p:strVal val="visible"/>
-                                      </p:to>
-                                    </p:set>
-                                  </p:childTnLst>
-                                </p:cTn>
-                              </p:par>
-                              <p:par>
-                                <p:cTn id="19" presetID="1" presetClass="entr" presetSubtype="0" fill="hold" nodeType="withEffect">
-                                  <p:stCondLst>
-                                    <p:cond delay="0"/>
-                                  </p:stCondLst>
-                                  <p:childTnLst>
-                                    <p:set>
-                                      <p:cBhvr>
-                                        <p:cTn id="20" dur="1" fill="hold">
-                                          <p:stCondLst>
-                                            <p:cond delay="0"/>
-                                          </p:stCondLst>
-                                        </p:cTn>
-                                        <p:tgtEl>
-                                          <p:spTgt spid="3">
-                                            <p:txEl>
-                                              <p:pRg st="6" end="6"/>
-                                            </p:txEl>
-                                          </p:spTgt>
-                                        </p:tgtEl>
-                                        <p:attrNameLst>
-                                          <p:attrName>style.visibility</p:attrName>
-                                        </p:attrNameLst>
-                                      </p:cBhvr>
-                                      <p:to>
-                                        <p:strVal val="visible"/>
-                                      </p:to>
-                                    </p:set>
-                                  </p:childTnLst>
-                                </p:cTn>
-                              </p:par>
-                              <p:par>
-                                <p:cTn id="21" presetID="1" presetClass="entr" presetSubtype="0" fill="hold" nodeType="withEffect">
-                                  <p:stCondLst>
-                                    <p:cond delay="0"/>
-                                  </p:stCondLst>
-                                  <p:childTnLst>
-                                    <p:set>
-                                      <p:cBhvr>
-                                        <p:cTn id="22" dur="1" fill="hold">
-                                          <p:stCondLst>
-                                            <p:cond delay="0"/>
-                                          </p:stCondLst>
-                                        </p:cTn>
-                                        <p:tgtEl>
-                                          <p:spTgt spid="3">
-                                            <p:txEl>
-                                              <p:pRg st="7" end="7"/>
-                                            </p:txEl>
-                                          </p:spTgt>
-                                        </p:tgtEl>
-                                        <p:attrNameLst>
-                                          <p:attrName>style.visibility</p:attrName>
-                                        </p:attrNameLst>
-                                      </p:cBhvr>
-                                      <p:to>
-                                        <p:strVal val="visible"/>
-                                      </p:to>
-                                    </p:set>
-                                  </p:childTnLst>
-                                </p:cTn>
-                              </p:par>
-                              <p:par>
-                                <p:cTn id="23" presetID="1" presetClass="entr" presetSubtype="0" fill="hold" nodeType="withEffect">
-                                  <p:stCondLst>
-                                    <p:cond delay="0"/>
-                                  </p:stCondLst>
-                                  <p:childTnLst>
-                                    <p:set>
-                                      <p:cBhvr>
-                                        <p:cTn id="24" dur="1" fill="hold">
-                                          <p:stCondLst>
-                                            <p:cond delay="0"/>
-                                          </p:stCondLst>
-                                        </p:cTn>
-                                        <p:tgtEl>
-                                          <p:spTgt spid="3">
-                                            <p:txEl>
-                                              <p:pRg st="8" end="8"/>
-                                            </p:txEl>
-                                          </p:spTgt>
-                                        </p:tgtEl>
-                                        <p:attrNameLst>
-                                          <p:attrName>style.visibility</p:attrName>
-                                        </p:attrNameLst>
-                                      </p:cBhvr>
-                                      <p:to>
-                                        <p:strVal val="visible"/>
-                                      </p:to>
-                                    </p:set>
-                                  </p:childTnLst>
-                                </p:cTn>
-                              </p:par>
-                            </p:childTnLst>
-                          </p:cTn>
-                        </p:par>
-                      </p:childTnLst>
-                    </p:cTn>
-                  </p:par>
-                  <p:par>
-                    <p:cTn id="25" fill="hold">
-                      <p:stCondLst>
-                        <p:cond delay="indefinite"/>
-                      </p:stCondLst>
-                      <p:childTnLst>
-                        <p:par>
-                          <p:cTn id="26" fill="hold">
-                            <p:stCondLst>
-                              <p:cond delay="0"/>
-                            </p:stCondLst>
-                            <p:childTnLst>
-                              <p:par>
-                                <p:cTn id="27" presetID="1" presetClass="entr" presetSubtype="0" fill="hold" nodeType="clickEffect">
-                                  <p:stCondLst>
-                                    <p:cond delay="0"/>
-                                  </p:stCondLst>
-                                  <p:childTnLst>
-                                    <p:set>
-                                      <p:cBhvr>
-                                        <p:cTn id="28" dur="1" fill="hold">
-                                          <p:stCondLst>
-                                            <p:cond delay="0"/>
-                                          </p:stCondLst>
-                                        </p:cTn>
-                                        <p:tgtEl>
-                                          <p:spTgt spid="3">
-                                            <p:txEl>
-                                              <p:pRg st="9" end="9"/>
-                                            </p:txEl>
-                                          </p:spTgt>
-                                        </p:tgtEl>
-                                        <p:attrNameLst>
-                                          <p:attrName>style.visibility</p:attrName>
-                                        </p:attrNameLst>
-                                      </p:cBhvr>
-                                      <p:to>
-                                        <p:strVal val="visible"/>
-                                      </p:to>
-                                    </p:set>
-                                  </p:childTnLst>
-                                </p:cTn>
-                              </p:par>
-                            </p:childTnLst>
-                          </p:cTn>
-                        </p:par>
-                      </p:childTnLst>
-                    </p:cTn>
-                  </p:par>
-                </p:childTnLst>
-              </p:cTn>
-              <p:prevCondLst>
-                <p:cond evt="onPrev" delay="0">
-                  <p:tgtEl>
-                    <p:sldTgt/>
-                  </p:tgtEl>
-                </p:cond>
-              </p:prevCondLst>
-              <p:nextCondLst>
-                <p:cond evt="onNext" delay="0">
-                  <p:tgtEl>
-                    <p:sldTgt/>
-                  </p:tgtEl>
-                </p:cond>
-              </p:nextCondLst>
-            </p:seq>
-          </p:childTnLst>
-        </p:cTn>
-      </p:par>
-    </p:tnLst>
-  </p:timing>
-</p:sld>
-</file>
-
-<file path=ppt/slides/slide30.xml><?xml version="1.0" encoding="utf-8"?>
+<file path=ppt/slides/slide31.xml><?xml version="1.0" encoding="utf-8"?>
 <p:sld xmlns:a="http://schemas.openxmlformats.org/drawingml/2006/main" xmlns:r="http://schemas.openxmlformats.org/officeDocument/2006/relationships" xmlns:p="http://schemas.openxmlformats.org/presentationml/2006/main">
   <p:cSld>
     <p:spTree>
@@ -29338,8 +30175,8 @@
           </a:p>
         </p:txBody>
       </p:sp>
-      <mc:AlternateContent xmlns:mc="http://schemas.openxmlformats.org/markup-compatibility/2006">
-        <mc:Choice xmlns:a14="http://schemas.microsoft.com/office/drawing/2010/main" Requires="a14">
+      <mc:AlternateContent xmlns:mc="http://schemas.openxmlformats.org/markup-compatibility/2006" xmlns:a14="http://schemas.microsoft.com/office/drawing/2010/main">
+        <mc:Choice Requires="a14">
           <p:sp>
             <p:nvSpPr>
               <p:cNvPr id="3" name="Content Placeholder 2"/>
@@ -30223,7 +31060,7 @@
             </p:txBody>
           </p:sp>
         </mc:Choice>
-        <mc:Fallback>
+        <mc:Fallback xmlns="">
           <p:sp>
             <p:nvSpPr>
               <p:cNvPr id="3" name="Content Placeholder 2"/>
@@ -30402,7 +31239,7 @@
 </p:sld>
 </file>
 
-<file path=ppt/slides/slide31.xml><?xml version="1.0" encoding="utf-8"?>
+<file path=ppt/slides/slide32.xml><?xml version="1.0" encoding="utf-8"?>
 <p:sld xmlns:a="http://schemas.openxmlformats.org/drawingml/2006/main" xmlns:r="http://schemas.openxmlformats.org/officeDocument/2006/relationships" xmlns:p="http://schemas.openxmlformats.org/presentationml/2006/main">
   <p:cSld>
     <p:spTree>
@@ -30448,8 +31285,8 @@
           </a:p>
         </p:txBody>
       </p:sp>
-      <mc:AlternateContent xmlns:mc="http://schemas.openxmlformats.org/markup-compatibility/2006">
-        <mc:Choice xmlns:a14="http://schemas.microsoft.com/office/drawing/2010/main" Requires="a14">
+      <mc:AlternateContent xmlns:mc="http://schemas.openxmlformats.org/markup-compatibility/2006" xmlns:a14="http://schemas.microsoft.com/office/drawing/2010/main">
+        <mc:Choice Requires="a14">
           <p:sp>
             <p:nvSpPr>
               <p:cNvPr id="3" name="Content Placeholder 2"/>
@@ -30710,6 +31547,28 @@
                 </a:r>
               </a:p>
               <a:p>
+                <a:r>
+                  <a:rPr lang="en-US" dirty="0">
+                    <a:latin typeface="+mn-lt"/>
+                  </a:rPr>
+                  <a:t>Then apply distance measure along graph edges </a:t>
+                </a:r>
+              </a:p>
+              <a:p>
+                <a:pPr marL="0" indent="0">
+                  <a:buNone/>
+                </a:pPr>
+                <a:r>
+                  <a:rPr lang="en-US" dirty="0">
+                    <a:solidFill>
+                      <a:srgbClr val="C00000"/>
+                    </a:solidFill>
+                    <a:latin typeface="+mn-lt"/>
+                  </a:rPr>
+                  <a:t>Don’t confuse this idea with clustering models!</a:t>
+                </a:r>
+              </a:p>
+              <a:p>
                 <a:pPr marL="0" indent="0">
                   <a:buNone/>
                 </a:pPr>
@@ -30720,7 +31579,7 @@
             </p:txBody>
           </p:sp>
         </mc:Choice>
-        <mc:Fallback>
+        <mc:Fallback xmlns="">
           <p:sp>
             <p:nvSpPr>
               <p:cNvPr id="3" name="Content Placeholder 2"/>
@@ -30874,6 +31733,104 @@
                       </p:childTnLst>
                     </p:cTn>
                   </p:par>
+                  <p:par>
+                    <p:cTn id="11" fill="hold">
+                      <p:stCondLst>
+                        <p:cond delay="indefinite"/>
+                      </p:stCondLst>
+                      <p:childTnLst>
+                        <p:par>
+                          <p:cTn id="12" fill="hold">
+                            <p:stCondLst>
+                              <p:cond delay="0"/>
+                            </p:stCondLst>
+                            <p:childTnLst>
+                              <p:par>
+                                <p:cTn id="13" presetID="1" presetClass="entr" presetSubtype="0" fill="hold" nodeType="clickEffect">
+                                  <p:stCondLst>
+                                    <p:cond delay="0"/>
+                                  </p:stCondLst>
+                                  <p:childTnLst>
+                                    <p:set>
+                                      <p:cBhvr>
+                                        <p:cTn id="14" dur="1" fill="hold">
+                                          <p:stCondLst>
+                                            <p:cond delay="0"/>
+                                          </p:stCondLst>
+                                        </p:cTn>
+                                        <p:tgtEl>
+                                          <p:spTgt spid="3">
+                                            <p:txEl>
+                                              <p:pRg st="4" end="4"/>
+                                            </p:txEl>
+                                          </p:spTgt>
+                                        </p:tgtEl>
+                                        <p:attrNameLst>
+                                          <p:attrName>style.visibility</p:attrName>
+                                        </p:attrNameLst>
+                                      </p:cBhvr>
+                                      <p:to>
+                                        <p:strVal val="visible"/>
+                                      </p:to>
+                                    </p:set>
+                                  </p:childTnLst>
+                                </p:cTn>
+                              </p:par>
+                            </p:childTnLst>
+                          </p:cTn>
+                        </p:par>
+                      </p:childTnLst>
+                    </p:cTn>
+                  </p:par>
+                  <p:par>
+                    <p:cTn id="15" fill="hold">
+                      <p:stCondLst>
+                        <p:cond delay="indefinite"/>
+                      </p:stCondLst>
+                      <p:childTnLst>
+                        <p:par>
+                          <p:cTn id="16" fill="hold">
+                            <p:stCondLst>
+                              <p:cond delay="0"/>
+                            </p:stCondLst>
+                            <p:childTnLst>
+                              <p:par>
+                                <p:cTn id="17" presetID="1" presetClass="entr" presetSubtype="0" fill="hold" nodeType="clickEffect">
+                                  <p:stCondLst>
+                                    <p:cond delay="0"/>
+                                  </p:stCondLst>
+                                  <p:childTnLst>
+                                    <p:set>
+                                      <p:cBhvr>
+                                        <p:cTn id="18" dur="1" fill="hold">
+                                          <p:stCondLst>
+                                            <p:cond delay="0"/>
+                                          </p:stCondLst>
+                                        </p:cTn>
+                                        <p:tgtEl>
+                                          <p:spTgt spid="3">
+                                            <p:txEl>
+                                              <p:pRg st="5" end="5"/>
+                                            </p:txEl>
+                                          </p:spTgt>
+                                        </p:tgtEl>
+                                        <p:attrNameLst>
+                                          <p:attrName>style.visibility</p:attrName>
+                                        </p:attrNameLst>
+                                      </p:cBhvr>
+                                      <p:to>
+                                        <p:strVal val="visible"/>
+                                      </p:to>
+                                    </p:set>
+                                  </p:childTnLst>
+                                </p:cTn>
+                              </p:par>
+                            </p:childTnLst>
+                          </p:cTn>
+                        </p:par>
+                      </p:childTnLst>
+                    </p:cTn>
+                  </p:par>
                 </p:childTnLst>
               </p:cTn>
               <p:prevCondLst>
@@ -30899,7 +31856,7 @@
 </p:sld>
 </file>
 
-<file path=ppt/slides/slide32.xml><?xml version="1.0" encoding="utf-8"?>
+<file path=ppt/slides/slide33.xml><?xml version="1.0" encoding="utf-8"?>
 <p:sld xmlns:a="http://schemas.openxmlformats.org/drawingml/2006/main" xmlns:r="http://schemas.openxmlformats.org/officeDocument/2006/relationships" xmlns:p="http://schemas.openxmlformats.org/presentationml/2006/main">
   <p:cSld>
     <p:spTree>
@@ -31466,7 +32423,7 @@
 </p:sld>
 </file>
 
-<file path=ppt/slides/slide33.xml><?xml version="1.0" encoding="utf-8"?>
+<file path=ppt/slides/slide34.xml><?xml version="1.0" encoding="utf-8"?>
 <p:sld xmlns:a="http://schemas.openxmlformats.org/drawingml/2006/main" xmlns:r="http://schemas.openxmlformats.org/officeDocument/2006/relationships" xmlns:p="http://schemas.openxmlformats.org/presentationml/2006/main">
   <p:cSld>
     <p:spTree>
@@ -32315,7 +33272,7 @@
 </p:sld>
 </file>
 
-<file path=ppt/slides/slide34.xml><?xml version="1.0" encoding="utf-8"?>
+<file path=ppt/slides/slide35.xml><?xml version="1.0" encoding="utf-8"?>
 <p:sld xmlns:a="http://schemas.openxmlformats.org/drawingml/2006/main" xmlns:r="http://schemas.openxmlformats.org/officeDocument/2006/relationships" xmlns:p="http://schemas.openxmlformats.org/presentationml/2006/main">
   <p:cSld>
     <p:spTree>
@@ -33145,7 +34102,7 @@
 </p:sld>
 </file>
 
-<file path=ppt/slides/slide35.xml><?xml version="1.0" encoding="utf-8"?>
+<file path=ppt/slides/slide36.xml><?xml version="1.0" encoding="utf-8"?>
 <p:sld xmlns:a="http://schemas.openxmlformats.org/drawingml/2006/main" xmlns:r="http://schemas.openxmlformats.org/officeDocument/2006/relationships" xmlns:p="http://schemas.openxmlformats.org/presentationml/2006/main">
   <p:cSld>
     <p:spTree>

</xml_diff>

<commit_message>
Correction of small typors and added clarifications of key points
</commit_message>
<xml_diff>
--- a/slides/4_DistanceAndSimilarityMeasures_Part1.pptx
+++ b/slides/4_DistanceAndSimilarityMeasures_Part1.pptx
@@ -17,8 +17,8 @@
     <p:sldId id="612" r:id="rId8"/>
     <p:sldId id="722" r:id="rId9"/>
     <p:sldId id="607" r:id="rId10"/>
-    <p:sldId id="681" r:id="rId11"/>
-    <p:sldId id="721" r:id="rId12"/>
+    <p:sldId id="721" r:id="rId11"/>
+    <p:sldId id="681" r:id="rId12"/>
     <p:sldId id="673" r:id="rId13"/>
     <p:sldId id="674" r:id="rId14"/>
     <p:sldId id="680" r:id="rId15"/>
@@ -232,7 +232,7 @@
           <a:p>
             <a:fld id="{8DD534D1-5B48-49E9-A024-C5EAE54CADD0}" type="datetimeFigureOut">
               <a:rPr lang="en-US" smtClean="0"/>
-              <a:t>2/11/2024</a:t>
+              <a:t>2/13/2024</a:t>
             </a:fld>
             <a:endParaRPr lang="en-US"/>
           </a:p>
@@ -659,7 +659,7 @@
     </p:spTree>
     <p:extLst>
       <p:ext uri="{BB962C8B-B14F-4D97-AF65-F5344CB8AC3E}">
-        <p14:creationId xmlns:p14="http://schemas.microsoft.com/office/powerpoint/2010/main" val="3875999212"/>
+        <p14:creationId xmlns:p14="http://schemas.microsoft.com/office/powerpoint/2010/main" val="1984437885"/>
       </p:ext>
     </p:extLst>
   </p:cSld>
@@ -3488,7 +3488,7 @@
     </p:spTree>
     <p:extLst>
       <p:ext uri="{BB962C8B-B14F-4D97-AF65-F5344CB8AC3E}">
-        <p14:creationId xmlns:p14="http://schemas.microsoft.com/office/powerpoint/2010/main" val="1984437885"/>
+        <p14:creationId xmlns:p14="http://schemas.microsoft.com/office/powerpoint/2010/main" val="3875999212"/>
       </p:ext>
     </p:extLst>
   </p:cSld>
@@ -3645,7 +3645,7 @@
           <a:p>
             <a:fld id="{9DC183D5-83EE-4A48-BB2E-1FC30CD8E44A}" type="datetimeFigureOut">
               <a:rPr lang="en-US" smtClean="0"/>
-              <a:t>2/11/2024</a:t>
+              <a:t>2/13/2024</a:t>
             </a:fld>
             <a:endParaRPr lang="en-US"/>
           </a:p>
@@ -3843,7 +3843,7 @@
           <a:p>
             <a:fld id="{9DC183D5-83EE-4A48-BB2E-1FC30CD8E44A}" type="datetimeFigureOut">
               <a:rPr lang="en-US" smtClean="0"/>
-              <a:t>2/11/2024</a:t>
+              <a:t>2/13/2024</a:t>
             </a:fld>
             <a:endParaRPr lang="en-US"/>
           </a:p>
@@ -4051,7 +4051,7 @@
           <a:p>
             <a:fld id="{9DC183D5-83EE-4A48-BB2E-1FC30CD8E44A}" type="datetimeFigureOut">
               <a:rPr lang="en-US" smtClean="0"/>
-              <a:t>2/11/2024</a:t>
+              <a:t>2/13/2024</a:t>
             </a:fld>
             <a:endParaRPr lang="en-US"/>
           </a:p>
@@ -4421,7 +4421,7 @@
           <a:p>
             <a:fld id="{9DC183D5-83EE-4A48-BB2E-1FC30CD8E44A}" type="datetimeFigureOut">
               <a:rPr lang="en-US" smtClean="0"/>
-              <a:t>2/11/2024</a:t>
+              <a:t>2/13/2024</a:t>
             </a:fld>
             <a:endParaRPr lang="en-US"/>
           </a:p>
@@ -4696,7 +4696,7 @@
           <a:p>
             <a:fld id="{9DC183D5-83EE-4A48-BB2E-1FC30CD8E44A}" type="datetimeFigureOut">
               <a:rPr lang="en-US" smtClean="0"/>
-              <a:t>2/11/2024</a:t>
+              <a:t>2/13/2024</a:t>
             </a:fld>
             <a:endParaRPr lang="en-US"/>
           </a:p>
@@ -4961,7 +4961,7 @@
           <a:p>
             <a:fld id="{9DC183D5-83EE-4A48-BB2E-1FC30CD8E44A}" type="datetimeFigureOut">
               <a:rPr lang="en-US" smtClean="0"/>
-              <a:t>2/11/2024</a:t>
+              <a:t>2/13/2024</a:t>
             </a:fld>
             <a:endParaRPr lang="en-US"/>
           </a:p>
@@ -5373,7 +5373,7 @@
           <a:p>
             <a:fld id="{9DC183D5-83EE-4A48-BB2E-1FC30CD8E44A}" type="datetimeFigureOut">
               <a:rPr lang="en-US" smtClean="0"/>
-              <a:t>2/11/2024</a:t>
+              <a:t>2/13/2024</a:t>
             </a:fld>
             <a:endParaRPr lang="en-US"/>
           </a:p>
@@ -5514,7 +5514,7 @@
           <a:p>
             <a:fld id="{9DC183D5-83EE-4A48-BB2E-1FC30CD8E44A}" type="datetimeFigureOut">
               <a:rPr lang="en-US" smtClean="0"/>
-              <a:t>2/11/2024</a:t>
+              <a:t>2/13/2024</a:t>
             </a:fld>
             <a:endParaRPr lang="en-US"/>
           </a:p>
@@ -5627,7 +5627,7 @@
           <a:p>
             <a:fld id="{9DC183D5-83EE-4A48-BB2E-1FC30CD8E44A}" type="datetimeFigureOut">
               <a:rPr lang="en-US" smtClean="0"/>
-              <a:t>2/11/2024</a:t>
+              <a:t>2/13/2024</a:t>
             </a:fld>
             <a:endParaRPr lang="en-US"/>
           </a:p>
@@ -5938,7 +5938,7 @@
           <a:p>
             <a:fld id="{9DC183D5-83EE-4A48-BB2E-1FC30CD8E44A}" type="datetimeFigureOut">
               <a:rPr lang="en-US" smtClean="0"/>
-              <a:t>2/11/2024</a:t>
+              <a:t>2/13/2024</a:t>
             </a:fld>
             <a:endParaRPr lang="en-US"/>
           </a:p>
@@ -6226,7 +6226,7 @@
           <a:p>
             <a:fld id="{9DC183D5-83EE-4A48-BB2E-1FC30CD8E44A}" type="datetimeFigureOut">
               <a:rPr lang="en-US" smtClean="0"/>
-              <a:t>2/11/2024</a:t>
+              <a:t>2/13/2024</a:t>
             </a:fld>
             <a:endParaRPr lang="en-US"/>
           </a:p>
@@ -6467,7 +6467,7 @@
           <a:p>
             <a:fld id="{9DC183D5-83EE-4A48-BB2E-1FC30CD8E44A}" type="datetimeFigureOut">
               <a:rPr lang="en-US" smtClean="0"/>
-              <a:t>2/11/2024</a:t>
+              <a:t>2/13/2024</a:t>
             </a:fld>
             <a:endParaRPr lang="en-US"/>
           </a:p>
@@ -7069,7 +7069,7 @@
             <a:pPr algn="ctr"/>
             <a:r>
               <a:rPr lang="en-US" sz="1100" dirty="0"/>
-              <a:t>Copyright 2021, 2022, 2023, Stephen F Elston. All rights reserved</a:t>
+              <a:t>Copyright 2021, 2022, 2023, 2024, Stephen F Elston. All rights reserved</a:t>
             </a:r>
             <a:r>
               <a:rPr lang="en-US" dirty="0"/>
@@ -7137,8 +7137,8 @@
           </a:p>
         </p:txBody>
       </p:sp>
-      <mc:AlternateContent xmlns:mc="http://schemas.openxmlformats.org/markup-compatibility/2006" xmlns:a14="http://schemas.microsoft.com/office/drawing/2010/main">
-        <mc:Choice Requires="a14">
+      <mc:AlternateContent xmlns:mc="http://schemas.openxmlformats.org/markup-compatibility/2006">
+        <mc:Choice xmlns:a14="http://schemas.microsoft.com/office/drawing/2010/main" Requires="a14">
           <p:sp>
             <p:nvSpPr>
               <p:cNvPr id="3" name="Content Placeholder 2"/>
@@ -7190,255 +7190,21 @@
                   <a:rPr lang="en-US" dirty="0">
                     <a:latin typeface="+mn-lt"/>
                   </a:rPr>
-                  <a:t>(standardized Euclidean distance) from a mean </a:t>
-                </a:r>
-                <a:r>
-                  <a:rPr lang="en-US" dirty="0">
-                    <a:latin typeface="Symbol" panose="05050102010706020507" pitchFamily="18" charset="2"/>
-                  </a:rPr>
-                  <a:t>m</a:t>
-                </a:r>
-                <a:endParaRPr lang="en-US" dirty="0">
-                  <a:latin typeface="+mn-lt"/>
-                </a:endParaRPr>
-              </a:p>
-              <a:p>
-                <a:pPr marL="0" indent="0">
-                  <a:buNone/>
-                </a:pPr>
-                <a:r>
-                  <a:rPr lang="en-US" b="0" dirty="0">
-                    <a:latin typeface="+mn-lt"/>
-                  </a:rPr>
-                  <a:t>				</a:t>
-                </a:r>
-                <a14:m>
-                  <m:oMath xmlns:m="http://schemas.openxmlformats.org/officeDocument/2006/math">
-                    <m:r>
-                      <a:rPr lang="en-US" b="0" i="0" smtClean="0">
-                        <a:latin typeface="Cambria Math" panose="02040503050406030204" pitchFamily="18" charset="0"/>
-                      </a:rPr>
-                      <m:t> </m:t>
-                    </m:r>
-                    <m:r>
-                      <a:rPr lang="en-US" b="0" i="1" smtClean="0">
-                        <a:latin typeface="Cambria Math" panose="02040503050406030204" pitchFamily="18" charset="0"/>
-                      </a:rPr>
-                      <m:t>𝑑</m:t>
-                    </m:r>
-                    <m:r>
-                      <a:rPr lang="en-US" b="0" i="1" smtClean="0">
-                        <a:latin typeface="Cambria Math" panose="02040503050406030204" pitchFamily="18" charset="0"/>
-                      </a:rPr>
-                      <m:t>(</m:t>
-                    </m:r>
-                    <m:r>
-                      <a:rPr lang="en-US" b="0" i="1" smtClean="0">
-                        <a:latin typeface="Cambria Math" panose="02040503050406030204" pitchFamily="18" charset="0"/>
-                      </a:rPr>
-                      <m:t>𝑥</m:t>
-                    </m:r>
-                    <m:r>
-                      <a:rPr lang="en-US" b="0" i="1" smtClean="0">
-                        <a:latin typeface="Cambria Math" panose="02040503050406030204" pitchFamily="18" charset="0"/>
-                      </a:rPr>
-                      <m:t>,</m:t>
-                    </m:r>
-                    <m:r>
-                      <a:rPr lang="en-US" i="1">
-                        <a:latin typeface="Cambria Math" panose="02040503050406030204" pitchFamily="18" charset="0"/>
-                        <a:ea typeface="Cambria Math" panose="02040503050406030204" pitchFamily="18" charset="0"/>
-                      </a:rPr>
-                      <m:t>𝜇</m:t>
-                    </m:r>
-                    <m:r>
-                      <a:rPr lang="en-US" b="0" i="1" smtClean="0">
-                        <a:latin typeface="Cambria Math" panose="02040503050406030204" pitchFamily="18" charset="0"/>
-                        <a:ea typeface="Cambria Math" panose="02040503050406030204" pitchFamily="18" charset="0"/>
-                      </a:rPr>
-                      <m:t>)</m:t>
-                    </m:r>
-                    <m:r>
-                      <a:rPr lang="en-US" b="0" i="1" smtClean="0">
-                        <a:latin typeface="Cambria Math" panose="02040503050406030204" pitchFamily="18" charset="0"/>
-                      </a:rPr>
-                      <m:t>= </m:t>
-                    </m:r>
-                    <m:rad>
-                      <m:radPr>
-                        <m:degHide m:val="on"/>
-                        <m:ctrlPr>
-                          <a:rPr lang="en-US" b="0" i="1" smtClean="0">
-                            <a:latin typeface="Cambria Math" panose="02040503050406030204" pitchFamily="18" charset="0"/>
-                          </a:rPr>
-                        </m:ctrlPr>
-                      </m:radPr>
-                      <m:deg/>
-                      <m:e>
-                        <m:sSup>
-                          <m:sSupPr>
-                            <m:ctrlPr>
-                              <a:rPr lang="en-US" b="0" i="1" smtClean="0">
-                                <a:latin typeface="Cambria Math" panose="02040503050406030204" pitchFamily="18" charset="0"/>
-                              </a:rPr>
-                            </m:ctrlPr>
-                          </m:sSupPr>
-                          <m:e>
-                            <m:d>
-                              <m:dPr>
-                                <m:ctrlPr>
-                                  <a:rPr lang="en-US" b="0" i="1" smtClean="0">
-                                    <a:latin typeface="Cambria Math" panose="02040503050406030204" pitchFamily="18" charset="0"/>
-                                  </a:rPr>
-                                </m:ctrlPr>
-                              </m:dPr>
-                              <m:e>
-                                <m:r>
-                                  <a:rPr lang="en-US" b="0" i="1" smtClean="0">
-                                    <a:latin typeface="Cambria Math" panose="02040503050406030204" pitchFamily="18" charset="0"/>
-                                  </a:rPr>
-                                  <m:t>𝑥</m:t>
-                                </m:r>
-                                <m:r>
-                                  <a:rPr lang="en-US" b="0" i="1" smtClean="0">
-                                    <a:latin typeface="Cambria Math" panose="02040503050406030204" pitchFamily="18" charset="0"/>
-                                  </a:rPr>
-                                  <m:t>−</m:t>
-                                </m:r>
-                                <m:r>
-                                  <a:rPr lang="en-US" b="0" i="1" smtClean="0">
-                                    <a:latin typeface="Cambria Math" panose="02040503050406030204" pitchFamily="18" charset="0"/>
-                                    <a:ea typeface="Cambria Math" panose="02040503050406030204" pitchFamily="18" charset="0"/>
-                                  </a:rPr>
-                                  <m:t>𝜇</m:t>
-                                </m:r>
-                              </m:e>
-                            </m:d>
-                          </m:e>
-                          <m:sup>
-                            <m:r>
-                              <a:rPr lang="en-US" b="0" i="1" smtClean="0">
-                                <a:latin typeface="Cambria Math" panose="02040503050406030204" pitchFamily="18" charset="0"/>
-                              </a:rPr>
-                              <m:t>𝑇</m:t>
-                            </m:r>
-                          </m:sup>
-                        </m:sSup>
-                        <m:sSup>
-                          <m:sSupPr>
-                            <m:ctrlPr>
-                              <a:rPr lang="en-US" b="0" i="1" smtClean="0">
-                                <a:latin typeface="Cambria Math" panose="02040503050406030204" pitchFamily="18" charset="0"/>
-                              </a:rPr>
-                            </m:ctrlPr>
-                          </m:sSupPr>
-                          <m:e>
-                            <m:r>
-                              <a:rPr lang="en-US" b="0" i="1" smtClean="0">
-                                <a:latin typeface="Cambria Math" panose="02040503050406030204" pitchFamily="18" charset="0"/>
-                              </a:rPr>
-                              <m:t>𝑆</m:t>
-                            </m:r>
-                          </m:e>
-                          <m:sup>
-                            <m:r>
-                              <a:rPr lang="en-US" b="0" i="1" smtClean="0">
-                                <a:latin typeface="Cambria Math" panose="02040503050406030204" pitchFamily="18" charset="0"/>
-                              </a:rPr>
-                              <m:t>−1</m:t>
-                            </m:r>
-                          </m:sup>
-                        </m:sSup>
-                        <m:d>
-                          <m:dPr>
-                            <m:ctrlPr>
-                              <a:rPr lang="en-US" b="0" i="1" smtClean="0">
-                                <a:latin typeface="Cambria Math" panose="02040503050406030204" pitchFamily="18" charset="0"/>
-                              </a:rPr>
-                            </m:ctrlPr>
-                          </m:dPr>
-                          <m:e>
-                            <m:r>
-                              <a:rPr lang="en-US" b="0" i="1" smtClean="0">
-                                <a:latin typeface="Cambria Math" panose="02040503050406030204" pitchFamily="18" charset="0"/>
-                              </a:rPr>
-                              <m:t>𝑥</m:t>
-                            </m:r>
-                            <m:r>
-                              <a:rPr lang="en-US" b="0" i="1" smtClean="0">
-                                <a:latin typeface="Cambria Math" panose="02040503050406030204" pitchFamily="18" charset="0"/>
-                              </a:rPr>
-                              <m:t>−</m:t>
-                            </m:r>
-                            <m:r>
-                              <a:rPr lang="en-US" b="0" i="1" smtClean="0">
-                                <a:latin typeface="Cambria Math" panose="02040503050406030204" pitchFamily="18" charset="0"/>
-                                <a:ea typeface="Cambria Math" panose="02040503050406030204" pitchFamily="18" charset="0"/>
-                              </a:rPr>
-                              <m:t>𝜇</m:t>
-                            </m:r>
-                          </m:e>
-                        </m:d>
-                      </m:e>
-                    </m:rad>
-                  </m:oMath>
-                </a14:m>
-                <a:endParaRPr lang="en-US" b="0" dirty="0">
-                  <a:latin typeface="+mn-lt"/>
-                </a:endParaRPr>
-              </a:p>
-              <a:p>
-                <a:pPr marL="0" indent="0">
-                  <a:buNone/>
-                </a:pPr>
-                <a:r>
-                  <a:rPr lang="en-US" dirty="0">
-                    <a:latin typeface="+mn-lt"/>
-                  </a:rPr>
-                  <a:t>Where, </a:t>
-                </a:r>
-                <a14:m>
-                  <m:oMath xmlns:m="http://schemas.openxmlformats.org/officeDocument/2006/math">
-                    <m:sSup>
-                      <m:sSupPr>
-                        <m:ctrlPr>
-                          <a:rPr lang="en-US" i="1" smtClean="0">
-                            <a:latin typeface="Cambria Math" panose="02040503050406030204" pitchFamily="18" charset="0"/>
-                          </a:rPr>
-                        </m:ctrlPr>
-                      </m:sSupPr>
-                      <m:e>
-                        <m:r>
-                          <a:rPr lang="en-US" b="0" i="1" smtClean="0">
-                            <a:latin typeface="Cambria Math" panose="02040503050406030204" pitchFamily="18" charset="0"/>
-                          </a:rPr>
-                          <m:t>𝑆</m:t>
-                        </m:r>
-                      </m:e>
-                      <m:sup>
-                        <m:r>
-                          <a:rPr lang="en-US" b="0" i="1" smtClean="0">
-                            <a:latin typeface="Cambria Math" panose="02040503050406030204" pitchFamily="18" charset="0"/>
-                          </a:rPr>
-                          <m:t> </m:t>
-                        </m:r>
-                      </m:sup>
-                    </m:sSup>
-                  </m:oMath>
-                </a14:m>
-                <a:r>
-                  <a:rPr lang="en-US" dirty="0">
-                    <a:latin typeface="+mn-lt"/>
-                  </a:rPr>
-                  <a:t> is the empirical covariance estimate </a:t>
+                  <a:t>(standardized Euclidean distance) is useful in cases with dependency between variables  </a:t>
                 </a:r>
               </a:p>
               <a:p>
                 <a:r>
+                  <a:rPr lang="en-US" b="1" dirty="0" err="1">
+                    <a:latin typeface="+mn-lt"/>
+                  </a:rPr>
+                  <a:t>Mahalanobis</a:t>
+                </a:r>
+                <a:r>
                   <a:rPr lang="en-US" b="1" dirty="0">
                     <a:latin typeface="+mn-lt"/>
                   </a:rPr>
-                  <a:t>Mahalanobis Distance </a:t>
+                  <a:t> Distance </a:t>
                 </a:r>
                 <a:r>
                   <a:rPr lang="en-US" dirty="0">
@@ -7729,6 +7495,12 @@
               </a:p>
               <a:p>
                 <a:r>
+                  <a:rPr lang="en-US" dirty="0">
+                    <a:latin typeface="+mn-lt"/>
+                  </a:rPr>
+                  <a:t>How can we interpret the </a:t>
+                </a:r>
+                <a:r>
                   <a:rPr lang="en-US" dirty="0" err="1">
                     <a:latin typeface="+mn-lt"/>
                   </a:rPr>
@@ -7738,39 +7510,13 @@
                   <a:rPr lang="en-US" dirty="0">
                     <a:latin typeface="+mn-lt"/>
                   </a:rPr>
-                  <a:t> distance is </a:t>
+                  <a:t> distance?   </a:t>
                 </a:r>
-                <a:r>
-                  <a:rPr lang="en-US" b="1" dirty="0">
-                    <a:latin typeface="+mn-lt"/>
-                  </a:rPr>
-                  <a:t>scale invariant </a:t>
-                </a:r>
-                <a:r>
-                  <a:rPr lang="en-US" dirty="0">
-                    <a:latin typeface="+mn-lt"/>
-                  </a:rPr>
-                  <a:t>and </a:t>
-                </a:r>
-                <a:r>
-                  <a:rPr lang="en-US" b="1" dirty="0">
-                    <a:latin typeface="+mn-lt"/>
-                  </a:rPr>
-                  <a:t>unitless</a:t>
-                </a:r>
-              </a:p>
-              <a:p>
-                <a:pPr marL="0" indent="0">
-                  <a:buNone/>
-                </a:pPr>
-                <a:endParaRPr lang="en-US" dirty="0">
-                  <a:latin typeface="+mn-lt"/>
-                </a:endParaRPr>
               </a:p>
             </p:txBody>
           </p:sp>
         </mc:Choice>
-        <mc:Fallback xmlns="">
+        <mc:Fallback>
           <p:sp>
             <p:nvSpPr>
               <p:cNvPr id="3" name="Content Placeholder 2"/>
@@ -7811,13 +7557,252 @@
     </p:spTree>
     <p:extLst>
       <p:ext uri="{BB962C8B-B14F-4D97-AF65-F5344CB8AC3E}">
-        <p14:creationId xmlns:p14="http://schemas.microsoft.com/office/powerpoint/2010/main" val="3749821566"/>
+        <p14:creationId xmlns:p14="http://schemas.microsoft.com/office/powerpoint/2010/main" val="4220097327"/>
       </p:ext>
     </p:extLst>
   </p:cSld>
   <p:clrMapOvr>
     <a:masterClrMapping/>
   </p:clrMapOvr>
+  <p:timing>
+    <p:tnLst>
+      <p:par>
+        <p:cTn id="1" dur="indefinite" restart="never" nodeType="tmRoot">
+          <p:childTnLst>
+            <p:seq concurrent="1" nextAc="seek">
+              <p:cTn id="2" dur="indefinite" nodeType="mainSeq">
+                <p:childTnLst>
+                  <p:par>
+                    <p:cTn id="3" fill="hold">
+                      <p:stCondLst>
+                        <p:cond delay="indefinite"/>
+                      </p:stCondLst>
+                      <p:childTnLst>
+                        <p:par>
+                          <p:cTn id="4" fill="hold">
+                            <p:stCondLst>
+                              <p:cond delay="0"/>
+                            </p:stCondLst>
+                            <p:childTnLst>
+                              <p:par>
+                                <p:cTn id="5" presetID="1" presetClass="entr" presetSubtype="0" fill="hold" nodeType="clickEffect">
+                                  <p:stCondLst>
+                                    <p:cond delay="0"/>
+                                  </p:stCondLst>
+                                  <p:childTnLst>
+                                    <p:set>
+                                      <p:cBhvr>
+                                        <p:cTn id="6" dur="1" fill="hold">
+                                          <p:stCondLst>
+                                            <p:cond delay="0"/>
+                                          </p:stCondLst>
+                                        </p:cTn>
+                                        <p:tgtEl>
+                                          <p:spTgt spid="3">
+                                            <p:txEl>
+                                              <p:pRg st="1" end="1"/>
+                                            </p:txEl>
+                                          </p:spTgt>
+                                        </p:tgtEl>
+                                        <p:attrNameLst>
+                                          <p:attrName>style.visibility</p:attrName>
+                                        </p:attrNameLst>
+                                      </p:cBhvr>
+                                      <p:to>
+                                        <p:strVal val="visible"/>
+                                      </p:to>
+                                    </p:set>
+                                  </p:childTnLst>
+                                </p:cTn>
+                              </p:par>
+                            </p:childTnLst>
+                          </p:cTn>
+                        </p:par>
+                      </p:childTnLst>
+                    </p:cTn>
+                  </p:par>
+                  <p:par>
+                    <p:cTn id="7" fill="hold">
+                      <p:stCondLst>
+                        <p:cond delay="indefinite"/>
+                      </p:stCondLst>
+                      <p:childTnLst>
+                        <p:par>
+                          <p:cTn id="8" fill="hold">
+                            <p:stCondLst>
+                              <p:cond delay="0"/>
+                            </p:stCondLst>
+                            <p:childTnLst>
+                              <p:par>
+                                <p:cTn id="9" presetID="1" presetClass="entr" presetSubtype="0" fill="hold" nodeType="clickEffect">
+                                  <p:stCondLst>
+                                    <p:cond delay="0"/>
+                                  </p:stCondLst>
+                                  <p:childTnLst>
+                                    <p:set>
+                                      <p:cBhvr>
+                                        <p:cTn id="10" dur="1" fill="hold">
+                                          <p:stCondLst>
+                                            <p:cond delay="0"/>
+                                          </p:stCondLst>
+                                        </p:cTn>
+                                        <p:tgtEl>
+                                          <p:spTgt spid="3">
+                                            <p:txEl>
+                                              <p:pRg st="2" end="2"/>
+                                            </p:txEl>
+                                          </p:spTgt>
+                                        </p:tgtEl>
+                                        <p:attrNameLst>
+                                          <p:attrName>style.visibility</p:attrName>
+                                        </p:attrNameLst>
+                                      </p:cBhvr>
+                                      <p:to>
+                                        <p:strVal val="visible"/>
+                                      </p:to>
+                                    </p:set>
+                                  </p:childTnLst>
+                                </p:cTn>
+                              </p:par>
+                              <p:par>
+                                <p:cTn id="11" presetID="1" presetClass="entr" presetSubtype="0" fill="hold" nodeType="withEffect">
+                                  <p:stCondLst>
+                                    <p:cond delay="0"/>
+                                  </p:stCondLst>
+                                  <p:childTnLst>
+                                    <p:set>
+                                      <p:cBhvr>
+                                        <p:cTn id="12" dur="1" fill="hold">
+                                          <p:stCondLst>
+                                            <p:cond delay="0"/>
+                                          </p:stCondLst>
+                                        </p:cTn>
+                                        <p:tgtEl>
+                                          <p:spTgt spid="3">
+                                            <p:txEl>
+                                              <p:pRg st="3" end="3"/>
+                                            </p:txEl>
+                                          </p:spTgt>
+                                        </p:tgtEl>
+                                        <p:attrNameLst>
+                                          <p:attrName>style.visibility</p:attrName>
+                                        </p:attrNameLst>
+                                      </p:cBhvr>
+                                      <p:to>
+                                        <p:strVal val="visible"/>
+                                      </p:to>
+                                    </p:set>
+                                  </p:childTnLst>
+                                </p:cTn>
+                              </p:par>
+                              <p:par>
+                                <p:cTn id="13" presetID="1" presetClass="entr" presetSubtype="0" fill="hold" nodeType="withEffect">
+                                  <p:stCondLst>
+                                    <p:cond delay="0"/>
+                                  </p:stCondLst>
+                                  <p:childTnLst>
+                                    <p:set>
+                                      <p:cBhvr>
+                                        <p:cTn id="14" dur="1" fill="hold">
+                                          <p:stCondLst>
+                                            <p:cond delay="0"/>
+                                          </p:stCondLst>
+                                        </p:cTn>
+                                        <p:tgtEl>
+                                          <p:spTgt spid="3">
+                                            <p:txEl>
+                                              <p:pRg st="4" end="4"/>
+                                            </p:txEl>
+                                          </p:spTgt>
+                                        </p:tgtEl>
+                                        <p:attrNameLst>
+                                          <p:attrName>style.visibility</p:attrName>
+                                        </p:attrNameLst>
+                                      </p:cBhvr>
+                                      <p:to>
+                                        <p:strVal val="visible"/>
+                                      </p:to>
+                                    </p:set>
+                                  </p:childTnLst>
+                                </p:cTn>
+                              </p:par>
+                            </p:childTnLst>
+                          </p:cTn>
+                        </p:par>
+                      </p:childTnLst>
+                    </p:cTn>
+                  </p:par>
+                  <p:par>
+                    <p:cTn id="15" fill="hold">
+                      <p:stCondLst>
+                        <p:cond delay="indefinite"/>
+                      </p:stCondLst>
+                      <p:childTnLst>
+                        <p:par>
+                          <p:cTn id="16" fill="hold">
+                            <p:stCondLst>
+                              <p:cond delay="0"/>
+                            </p:stCondLst>
+                            <p:childTnLst>
+                              <p:par>
+                                <p:cTn id="17" presetID="1" presetClass="entr" presetSubtype="0" fill="hold" nodeType="clickEffect">
+                                  <p:stCondLst>
+                                    <p:cond delay="0"/>
+                                  </p:stCondLst>
+                                  <p:childTnLst>
+                                    <p:set>
+                                      <p:cBhvr>
+                                        <p:cTn id="18" dur="1" fill="hold">
+                                          <p:stCondLst>
+                                            <p:cond delay="0"/>
+                                          </p:stCondLst>
+                                        </p:cTn>
+                                        <p:tgtEl>
+                                          <p:spTgt spid="3">
+                                            <p:txEl>
+                                              <p:pRg st="5" end="5"/>
+                                            </p:txEl>
+                                          </p:spTgt>
+                                        </p:tgtEl>
+                                        <p:attrNameLst>
+                                          <p:attrName>style.visibility</p:attrName>
+                                        </p:attrNameLst>
+                                      </p:cBhvr>
+                                      <p:to>
+                                        <p:strVal val="visible"/>
+                                      </p:to>
+                                    </p:set>
+                                  </p:childTnLst>
+                                </p:cTn>
+                              </p:par>
+                            </p:childTnLst>
+                          </p:cTn>
+                        </p:par>
+                      </p:childTnLst>
+                    </p:cTn>
+                  </p:par>
+                </p:childTnLst>
+              </p:cTn>
+              <p:prevCondLst>
+                <p:cond evt="onPrev" delay="0">
+                  <p:tgtEl>
+                    <p:sldTgt/>
+                  </p:tgtEl>
+                </p:cond>
+              </p:prevCondLst>
+              <p:nextCondLst>
+                <p:cond evt="onNext" delay="0">
+                  <p:tgtEl>
+                    <p:sldTgt/>
+                  </p:tgtEl>
+                </p:cond>
+              </p:nextCondLst>
+            </p:seq>
+          </p:childTnLst>
+        </p:cTn>
+      </p:par>
+    </p:tnLst>
+  </p:timing>
 </p:sld>
 </file>
 
@@ -7867,8 +7852,8 @@
           </a:p>
         </p:txBody>
       </p:sp>
-      <mc:AlternateContent xmlns:mc="http://schemas.openxmlformats.org/markup-compatibility/2006" xmlns:a14="http://schemas.microsoft.com/office/drawing/2010/main">
-        <mc:Choice Requires="a14">
+      <mc:AlternateContent xmlns:mc="http://schemas.openxmlformats.org/markup-compatibility/2006">
+        <mc:Choice xmlns:a14="http://schemas.microsoft.com/office/drawing/2010/main" Requires="a14">
           <p:sp>
             <p:nvSpPr>
               <p:cNvPr id="3" name="Content Placeholder 2"/>
@@ -8206,26 +8191,6 @@
                   <a:rPr lang="en-US" dirty="0">
                     <a:latin typeface="+mn-lt"/>
                   </a:rPr>
-                  <a:t>How can we interpret the </a:t>
-                </a:r>
-                <a:r>
-                  <a:rPr lang="en-US" dirty="0" err="1">
-                    <a:latin typeface="+mn-lt"/>
-                  </a:rPr>
-                  <a:t>Mahalanobis</a:t>
-                </a:r>
-                <a:r>
-                  <a:rPr lang="en-US" dirty="0">
-                    <a:latin typeface="+mn-lt"/>
-                  </a:rPr>
-                  <a:t> distance?   </a:t>
-                </a:r>
-              </a:p>
-              <a:p>
-                <a:r>
-                  <a:rPr lang="en-US" dirty="0">
-                    <a:latin typeface="+mn-lt"/>
-                  </a:rPr>
                   <a:t>The </a:t>
                 </a:r>
                 <a:r>
@@ -8258,6 +8223,94 @@
                 </a:r>
               </a:p>
               <a:p>
+                <a:r>
+                  <a:rPr lang="en-US" dirty="0">
+                    <a:latin typeface="+mn-lt"/>
+                  </a:rPr>
+                  <a:t>Inverse covariance, </a:t>
+                </a:r>
+                <a14:m>
+                  <m:oMath xmlns:m="http://schemas.openxmlformats.org/officeDocument/2006/math">
+                    <m:sSup>
+                      <m:sSupPr>
+                        <m:ctrlPr>
+                          <a:rPr lang="en-US" i="1">
+                            <a:latin typeface="Cambria Math" panose="02040503050406030204" pitchFamily="18" charset="0"/>
+                          </a:rPr>
+                        </m:ctrlPr>
+                      </m:sSupPr>
+                      <m:e>
+                        <m:r>
+                          <a:rPr lang="en-US" i="1">
+                            <a:latin typeface="Cambria Math" panose="02040503050406030204" pitchFamily="18" charset="0"/>
+                          </a:rPr>
+                          <m:t>𝑆</m:t>
+                        </m:r>
+                      </m:e>
+                      <m:sup>
+                        <m:r>
+                          <a:rPr lang="en-US" i="1">
+                            <a:latin typeface="Cambria Math" panose="02040503050406030204" pitchFamily="18" charset="0"/>
+                          </a:rPr>
+                          <m:t>−1</m:t>
+                        </m:r>
+                      </m:sup>
+                    </m:sSup>
+                  </m:oMath>
+                </a14:m>
+                <a:r>
+                  <a:rPr lang="en-US" dirty="0">
+                    <a:latin typeface="+mn-lt"/>
+                  </a:rPr>
+                  <a:t>, transforms elliptical Normal distribution to spherical distribution  </a:t>
+                </a:r>
+              </a:p>
+              <a:p>
+                <a:r>
+                  <a:rPr lang="en-US" dirty="0" err="1">
+                    <a:latin typeface="+mn-lt"/>
+                  </a:rPr>
+                  <a:t>Mahalanobis</a:t>
+                </a:r>
+                <a:r>
+                  <a:rPr lang="en-US" dirty="0">
+                    <a:latin typeface="+mn-lt"/>
+                  </a:rPr>
+                  <a:t> distance is </a:t>
+                </a:r>
+                <a:r>
+                  <a:rPr lang="en-US" b="1" dirty="0">
+                    <a:latin typeface="+mn-lt"/>
+                  </a:rPr>
+                  <a:t>scale invariant </a:t>
+                </a:r>
+                <a:r>
+                  <a:rPr lang="en-US" dirty="0">
+                    <a:latin typeface="+mn-lt"/>
+                  </a:rPr>
+                  <a:t>and </a:t>
+                </a:r>
+                <a:r>
+                  <a:rPr lang="en-US" b="1" dirty="0">
+                    <a:latin typeface="+mn-lt"/>
+                  </a:rPr>
+                  <a:t>unitless</a:t>
+                </a:r>
+              </a:p>
+              <a:p>
+                <a:endParaRPr lang="en-US" dirty="0">
+                  <a:latin typeface="+mn-lt"/>
+                </a:endParaRPr>
+              </a:p>
+              <a:p>
+                <a:endParaRPr lang="en-US" dirty="0">
+                  <a:latin typeface="+mn-lt"/>
+                </a:endParaRPr>
+              </a:p>
+              <a:p>
+                <a:pPr marL="0" indent="0">
+                  <a:buNone/>
+                </a:pPr>
                 <a:endParaRPr lang="en-US" dirty="0">
                   <a:latin typeface="+mn-lt"/>
                 </a:endParaRPr>
@@ -8265,7 +8318,7 @@
             </p:txBody>
           </p:sp>
         </mc:Choice>
-        <mc:Fallback xmlns="">
+        <mc:Fallback>
           <p:sp>
             <p:nvSpPr>
               <p:cNvPr id="3" name="Content Placeholder 2"/>
@@ -8284,7 +8337,7 @@
               <a:blipFill>
                 <a:blip r:embed="rId3"/>
                 <a:stretch>
-                  <a:fillRect l="-1111" t="-1818"/>
+                  <a:fillRect l="-1111" t="-1818" r="-1587"/>
                 </a:stretch>
               </a:blipFill>
             </p:spPr>
@@ -8306,7 +8359,7 @@
     </p:spTree>
     <p:extLst>
       <p:ext uri="{BB962C8B-B14F-4D97-AF65-F5344CB8AC3E}">
-        <p14:creationId xmlns:p14="http://schemas.microsoft.com/office/powerpoint/2010/main" val="4220097327"/>
+        <p14:creationId xmlns:p14="http://schemas.microsoft.com/office/powerpoint/2010/main" val="3749821566"/>
       </p:ext>
     </p:extLst>
   </p:cSld>
@@ -8349,7 +8402,7 @@
                                         <p:tgtEl>
                                           <p:spTgt spid="3">
                                             <p:txEl>
-                                              <p:pRg st="1" end="1"/>
+                                              <p:pRg st="4" end="4"/>
                                             </p:txEl>
                                           </p:spTgt>
                                         </p:tgtEl>
@@ -8364,39 +8417,26 @@
                                   </p:childTnLst>
                                 </p:cTn>
                               </p:par>
+                            </p:childTnLst>
+                          </p:cTn>
+                        </p:par>
+                      </p:childTnLst>
+                    </p:cTn>
+                  </p:par>
+                  <p:par>
+                    <p:cTn id="7" fill="hold">
+                      <p:stCondLst>
+                        <p:cond delay="indefinite"/>
+                      </p:stCondLst>
+                      <p:childTnLst>
+                        <p:par>
+                          <p:cTn id="8" fill="hold">
+                            <p:stCondLst>
+                              <p:cond delay="0"/>
+                            </p:stCondLst>
+                            <p:childTnLst>
                               <p:par>
-                                <p:cTn id="7" presetID="1" presetClass="entr" presetSubtype="0" fill="hold" nodeType="withEffect">
-                                  <p:stCondLst>
-                                    <p:cond delay="0"/>
-                                  </p:stCondLst>
-                                  <p:childTnLst>
-                                    <p:set>
-                                      <p:cBhvr>
-                                        <p:cTn id="8" dur="1" fill="hold">
-                                          <p:stCondLst>
-                                            <p:cond delay="0"/>
-                                          </p:stCondLst>
-                                        </p:cTn>
-                                        <p:tgtEl>
-                                          <p:spTgt spid="3">
-                                            <p:txEl>
-                                              <p:pRg st="2" end="2"/>
-                                            </p:txEl>
-                                          </p:spTgt>
-                                        </p:tgtEl>
-                                        <p:attrNameLst>
-                                          <p:attrName>style.visibility</p:attrName>
-                                        </p:attrNameLst>
-                                      </p:cBhvr>
-                                      <p:to>
-                                        <p:strVal val="visible"/>
-                                      </p:to>
-                                    </p:set>
-                                  </p:childTnLst>
-                                </p:cTn>
-                              </p:par>
-                              <p:par>
-                                <p:cTn id="9" presetID="1" presetClass="entr" presetSubtype="0" fill="hold" nodeType="withEffect">
+                                <p:cTn id="9" presetID="1" presetClass="entr" presetSubtype="0" fill="hold" nodeType="clickEffect">
                                   <p:stCondLst>
                                     <p:cond delay="0"/>
                                   </p:stCondLst>
@@ -8411,7 +8451,7 @@
                                         <p:tgtEl>
                                           <p:spTgt spid="3">
                                             <p:txEl>
-                                              <p:pRg st="3" end="3"/>
+                                              <p:pRg st="5" end="5"/>
                                             </p:txEl>
                                           </p:spTgt>
                                         </p:tgtEl>
@@ -8460,56 +8500,7 @@
                                         <p:tgtEl>
                                           <p:spTgt spid="3">
                                             <p:txEl>
-                                              <p:pRg st="4" end="4"/>
-                                            </p:txEl>
-                                          </p:spTgt>
-                                        </p:tgtEl>
-                                        <p:attrNameLst>
-                                          <p:attrName>style.visibility</p:attrName>
-                                        </p:attrNameLst>
-                                      </p:cBhvr>
-                                      <p:to>
-                                        <p:strVal val="visible"/>
-                                      </p:to>
-                                    </p:set>
-                                  </p:childTnLst>
-                                </p:cTn>
-                              </p:par>
-                            </p:childTnLst>
-                          </p:cTn>
-                        </p:par>
-                      </p:childTnLst>
-                    </p:cTn>
-                  </p:par>
-                  <p:par>
-                    <p:cTn id="15" fill="hold">
-                      <p:stCondLst>
-                        <p:cond delay="indefinite"/>
-                      </p:stCondLst>
-                      <p:childTnLst>
-                        <p:par>
-                          <p:cTn id="16" fill="hold">
-                            <p:stCondLst>
-                              <p:cond delay="0"/>
-                            </p:stCondLst>
-                            <p:childTnLst>
-                              <p:par>
-                                <p:cTn id="17" presetID="1" presetClass="entr" presetSubtype="0" fill="hold" nodeType="clickEffect">
-                                  <p:stCondLst>
-                                    <p:cond delay="0"/>
-                                  </p:stCondLst>
-                                  <p:childTnLst>
-                                    <p:set>
-                                      <p:cBhvr>
-                                        <p:cTn id="18" dur="1" fill="hold">
-                                          <p:stCondLst>
-                                            <p:cond delay="0"/>
-                                          </p:stCondLst>
-                                        </p:cTn>
-                                        <p:tgtEl>
-                                          <p:spTgt spid="3">
-                                            <p:txEl>
-                                              <p:pRg st="5" end="5"/>
+                                              <p:pRg st="6" end="6"/>
                                             </p:txEl>
                                           </p:spTgt>
                                         </p:tgtEl>
@@ -12023,215 +12014,273 @@
           </a:p>
         </p:txBody>
       </p:sp>
-      <p:sp>
-        <p:nvSpPr>
-          <p:cNvPr id="3" name="Content Placeholder 2"/>
-          <p:cNvSpPr>
-            <a:spLocks noGrp="1"/>
-          </p:cNvSpPr>
-          <p:nvPr>
-            <p:ph sz="quarter" idx="10"/>
-          </p:nvPr>
-        </p:nvSpPr>
-        <p:spPr>
-          <a:xfrm>
-            <a:off x="333375" y="896079"/>
-            <a:ext cx="11525250" cy="5698998"/>
-          </a:xfrm>
-        </p:spPr>
-        <p:txBody>
-          <a:bodyPr>
-            <a:normAutofit/>
-          </a:bodyPr>
-          <a:lstStyle/>
-          <a:p>
-            <a:pPr marL="0" indent="0">
-              <a:buNone/>
-            </a:pPr>
-            <a:r>
-              <a:rPr lang="en-US" b="1" dirty="0">
-                <a:latin typeface="+mn-lt"/>
-              </a:rPr>
-              <a:t>Edit Distance</a:t>
-            </a:r>
-            <a:r>
-              <a:rPr lang="en-US" dirty="0">
-                <a:latin typeface="+mn-lt"/>
-              </a:rPr>
-              <a:t>: the number of edit operations required to </a:t>
-            </a:r>
-          </a:p>
-          <a:p>
-            <a:r>
-              <a:rPr lang="en-US" dirty="0">
-                <a:latin typeface="+mn-lt"/>
-              </a:rPr>
-              <a:t>Example: Consider two binary vectors:   </a:t>
-            </a:r>
-            <a:r>
-              <a:rPr lang="en-US" sz="2400" dirty="0">
-                <a:latin typeface="+mn-lt"/>
-              </a:rPr>
-              <a:t> </a:t>
-            </a:r>
-          </a:p>
-          <a:p>
-            <a:pPr marL="457200" lvl="1" indent="0">
-              <a:buNone/>
-            </a:pPr>
-            <a:r>
-              <a:rPr lang="en-US" dirty="0">
-                <a:latin typeface="+mn-lt"/>
-              </a:rPr>
-              <a:t>				x = </a:t>
-            </a:r>
-            <a:r>
-              <a:rPr lang="en-US" dirty="0" err="1">
-                <a:latin typeface="+mn-lt"/>
-              </a:rPr>
-              <a:t>thisismy</a:t>
-            </a:r>
-            <a:r>
-              <a:rPr lang="en-US" dirty="0" err="1">
-                <a:solidFill>
-                  <a:srgbClr val="C00000"/>
-                </a:solidFill>
-                <a:latin typeface="+mn-lt"/>
-              </a:rPr>
-              <a:t>olddog</a:t>
-            </a:r>
-            <a:endParaRPr lang="en-US" dirty="0">
-              <a:solidFill>
-                <a:srgbClr val="C00000"/>
-              </a:solidFill>
-              <a:latin typeface="+mn-lt"/>
-            </a:endParaRPr>
-          </a:p>
-          <a:p>
-            <a:pPr marL="457200" lvl="1" indent="0">
-              <a:buNone/>
-            </a:pPr>
-            <a:r>
-              <a:rPr lang="en-US" dirty="0">
-                <a:latin typeface="+mn-lt"/>
-              </a:rPr>
-              <a:t>				x’ = </a:t>
-            </a:r>
-            <a:r>
-              <a:rPr lang="en-US" dirty="0" err="1">
-                <a:latin typeface="+mn-lt"/>
-              </a:rPr>
-              <a:t>thisismy</a:t>
-            </a:r>
-            <a:r>
-              <a:rPr lang="en-US" dirty="0" err="1">
-                <a:solidFill>
-                  <a:srgbClr val="C00000"/>
-                </a:solidFill>
-                <a:latin typeface="+mn-lt"/>
-              </a:rPr>
-              <a:t>cat</a:t>
-            </a:r>
-            <a:endParaRPr lang="en-US" dirty="0">
-              <a:solidFill>
-                <a:srgbClr val="C00000"/>
-              </a:solidFill>
-              <a:latin typeface="+mn-lt"/>
-            </a:endParaRPr>
-          </a:p>
-          <a:p>
-            <a:pPr marL="457200" lvl="1" indent="0">
-              <a:buNone/>
-            </a:pPr>
-            <a:r>
-              <a:rPr lang="en-US" dirty="0">
-                <a:latin typeface="+mn-lt"/>
-              </a:rPr>
-              <a:t>Changes required to have same characters in both strings:   </a:t>
-            </a:r>
-          </a:p>
-          <a:p>
-            <a:pPr marL="457200" lvl="1" indent="0">
-              <a:buNone/>
-            </a:pPr>
-            <a:r>
-              <a:rPr lang="en-US" dirty="0">
-                <a:latin typeface="+mn-lt"/>
-              </a:rPr>
-              <a:t>				3 – deletes, o, l, d</a:t>
-            </a:r>
-          </a:p>
-          <a:p>
-            <a:pPr marL="457200" lvl="1" indent="0">
-              <a:buNone/>
-            </a:pPr>
-            <a:r>
-              <a:rPr lang="en-US" dirty="0">
-                <a:latin typeface="+mn-lt"/>
-              </a:rPr>
-              <a:t>                                               3 – changes, c, a, t</a:t>
-            </a:r>
-          </a:p>
-          <a:p>
-            <a:r>
-              <a:rPr lang="en-US" dirty="0">
-                <a:latin typeface="+mn-lt"/>
-              </a:rPr>
-              <a:t>Many edit distance metrics can be applied:  </a:t>
-            </a:r>
-          </a:p>
-          <a:p>
-            <a:pPr lvl="1"/>
-            <a:r>
-              <a:rPr lang="en-US" dirty="0">
-                <a:latin typeface="+mn-lt"/>
-              </a:rPr>
-              <a:t>Hamming distance </a:t>
-            </a:r>
-          </a:p>
-          <a:p>
-            <a:pPr lvl="1"/>
-            <a:r>
-              <a:rPr lang="en-US" dirty="0" err="1">
-                <a:latin typeface="+mn-lt"/>
-                <a:hlinkClick r:id="rId3"/>
-              </a:rPr>
-              <a:t>Levenshtein</a:t>
-            </a:r>
-            <a:r>
-              <a:rPr lang="en-US" dirty="0">
-                <a:latin typeface="+mn-lt"/>
-                <a:hlinkClick r:id="rId3"/>
-              </a:rPr>
-              <a:t> distance</a:t>
-            </a:r>
-            <a:r>
-              <a:rPr lang="en-US" dirty="0">
-                <a:latin typeface="+mn-lt"/>
-              </a:rPr>
-              <a:t>   </a:t>
-            </a:r>
-          </a:p>
-          <a:p>
-            <a:pPr lvl="1"/>
-            <a:r>
-              <a:rPr lang="en-US" dirty="0">
-                <a:latin typeface="+mn-lt"/>
-              </a:rPr>
-              <a:t>Longest common sequence</a:t>
-            </a:r>
-          </a:p>
-          <a:p>
-            <a:pPr lvl="1"/>
-            <a:r>
-              <a:rPr lang="en-US" dirty="0">
-                <a:latin typeface="+mn-lt"/>
-              </a:rPr>
-              <a:t>…</a:t>
-            </a:r>
-          </a:p>
-        </p:txBody>
-      </p:sp>
+      <mc:AlternateContent xmlns:mc="http://schemas.openxmlformats.org/markup-compatibility/2006">
+        <mc:Choice xmlns:a14="http://schemas.microsoft.com/office/drawing/2010/main" Requires="a14">
+          <p:sp>
+            <p:nvSpPr>
+              <p:cNvPr id="3" name="Content Placeholder 2"/>
+              <p:cNvSpPr>
+                <a:spLocks noGrp="1"/>
+              </p:cNvSpPr>
+              <p:nvPr>
+                <p:ph sz="quarter" idx="10"/>
+              </p:nvPr>
+            </p:nvSpPr>
+            <p:spPr>
+              <a:xfrm>
+                <a:off x="333375" y="896079"/>
+                <a:ext cx="11525250" cy="5698998"/>
+              </a:xfrm>
+            </p:spPr>
+            <p:txBody>
+              <a:bodyPr>
+                <a:normAutofit/>
+              </a:bodyPr>
+              <a:lstStyle/>
+              <a:p>
+                <a:pPr marL="0" indent="0">
+                  <a:buNone/>
+                </a:pPr>
+                <a:r>
+                  <a:rPr lang="en-US" b="1" dirty="0">
+                    <a:latin typeface="+mn-lt"/>
+                  </a:rPr>
+                  <a:t>Edit Distance</a:t>
+                </a:r>
+                <a:r>
+                  <a:rPr lang="en-US" dirty="0">
+                    <a:latin typeface="+mn-lt"/>
+                  </a:rPr>
+                  <a:t>: the number of edit operations required to </a:t>
+                </a:r>
+              </a:p>
+              <a:p>
+                <a:r>
+                  <a:rPr lang="en-US" dirty="0">
+                    <a:latin typeface="+mn-lt"/>
+                  </a:rPr>
+                  <a:t>Example: Consider two binary vectors:   </a:t>
+                </a:r>
+                <a:r>
+                  <a:rPr lang="en-US" sz="2400" dirty="0">
+                    <a:latin typeface="+mn-lt"/>
+                  </a:rPr>
+                  <a:t> </a:t>
+                </a:r>
+              </a:p>
+              <a:p>
+                <a:pPr marL="457200" lvl="1" indent="0">
+                  <a:buNone/>
+                </a:pPr>
+                <a:r>
+                  <a:rPr lang="en-US" dirty="0">
+                    <a:latin typeface="+mn-lt"/>
+                  </a:rPr>
+                  <a:t>				x = </a:t>
+                </a:r>
+                <a:r>
+                  <a:rPr lang="en-US" dirty="0" err="1">
+                    <a:latin typeface="+mn-lt"/>
+                  </a:rPr>
+                  <a:t>thisismy</a:t>
+                </a:r>
+                <a:r>
+                  <a:rPr lang="en-US" dirty="0" err="1">
+                    <a:solidFill>
+                      <a:srgbClr val="C00000"/>
+                    </a:solidFill>
+                    <a:latin typeface="+mn-lt"/>
+                  </a:rPr>
+                  <a:t>olddog</a:t>
+                </a:r>
+                <a:endParaRPr lang="en-US" dirty="0">
+                  <a:solidFill>
+                    <a:srgbClr val="C00000"/>
+                  </a:solidFill>
+                  <a:latin typeface="+mn-lt"/>
+                </a:endParaRPr>
+              </a:p>
+              <a:p>
+                <a:pPr marL="457200" lvl="1" indent="0">
+                  <a:buNone/>
+                </a:pPr>
+                <a:r>
+                  <a:rPr lang="en-US" dirty="0">
+                    <a:latin typeface="+mn-lt"/>
+                  </a:rPr>
+                  <a:t>				x’ = </a:t>
+                </a:r>
+                <a:r>
+                  <a:rPr lang="en-US" dirty="0" err="1">
+                    <a:latin typeface="+mn-lt"/>
+                  </a:rPr>
+                  <a:t>thisismy</a:t>
+                </a:r>
+                <a:r>
+                  <a:rPr lang="en-US" dirty="0" err="1">
+                    <a:solidFill>
+                      <a:srgbClr val="C00000"/>
+                    </a:solidFill>
+                    <a:latin typeface="+mn-lt"/>
+                  </a:rPr>
+                  <a:t>cat</a:t>
+                </a:r>
+                <a:endParaRPr lang="en-US" dirty="0">
+                  <a:solidFill>
+                    <a:srgbClr val="C00000"/>
+                  </a:solidFill>
+                  <a:latin typeface="+mn-lt"/>
+                </a:endParaRPr>
+              </a:p>
+              <a:p>
+                <a:pPr marL="457200" lvl="1" indent="0">
+                  <a:buNone/>
+                </a:pPr>
+                <a:r>
+                  <a:rPr lang="en-US" dirty="0">
+                    <a:latin typeface="+mn-lt"/>
+                  </a:rPr>
+                  <a:t>Changes required to have same characters in both strings:   </a:t>
+                </a:r>
+              </a:p>
+              <a:p>
+                <a:pPr marL="457200" lvl="1" indent="0">
+                  <a:buNone/>
+                </a:pPr>
+                <a:r>
+                  <a:rPr lang="en-US" dirty="0">
+                    <a:latin typeface="+mn-lt"/>
+                  </a:rPr>
+                  <a:t>				3 – deletes, o, l, d</a:t>
+                </a:r>
+              </a:p>
+              <a:p>
+                <a:pPr marL="457200" lvl="1" indent="0">
+                  <a:buNone/>
+                </a:pPr>
+                <a:r>
+                  <a:rPr lang="en-US" dirty="0">
+                    <a:latin typeface="+mn-lt"/>
+                  </a:rPr>
+                  <a:t>                                               3 – changes, c, a, t </a:t>
+                </a:r>
+                <a14:m>
+                  <m:oMath xmlns:m="http://schemas.openxmlformats.org/officeDocument/2006/math">
+                    <m:r>
+                      <a:rPr lang="en-US" i="1" smtClean="0">
+                        <a:latin typeface="Cambria Math" panose="02040503050406030204" pitchFamily="18" charset="0"/>
+                        <a:ea typeface="Cambria Math" panose="02040503050406030204" pitchFamily="18" charset="0"/>
+                      </a:rPr>
+                      <m:t>→</m:t>
+                    </m:r>
+                  </m:oMath>
+                </a14:m>
+                <a:r>
+                  <a:rPr lang="en-US" dirty="0">
+                    <a:latin typeface="+mn-lt"/>
+                  </a:rPr>
+                  <a:t> d, o, g</a:t>
+                </a:r>
+              </a:p>
+              <a:p>
+                <a:r>
+                  <a:rPr lang="en-US" dirty="0">
+                    <a:latin typeface="+mn-lt"/>
+                  </a:rPr>
+                  <a:t>Many edit distance metrics can be applied:  </a:t>
+                </a:r>
+              </a:p>
+              <a:p>
+                <a:pPr lvl="1"/>
+                <a:r>
+                  <a:rPr lang="en-US" dirty="0">
+                    <a:latin typeface="+mn-lt"/>
+                  </a:rPr>
+                  <a:t>Hamming distance </a:t>
+                </a:r>
+              </a:p>
+              <a:p>
+                <a:pPr lvl="1"/>
+                <a:r>
+                  <a:rPr lang="en-US" dirty="0" err="1">
+                    <a:latin typeface="+mn-lt"/>
+                    <a:hlinkClick r:id="rId3"/>
+                  </a:rPr>
+                  <a:t>Levenshtein</a:t>
+                </a:r>
+                <a:r>
+                  <a:rPr lang="en-US" dirty="0">
+                    <a:latin typeface="+mn-lt"/>
+                    <a:hlinkClick r:id="rId3"/>
+                  </a:rPr>
+                  <a:t> distance</a:t>
+                </a:r>
+                <a:r>
+                  <a:rPr lang="en-US" dirty="0">
+                    <a:latin typeface="+mn-lt"/>
+                  </a:rPr>
+                  <a:t>   </a:t>
+                </a:r>
+              </a:p>
+              <a:p>
+                <a:pPr lvl="1"/>
+                <a:r>
+                  <a:rPr lang="en-US" dirty="0">
+                    <a:latin typeface="+mn-lt"/>
+                  </a:rPr>
+                  <a:t>Longest common sequence</a:t>
+                </a:r>
+              </a:p>
+              <a:p>
+                <a:pPr lvl="1"/>
+                <a:r>
+                  <a:rPr lang="en-US" dirty="0">
+                    <a:latin typeface="+mn-lt"/>
+                  </a:rPr>
+                  <a:t>…</a:t>
+                </a:r>
+              </a:p>
+            </p:txBody>
+          </p:sp>
+        </mc:Choice>
+        <mc:Fallback>
+          <p:sp>
+            <p:nvSpPr>
+              <p:cNvPr id="3" name="Content Placeholder 2"/>
+              <p:cNvSpPr>
+                <a:spLocks noGrp="1" noRot="1" noChangeAspect="1" noMove="1" noResize="1" noEditPoints="1" noAdjustHandles="1" noChangeArrowheads="1" noChangeShapeType="1" noTextEdit="1"/>
+              </p:cNvSpPr>
+              <p:nvPr>
+                <p:ph sz="quarter" idx="10"/>
+              </p:nvPr>
+            </p:nvSpPr>
+            <p:spPr>
+              <a:xfrm>
+                <a:off x="333375" y="896079"/>
+                <a:ext cx="11525250" cy="5698998"/>
+              </a:xfrm>
+              <a:blipFill>
+                <a:blip r:embed="rId4"/>
+                <a:stretch>
+                  <a:fillRect l="-1111" t="-1818"/>
+                </a:stretch>
+              </a:blipFill>
+            </p:spPr>
+            <p:txBody>
+              <a:bodyPr/>
+              <a:lstStyle/>
+              <a:p>
+                <a:r>
+                  <a:rPr lang="en-US">
+                    <a:noFill/>
+                  </a:rPr>
+                  <a:t> </a:t>
+                </a:r>
+              </a:p>
+            </p:txBody>
+          </p:sp>
+        </mc:Fallback>
+      </mc:AlternateContent>
     </p:spTree>
     <p:extLst>
       <p:ext uri="{BB962C8B-B14F-4D97-AF65-F5344CB8AC3E}">
@@ -14270,8 +14319,8 @@
           </a:p>
         </p:txBody>
       </p:sp>
-      <mc:AlternateContent xmlns:mc="http://schemas.openxmlformats.org/markup-compatibility/2006" xmlns:a14="http://schemas.microsoft.com/office/drawing/2010/main">
-        <mc:Choice Requires="a14">
+      <mc:AlternateContent xmlns:mc="http://schemas.openxmlformats.org/markup-compatibility/2006">
+        <mc:Choice xmlns:a14="http://schemas.microsoft.com/office/drawing/2010/main" Requires="a14">
           <p:sp>
             <p:nvSpPr>
               <p:cNvPr id="3" name="Content Placeholder 2"/>
@@ -14343,19 +14392,7 @@
                   <a:rPr lang="en-US" dirty="0">
                     <a:latin typeface="+mn-lt"/>
                   </a:rPr>
-                  <a:t>, to adjust for the variance and normalization, </a:t>
-                </a:r>
-                <a:r>
-                  <a:rPr lang="en-US" i="1" dirty="0">
-                    <a:latin typeface="+mn-lt"/>
-                  </a:rPr>
-                  <a:t>r</a:t>
-                </a:r>
-                <a:r>
-                  <a:rPr lang="en-US" dirty="0">
-                    <a:latin typeface="+mn-lt"/>
-                  </a:rPr>
-                  <a:t>, for </a:t>
+                  <a:t>, to standardize the variance of </a:t>
                 </a:r>
                 <a:r>
                   <a:rPr lang="en-US" i="1" dirty="0">
@@ -14367,7 +14404,23 @@
                   <a:rPr lang="en-US" dirty="0">
                     <a:latin typeface="+mn-lt"/>
                   </a:rPr>
-                  <a:t>variables </a:t>
+                  <a:t>variables with </a:t>
+                </a:r>
+                <a14:m>
+                  <m:oMath xmlns:m="http://schemas.openxmlformats.org/officeDocument/2006/math">
+                    <m:r>
+                      <a:rPr lang="en-US" b="0" i="1" smtClean="0">
+                        <a:latin typeface="Cambria Math" panose="02040503050406030204" pitchFamily="18" charset="0"/>
+                      </a:rPr>
+                      <m:t>𝑛</m:t>
+                    </m:r>
+                  </m:oMath>
+                </a14:m>
+                <a:r>
+                  <a:rPr lang="en-US" dirty="0">
+                    <a:latin typeface="+mn-lt"/>
+                  </a:rPr>
+                  <a:t> samples </a:t>
                 </a:r>
               </a:p>
               <a:p>
@@ -14428,32 +14481,21 @@
                           </m:r>
                         </m:num>
                         <m:den>
-                          <m:r>
-                            <a:rPr lang="en-US" b="0" i="1" smtClean="0">
-                              <a:latin typeface="Cambria Math" panose="02040503050406030204" pitchFamily="18" charset="0"/>
-                            </a:rPr>
-                            <m:t>𝑟</m:t>
-                          </m:r>
-                          <m:r>
-                            <a:rPr lang="en-US" b="0" i="1" smtClean="0">
-                              <a:latin typeface="Cambria Math" panose="02040503050406030204" pitchFamily="18" charset="0"/>
-                            </a:rPr>
-                            <m:t>∗</m:t>
-                          </m:r>
-                          <m:sSub>
-                            <m:sSubPr>
+                          <m:sSubSup>
+                            <m:sSubSupPr>
                               <m:ctrlPr>
                                 <a:rPr lang="en-US" b="0" i="1" smtClean="0">
                                   <a:latin typeface="Cambria Math" panose="02040503050406030204" pitchFamily="18" charset="0"/>
                                 </a:rPr>
                               </m:ctrlPr>
-                            </m:sSubPr>
+                            </m:sSubSupPr>
                             <m:e>
                               <m:r>
-                                <a:rPr lang="en-US" i="1">
+                                <a:rPr lang="en-US" b="0" i="1" smtClean="0">
                                   <a:latin typeface="Cambria Math" panose="02040503050406030204" pitchFamily="18" charset="0"/>
+                                  <a:ea typeface="Cambria Math" panose="02040503050406030204" pitchFamily="18" charset="0"/>
                                 </a:rPr>
-                                <m:t>𝑣𝑎𝑟𝑖𝑎𝑛𝑐𝑒</m:t>
+                                <m:t>𝜎</m:t>
                               </m:r>
                             </m:e>
                             <m:sub>
@@ -14464,21 +14506,63 @@
                                 <m:t>𝑖</m:t>
                               </m:r>
                             </m:sub>
-                          </m:sSub>
+                            <m:sup>
+                              <m:r>
+                                <a:rPr lang="en-US" b="0" i="1" smtClean="0">
+                                  <a:latin typeface="Cambria Math" panose="02040503050406030204" pitchFamily="18" charset="0"/>
+                                </a:rPr>
+                                <m:t>2</m:t>
+                              </m:r>
+                            </m:sup>
+                          </m:sSubSup>
                         </m:den>
                       </m:f>
                       <m:r>
                         <a:rPr lang="en-US" b="0" i="1" smtClean="0">
                           <a:latin typeface="Cambria Math" panose="02040503050406030204" pitchFamily="18" charset="0"/>
                         </a:rPr>
-                        <m:t>,  </m:t>
+                        <m:t>,</m:t>
                       </m:r>
                       <m:r>
                         <a:rPr lang="en-US" b="0" i="1" smtClean="0">
                           <a:latin typeface="Cambria Math" panose="02040503050406030204" pitchFamily="18" charset="0"/>
                         </a:rPr>
-                        <m:t>𝑟</m:t>
+                        <m:t>    </m:t>
                       </m:r>
+                      <m:sSubSup>
+                        <m:sSubSupPr>
+                          <m:ctrlPr>
+                            <a:rPr lang="en-US" i="1">
+                              <a:latin typeface="Cambria Math" panose="02040503050406030204" pitchFamily="18" charset="0"/>
+                            </a:rPr>
+                          </m:ctrlPr>
+                        </m:sSubSupPr>
+                        <m:e>
+                          <m:r>
+                            <a:rPr lang="en-US" i="1">
+                              <a:latin typeface="Cambria Math" panose="02040503050406030204" pitchFamily="18" charset="0"/>
+                              <a:ea typeface="Cambria Math" panose="02040503050406030204" pitchFamily="18" charset="0"/>
+                            </a:rPr>
+                            <m:t>𝜎</m:t>
+                          </m:r>
+                        </m:e>
+                        <m:sub>
+                          <m:r>
+                            <a:rPr lang="en-US" i="1">
+                              <a:latin typeface="Cambria Math" panose="02040503050406030204" pitchFamily="18" charset="0"/>
+                            </a:rPr>
+                            <m:t>𝑖</m:t>
+                          </m:r>
+                        </m:sub>
+                        <m:sup>
+                          <m:r>
+                            <a:rPr lang="en-US" i="1">
+                              <a:latin typeface="Cambria Math" panose="02040503050406030204" pitchFamily="18" charset="0"/>
+                            </a:rPr>
+                            <m:t>2</m:t>
+                          </m:r>
+                        </m:sup>
+                      </m:sSubSup>
                       <m:r>
                         <a:rPr lang="en-US" b="0" i="1" smtClean="0">
                           <a:latin typeface="Cambria Math" panose="02040503050406030204" pitchFamily="18" charset="0"/>
@@ -14502,7 +14586,7 @@
                             <a:rPr lang="en-US" b="0" i="1" smtClean="0">
                               <a:latin typeface="Cambria Math" panose="02040503050406030204" pitchFamily="18" charset="0"/>
                             </a:rPr>
-                            <m:t>𝑖</m:t>
+                            <m:t>𝑗</m:t>
                           </m:r>
                           <m:r>
                             <a:rPr lang="en-US" b="0" i="1" smtClean="0">
@@ -14516,10 +14600,61 @@
                             <a:rPr lang="en-US" b="0" i="1" smtClean="0">
                               <a:latin typeface="Cambria Math" panose="02040503050406030204" pitchFamily="18" charset="0"/>
                             </a:rPr>
-                            <m:t>𝑝</m:t>
+                            <m:t>𝑛</m:t>
                           </m:r>
                         </m:sup>
                         <m:e>
+                          <m:sSubSup>
+                            <m:sSubSupPr>
+                              <m:ctrlPr>
+                                <a:rPr lang="en-US" b="0" i="1" smtClean="0">
+                                  <a:latin typeface="Cambria Math" panose="02040503050406030204" pitchFamily="18" charset="0"/>
+                                </a:rPr>
+                              </m:ctrlPr>
+                            </m:sSubSupPr>
+                            <m:e>
+                              <m:r>
+                                <a:rPr lang="en-US" b="0" i="1" smtClean="0">
+                                  <a:latin typeface="Cambria Math" panose="02040503050406030204" pitchFamily="18" charset="0"/>
+                                </a:rPr>
+                                <m:t>𝑥</m:t>
+                              </m:r>
+                            </m:e>
+                            <m:sub>
+                              <m:r>
+                                <a:rPr lang="en-US" b="0" i="1" smtClean="0">
+                                  <a:latin typeface="Cambria Math" panose="02040503050406030204" pitchFamily="18" charset="0"/>
+                                </a:rPr>
+                                <m:t>𝑗</m:t>
+                              </m:r>
+                            </m:sub>
+                            <m:sup>
+                              <m:r>
+                                <a:rPr lang="en-US" b="0" i="1" smtClean="0">
+                                  <a:latin typeface="Cambria Math" panose="02040503050406030204" pitchFamily="18" charset="0"/>
+                                </a:rPr>
+                                <m:t>(</m:t>
+                              </m:r>
+                              <m:r>
+                                <a:rPr lang="en-US" b="0" i="1" smtClean="0">
+                                  <a:latin typeface="Cambria Math" panose="02040503050406030204" pitchFamily="18" charset="0"/>
+                                </a:rPr>
+                                <m:t>𝑖</m:t>
+                              </m:r>
+                              <m:r>
+                                <a:rPr lang="en-US" b="0" i="1" smtClean="0">
+                                  <a:latin typeface="Cambria Math" panose="02040503050406030204" pitchFamily="18" charset="0"/>
+                                </a:rPr>
+                                <m:t>)</m:t>
+                              </m:r>
+                            </m:sup>
+                          </m:sSubSup>
+                          <m:r>
+                            <a:rPr lang="en-US" b="0" i="1" smtClean="0">
+                              <a:latin typeface="Cambria Math" panose="02040503050406030204" pitchFamily="18" charset="0"/>
+                            </a:rPr>
+                            <m:t>−</m:t>
+                          </m:r>
                           <m:sSub>
                             <m:sSubPr>
                               <m:ctrlPr>
@@ -14529,19 +14664,62 @@
                               </m:ctrlPr>
                             </m:sSubPr>
                             <m:e>
-                              <m:r>
-                                <a:rPr lang="en-US" b="0" i="1" smtClean="0">
-                                  <a:latin typeface="Cambria Math" panose="02040503050406030204" pitchFamily="18" charset="0"/>
-                                </a:rPr>
-                                <m:t>𝑣𝑎𝑟𝑖𝑎𝑛𝑐𝑒</m:t>
-                              </m:r>
+                              <m:sSup>
+                                <m:sSupPr>
+                                  <m:ctrlPr>
+                                    <a:rPr lang="en-US" b="0" i="1" smtClean="0">
+                                      <a:latin typeface="Cambria Math" panose="02040503050406030204" pitchFamily="18" charset="0"/>
+                                    </a:rPr>
+                                  </m:ctrlPr>
+                                </m:sSupPr>
+                                <m:e>
+                                  <m:acc>
+                                    <m:accPr>
+                                      <m:chr m:val="̅"/>
+                                      <m:ctrlPr>
+                                        <a:rPr lang="en-US" i="1">
+                                          <a:latin typeface="Cambria Math" panose="02040503050406030204" pitchFamily="18" charset="0"/>
+                                        </a:rPr>
+                                      </m:ctrlPr>
+                                    </m:accPr>
+                                    <m:e>
+                                      <m:r>
+                                        <a:rPr lang="en-US" i="1">
+                                          <a:latin typeface="Cambria Math" panose="02040503050406030204" pitchFamily="18" charset="0"/>
+                                        </a:rPr>
+                                        <m:t>𝑥</m:t>
+                                      </m:r>
+                                    </m:e>
+                                  </m:acc>
+                                </m:e>
+                                <m:sup>
+                                  <m:r>
+                                    <a:rPr lang="en-US" b="0" i="1" smtClean="0">
+                                      <a:latin typeface="Cambria Math" panose="02040503050406030204" pitchFamily="18" charset="0"/>
+                                    </a:rPr>
+                                    <m:t>(</m:t>
+                                  </m:r>
+                                  <m:r>
+                                    <a:rPr lang="en-US" b="0" i="1" smtClean="0">
+                                      <a:latin typeface="Cambria Math" panose="02040503050406030204" pitchFamily="18" charset="0"/>
+                                    </a:rPr>
+                                    <m:t>𝑖</m:t>
+                                  </m:r>
+                                  <m:r>
+                                    <a:rPr lang="en-US" b="0" i="1" smtClean="0">
+                                      <a:latin typeface="Cambria Math" panose="02040503050406030204" pitchFamily="18" charset="0"/>
+                                    </a:rPr>
+                                    <m:t>)</m:t>
+                                  </m:r>
+                                </m:sup>
+                              </m:sSup>
                             </m:e>
                             <m:sub>
                               <m:r>
                                 <a:rPr lang="en-US" b="0" i="1" smtClean="0">
                                   <a:latin typeface="Cambria Math" panose="02040503050406030204" pitchFamily="18" charset="0"/>
                                 </a:rPr>
-                                <m:t>𝑖</m:t>
+                                <m:t> </m:t>
                               </m:r>
                             </m:sub>
                           </m:sSub>
@@ -14559,7 +14737,7 @@
                   <a:rPr lang="en-US" dirty="0">
                     <a:latin typeface="+mn-lt"/>
                   </a:rPr>
-                  <a:t>Or better, set weights to have meaning from the problem</a:t>
+                  <a:t>Or, set weights to have meaning from the problem</a:t>
                 </a:r>
               </a:p>
               <a:p>
@@ -14588,7 +14766,7 @@
             </p:txBody>
           </p:sp>
         </mc:Choice>
-        <mc:Fallback xmlns="">
+        <mc:Fallback>
           <p:sp>
             <p:nvSpPr>
               <p:cNvPr id="3" name="Content Placeholder 2"/>
@@ -14865,33 +15043,15 @@
                                   </p:childTnLst>
                                 </p:cTn>
                               </p:par>
-                            </p:childTnLst>
-                          </p:cTn>
-                        </p:par>
-                      </p:childTnLst>
-                    </p:cTn>
-                  </p:par>
-                  <p:par>
-                    <p:cTn id="21" fill="hold">
-                      <p:stCondLst>
-                        <p:cond delay="indefinite"/>
-                      </p:stCondLst>
-                      <p:childTnLst>
-                        <p:par>
-                          <p:cTn id="22" fill="hold">
-                            <p:stCondLst>
-                              <p:cond delay="0"/>
-                            </p:stCondLst>
-                            <p:childTnLst>
                               <p:par>
-                                <p:cTn id="23" presetID="1" presetClass="entr" presetSubtype="0" fill="hold" nodeType="clickEffect">
+                                <p:cTn id="21" presetID="1" presetClass="entr" presetSubtype="0" fill="hold" nodeType="withEffect">
                                   <p:stCondLst>
                                     <p:cond delay="0"/>
                                   </p:stCondLst>
                                   <p:childTnLst>
                                     <p:set>
                                       <p:cBhvr>
-                                        <p:cTn id="24" dur="1" fill="hold">
+                                        <p:cTn id="22" dur="1" fill="hold">
                                           <p:stCondLst>
                                             <p:cond delay="0"/>
                                           </p:stCondLst>
@@ -16949,7 +17109,7 @@
         </p:spPr>
         <p:txBody>
           <a:bodyPr>
-            <a:normAutofit lnSpcReduction="10000"/>
+            <a:normAutofit/>
           </a:bodyPr>
           <a:lstStyle/>
           <a:p>
@@ -17037,7 +17197,7 @@
               <a:rPr lang="en-US" sz="2400" i="1" dirty="0">
                 <a:latin typeface="+mn-lt"/>
               </a:rPr>
-              <a:t>Important Note: There is some controversy around methodology for combining distance metrics of different data types. Some textbooks and theoreticians say combining types should never be done. Pragmatists, claim realize we must do something, even if questionable. </a:t>
+              <a:t>Important Note: There is some controversy around methodology for combining distance metrics of different data types. Some textbooks and theoreticians say combining types should never be done. Pragmatists, realize we must do something, even if questionable. </a:t>
             </a:r>
           </a:p>
         </p:txBody>
@@ -27214,12 +27374,12 @@
         <p:spPr>
           <a:xfrm>
             <a:off x="333375" y="896079"/>
-            <a:ext cx="11525250" cy="2486354"/>
+            <a:ext cx="11525250" cy="2141761"/>
           </a:xfrm>
         </p:spPr>
         <p:txBody>
           <a:bodyPr>
-            <a:normAutofit/>
+            <a:normAutofit lnSpcReduction="10000"/>
           </a:bodyPr>
           <a:lstStyle/>
           <a:p>
@@ -27267,8 +27427,8 @@
           </a:p>
         </p:txBody>
       </p:sp>
-      <mc:AlternateContent xmlns:mc="http://schemas.openxmlformats.org/markup-compatibility/2006" xmlns:a14="http://schemas.microsoft.com/office/drawing/2010/main">
-        <mc:Choice Requires="a14">
+      <mc:AlternateContent xmlns:mc="http://schemas.openxmlformats.org/markup-compatibility/2006">
+        <mc:Choice xmlns:a14="http://schemas.microsoft.com/office/drawing/2010/main" Requires="a14">
           <p:graphicFrame>
             <p:nvGraphicFramePr>
               <p:cNvPr id="5" name="Table 5">
@@ -27284,14 +27444,14 @@
               <p:nvPr>
                 <p:extLst>
                   <p:ext uri="{D42A27DB-BD31-4B8C-83A1-F6EECF244321}">
-                    <p14:modId xmlns:p14="http://schemas.microsoft.com/office/powerpoint/2010/main" val="768059417"/>
+                    <p14:modId xmlns:p14="http://schemas.microsoft.com/office/powerpoint/2010/main" val="3884684090"/>
                   </p:ext>
                 </p:extLst>
               </p:nvPr>
             </p:nvGraphicFramePr>
             <p:xfrm>
-              <a:off x="825468" y="3675331"/>
-              <a:ext cx="10618258" cy="2903284"/>
+              <a:off x="127000" y="3244292"/>
+              <a:ext cx="11938000" cy="3421444"/>
             </p:xfrm>
             <a:graphic>
               <a:graphicData uri="http://schemas.openxmlformats.org/drawingml/2006/table">
@@ -27300,14 +27460,14 @@
                     <a:tableStyleId>{5C22544A-7EE6-4342-B048-85BDC9FD1C3A}</a:tableStyleId>
                   </a:tblPr>
                   <a:tblGrid>
-                    <a:gridCol w="4216336">
+                    <a:gridCol w="5704840">
                       <a:extLst>
                         <a:ext uri="{9D8B030D-6E8A-4147-A177-3AD203B41FA5}">
                           <a16:colId xmlns:a16="http://schemas.microsoft.com/office/drawing/2014/main" val="367994989"/>
                         </a:ext>
                       </a:extLst>
                     </a:gridCol>
-                    <a:gridCol w="6401922">
+                    <a:gridCol w="6233160">
                       <a:extLst>
                         <a:ext uri="{9D8B030D-6E8A-4147-A177-3AD203B41FA5}">
                           <a16:colId xmlns:a16="http://schemas.microsoft.com/office/drawing/2014/main" val="2940886102"/>
@@ -27945,6 +28105,306 @@
                                 <a:schemeClr val="tx1"/>
                               </a:solidFill>
                             </a:rPr>
+                            <a:t>Hamming Similarity (</a:t>
+                          </a:r>
+                          <a14:m>
+                            <m:oMath xmlns:m="http://schemas.openxmlformats.org/officeDocument/2006/math">
+                              <m:r>
+                                <a:rPr lang="en-US" sz="2800" b="0" i="1" smtClean="0">
+                                  <a:solidFill>
+                                    <a:schemeClr val="tx1"/>
+                                  </a:solidFill>
+                                  <a:latin typeface="Cambria Math" panose="02040503050406030204" pitchFamily="18" charset="0"/>
+                                </a:rPr>
+                                <m:t>𝑛</m:t>
+                              </m:r>
+                            </m:oMath>
+                          </a14:m>
+                          <a:r>
+                            <a:rPr lang="en-US" sz="2800" dirty="0">
+                              <a:solidFill>
+                                <a:schemeClr val="tx1"/>
+                              </a:solidFill>
+                            </a:rPr>
+                            <a:t> length string)</a:t>
+                          </a:r>
+                        </a:p>
+                      </a:txBody>
+                      <a:tcPr/>
+                    </a:tc>
+                    <a:tc>
+                      <a:txBody>
+                        <a:bodyPr/>
+                        <a:lstStyle/>
+                        <a:p>
+                          <a:pPr/>
+                          <a14:m>
+                            <m:oMathPara xmlns:m="http://schemas.openxmlformats.org/officeDocument/2006/math">
+                              <m:oMathParaPr>
+                                <m:jc m:val="centerGroup"/>
+                              </m:oMathParaPr>
+                              <m:oMath xmlns:m="http://schemas.openxmlformats.org/officeDocument/2006/math">
+                                <m:sSub>
+                                  <m:sSubPr>
+                                    <m:ctrlPr>
+                                      <a:rPr lang="en-US" sz="2800" i="1" smtClean="0">
+                                        <a:solidFill>
+                                          <a:schemeClr val="tx1"/>
+                                        </a:solidFill>
+                                        <a:latin typeface="Cambria Math" panose="02040503050406030204" pitchFamily="18" charset="0"/>
+                                      </a:rPr>
+                                    </m:ctrlPr>
+                                  </m:sSubPr>
+                                  <m:e>
+                                    <m:r>
+                                      <a:rPr lang="en-US" sz="2800" b="0" i="1" smtClean="0">
+                                        <a:solidFill>
+                                          <a:schemeClr val="tx1"/>
+                                        </a:solidFill>
+                                        <a:latin typeface="Cambria Math" panose="02040503050406030204" pitchFamily="18" charset="0"/>
+                                      </a:rPr>
+                                      <m:t>𝑑</m:t>
+                                    </m:r>
+                                  </m:e>
+                                  <m:sub>
+                                    <m:r>
+                                      <a:rPr lang="en-US" sz="2800" b="0" i="1" smtClean="0">
+                                        <a:solidFill>
+                                          <a:schemeClr val="tx1"/>
+                                        </a:solidFill>
+                                        <a:latin typeface="Cambria Math" panose="02040503050406030204" pitchFamily="18" charset="0"/>
+                                      </a:rPr>
+                                      <m:t>h</m:t>
+                                    </m:r>
+                                  </m:sub>
+                                </m:sSub>
+                                <m:d>
+                                  <m:dPr>
+                                    <m:ctrlPr>
+                                      <a:rPr lang="en-US" sz="2800" b="0" i="1" smtClean="0">
+                                        <a:solidFill>
+                                          <a:schemeClr val="tx1"/>
+                                        </a:solidFill>
+                                        <a:latin typeface="Cambria Math" panose="02040503050406030204" pitchFamily="18" charset="0"/>
+                                      </a:rPr>
+                                    </m:ctrlPr>
+                                  </m:dPr>
+                                  <m:e>
+                                    <m:r>
+                                      <a:rPr lang="en-US" sz="2800" b="0" i="1" smtClean="0">
+                                        <a:solidFill>
+                                          <a:schemeClr val="tx1"/>
+                                        </a:solidFill>
+                                        <a:latin typeface="Cambria Math" panose="02040503050406030204" pitchFamily="18" charset="0"/>
+                                      </a:rPr>
+                                      <m:t>𝑥</m:t>
+                                    </m:r>
+                                    <m:r>
+                                      <a:rPr lang="en-US" sz="2800" b="0" i="1" smtClean="0">
+                                        <a:solidFill>
+                                          <a:schemeClr val="tx1"/>
+                                        </a:solidFill>
+                                        <a:latin typeface="Cambria Math" panose="02040503050406030204" pitchFamily="18" charset="0"/>
+                                      </a:rPr>
+                                      <m:t>,</m:t>
+                                    </m:r>
+                                    <m:sSup>
+                                      <m:sSupPr>
+                                        <m:ctrlPr>
+                                          <a:rPr lang="en-US" sz="2800" b="0" i="1" smtClean="0">
+                                            <a:solidFill>
+                                              <a:schemeClr val="tx1"/>
+                                            </a:solidFill>
+                                            <a:latin typeface="Cambria Math" panose="02040503050406030204" pitchFamily="18" charset="0"/>
+                                          </a:rPr>
+                                        </m:ctrlPr>
+                                      </m:sSupPr>
+                                      <m:e>
+                                        <m:r>
+                                          <a:rPr lang="en-US" sz="2800" b="0" i="1" smtClean="0">
+                                            <a:solidFill>
+                                              <a:schemeClr val="tx1"/>
+                                            </a:solidFill>
+                                            <a:latin typeface="Cambria Math" panose="02040503050406030204" pitchFamily="18" charset="0"/>
+                                          </a:rPr>
+                                          <m:t>𝑥</m:t>
+                                        </m:r>
+                                      </m:e>
+                                      <m:sup>
+                                        <m:r>
+                                          <a:rPr lang="en-US" sz="2800" b="0" i="1" smtClean="0">
+                                            <a:solidFill>
+                                              <a:schemeClr val="tx1"/>
+                                            </a:solidFill>
+                                            <a:latin typeface="Cambria Math" panose="02040503050406030204" pitchFamily="18" charset="0"/>
+                                          </a:rPr>
+                                          <m:t>′</m:t>
+                                        </m:r>
+                                      </m:sup>
+                                    </m:sSup>
+                                  </m:e>
+                                </m:d>
+                                <m:r>
+                                  <a:rPr lang="en-US" sz="2800" b="0" i="1" smtClean="0">
+                                    <a:solidFill>
+                                      <a:schemeClr val="tx1"/>
+                                    </a:solidFill>
+                                    <a:latin typeface="Cambria Math" panose="02040503050406030204" pitchFamily="18" charset="0"/>
+                                  </a:rPr>
+                                  <m:t>=</m:t>
+                                </m:r>
+                                <m:r>
+                                  <a:rPr lang="en-US" sz="2800" b="0" i="1" smtClean="0">
+                                    <a:solidFill>
+                                      <a:schemeClr val="tx1"/>
+                                    </a:solidFill>
+                                    <a:latin typeface="Cambria Math" panose="02040503050406030204" pitchFamily="18" charset="0"/>
+                                  </a:rPr>
+                                  <m:t>𝑛</m:t>
+                                </m:r>
+                                <m:r>
+                                  <a:rPr lang="en-US" sz="2800" b="0" i="1" smtClean="0">
+                                    <a:solidFill>
+                                      <a:schemeClr val="tx1"/>
+                                    </a:solidFill>
+                                    <a:latin typeface="Cambria Math" panose="02040503050406030204" pitchFamily="18" charset="0"/>
+                                  </a:rPr>
+                                  <m:t>−</m:t>
+                                </m:r>
+                                <m:sSub>
+                                  <m:sSubPr>
+                                    <m:ctrlPr>
+                                      <a:rPr lang="en-US" sz="2800" b="0" i="1" smtClean="0">
+                                        <a:solidFill>
+                                          <a:schemeClr val="tx1"/>
+                                        </a:solidFill>
+                                        <a:latin typeface="Cambria Math" panose="02040503050406030204" pitchFamily="18" charset="0"/>
+                                      </a:rPr>
+                                    </m:ctrlPr>
+                                  </m:sSubPr>
+                                  <m:e>
+                                    <m:r>
+                                      <a:rPr lang="en-US" sz="2800" b="0" i="1" smtClean="0">
+                                        <a:solidFill>
+                                          <a:schemeClr val="tx1"/>
+                                        </a:solidFill>
+                                        <a:latin typeface="Cambria Math" panose="02040503050406030204" pitchFamily="18" charset="0"/>
+                                      </a:rPr>
+                                      <m:t>𝑠</m:t>
+                                    </m:r>
+                                  </m:e>
+                                  <m:sub>
+                                    <m:r>
+                                      <a:rPr lang="en-US" sz="2800" b="0" i="1" smtClean="0">
+                                        <a:solidFill>
+                                          <a:schemeClr val="tx1"/>
+                                        </a:solidFill>
+                                        <a:latin typeface="Cambria Math" panose="02040503050406030204" pitchFamily="18" charset="0"/>
+                                      </a:rPr>
+                                      <m:t>h</m:t>
+                                    </m:r>
+                                  </m:sub>
+                                </m:sSub>
+                                <m:r>
+                                  <a:rPr lang="en-US" sz="2800" b="0" i="1" smtClean="0">
+                                    <a:solidFill>
+                                      <a:schemeClr val="tx1"/>
+                                    </a:solidFill>
+                                    <a:latin typeface="Cambria Math" panose="02040503050406030204" pitchFamily="18" charset="0"/>
+                                  </a:rPr>
+                                  <m:t>(</m:t>
+                                </m:r>
+                                <m:r>
+                                  <a:rPr lang="en-US" sz="2800" b="0" i="1" smtClean="0">
+                                    <a:solidFill>
+                                      <a:schemeClr val="tx1"/>
+                                    </a:solidFill>
+                                    <a:latin typeface="Cambria Math" panose="02040503050406030204" pitchFamily="18" charset="0"/>
+                                  </a:rPr>
+                                  <m:t>𝑥</m:t>
+                                </m:r>
+                                <m:r>
+                                  <a:rPr lang="en-US" sz="2800" b="0" i="1" smtClean="0">
+                                    <a:solidFill>
+                                      <a:schemeClr val="tx1"/>
+                                    </a:solidFill>
+                                    <a:latin typeface="Cambria Math" panose="02040503050406030204" pitchFamily="18" charset="0"/>
+                                  </a:rPr>
+                                  <m:t>,</m:t>
+                                </m:r>
+                                <m:sSup>
+                                  <m:sSupPr>
+                                    <m:ctrlPr>
+                                      <a:rPr lang="en-US" sz="2800" b="0" i="1" smtClean="0">
+                                        <a:solidFill>
+                                          <a:schemeClr val="tx1"/>
+                                        </a:solidFill>
+                                        <a:latin typeface="Cambria Math" panose="02040503050406030204" pitchFamily="18" charset="0"/>
+                                      </a:rPr>
+                                    </m:ctrlPr>
+                                  </m:sSupPr>
+                                  <m:e>
+                                    <m:r>
+                                      <a:rPr lang="en-US" sz="2800" b="0" i="1" smtClean="0">
+                                        <a:solidFill>
+                                          <a:schemeClr val="tx1"/>
+                                        </a:solidFill>
+                                        <a:latin typeface="Cambria Math" panose="02040503050406030204" pitchFamily="18" charset="0"/>
+                                      </a:rPr>
+                                      <m:t>𝑥</m:t>
+                                    </m:r>
+                                  </m:e>
+                                  <m:sup>
+                                    <m:r>
+                                      <a:rPr lang="en-US" sz="2800" b="0" i="1" smtClean="0">
+                                        <a:solidFill>
+                                          <a:schemeClr val="tx1"/>
+                                        </a:solidFill>
+                                        <a:latin typeface="Cambria Math" panose="02040503050406030204" pitchFamily="18" charset="0"/>
+                                      </a:rPr>
+                                      <m:t>′</m:t>
+                                    </m:r>
+                                  </m:sup>
+                                </m:sSup>
+                                <m:r>
+                                  <a:rPr lang="en-US" sz="2800" b="0" i="1" smtClean="0">
+                                    <a:solidFill>
+                                      <a:schemeClr val="tx1"/>
+                                    </a:solidFill>
+                                    <a:latin typeface="Cambria Math" panose="02040503050406030204" pitchFamily="18" charset="0"/>
+                                  </a:rPr>
+                                  <m:t>)</m:t>
+                                </m:r>
+                              </m:oMath>
+                            </m:oMathPara>
+                          </a14:m>
+                          <a:endParaRPr lang="en-US" sz="2800" dirty="0">
+                            <a:solidFill>
+                              <a:schemeClr val="tx1"/>
+                            </a:solidFill>
+                          </a:endParaRPr>
+                        </a:p>
+                      </a:txBody>
+                      <a:tcPr/>
+                    </a:tc>
+                    <a:extLst>
+                      <a:ext uri="{0D108BD9-81ED-4DB2-BD59-A6C34878D82A}">
+                        <a16:rowId xmlns:a16="http://schemas.microsoft.com/office/drawing/2014/main" val="1091878639"/>
+                      </a:ext>
+                    </a:extLst>
+                  </a:tr>
+                  <a:tr h="370840">
+                    <a:tc>
+                      <a:txBody>
+                        <a:bodyPr/>
+                        <a:lstStyle/>
+                        <a:p>
+                          <a:r>
+                            <a:rPr lang="en-US" sz="2800" dirty="0">
+                              <a:solidFill>
+                                <a:schemeClr val="tx1"/>
+                              </a:solidFill>
+                            </a:rPr>
                             <a:t>Cosine Similarity</a:t>
                           </a:r>
                         </a:p>
@@ -28273,7 +28733,7 @@
             </a:graphic>
           </p:graphicFrame>
         </mc:Choice>
-        <mc:Fallback xmlns="">
+        <mc:Fallback>
           <p:graphicFrame>
             <p:nvGraphicFramePr>
               <p:cNvPr id="5" name="Table 5">
@@ -28289,14 +28749,14 @@
               <p:nvPr>
                 <p:extLst>
                   <p:ext uri="{D42A27DB-BD31-4B8C-83A1-F6EECF244321}">
-                    <p14:modId xmlns:p14="http://schemas.microsoft.com/office/powerpoint/2010/main" val="768059417"/>
+                    <p14:modId xmlns:p14="http://schemas.microsoft.com/office/powerpoint/2010/main" val="3884684090"/>
                   </p:ext>
                 </p:extLst>
               </p:nvPr>
             </p:nvGraphicFramePr>
             <p:xfrm>
-              <a:off x="825468" y="3675331"/>
-              <a:ext cx="10618258" cy="2903284"/>
+              <a:off x="127000" y="3244292"/>
+              <a:ext cx="11938000" cy="3421444"/>
             </p:xfrm>
             <a:graphic>
               <a:graphicData uri="http://schemas.openxmlformats.org/drawingml/2006/table">
@@ -28305,14 +28765,14 @@
                     <a:tableStyleId>{5C22544A-7EE6-4342-B048-85BDC9FD1C3A}</a:tableStyleId>
                   </a:tblPr>
                   <a:tblGrid>
-                    <a:gridCol w="4216336">
+                    <a:gridCol w="5704840">
                       <a:extLst>
                         <a:ext uri="{9D8B030D-6E8A-4147-A177-3AD203B41FA5}">
                           <a16:colId xmlns:a16="http://schemas.microsoft.com/office/drawing/2014/main" val="367994989"/>
                         </a:ext>
                       </a:extLst>
                     </a:gridCol>
-                    <a:gridCol w="6401922">
+                    <a:gridCol w="6233160">
                       <a:extLst>
                         <a:ext uri="{9D8B030D-6E8A-4147-A177-3AD203B41FA5}">
                           <a16:colId xmlns:a16="http://schemas.microsoft.com/office/drawing/2014/main" val="2940886102"/>
@@ -28393,7 +28853,7 @@
                         <a:blipFill>
                           <a:blip r:embed="rId3"/>
                           <a:stretch>
-                            <a:fillRect l="-65937" t="-63946" r="-381" b="-168707"/>
+                            <a:fillRect l="-91691" t="-64384" r="-391" b="-228082"/>
                           </a:stretch>
                         </a:blipFill>
                       </a:tcPr>
@@ -28434,7 +28894,7 @@
                         <a:blipFill>
                           <a:blip r:embed="rId3"/>
                           <a:stretch>
-                            <a:fillRect l="-65937" t="-267778" r="-381" b="-175556"/>
+                            <a:fillRect l="-91691" t="-266667" r="-391" b="-270000"/>
                           </a:stretch>
                         </a:blipFill>
                       </a:tcPr>
@@ -28442,6 +28902,47 @@
                     <a:extLst>
                       <a:ext uri="{0D108BD9-81ED-4DB2-BD59-A6C34878D82A}">
                         <a16:rowId xmlns:a16="http://schemas.microsoft.com/office/drawing/2014/main" val="518136395"/>
+                      </a:ext>
+                    </a:extLst>
+                  </a:tr>
+                  <a:tr h="518160">
+                    <a:tc>
+                      <a:txBody>
+                        <a:bodyPr/>
+                        <a:lstStyle/>
+                        <a:p>
+                          <a:endParaRPr lang="en-US"/>
+                        </a:p>
+                      </a:txBody>
+                      <a:tcPr>
+                        <a:blipFill>
+                          <a:blip r:embed="rId3"/>
+                          <a:stretch>
+                            <a:fillRect l="-107" t="-388235" r="-109605" b="-185882"/>
+                          </a:stretch>
+                        </a:blipFill>
+                      </a:tcPr>
+                    </a:tc>
+                    <a:tc>
+                      <a:txBody>
+                        <a:bodyPr/>
+                        <a:lstStyle/>
+                        <a:p>
+                          <a:endParaRPr lang="en-US"/>
+                        </a:p>
+                      </a:txBody>
+                      <a:tcPr>
+                        <a:blipFill>
+                          <a:blip r:embed="rId3"/>
+                          <a:stretch>
+                            <a:fillRect l="-91691" t="-388235" r="-391" b="-185882"/>
+                          </a:stretch>
+                        </a:blipFill>
+                      </a:tcPr>
+                    </a:tc>
+                    <a:extLst>
+                      <a:ext uri="{0D108BD9-81ED-4DB2-BD59-A6C34878D82A}">
+                        <a16:rowId xmlns:a16="http://schemas.microsoft.com/office/drawing/2014/main" val="1091878639"/>
                       </a:ext>
                     </a:extLst>
                   </a:tr>
@@ -28475,7 +28976,7 @@
                         <a:blipFill>
                           <a:blip r:embed="rId3"/>
                           <a:stretch>
-                            <a:fillRect l="-65937" t="-212179" r="-381" b="-1282"/>
+                            <a:fillRect l="-91691" t="-266026" r="-391" b="-1282"/>
                           </a:stretch>
                         </a:blipFill>
                       </a:tcPr>
@@ -29315,8 +29816,8 @@
           </a:p>
         </p:txBody>
       </p:sp>
-      <mc:AlternateContent xmlns:mc="http://schemas.openxmlformats.org/markup-compatibility/2006" xmlns:a14="http://schemas.microsoft.com/office/drawing/2010/main">
-        <mc:Choice Requires="a14">
+      <mc:AlternateContent xmlns:mc="http://schemas.openxmlformats.org/markup-compatibility/2006">
+        <mc:Choice xmlns:a14="http://schemas.microsoft.com/office/drawing/2010/main" Requires="a14">
           <p:sp>
             <p:nvSpPr>
               <p:cNvPr id="3" name="Content Placeholder 2"/>
@@ -29388,7 +29889,48 @@
                   <a:rPr lang="en-US" dirty="0">
                     <a:latin typeface="+mn-lt"/>
                   </a:rPr>
-                  <a:t>Examples of transformations (e.g. for Euclidean metrics) :  </a:t>
+                  <a:t>Distance always </a:t>
+                </a:r>
+                <a14:m>
+                  <m:oMath xmlns:m="http://schemas.openxmlformats.org/officeDocument/2006/math">
+                    <m:r>
+                      <a:rPr lang="en-US" i="1" smtClean="0">
+                        <a:latin typeface="Cambria Math" panose="02040503050406030204" pitchFamily="18" charset="0"/>
+                        <a:ea typeface="Cambria Math" panose="02040503050406030204" pitchFamily="18" charset="0"/>
+                      </a:rPr>
+                      <m:t>≥</m:t>
+                    </m:r>
+                    <m:r>
+                      <a:rPr lang="en-US" b="0" i="1" smtClean="0">
+                        <a:latin typeface="Cambria Math" panose="02040503050406030204" pitchFamily="18" charset="0"/>
+                        <a:ea typeface="Cambria Math" panose="02040503050406030204" pitchFamily="18" charset="0"/>
+                      </a:rPr>
+                      <m:t>0</m:t>
+                    </m:r>
+                  </m:oMath>
+                </a14:m>
+                <a:endParaRPr lang="en-US" dirty="0">
+                  <a:latin typeface="+mn-lt"/>
+                </a:endParaRPr>
+              </a:p>
+              <a:p>
+                <a:r>
+                  <a:rPr lang="en-US" dirty="0">
+                    <a:latin typeface="+mn-lt"/>
+                  </a:rPr>
+                  <a:t>Examples </a:t>
+                </a:r>
+                <a:r>
+                  <a:rPr lang="en-US">
+                    <a:latin typeface="+mn-lt"/>
+                  </a:rPr>
+                  <a:t>of transformations for Euclidean metrics </a:t>
+                </a:r>
+                <a:r>
+                  <a:rPr lang="en-US" dirty="0">
+                    <a:latin typeface="+mn-lt"/>
+                  </a:rPr>
+                  <a:t>:  </a:t>
                 </a:r>
               </a:p>
               <a:p>
@@ -29569,7 +30111,7 @@
                 <a:pPr marL="0" indent="0">
                   <a:buNone/>
                 </a:pPr>
-                <a:endParaRPr lang="en-US" dirty="0"/>
+                <a:endParaRPr lang="en-US" sz="1200" dirty="0"/>
               </a:p>
               <a:p>
                 <a:pPr marL="0" indent="0">
@@ -29777,7 +30319,7 @@
             </p:txBody>
           </p:sp>
         </mc:Choice>
-        <mc:Fallback xmlns="">
+        <mc:Fallback>
           <p:sp>
             <p:nvSpPr>
               <p:cNvPr id="3" name="Content Placeholder 2"/>
@@ -30036,15 +30578,33 @@
                                   </p:childTnLst>
                                 </p:cTn>
                               </p:par>
+                            </p:childTnLst>
+                          </p:cTn>
+                        </p:par>
+                      </p:childTnLst>
+                    </p:cTn>
+                  </p:par>
+                  <p:par>
+                    <p:cTn id="19" fill="hold">
+                      <p:stCondLst>
+                        <p:cond delay="indefinite"/>
+                      </p:stCondLst>
+                      <p:childTnLst>
+                        <p:par>
+                          <p:cTn id="20" fill="hold">
+                            <p:stCondLst>
+                              <p:cond delay="0"/>
+                            </p:stCondLst>
+                            <p:childTnLst>
                               <p:par>
-                                <p:cTn id="19" presetID="1" presetClass="entr" presetSubtype="0" fill="hold" nodeType="withEffect">
+                                <p:cTn id="21" presetID="1" presetClass="entr" presetSubtype="0" fill="hold" nodeType="clickEffect">
                                   <p:stCondLst>
                                     <p:cond delay="0"/>
                                   </p:stCondLst>
                                   <p:childTnLst>
                                     <p:set>
                                       <p:cBhvr>
-                                        <p:cTn id="20" dur="1" fill="hold">
+                                        <p:cTn id="22" dur="1" fill="hold">
                                           <p:stCondLst>
                                             <p:cond delay="0"/>
                                           </p:stCondLst>
@@ -30068,14 +30628,14 @@
                                 </p:cTn>
                               </p:par>
                               <p:par>
-                                <p:cTn id="21" presetID="1" presetClass="entr" presetSubtype="0" fill="hold" nodeType="withEffect">
+                                <p:cTn id="23" presetID="1" presetClass="entr" presetSubtype="0" fill="hold" nodeType="withEffect">
                                   <p:stCondLst>
                                     <p:cond delay="0"/>
                                   </p:stCondLst>
                                   <p:childTnLst>
                                     <p:set>
                                       <p:cBhvr>
-                                        <p:cTn id="22" dur="1" fill="hold">
+                                        <p:cTn id="24" dur="1" fill="hold">
                                           <p:stCondLst>
                                             <p:cond delay="0"/>
                                           </p:stCondLst>
@@ -30083,7 +30643,38 @@
                                         <p:tgtEl>
                                           <p:spTgt spid="3">
                                             <p:txEl>
-                                              <p:pRg st="8" end="8"/>
+                                              <p:pRg st="7" end="7"/>
+                                            </p:txEl>
+                                          </p:spTgt>
+                                        </p:tgtEl>
+                                        <p:attrNameLst>
+                                          <p:attrName>style.visibility</p:attrName>
+                                        </p:attrNameLst>
+                                      </p:cBhvr>
+                                      <p:to>
+                                        <p:strVal val="visible"/>
+                                      </p:to>
+                                    </p:set>
+                                  </p:childTnLst>
+                                </p:cTn>
+                              </p:par>
+                              <p:par>
+                                <p:cTn id="25" presetID="1" presetClass="entr" presetSubtype="0" fill="hold" nodeType="withEffect">
+                                  <p:stCondLst>
+                                    <p:cond delay="0"/>
+                                  </p:stCondLst>
+                                  <p:childTnLst>
+                                    <p:set>
+                                      <p:cBhvr>
+                                        <p:cTn id="26" dur="1" fill="hold">
+                                          <p:stCondLst>
+                                            <p:cond delay="0"/>
+                                          </p:stCondLst>
+                                        </p:cTn>
+                                        <p:tgtEl>
+                                          <p:spTgt spid="3">
+                                            <p:txEl>
+                                              <p:pRg st="9" end="9"/>
                                             </p:txEl>
                                           </p:spTgt>
                                         </p:tgtEl>
@@ -35976,8 +36567,8 @@
           </a:p>
         </p:txBody>
       </p:sp>
-      <mc:AlternateContent xmlns:mc="http://schemas.openxmlformats.org/markup-compatibility/2006" xmlns:a14="http://schemas.microsoft.com/office/drawing/2010/main">
-        <mc:Choice Requires="a14">
+      <mc:AlternateContent xmlns:mc="http://schemas.openxmlformats.org/markup-compatibility/2006">
+        <mc:Choice xmlns:a14="http://schemas.microsoft.com/office/drawing/2010/main" Requires="a14">
           <p:sp>
             <p:nvSpPr>
               <p:cNvPr id="3" name="Content Placeholder 2"/>
@@ -36056,7 +36647,7 @@
                   <a:rPr lang="en-US" dirty="0">
                     <a:latin typeface="+mn-lt"/>
                   </a:rPr>
-                  <a:t>of the differences between each case </a:t>
+                  <a:t>of the distances between each case </a:t>
                 </a:r>
                 <a:r>
                   <a:rPr lang="en-US" i="1" dirty="0">
@@ -36782,7 +37373,7 @@
             </p:txBody>
           </p:sp>
         </mc:Choice>
-        <mc:Fallback xmlns="">
+        <mc:Fallback>
           <p:sp>
             <p:nvSpPr>
               <p:cNvPr id="3" name="Content Placeholder 2"/>
@@ -36801,7 +37392,7 @@
               <a:blipFill>
                 <a:blip r:embed="rId3"/>
                 <a:stretch>
-                  <a:fillRect l="-1111" t="-1959"/>
+                  <a:fillRect l="-1111" t="-1959" r="-1693"/>
                 </a:stretch>
               </a:blipFill>
             </p:spPr>
@@ -37038,8 +37629,8 @@
           </a:p>
         </p:txBody>
       </p:sp>
-      <mc:AlternateContent xmlns:mc="http://schemas.openxmlformats.org/markup-compatibility/2006" xmlns:a14="http://schemas.microsoft.com/office/drawing/2010/main">
-        <mc:Choice Requires="a14">
+      <mc:AlternateContent xmlns:mc="http://schemas.openxmlformats.org/markup-compatibility/2006">
+        <mc:Choice xmlns:a14="http://schemas.microsoft.com/office/drawing/2010/main" Requires="a14">
           <p:sp>
             <p:nvSpPr>
               <p:cNvPr id="3" name="Content Placeholder 2"/>
@@ -37069,7 +37660,7 @@
                   <a:rPr lang="en-US" dirty="0">
                     <a:latin typeface="+mn-lt"/>
                   </a:rPr>
-                  <a:t>A dissimilarity matrix contains the differences between each case </a:t>
+                  <a:t>A dissimilarity matrix contains the distances between each case </a:t>
                 </a:r>
                 <a:r>
                   <a:rPr lang="en-US" i="1" dirty="0">
@@ -38078,7 +38669,7 @@
             </p:txBody>
           </p:sp>
         </mc:Choice>
-        <mc:Fallback xmlns="">
+        <mc:Fallback>
           <p:sp>
             <p:nvSpPr>
               <p:cNvPr id="3" name="Content Placeholder 2"/>
@@ -38097,7 +38688,7 @@
               <a:blipFill>
                 <a:blip r:embed="rId3"/>
                 <a:stretch>
-                  <a:fillRect l="-1111" t="-1876" r="-370"/>
+                  <a:fillRect l="-1111" t="-1876"/>
                 </a:stretch>
               </a:blipFill>
             </p:spPr>

</xml_diff>

<commit_message>
Corrected typos noticed in class
</commit_message>
<xml_diff>
--- a/slides/4_DistanceAndSimilarityMeasures_Part1.pptx
+++ b/slides/4_DistanceAndSimilarityMeasures_Part1.pptx
@@ -7137,8 +7137,8 @@
           </a:p>
         </p:txBody>
       </p:sp>
-      <mc:AlternateContent xmlns:mc="http://schemas.openxmlformats.org/markup-compatibility/2006">
-        <mc:Choice xmlns:a14="http://schemas.microsoft.com/office/drawing/2010/main" Requires="a14">
+      <mc:AlternateContent xmlns:mc="http://schemas.openxmlformats.org/markup-compatibility/2006" xmlns:a14="http://schemas.microsoft.com/office/drawing/2010/main">
+        <mc:Choice Requires="a14">
           <p:sp>
             <p:nvSpPr>
               <p:cNvPr id="3" name="Content Placeholder 2"/>
@@ -7516,7 +7516,7 @@
             </p:txBody>
           </p:sp>
         </mc:Choice>
-        <mc:Fallback>
+        <mc:Fallback xmlns="">
           <p:sp>
             <p:nvSpPr>
               <p:cNvPr id="3" name="Content Placeholder 2"/>
@@ -7852,8 +7852,8 @@
           </a:p>
         </p:txBody>
       </p:sp>
-      <mc:AlternateContent xmlns:mc="http://schemas.openxmlformats.org/markup-compatibility/2006">
-        <mc:Choice xmlns:a14="http://schemas.microsoft.com/office/drawing/2010/main" Requires="a14">
+      <mc:AlternateContent xmlns:mc="http://schemas.openxmlformats.org/markup-compatibility/2006" xmlns:a14="http://schemas.microsoft.com/office/drawing/2010/main">
+        <mc:Choice Requires="a14">
           <p:sp>
             <p:nvSpPr>
               <p:cNvPr id="3" name="Content Placeholder 2"/>
@@ -8318,7 +8318,7 @@
             </p:txBody>
           </p:sp>
         </mc:Choice>
-        <mc:Fallback>
+        <mc:Fallback xmlns="">
           <p:sp>
             <p:nvSpPr>
               <p:cNvPr id="3" name="Content Placeholder 2"/>
@@ -12059,7 +12059,7 @@
                   <a:rPr lang="en-US" dirty="0">
                     <a:latin typeface="+mn-lt"/>
                   </a:rPr>
-                  <a:t>Example: Consider two binary vectors:   </a:t>
+                  <a:t>Example: Consider two character vectors, strings:   </a:t>
                 </a:r>
                 <a:r>
                   <a:rPr lang="en-US" sz="2400" dirty="0">
@@ -14493,6 +14493,18 @@
                               <m:r>
                                 <a:rPr lang="en-US" b="0" i="1" smtClean="0">
                                   <a:latin typeface="Cambria Math" panose="02040503050406030204" pitchFamily="18" charset="0"/>
+                                </a:rPr>
+                                <m:t>𝑟</m:t>
+                              </m:r>
+                              <m:r>
+                                <a:rPr lang="en-US" b="0" i="1" smtClean="0">
+                                  <a:latin typeface="Cambria Math" panose="02040503050406030204" pitchFamily="18" charset="0"/>
+                                </a:rPr>
+                                <m:t> </m:t>
+                              </m:r>
+                              <m:r>
+                                <a:rPr lang="en-US" b="0" i="1" smtClean="0">
+                                  <a:latin typeface="Cambria Math" panose="02040503050406030204" pitchFamily="18" charset="0"/>
                                   <a:ea typeface="Cambria Math" panose="02040503050406030204" pitchFamily="18" charset="0"/>
                                 </a:rPr>
                                 <m:t>𝜎</m:t>
@@ -14521,13 +14533,13 @@
                         <a:rPr lang="en-US" b="0" i="1" smtClean="0">
                           <a:latin typeface="Cambria Math" panose="02040503050406030204" pitchFamily="18" charset="0"/>
                         </a:rPr>
-                        <m:t>,</m:t>
+                        <m:t>, </m:t>
                       </m:r>
                       <m:r>
                         <a:rPr lang="en-US" b="0" i="1" smtClean="0">
                           <a:latin typeface="Cambria Math" panose="02040503050406030204" pitchFamily="18" charset="0"/>
                         </a:rPr>
-                        <m:t>    </m:t>
+                        <m:t> </m:t>
                       </m:r>
                       <m:sSubSup>
                         <m:sSubSupPr>
@@ -14693,24 +14705,23 @@
                                   </m:acc>
                                 </m:e>
                                 <m:sup>
-                                  <m:r>
-                                    <a:rPr lang="en-US" b="0" i="1" smtClean="0">
-                                      <a:latin typeface="Cambria Math" panose="02040503050406030204" pitchFamily="18" charset="0"/>
-                                    </a:rPr>
-                                    <m:t>(</m:t>
-                                  </m:r>
-                                  <m:r>
-                                    <a:rPr lang="en-US" b="0" i="1" smtClean="0">
-                                      <a:latin typeface="Cambria Math" panose="02040503050406030204" pitchFamily="18" charset="0"/>
-                                    </a:rPr>
-                                    <m:t>𝑖</m:t>
-                                  </m:r>
-                                  <m:r>
-                                    <a:rPr lang="en-US" b="0" i="1" smtClean="0">
-                                      <a:latin typeface="Cambria Math" panose="02040503050406030204" pitchFamily="18" charset="0"/>
-                                    </a:rPr>
-                                    <m:t>)</m:t>
-                                  </m:r>
+                                  <m:d>
+                                    <m:dPr>
+                                      <m:ctrlPr>
+                                        <a:rPr lang="en-US" b="0" i="1" smtClean="0">
+                                          <a:latin typeface="Cambria Math" panose="02040503050406030204" pitchFamily="18" charset="0"/>
+                                        </a:rPr>
+                                      </m:ctrlPr>
+                                    </m:dPr>
+                                    <m:e>
+                                      <m:r>
+                                        <a:rPr lang="en-US" b="0" i="1" smtClean="0">
+                                          <a:latin typeface="Cambria Math" panose="02040503050406030204" pitchFamily="18" charset="0"/>
+                                        </a:rPr>
+                                        <m:t>𝑖</m:t>
+                                      </m:r>
+                                    </m:e>
+                                  </m:d>
                                 </m:sup>
                               </m:sSup>
                             </m:e>
@@ -14723,12 +14734,131 @@
                               </m:r>
                             </m:sub>
                           </m:sSub>
+                          <m:r>
+                            <a:rPr lang="en-US" b="0" i="1" smtClean="0">
+                              <a:latin typeface="Cambria Math" panose="02040503050406030204" pitchFamily="18" charset="0"/>
+                            </a:rPr>
+                            <m:t>,  </m:t>
+                          </m:r>
+                          <m:r>
+                            <a:rPr lang="en-US" b="0" i="1" smtClean="0">
+                              <a:latin typeface="Cambria Math" panose="02040503050406030204" pitchFamily="18" charset="0"/>
+                            </a:rPr>
+                            <m:t>𝑟</m:t>
+                          </m:r>
+                          <m:r>
+                            <a:rPr lang="en-US" b="0" i="1" smtClean="0">
+                              <a:latin typeface="Cambria Math" panose="02040503050406030204" pitchFamily="18" charset="0"/>
+                            </a:rPr>
+                            <m:t>=</m:t>
+                          </m:r>
+                        </m:e>
+                      </m:nary>
+                      <m:nary>
+                        <m:naryPr>
+                          <m:chr m:val="∑"/>
+                          <m:ctrlPr>
+                            <a:rPr lang="en-US" b="0" i="1" smtClean="0">
+                              <a:latin typeface="Cambria Math" panose="02040503050406030204" pitchFamily="18" charset="0"/>
+                            </a:rPr>
+                          </m:ctrlPr>
+                        </m:naryPr>
+                        <m:sub>
+                          <m:r>
+                            <m:rPr>
+                              <m:brk m:alnAt="23"/>
+                            </m:rPr>
+                            <a:rPr lang="en-US" b="0" i="1" smtClean="0">
+                              <a:latin typeface="Cambria Math" panose="02040503050406030204" pitchFamily="18" charset="0"/>
+                            </a:rPr>
+                            <m:t>𝑖</m:t>
+                          </m:r>
+                          <m:r>
+                            <a:rPr lang="en-US" b="0" i="1" smtClean="0">
+                              <a:latin typeface="Cambria Math" panose="02040503050406030204" pitchFamily="18" charset="0"/>
+                            </a:rPr>
+                            <m:t>=1</m:t>
+                          </m:r>
+                        </m:sub>
+                        <m:sup>
+                          <m:r>
+                            <a:rPr lang="en-US" b="0" i="1" smtClean="0">
+                              <a:latin typeface="Cambria Math" panose="02040503050406030204" pitchFamily="18" charset="0"/>
+                            </a:rPr>
+                            <m:t>𝑝</m:t>
+                          </m:r>
+                        </m:sup>
+                        <m:e>
+                          <m:sSubSup>
+                            <m:sSubSupPr>
+                              <m:ctrlPr>
+                                <a:rPr lang="en-US" i="1">
+                                  <a:latin typeface="Cambria Math" panose="02040503050406030204" pitchFamily="18" charset="0"/>
+                                </a:rPr>
+                              </m:ctrlPr>
+                            </m:sSubSupPr>
+                            <m:e>
+                              <m:r>
+                                <a:rPr lang="en-US" i="1">
+                                  <a:latin typeface="Cambria Math" panose="02040503050406030204" pitchFamily="18" charset="0"/>
+                                  <a:ea typeface="Cambria Math" panose="02040503050406030204" pitchFamily="18" charset="0"/>
+                                </a:rPr>
+                                <m:t>𝜎</m:t>
+                              </m:r>
+                            </m:e>
+                            <m:sub>
+                              <m:r>
+                                <a:rPr lang="en-US" i="1">
+                                  <a:latin typeface="Cambria Math" panose="02040503050406030204" pitchFamily="18" charset="0"/>
+                                </a:rPr>
+                                <m:t>𝑖</m:t>
+                              </m:r>
+                            </m:sub>
+                            <m:sup>
+                              <m:r>
+                                <a:rPr lang="en-US" i="1">
+                                  <a:latin typeface="Cambria Math" panose="02040503050406030204" pitchFamily="18" charset="0"/>
+                                </a:rPr>
+                                <m:t>2</m:t>
+                              </m:r>
+                            </m:sup>
+                          </m:sSubSup>
                         </m:e>
                       </m:nary>
                     </m:oMath>
                   </m:oMathPara>
                 </a14:m>
                 <a:endParaRPr lang="en-US" dirty="0">
+                  <a:latin typeface="+mn-lt"/>
+                </a:endParaRPr>
+              </a:p>
+              <a:p>
+                <a:pPr marL="914400" lvl="2" indent="0">
+                  <a:buNone/>
+                </a:pPr>
+                <a14:m>
+                  <m:oMath xmlns:m="http://schemas.openxmlformats.org/officeDocument/2006/math">
+                    <m:r>
+                      <a:rPr lang="en-US" sz="2400" i="1">
+                        <a:latin typeface="Cambria Math" panose="02040503050406030204" pitchFamily="18" charset="0"/>
+                      </a:rPr>
+                      <m:t>𝑟</m:t>
+                    </m:r>
+                  </m:oMath>
+                </a14:m>
+                <a:r>
+                  <a:rPr lang="en-US" sz="2400" dirty="0">
+                    <a:latin typeface="+mn-lt"/>
+                  </a:rPr>
+                  <a:t> is an optional normalization to ensure the </a:t>
+                </a:r>
+                <a:r>
+                  <a:rPr lang="en-US" sz="2400">
+                    <a:latin typeface="+mn-lt"/>
+                  </a:rPr>
+                  <a:t>weights sum to 1.0 </a:t>
+                </a:r>
+                <a:endParaRPr lang="en-US" sz="2400" dirty="0">
                   <a:latin typeface="+mn-lt"/>
                 </a:endParaRPr>
               </a:p>
@@ -14785,7 +14915,7 @@
               <a:blipFill>
                 <a:blip r:embed="rId3"/>
                 <a:stretch>
-                  <a:fillRect l="-1111" t="-2460" r="-476"/>
+                  <a:fillRect l="-1111" t="-2460" r="-476" b="-2246"/>
                 </a:stretch>
               </a:blipFill>
             </p:spPr>
@@ -14814,294 +14944,6 @@
   <p:clrMapOvr>
     <a:masterClrMapping/>
   </p:clrMapOvr>
-  <p:timing>
-    <p:tnLst>
-      <p:par>
-        <p:cTn id="1" dur="indefinite" restart="never" nodeType="tmRoot">
-          <p:childTnLst>
-            <p:seq concurrent="1" nextAc="seek">
-              <p:cTn id="2" dur="indefinite" nodeType="mainSeq">
-                <p:childTnLst>
-                  <p:par>
-                    <p:cTn id="3" fill="hold">
-                      <p:stCondLst>
-                        <p:cond delay="indefinite"/>
-                      </p:stCondLst>
-                      <p:childTnLst>
-                        <p:par>
-                          <p:cTn id="4" fill="hold">
-                            <p:stCondLst>
-                              <p:cond delay="0"/>
-                            </p:stCondLst>
-                            <p:childTnLst>
-                              <p:par>
-                                <p:cTn id="5" presetID="1" presetClass="entr" presetSubtype="0" fill="hold" nodeType="clickEffect">
-                                  <p:stCondLst>
-                                    <p:cond delay="0"/>
-                                  </p:stCondLst>
-                                  <p:childTnLst>
-                                    <p:set>
-                                      <p:cBhvr>
-                                        <p:cTn id="6" dur="1" fill="hold">
-                                          <p:stCondLst>
-                                            <p:cond delay="0"/>
-                                          </p:stCondLst>
-                                        </p:cTn>
-                                        <p:tgtEl>
-                                          <p:spTgt spid="3">
-                                            <p:txEl>
-                                              <p:pRg st="1" end="1"/>
-                                            </p:txEl>
-                                          </p:spTgt>
-                                        </p:tgtEl>
-                                        <p:attrNameLst>
-                                          <p:attrName>style.visibility</p:attrName>
-                                        </p:attrNameLst>
-                                      </p:cBhvr>
-                                      <p:to>
-                                        <p:strVal val="visible"/>
-                                      </p:to>
-                                    </p:set>
-                                  </p:childTnLst>
-                                </p:cTn>
-                              </p:par>
-                            </p:childTnLst>
-                          </p:cTn>
-                        </p:par>
-                      </p:childTnLst>
-                    </p:cTn>
-                  </p:par>
-                  <p:par>
-                    <p:cTn id="7" fill="hold">
-                      <p:stCondLst>
-                        <p:cond delay="indefinite"/>
-                      </p:stCondLst>
-                      <p:childTnLst>
-                        <p:par>
-                          <p:cTn id="8" fill="hold">
-                            <p:stCondLst>
-                              <p:cond delay="0"/>
-                            </p:stCondLst>
-                            <p:childTnLst>
-                              <p:par>
-                                <p:cTn id="9" presetID="1" presetClass="entr" presetSubtype="0" fill="hold" nodeType="clickEffect">
-                                  <p:stCondLst>
-                                    <p:cond delay="0"/>
-                                  </p:stCondLst>
-                                  <p:childTnLst>
-                                    <p:set>
-                                      <p:cBhvr>
-                                        <p:cTn id="10" dur="1" fill="hold">
-                                          <p:stCondLst>
-                                            <p:cond delay="0"/>
-                                          </p:stCondLst>
-                                        </p:cTn>
-                                        <p:tgtEl>
-                                          <p:spTgt spid="3">
-                                            <p:txEl>
-                                              <p:pRg st="2" end="2"/>
-                                            </p:txEl>
-                                          </p:spTgt>
-                                        </p:tgtEl>
-                                        <p:attrNameLst>
-                                          <p:attrName>style.visibility</p:attrName>
-                                        </p:attrNameLst>
-                                      </p:cBhvr>
-                                      <p:to>
-                                        <p:strVal val="visible"/>
-                                      </p:to>
-                                    </p:set>
-                                  </p:childTnLst>
-                                </p:cTn>
-                              </p:par>
-                            </p:childTnLst>
-                          </p:cTn>
-                        </p:par>
-                      </p:childTnLst>
-                    </p:cTn>
-                  </p:par>
-                  <p:par>
-                    <p:cTn id="11" fill="hold">
-                      <p:stCondLst>
-                        <p:cond delay="indefinite"/>
-                      </p:stCondLst>
-                      <p:childTnLst>
-                        <p:par>
-                          <p:cTn id="12" fill="hold">
-                            <p:stCondLst>
-                              <p:cond delay="0"/>
-                            </p:stCondLst>
-                            <p:childTnLst>
-                              <p:par>
-                                <p:cTn id="13" presetID="1" presetClass="entr" presetSubtype="0" fill="hold" nodeType="clickEffect">
-                                  <p:stCondLst>
-                                    <p:cond delay="0"/>
-                                  </p:stCondLst>
-                                  <p:childTnLst>
-                                    <p:set>
-                                      <p:cBhvr>
-                                        <p:cTn id="14" dur="1" fill="hold">
-                                          <p:stCondLst>
-                                            <p:cond delay="0"/>
-                                          </p:stCondLst>
-                                        </p:cTn>
-                                        <p:tgtEl>
-                                          <p:spTgt spid="3">
-                                            <p:txEl>
-                                              <p:pRg st="3" end="3"/>
-                                            </p:txEl>
-                                          </p:spTgt>
-                                        </p:tgtEl>
-                                        <p:attrNameLst>
-                                          <p:attrName>style.visibility</p:attrName>
-                                        </p:attrNameLst>
-                                      </p:cBhvr>
-                                      <p:to>
-                                        <p:strVal val="visible"/>
-                                      </p:to>
-                                    </p:set>
-                                  </p:childTnLst>
-                                </p:cTn>
-                              </p:par>
-                              <p:par>
-                                <p:cTn id="15" presetID="1" presetClass="entr" presetSubtype="0" fill="hold" nodeType="withEffect">
-                                  <p:stCondLst>
-                                    <p:cond delay="0"/>
-                                  </p:stCondLst>
-                                  <p:childTnLst>
-                                    <p:set>
-                                      <p:cBhvr>
-                                        <p:cTn id="16" dur="1" fill="hold">
-                                          <p:stCondLst>
-                                            <p:cond delay="0"/>
-                                          </p:stCondLst>
-                                        </p:cTn>
-                                        <p:tgtEl>
-                                          <p:spTgt spid="3">
-                                            <p:txEl>
-                                              <p:pRg st="4" end="4"/>
-                                            </p:txEl>
-                                          </p:spTgt>
-                                        </p:tgtEl>
-                                        <p:attrNameLst>
-                                          <p:attrName>style.visibility</p:attrName>
-                                        </p:attrNameLst>
-                                      </p:cBhvr>
-                                      <p:to>
-                                        <p:strVal val="visible"/>
-                                      </p:to>
-                                    </p:set>
-                                  </p:childTnLst>
-                                </p:cTn>
-                              </p:par>
-                            </p:childTnLst>
-                          </p:cTn>
-                        </p:par>
-                      </p:childTnLst>
-                    </p:cTn>
-                  </p:par>
-                  <p:par>
-                    <p:cTn id="17" fill="hold">
-                      <p:stCondLst>
-                        <p:cond delay="indefinite"/>
-                      </p:stCondLst>
-                      <p:childTnLst>
-                        <p:par>
-                          <p:cTn id="18" fill="hold">
-                            <p:stCondLst>
-                              <p:cond delay="0"/>
-                            </p:stCondLst>
-                            <p:childTnLst>
-                              <p:par>
-                                <p:cTn id="19" presetID="1" presetClass="entr" presetSubtype="0" fill="hold" nodeType="clickEffect">
-                                  <p:stCondLst>
-                                    <p:cond delay="0"/>
-                                  </p:stCondLst>
-                                  <p:childTnLst>
-                                    <p:set>
-                                      <p:cBhvr>
-                                        <p:cTn id="20" dur="1" fill="hold">
-                                          <p:stCondLst>
-                                            <p:cond delay="0"/>
-                                          </p:stCondLst>
-                                        </p:cTn>
-                                        <p:tgtEl>
-                                          <p:spTgt spid="3">
-                                            <p:txEl>
-                                              <p:pRg st="5" end="5"/>
-                                            </p:txEl>
-                                          </p:spTgt>
-                                        </p:tgtEl>
-                                        <p:attrNameLst>
-                                          <p:attrName>style.visibility</p:attrName>
-                                        </p:attrNameLst>
-                                      </p:cBhvr>
-                                      <p:to>
-                                        <p:strVal val="visible"/>
-                                      </p:to>
-                                    </p:set>
-                                  </p:childTnLst>
-                                </p:cTn>
-                              </p:par>
-                              <p:par>
-                                <p:cTn id="21" presetID="1" presetClass="entr" presetSubtype="0" fill="hold" nodeType="withEffect">
-                                  <p:stCondLst>
-                                    <p:cond delay="0"/>
-                                  </p:stCondLst>
-                                  <p:childTnLst>
-                                    <p:set>
-                                      <p:cBhvr>
-                                        <p:cTn id="22" dur="1" fill="hold">
-                                          <p:stCondLst>
-                                            <p:cond delay="0"/>
-                                          </p:stCondLst>
-                                        </p:cTn>
-                                        <p:tgtEl>
-                                          <p:spTgt spid="3">
-                                            <p:txEl>
-                                              <p:pRg st="6" end="6"/>
-                                            </p:txEl>
-                                          </p:spTgt>
-                                        </p:tgtEl>
-                                        <p:attrNameLst>
-                                          <p:attrName>style.visibility</p:attrName>
-                                        </p:attrNameLst>
-                                      </p:cBhvr>
-                                      <p:to>
-                                        <p:strVal val="visible"/>
-                                      </p:to>
-                                    </p:set>
-                                  </p:childTnLst>
-                                </p:cTn>
-                              </p:par>
-                            </p:childTnLst>
-                          </p:cTn>
-                        </p:par>
-                      </p:childTnLst>
-                    </p:cTn>
-                  </p:par>
-                </p:childTnLst>
-              </p:cTn>
-              <p:prevCondLst>
-                <p:cond evt="onPrev" delay="0">
-                  <p:tgtEl>
-                    <p:sldTgt/>
-                  </p:tgtEl>
-                </p:cond>
-              </p:prevCondLst>
-              <p:nextCondLst>
-                <p:cond evt="onNext" delay="0">
-                  <p:tgtEl>
-                    <p:sldTgt/>
-                  </p:tgtEl>
-                </p:cond>
-              </p:nextCondLst>
-            </p:seq>
-          </p:childTnLst>
-        </p:cTn>
-      </p:par>
-    </p:tnLst>
-  </p:timing>
 </p:sld>
 </file>
 
@@ -27427,8 +27269,8 @@
           </a:p>
         </p:txBody>
       </p:sp>
-      <mc:AlternateContent xmlns:mc="http://schemas.openxmlformats.org/markup-compatibility/2006">
-        <mc:Choice xmlns:a14="http://schemas.microsoft.com/office/drawing/2010/main" Requires="a14">
+      <mc:AlternateContent xmlns:mc="http://schemas.openxmlformats.org/markup-compatibility/2006" xmlns:a14="http://schemas.microsoft.com/office/drawing/2010/main">
+        <mc:Choice Requires="a14">
           <p:graphicFrame>
             <p:nvGraphicFramePr>
               <p:cNvPr id="5" name="Table 5">
@@ -28733,7 +28575,7 @@
             </a:graphic>
           </p:graphicFrame>
         </mc:Choice>
-        <mc:Fallback>
+        <mc:Fallback xmlns="">
           <p:graphicFrame>
             <p:nvGraphicFramePr>
               <p:cNvPr id="5" name="Table 5">
@@ -29816,8 +29658,8 @@
           </a:p>
         </p:txBody>
       </p:sp>
-      <mc:AlternateContent xmlns:mc="http://schemas.openxmlformats.org/markup-compatibility/2006">
-        <mc:Choice xmlns:a14="http://schemas.microsoft.com/office/drawing/2010/main" Requires="a14">
+      <mc:AlternateContent xmlns:mc="http://schemas.openxmlformats.org/markup-compatibility/2006" xmlns:a14="http://schemas.microsoft.com/office/drawing/2010/main">
+        <mc:Choice Requires="a14">
           <p:sp>
             <p:nvSpPr>
               <p:cNvPr id="3" name="Content Placeholder 2"/>
@@ -30319,7 +30161,7 @@
             </p:txBody>
           </p:sp>
         </mc:Choice>
-        <mc:Fallback>
+        <mc:Fallback xmlns="">
           <p:sp>
             <p:nvSpPr>
               <p:cNvPr id="3" name="Content Placeholder 2"/>
@@ -36567,8 +36409,8 @@
           </a:p>
         </p:txBody>
       </p:sp>
-      <mc:AlternateContent xmlns:mc="http://schemas.openxmlformats.org/markup-compatibility/2006">
-        <mc:Choice xmlns:a14="http://schemas.microsoft.com/office/drawing/2010/main" Requires="a14">
+      <mc:AlternateContent xmlns:mc="http://schemas.openxmlformats.org/markup-compatibility/2006" xmlns:a14="http://schemas.microsoft.com/office/drawing/2010/main">
+        <mc:Choice Requires="a14">
           <p:sp>
             <p:nvSpPr>
               <p:cNvPr id="3" name="Content Placeholder 2"/>
@@ -37373,7 +37215,7 @@
             </p:txBody>
           </p:sp>
         </mc:Choice>
-        <mc:Fallback>
+        <mc:Fallback xmlns="">
           <p:sp>
             <p:nvSpPr>
               <p:cNvPr id="3" name="Content Placeholder 2"/>
@@ -37629,8 +37471,8 @@
           </a:p>
         </p:txBody>
       </p:sp>
-      <mc:AlternateContent xmlns:mc="http://schemas.openxmlformats.org/markup-compatibility/2006">
-        <mc:Choice xmlns:a14="http://schemas.microsoft.com/office/drawing/2010/main" Requires="a14">
+      <mc:AlternateContent xmlns:mc="http://schemas.openxmlformats.org/markup-compatibility/2006" xmlns:a14="http://schemas.microsoft.com/office/drawing/2010/main">
+        <mc:Choice Requires="a14">
           <p:sp>
             <p:nvSpPr>
               <p:cNvPr id="3" name="Content Placeholder 2"/>
@@ -38669,7 +38511,7 @@
             </p:txBody>
           </p:sp>
         </mc:Choice>
-        <mc:Fallback>
+        <mc:Fallback xmlns="">
           <p:sp>
             <p:nvSpPr>
               <p:cNvPr id="3" name="Content Placeholder 2"/>
@@ -40058,8 +39900,8 @@
           </a:p>
         </p:txBody>
       </p:sp>
-      <mc:AlternateContent xmlns:mc="http://schemas.openxmlformats.org/markup-compatibility/2006" xmlns:a14="http://schemas.microsoft.com/office/drawing/2010/main">
-        <mc:Choice Requires="a14">
+      <mc:AlternateContent xmlns:mc="http://schemas.openxmlformats.org/markup-compatibility/2006">
+        <mc:Choice xmlns:a14="http://schemas.microsoft.com/office/drawing/2010/main" Requires="a14">
           <p:sp>
             <p:nvSpPr>
               <p:cNvPr id="3" name="Content Placeholder 2"/>
@@ -40322,12 +40164,31 @@
                                       </m:ctrlPr>
                                     </m:sSubPr>
                                     <m:e>
-                                      <m:r>
-                                        <a:rPr lang="en-US" i="1">
-                                          <a:latin typeface="Cambria Math" panose="02040503050406030204" pitchFamily="18" charset="0"/>
-                                        </a:rPr>
-                                        <m:t>𝑥</m:t>
-                                      </m:r>
+                                      <m:sSub>
+                                        <m:sSubPr>
+                                          <m:ctrlPr>
+                                            <a:rPr lang="en-US" i="1" smtClean="0">
+                                              <a:latin typeface="Cambria Math" panose="02040503050406030204" pitchFamily="18" charset="0"/>
+                                            </a:rPr>
+                                          </m:ctrlPr>
+                                        </m:sSubPr>
+                                        <m:e>
+                                          <m:r>
+                                            <a:rPr lang="en-US" b="0" i="1" smtClean="0">
+                                              <a:latin typeface="Cambria Math" panose="02040503050406030204" pitchFamily="18" charset="0"/>
+                                            </a:rPr>
+                                            <m:t>𝑥</m:t>
+                                          </m:r>
+                                        </m:e>
+                                        <m:sub>
+                                          <m:r>
+                                            <a:rPr lang="en-US" b="0" i="1" smtClean="0">
+                                              <a:latin typeface="Cambria Math" panose="02040503050406030204" pitchFamily="18" charset="0"/>
+                                            </a:rPr>
+                                            <m:t>𝑖</m:t>
+                                          </m:r>
+                                        </m:sub>
+                                      </m:sSub>
                                       <m:r>
                                         <a:rPr lang="en-US" i="1">
                                           <a:latin typeface="Cambria Math" panose="02040503050406030204" pitchFamily="18" charset="0"/>
@@ -40626,12 +40487,31 @@
                                   </m:ctrlPr>
                                 </m:sSubPr>
                                 <m:e>
-                                  <m:r>
-                                    <a:rPr lang="en-US" b="0" i="1" smtClean="0">
-                                      <a:latin typeface="Cambria Math" panose="02040503050406030204" pitchFamily="18" charset="0"/>
-                                    </a:rPr>
-                                    <m:t>𝑥</m:t>
-                                  </m:r>
+                                  <m:sSub>
+                                    <m:sSubPr>
+                                      <m:ctrlPr>
+                                        <a:rPr lang="en-US" i="1">
+                                          <a:latin typeface="Cambria Math" panose="02040503050406030204" pitchFamily="18" charset="0"/>
+                                        </a:rPr>
+                                      </m:ctrlPr>
+                                    </m:sSubPr>
+                                    <m:e>
+                                      <m:r>
+                                        <a:rPr lang="en-US" i="1">
+                                          <a:latin typeface="Cambria Math" panose="02040503050406030204" pitchFamily="18" charset="0"/>
+                                        </a:rPr>
+                                        <m:t>𝑥</m:t>
+                                      </m:r>
+                                    </m:e>
+                                    <m:sub>
+                                      <m:r>
+                                        <a:rPr lang="en-US" i="1">
+                                          <a:latin typeface="Cambria Math" panose="02040503050406030204" pitchFamily="18" charset="0"/>
+                                        </a:rPr>
+                                        <m:t>𝑖</m:t>
+                                      </m:r>
+                                    </m:sub>
+                                  </m:sSub>
                                   <m:r>
                                     <a:rPr lang="en-US" b="0" i="1" smtClean="0">
                                       <a:latin typeface="Cambria Math" panose="02040503050406030204" pitchFamily="18" charset="0"/>
@@ -40914,12 +40794,31 @@
                                   </m:ctrlPr>
                                 </m:sSubPr>
                                 <m:e>
-                                  <m:r>
-                                    <a:rPr lang="en-US" b="0" i="1" smtClean="0">
-                                      <a:latin typeface="Cambria Math" panose="02040503050406030204" pitchFamily="18" charset="0"/>
-                                    </a:rPr>
-                                    <m:t>𝑥</m:t>
-                                  </m:r>
+                                  <m:sSub>
+                                    <m:sSubPr>
+                                      <m:ctrlPr>
+                                        <a:rPr lang="en-US" i="1">
+                                          <a:latin typeface="Cambria Math" panose="02040503050406030204" pitchFamily="18" charset="0"/>
+                                        </a:rPr>
+                                      </m:ctrlPr>
+                                    </m:sSubPr>
+                                    <m:e>
+                                      <m:r>
+                                        <a:rPr lang="en-US" i="1">
+                                          <a:latin typeface="Cambria Math" panose="02040503050406030204" pitchFamily="18" charset="0"/>
+                                        </a:rPr>
+                                        <m:t>𝑥</m:t>
+                                      </m:r>
+                                    </m:e>
+                                    <m:sub>
+                                      <m:r>
+                                        <a:rPr lang="en-US" i="1">
+                                          <a:latin typeface="Cambria Math" panose="02040503050406030204" pitchFamily="18" charset="0"/>
+                                        </a:rPr>
+                                        <m:t>𝑖</m:t>
+                                      </m:r>
+                                    </m:sub>
+                                  </m:sSub>
                                   <m:r>
                                     <a:rPr lang="en-US" b="0" i="1" smtClean="0">
                                       <a:latin typeface="Cambria Math" panose="02040503050406030204" pitchFamily="18" charset="0"/>
@@ -40948,7 +40847,7 @@
             </p:txBody>
           </p:sp>
         </mc:Choice>
-        <mc:Fallback xmlns="">
+        <mc:Fallback>
           <p:sp>
             <p:nvSpPr>
               <p:cNvPr id="3" name="Content Placeholder 2"/>
@@ -40996,276 +40895,6 @@
   <p:clrMapOvr>
     <a:masterClrMapping/>
   </p:clrMapOvr>
-  <p:timing>
-    <p:tnLst>
-      <p:par>
-        <p:cTn id="1" dur="indefinite" restart="never" nodeType="tmRoot">
-          <p:childTnLst>
-            <p:seq concurrent="1" nextAc="seek">
-              <p:cTn id="2" dur="indefinite" nodeType="mainSeq">
-                <p:childTnLst>
-                  <p:par>
-                    <p:cTn id="3" fill="hold">
-                      <p:stCondLst>
-                        <p:cond delay="indefinite"/>
-                      </p:stCondLst>
-                      <p:childTnLst>
-                        <p:par>
-                          <p:cTn id="4" fill="hold">
-                            <p:stCondLst>
-                              <p:cond delay="0"/>
-                            </p:stCondLst>
-                            <p:childTnLst>
-                              <p:par>
-                                <p:cTn id="5" presetID="1" presetClass="entr" presetSubtype="0" fill="hold" nodeType="clickEffect">
-                                  <p:stCondLst>
-                                    <p:cond delay="0"/>
-                                  </p:stCondLst>
-                                  <p:childTnLst>
-                                    <p:set>
-                                      <p:cBhvr>
-                                        <p:cTn id="6" dur="1" fill="hold">
-                                          <p:stCondLst>
-                                            <p:cond delay="0"/>
-                                          </p:stCondLst>
-                                        </p:cTn>
-                                        <p:tgtEl>
-                                          <p:spTgt spid="3">
-                                            <p:txEl>
-                                              <p:pRg st="1" end="1"/>
-                                            </p:txEl>
-                                          </p:spTgt>
-                                        </p:tgtEl>
-                                        <p:attrNameLst>
-                                          <p:attrName>style.visibility</p:attrName>
-                                        </p:attrNameLst>
-                                      </p:cBhvr>
-                                      <p:to>
-                                        <p:strVal val="visible"/>
-                                      </p:to>
-                                    </p:set>
-                                  </p:childTnLst>
-                                </p:cTn>
-                              </p:par>
-                              <p:par>
-                                <p:cTn id="7" presetID="1" presetClass="entr" presetSubtype="0" fill="hold" nodeType="withEffect">
-                                  <p:stCondLst>
-                                    <p:cond delay="0"/>
-                                  </p:stCondLst>
-                                  <p:childTnLst>
-                                    <p:set>
-                                      <p:cBhvr>
-                                        <p:cTn id="8" dur="1" fill="hold">
-                                          <p:stCondLst>
-                                            <p:cond delay="0"/>
-                                          </p:stCondLst>
-                                        </p:cTn>
-                                        <p:tgtEl>
-                                          <p:spTgt spid="3">
-                                            <p:txEl>
-                                              <p:pRg st="2" end="2"/>
-                                            </p:txEl>
-                                          </p:spTgt>
-                                        </p:tgtEl>
-                                        <p:attrNameLst>
-                                          <p:attrName>style.visibility</p:attrName>
-                                        </p:attrNameLst>
-                                      </p:cBhvr>
-                                      <p:to>
-                                        <p:strVal val="visible"/>
-                                      </p:to>
-                                    </p:set>
-                                  </p:childTnLst>
-                                </p:cTn>
-                              </p:par>
-                            </p:childTnLst>
-                          </p:cTn>
-                        </p:par>
-                      </p:childTnLst>
-                    </p:cTn>
-                  </p:par>
-                  <p:par>
-                    <p:cTn id="9" fill="hold">
-                      <p:stCondLst>
-                        <p:cond delay="indefinite"/>
-                      </p:stCondLst>
-                      <p:childTnLst>
-                        <p:par>
-                          <p:cTn id="10" fill="hold">
-                            <p:stCondLst>
-                              <p:cond delay="0"/>
-                            </p:stCondLst>
-                            <p:childTnLst>
-                              <p:par>
-                                <p:cTn id="11" presetID="1" presetClass="entr" presetSubtype="0" fill="hold" nodeType="clickEffect">
-                                  <p:stCondLst>
-                                    <p:cond delay="0"/>
-                                  </p:stCondLst>
-                                  <p:childTnLst>
-                                    <p:set>
-                                      <p:cBhvr>
-                                        <p:cTn id="12" dur="1" fill="hold">
-                                          <p:stCondLst>
-                                            <p:cond delay="0"/>
-                                          </p:stCondLst>
-                                        </p:cTn>
-                                        <p:tgtEl>
-                                          <p:spTgt spid="3">
-                                            <p:txEl>
-                                              <p:pRg st="3" end="3"/>
-                                            </p:txEl>
-                                          </p:spTgt>
-                                        </p:tgtEl>
-                                        <p:attrNameLst>
-                                          <p:attrName>style.visibility</p:attrName>
-                                        </p:attrNameLst>
-                                      </p:cBhvr>
-                                      <p:to>
-                                        <p:strVal val="visible"/>
-                                      </p:to>
-                                    </p:set>
-                                  </p:childTnLst>
-                                </p:cTn>
-                              </p:par>
-                              <p:par>
-                                <p:cTn id="13" presetID="1" presetClass="entr" presetSubtype="0" fill="hold" nodeType="withEffect">
-                                  <p:stCondLst>
-                                    <p:cond delay="0"/>
-                                  </p:stCondLst>
-                                  <p:childTnLst>
-                                    <p:set>
-                                      <p:cBhvr>
-                                        <p:cTn id="14" dur="1" fill="hold">
-                                          <p:stCondLst>
-                                            <p:cond delay="0"/>
-                                          </p:stCondLst>
-                                        </p:cTn>
-                                        <p:tgtEl>
-                                          <p:spTgt spid="3">
-                                            <p:txEl>
-                                              <p:pRg st="4" end="4"/>
-                                            </p:txEl>
-                                          </p:spTgt>
-                                        </p:tgtEl>
-                                        <p:attrNameLst>
-                                          <p:attrName>style.visibility</p:attrName>
-                                        </p:attrNameLst>
-                                      </p:cBhvr>
-                                      <p:to>
-                                        <p:strVal val="visible"/>
-                                      </p:to>
-                                    </p:set>
-                                  </p:childTnLst>
-                                </p:cTn>
-                              </p:par>
-                            </p:childTnLst>
-                          </p:cTn>
-                        </p:par>
-                      </p:childTnLst>
-                    </p:cTn>
-                  </p:par>
-                  <p:par>
-                    <p:cTn id="15" fill="hold">
-                      <p:stCondLst>
-                        <p:cond delay="indefinite"/>
-                      </p:stCondLst>
-                      <p:childTnLst>
-                        <p:par>
-                          <p:cTn id="16" fill="hold">
-                            <p:stCondLst>
-                              <p:cond delay="0"/>
-                            </p:stCondLst>
-                            <p:childTnLst>
-                              <p:par>
-                                <p:cTn id="17" presetID="1" presetClass="entr" presetSubtype="0" fill="hold" nodeType="clickEffect">
-                                  <p:stCondLst>
-                                    <p:cond delay="0"/>
-                                  </p:stCondLst>
-                                  <p:childTnLst>
-                                    <p:set>
-                                      <p:cBhvr>
-                                        <p:cTn id="18" dur="1" fill="hold">
-                                          <p:stCondLst>
-                                            <p:cond delay="0"/>
-                                          </p:stCondLst>
-                                        </p:cTn>
-                                        <p:tgtEl>
-                                          <p:spTgt spid="3">
-                                            <p:txEl>
-                                              <p:pRg st="5" end="5"/>
-                                            </p:txEl>
-                                          </p:spTgt>
-                                        </p:tgtEl>
-                                        <p:attrNameLst>
-                                          <p:attrName>style.visibility</p:attrName>
-                                        </p:attrNameLst>
-                                      </p:cBhvr>
-                                      <p:to>
-                                        <p:strVal val="visible"/>
-                                      </p:to>
-                                    </p:set>
-                                  </p:childTnLst>
-                                </p:cTn>
-                              </p:par>
-                              <p:par>
-                                <p:cTn id="19" presetID="1" presetClass="entr" presetSubtype="0" fill="hold" nodeType="withEffect">
-                                  <p:stCondLst>
-                                    <p:cond delay="0"/>
-                                  </p:stCondLst>
-                                  <p:childTnLst>
-                                    <p:set>
-                                      <p:cBhvr>
-                                        <p:cTn id="20" dur="1" fill="hold">
-                                          <p:stCondLst>
-                                            <p:cond delay="0"/>
-                                          </p:stCondLst>
-                                        </p:cTn>
-                                        <p:tgtEl>
-                                          <p:spTgt spid="3">
-                                            <p:txEl>
-                                              <p:pRg st="6" end="6"/>
-                                            </p:txEl>
-                                          </p:spTgt>
-                                        </p:tgtEl>
-                                        <p:attrNameLst>
-                                          <p:attrName>style.visibility</p:attrName>
-                                        </p:attrNameLst>
-                                      </p:cBhvr>
-                                      <p:to>
-                                        <p:strVal val="visible"/>
-                                      </p:to>
-                                    </p:set>
-                                  </p:childTnLst>
-                                </p:cTn>
-                              </p:par>
-                            </p:childTnLst>
-                          </p:cTn>
-                        </p:par>
-                      </p:childTnLst>
-                    </p:cTn>
-                  </p:par>
-                </p:childTnLst>
-              </p:cTn>
-              <p:prevCondLst>
-                <p:cond evt="onPrev" delay="0">
-                  <p:tgtEl>
-                    <p:sldTgt/>
-                  </p:tgtEl>
-                </p:cond>
-              </p:prevCondLst>
-              <p:nextCondLst>
-                <p:cond evt="onNext" delay="0">
-                  <p:tgtEl>
-                    <p:sldTgt/>
-                  </p:tgtEl>
-                </p:cond>
-              </p:nextCondLst>
-            </p:seq>
-          </p:childTnLst>
-        </p:cTn>
-      </p:par>
-    </p:tnLst>
-  </p:timing>
 </p:sld>
 </file>
 

</xml_diff>